<commit_message>
amended some functions to make task slightly faster. Fixed bugs. Task should run without error now, only to do is fMRI compatibility and responsebox reading
</commit_message>
<xml_diff>
--- a/task/stimuli/originals_SAP_Task.pptx
+++ b/task/stimuli/originals_SAP_Task.pptx
@@ -303,7 +303,7 @@
           <a:p>
             <a:fld id="{9B916260-F45C-B647-88A4-C91F6BA5DC4E}" type="datetimeFigureOut">
               <a:rPr lang="en-CH" smtClean="0"/>
-              <a:t>25.07.24</a:t>
+              <a:t>20.09.24</a:t>
             </a:fld>
             <a:endParaRPr lang="en-CH"/>
           </a:p>
@@ -503,7 +503,7 @@
           <a:p>
             <a:fld id="{9B916260-F45C-B647-88A4-C91F6BA5DC4E}" type="datetimeFigureOut">
               <a:rPr lang="en-CH" smtClean="0"/>
-              <a:t>25.07.24</a:t>
+              <a:t>20.09.24</a:t>
             </a:fld>
             <a:endParaRPr lang="en-CH"/>
           </a:p>
@@ -713,7 +713,7 @@
           <a:p>
             <a:fld id="{9B916260-F45C-B647-88A4-C91F6BA5DC4E}" type="datetimeFigureOut">
               <a:rPr lang="en-CH" smtClean="0"/>
-              <a:t>25.07.24</a:t>
+              <a:t>20.09.24</a:t>
             </a:fld>
             <a:endParaRPr lang="en-CH"/>
           </a:p>
@@ -913,7 +913,7 @@
           <a:p>
             <a:fld id="{9B916260-F45C-B647-88A4-C91F6BA5DC4E}" type="datetimeFigureOut">
               <a:rPr lang="en-CH" smtClean="0"/>
-              <a:t>25.07.24</a:t>
+              <a:t>20.09.24</a:t>
             </a:fld>
             <a:endParaRPr lang="en-CH"/>
           </a:p>
@@ -1189,7 +1189,7 @@
           <a:p>
             <a:fld id="{9B916260-F45C-B647-88A4-C91F6BA5DC4E}" type="datetimeFigureOut">
               <a:rPr lang="en-CH" smtClean="0"/>
-              <a:t>25.07.24</a:t>
+              <a:t>20.09.24</a:t>
             </a:fld>
             <a:endParaRPr lang="en-CH"/>
           </a:p>
@@ -1457,7 +1457,7 @@
           <a:p>
             <a:fld id="{9B916260-F45C-B647-88A4-C91F6BA5DC4E}" type="datetimeFigureOut">
               <a:rPr lang="en-CH" smtClean="0"/>
-              <a:t>25.07.24</a:t>
+              <a:t>20.09.24</a:t>
             </a:fld>
             <a:endParaRPr lang="en-CH"/>
           </a:p>
@@ -1872,7 +1872,7 @@
           <a:p>
             <a:fld id="{9B916260-F45C-B647-88A4-C91F6BA5DC4E}" type="datetimeFigureOut">
               <a:rPr lang="en-CH" smtClean="0"/>
-              <a:t>25.07.24</a:t>
+              <a:t>20.09.24</a:t>
             </a:fld>
             <a:endParaRPr lang="en-CH"/>
           </a:p>
@@ -2014,7 +2014,7 @@
           <a:p>
             <a:fld id="{9B916260-F45C-B647-88A4-C91F6BA5DC4E}" type="datetimeFigureOut">
               <a:rPr lang="en-CH" smtClean="0"/>
-              <a:t>25.07.24</a:t>
+              <a:t>20.09.24</a:t>
             </a:fld>
             <a:endParaRPr lang="en-CH"/>
           </a:p>
@@ -2127,7 +2127,7 @@
           <a:p>
             <a:fld id="{9B916260-F45C-B647-88A4-C91F6BA5DC4E}" type="datetimeFigureOut">
               <a:rPr lang="en-CH" smtClean="0"/>
-              <a:t>25.07.24</a:t>
+              <a:t>20.09.24</a:t>
             </a:fld>
             <a:endParaRPr lang="en-CH"/>
           </a:p>
@@ -2440,7 +2440,7 @@
           <a:p>
             <a:fld id="{9B916260-F45C-B647-88A4-C91F6BA5DC4E}" type="datetimeFigureOut">
               <a:rPr lang="en-CH" smtClean="0"/>
-              <a:t>25.07.24</a:t>
+              <a:t>20.09.24</a:t>
             </a:fld>
             <a:endParaRPr lang="en-CH"/>
           </a:p>
@@ -2729,7 +2729,7 @@
           <a:p>
             <a:fld id="{9B916260-F45C-B647-88A4-C91F6BA5DC4E}" type="datetimeFigureOut">
               <a:rPr lang="en-CH" smtClean="0"/>
-              <a:t>25.07.24</a:t>
+              <a:t>20.09.24</a:t>
             </a:fld>
             <a:endParaRPr lang="en-CH"/>
           </a:p>
@@ -2972,7 +2972,7 @@
           <a:p>
             <a:fld id="{9B916260-F45C-B647-88A4-C91F6BA5DC4E}" type="datetimeFigureOut">
               <a:rPr lang="en-CH" smtClean="0"/>
-              <a:t>25.07.24</a:t>
+              <a:t>20.09.24</a:t>
             </a:fld>
             <a:endParaRPr lang="en-CH"/>
           </a:p>
@@ -5099,7 +5099,7 @@
                 <a:latin typeface="Arial" panose="020B0604020202020204" pitchFamily="34" charset="0"/>
                 <a:cs typeface="Arial" panose="020B0604020202020204" pitchFamily="34" charset="0"/>
               </a:rPr>
-              <a:t> face smiles or you stay neutral – the face stays neutral) you earn a point. If you collect 70 points you get an additional bonus of AUD 5, if you colledt 120 points you get a bonus of AUD 10.</a:t>
+              <a:t> face smiles or you stay neutral – the face stays neutral) you earn a point. If you collect 20 points you get an additional bonus of AUD 5, if you collect 40 points you get a bonus of AUD 10.</a:t>
             </a:r>
           </a:p>
           <a:p>
@@ -5124,7 +5124,7 @@
                 <a:latin typeface="Arial" panose="020B0604020202020204" pitchFamily="34" charset="0"/>
                 <a:cs typeface="Arial" panose="020B0604020202020204" pitchFamily="34" charset="0"/>
               </a:rPr>
-              <a:t>The task is going to take ca. 15 minutes. </a:t>
+              <a:t>The task is going to take ca. 20 minutes. </a:t>
             </a:r>
           </a:p>
         </p:txBody>

</xml_diff>

<commit_message>
updated stimuli and deleted suberfluous images in folders
</commit_message>
<xml_diff>
--- a/task/stimuli/originals_SAP_Task.pptx
+++ b/task/stimuli/originals_SAP_Task.pptx
@@ -9,30 +9,39 @@
     <p:sldId id="258" r:id="rId3"/>
     <p:sldId id="282" r:id="rId4"/>
     <p:sldId id="3497" r:id="rId5"/>
-    <p:sldId id="283" r:id="rId6"/>
-    <p:sldId id="3479" r:id="rId7"/>
-    <p:sldId id="3480" r:id="rId8"/>
-    <p:sldId id="3481" r:id="rId9"/>
-    <p:sldId id="3482" r:id="rId10"/>
-    <p:sldId id="3483" r:id="rId11"/>
-    <p:sldId id="3484" r:id="rId12"/>
-    <p:sldId id="3485" r:id="rId13"/>
-    <p:sldId id="3486" r:id="rId14"/>
-    <p:sldId id="3503" r:id="rId15"/>
-    <p:sldId id="3504" r:id="rId16"/>
-    <p:sldId id="3505" r:id="rId17"/>
-    <p:sldId id="3506" r:id="rId18"/>
-    <p:sldId id="3508" r:id="rId19"/>
-    <p:sldId id="3509" r:id="rId20"/>
-    <p:sldId id="3510" r:id="rId21"/>
-    <p:sldId id="3475" r:id="rId22"/>
-    <p:sldId id="3474" r:id="rId23"/>
-    <p:sldId id="3498" r:id="rId24"/>
-    <p:sldId id="3502" r:id="rId25"/>
-    <p:sldId id="3500" r:id="rId26"/>
-    <p:sldId id="3499" r:id="rId27"/>
-    <p:sldId id="3476" r:id="rId28"/>
-    <p:sldId id="3477" r:id="rId29"/>
+    <p:sldId id="3519" r:id="rId6"/>
+    <p:sldId id="283" r:id="rId7"/>
+    <p:sldId id="3511" r:id="rId8"/>
+    <p:sldId id="3479" r:id="rId9"/>
+    <p:sldId id="3480" r:id="rId10"/>
+    <p:sldId id="3512" r:id="rId11"/>
+    <p:sldId id="3481" r:id="rId12"/>
+    <p:sldId id="3482" r:id="rId13"/>
+    <p:sldId id="3513" r:id="rId14"/>
+    <p:sldId id="3483" r:id="rId15"/>
+    <p:sldId id="3484" r:id="rId16"/>
+    <p:sldId id="3514" r:id="rId17"/>
+    <p:sldId id="3485" r:id="rId18"/>
+    <p:sldId id="3486" r:id="rId19"/>
+    <p:sldId id="3515" r:id="rId20"/>
+    <p:sldId id="3503" r:id="rId21"/>
+    <p:sldId id="3504" r:id="rId22"/>
+    <p:sldId id="3516" r:id="rId23"/>
+    <p:sldId id="3505" r:id="rId24"/>
+    <p:sldId id="3506" r:id="rId25"/>
+    <p:sldId id="3517" r:id="rId26"/>
+    <p:sldId id="3508" r:id="rId27"/>
+    <p:sldId id="3509" r:id="rId28"/>
+    <p:sldId id="3518" r:id="rId29"/>
+    <p:sldId id="3510" r:id="rId30"/>
+    <p:sldId id="3475" r:id="rId31"/>
+    <p:sldId id="3474" r:id="rId32"/>
+    <p:sldId id="3498" r:id="rId33"/>
+    <p:sldId id="3502" r:id="rId34"/>
+    <p:sldId id="3500" r:id="rId35"/>
+    <p:sldId id="3499" r:id="rId36"/>
+    <p:sldId id="3476" r:id="rId37"/>
+    <p:sldId id="3477" r:id="rId38"/>
   </p:sldIdLst>
   <p:sldSz cx="12192000" cy="6858000"/>
   <p:notesSz cx="6858000" cy="9144000"/>
@@ -288,7 +297,7 @@
           <a:p>
             <a:fld id="{9B916260-F45C-B647-88A4-C91F6BA5DC4E}" type="datetimeFigureOut">
               <a:rPr lang="en-CH" smtClean="0"/>
-              <a:t>26.09.24</a:t>
+              <a:t>11.10.24</a:t>
             </a:fld>
             <a:endParaRPr lang="en-CH"/>
           </a:p>
@@ -488,7 +497,7 @@
           <a:p>
             <a:fld id="{9B916260-F45C-B647-88A4-C91F6BA5DC4E}" type="datetimeFigureOut">
               <a:rPr lang="en-CH" smtClean="0"/>
-              <a:t>26.09.24</a:t>
+              <a:t>11.10.24</a:t>
             </a:fld>
             <a:endParaRPr lang="en-CH"/>
           </a:p>
@@ -698,7 +707,7 @@
           <a:p>
             <a:fld id="{9B916260-F45C-B647-88A4-C91F6BA5DC4E}" type="datetimeFigureOut">
               <a:rPr lang="en-CH" smtClean="0"/>
-              <a:t>26.09.24</a:t>
+              <a:t>11.10.24</a:t>
             </a:fld>
             <a:endParaRPr lang="en-CH"/>
           </a:p>
@@ -898,7 +907,7 @@
           <a:p>
             <a:fld id="{9B916260-F45C-B647-88A4-C91F6BA5DC4E}" type="datetimeFigureOut">
               <a:rPr lang="en-CH" smtClean="0"/>
-              <a:t>26.09.24</a:t>
+              <a:t>11.10.24</a:t>
             </a:fld>
             <a:endParaRPr lang="en-CH"/>
           </a:p>
@@ -1174,7 +1183,7 @@
           <a:p>
             <a:fld id="{9B916260-F45C-B647-88A4-C91F6BA5DC4E}" type="datetimeFigureOut">
               <a:rPr lang="en-CH" smtClean="0"/>
-              <a:t>26.09.24</a:t>
+              <a:t>11.10.24</a:t>
             </a:fld>
             <a:endParaRPr lang="en-CH"/>
           </a:p>
@@ -1442,7 +1451,7 @@
           <a:p>
             <a:fld id="{9B916260-F45C-B647-88A4-C91F6BA5DC4E}" type="datetimeFigureOut">
               <a:rPr lang="en-CH" smtClean="0"/>
-              <a:t>26.09.24</a:t>
+              <a:t>11.10.24</a:t>
             </a:fld>
             <a:endParaRPr lang="en-CH"/>
           </a:p>
@@ -1857,7 +1866,7 @@
           <a:p>
             <a:fld id="{9B916260-F45C-B647-88A4-C91F6BA5DC4E}" type="datetimeFigureOut">
               <a:rPr lang="en-CH" smtClean="0"/>
-              <a:t>26.09.24</a:t>
+              <a:t>11.10.24</a:t>
             </a:fld>
             <a:endParaRPr lang="en-CH"/>
           </a:p>
@@ -1999,7 +2008,7 @@
           <a:p>
             <a:fld id="{9B916260-F45C-B647-88A4-C91F6BA5DC4E}" type="datetimeFigureOut">
               <a:rPr lang="en-CH" smtClean="0"/>
-              <a:t>26.09.24</a:t>
+              <a:t>11.10.24</a:t>
             </a:fld>
             <a:endParaRPr lang="en-CH"/>
           </a:p>
@@ -2112,7 +2121,7 @@
           <a:p>
             <a:fld id="{9B916260-F45C-B647-88A4-C91F6BA5DC4E}" type="datetimeFigureOut">
               <a:rPr lang="en-CH" smtClean="0"/>
-              <a:t>26.09.24</a:t>
+              <a:t>11.10.24</a:t>
             </a:fld>
             <a:endParaRPr lang="en-CH"/>
           </a:p>
@@ -2425,7 +2434,7 @@
           <a:p>
             <a:fld id="{9B916260-F45C-B647-88A4-C91F6BA5DC4E}" type="datetimeFigureOut">
               <a:rPr lang="en-CH" smtClean="0"/>
-              <a:t>26.09.24</a:t>
+              <a:t>11.10.24</a:t>
             </a:fld>
             <a:endParaRPr lang="en-CH"/>
           </a:p>
@@ -2714,7 +2723,7 @@
           <a:p>
             <a:fld id="{9B916260-F45C-B647-88A4-C91F6BA5DC4E}" type="datetimeFigureOut">
               <a:rPr lang="en-CH" smtClean="0"/>
-              <a:t>26.09.24</a:t>
+              <a:t>11.10.24</a:t>
             </a:fld>
             <a:endParaRPr lang="en-CH"/>
           </a:p>
@@ -2957,7 +2966,7 @@
           <a:p>
             <a:fld id="{9B916260-F45C-B647-88A4-C91F6BA5DC4E}" type="datetimeFigureOut">
               <a:rPr lang="en-CH" smtClean="0"/>
-              <a:t>26.09.24</a:t>
+              <a:t>11.10.24</a:t>
             </a:fld>
             <a:endParaRPr lang="en-CH"/>
           </a:p>
@@ -3456,7 +3465,13 @@
     </p:bg>
     <p:spTree>
       <p:nvGrpSpPr>
-        <p:cNvPr id="1" name=""/>
+        <p:cNvPr id="1" name="">
+          <a:extLst>
+            <a:ext uri="{FF2B5EF4-FFF2-40B4-BE49-F238E27FC236}">
+              <a16:creationId xmlns:a16="http://schemas.microsoft.com/office/drawing/2014/main" id="{58362876-6F74-6E63-CF52-920E19E230DA}"/>
+            </a:ext>
+          </a:extLst>
+        </p:cNvPr>
         <p:cNvGrpSpPr/>
         <p:nvPr/>
       </p:nvGrpSpPr>
@@ -3473,7 +3488,7 @@
           <p:cNvPr id="4" name="Picture 3">
             <a:extLst>
               <a:ext uri="{FF2B5EF4-FFF2-40B4-BE49-F238E27FC236}">
-                <a16:creationId xmlns:a16="http://schemas.microsoft.com/office/drawing/2014/main" id="{AC877C18-2AC4-AD3E-88E1-3B24759CC822}"/>
+                <a16:creationId xmlns:a16="http://schemas.microsoft.com/office/drawing/2014/main" id="{34157AAE-2B20-D88F-D95B-3AD9283E705D}"/>
               </a:ext>
             </a:extLst>
           </p:cNvPr>
@@ -3483,7 +3498,24 @@
           <p:nvPr/>
         </p:nvPicPr>
         <p:blipFill>
-          <a:blip r:embed="rId2"/>
+          <a:blip r:embed="rId2">
+            <a:extLst>
+              <a:ext uri="{BEBA8EAE-BF5A-486C-A8C5-ECC9F3942E4B}">
+                <a14:imgProps xmlns:a14="http://schemas.microsoft.com/office/drawing/2010/main">
+                  <a14:imgLayer r:embed="rId3">
+                    <a14:imgEffect>
+                      <a14:backgroundRemoval t="3664" b="98922" l="9704" r="89803">
+                        <a14:foregroundMark x1="45888" y1="12716" x2="45888" y2="12716"/>
+                        <a14:foregroundMark x1="48026" y1="3879" x2="48026" y2="3879"/>
+                        <a14:foregroundMark x1="52796" y1="93103" x2="52796" y2="93103"/>
+                        <a14:foregroundMark x1="50164" y1="98922" x2="50164" y2="98922"/>
+                      </a14:backgroundRemoval>
+                    </a14:imgEffect>
+                  </a14:imgLayer>
+                </a14:imgProps>
+              </a:ext>
+            </a:extLst>
+          </a:blip>
           <a:stretch>
             <a:fillRect/>
           </a:stretch>
@@ -3501,7 +3533,7 @@
     </p:spTree>
     <p:extLst>
       <p:ext uri="{BB962C8B-B14F-4D97-AF65-F5344CB8AC3E}">
-        <p14:creationId xmlns:p14="http://schemas.microsoft.com/office/powerpoint/2010/main" val="1944642154"/>
+        <p14:creationId xmlns:p14="http://schemas.microsoft.com/office/powerpoint/2010/main" val="2463032928"/>
       </p:ext>
     </p:extLst>
   </p:cSld>
@@ -3538,10 +3570,10 @@
       </p:grpSpPr>
       <p:pic>
         <p:nvPicPr>
-          <p:cNvPr id="4" name="Picture 3">
-            <a:extLst>
-              <a:ext uri="{FF2B5EF4-FFF2-40B4-BE49-F238E27FC236}">
-                <a16:creationId xmlns:a16="http://schemas.microsoft.com/office/drawing/2014/main" id="{BF22FE1A-67F2-9A08-251F-880432C4BF90}"/>
+          <p:cNvPr id="3" name="Picture 2">
+            <a:extLst>
+              <a:ext uri="{FF2B5EF4-FFF2-40B4-BE49-F238E27FC236}">
+                <a16:creationId xmlns:a16="http://schemas.microsoft.com/office/drawing/2014/main" id="{B720F08B-DC1B-BB78-54B3-C8A371BB9278}"/>
               </a:ext>
             </a:extLst>
           </p:cNvPr>
@@ -3551,7 +3583,24 @@
           <p:nvPr/>
         </p:nvPicPr>
         <p:blipFill>
-          <a:blip r:embed="rId2"/>
+          <a:blip r:embed="rId2">
+            <a:extLst>
+              <a:ext uri="{BEBA8EAE-BF5A-486C-A8C5-ECC9F3942E4B}">
+                <a14:imgProps xmlns:a14="http://schemas.microsoft.com/office/drawing/2010/main">
+                  <a14:imgLayer r:embed="rId3">
+                    <a14:imgEffect>
+                      <a14:backgroundRemoval t="4095" b="98276" l="9704" r="89803">
+                        <a14:foregroundMark x1="50000" y1="18534" x2="50000" y2="18534"/>
+                        <a14:foregroundMark x1="51480" y1="4095" x2="51480" y2="4095"/>
+                        <a14:foregroundMark x1="49671" y1="92672" x2="49671" y2="92672"/>
+                        <a14:foregroundMark x1="49671" y1="98276" x2="49671" y2="98276"/>
+                      </a14:backgroundRemoval>
+                    </a14:imgEffect>
+                  </a14:imgLayer>
+                </a14:imgProps>
+              </a:ext>
+            </a:extLst>
+          </a:blip>
           <a:stretch>
             <a:fillRect/>
           </a:stretch>
@@ -3569,7 +3618,7 @@
     </p:spTree>
     <p:extLst>
       <p:ext uri="{BB962C8B-B14F-4D97-AF65-F5344CB8AC3E}">
-        <p14:creationId xmlns:p14="http://schemas.microsoft.com/office/powerpoint/2010/main" val="3262247840"/>
+        <p14:creationId xmlns:p14="http://schemas.microsoft.com/office/powerpoint/2010/main" val="586545891"/>
       </p:ext>
     </p:extLst>
   </p:cSld>
@@ -3606,10 +3655,186 @@
       </p:grpSpPr>
       <p:pic>
         <p:nvPicPr>
+          <p:cNvPr id="3" name="Picture 2">
+            <a:extLst>
+              <a:ext uri="{FF2B5EF4-FFF2-40B4-BE49-F238E27FC236}">
+                <a16:creationId xmlns:a16="http://schemas.microsoft.com/office/drawing/2014/main" id="{02C3729A-FF3F-F995-3345-DEEDC1FC84C1}"/>
+              </a:ext>
+            </a:extLst>
+          </p:cNvPr>
+          <p:cNvPicPr>
+            <a:picLocks noChangeAspect="1"/>
+          </p:cNvPicPr>
+          <p:nvPr/>
+        </p:nvPicPr>
+        <p:blipFill>
+          <a:blip r:embed="rId2">
+            <a:extLst>
+              <a:ext uri="{BEBA8EAE-BF5A-486C-A8C5-ECC9F3942E4B}">
+                <a14:imgProps xmlns:a14="http://schemas.microsoft.com/office/drawing/2010/main">
+                  <a14:imgLayer r:embed="rId3">
+                    <a14:imgEffect>
+                      <a14:backgroundRemoval t="1940" b="99784" l="9704" r="89803">
+                        <a14:foregroundMark x1="50987" y1="6681" x2="50987" y2="6681"/>
+                        <a14:foregroundMark x1="50493" y1="1940" x2="50493" y2="1940"/>
+                        <a14:foregroundMark x1="48849" y1="95259" x2="48849" y2="95259"/>
+                        <a14:foregroundMark x1="48849" y1="99784" x2="48849" y2="99784"/>
+                      </a14:backgroundRemoval>
+                    </a14:imgEffect>
+                  </a14:imgLayer>
+                </a14:imgProps>
+              </a:ext>
+            </a:extLst>
+          </a:blip>
+          <a:stretch>
+            <a:fillRect/>
+          </a:stretch>
+        </p:blipFill>
+        <p:spPr>
+          <a:xfrm>
+            <a:off x="3501517" y="1449000"/>
+            <a:ext cx="5188966" cy="3960000"/>
+          </a:xfrm>
+          <a:prstGeom prst="rect">
+            <a:avLst/>
+          </a:prstGeom>
+        </p:spPr>
+      </p:pic>
+    </p:spTree>
+    <p:extLst>
+      <p:ext uri="{BB962C8B-B14F-4D97-AF65-F5344CB8AC3E}">
+        <p14:creationId xmlns:p14="http://schemas.microsoft.com/office/powerpoint/2010/main" val="1313142258"/>
+      </p:ext>
+    </p:extLst>
+  </p:cSld>
+  <p:clrMapOvr>
+    <a:masterClrMapping/>
+  </p:clrMapOvr>
+</p:sld>
+</file>
+
+<file path=ppt/slides/slide13.xml><?xml version="1.0" encoding="utf-8"?>
+<p:sld xmlns:a="http://schemas.openxmlformats.org/drawingml/2006/main" xmlns:r="http://schemas.openxmlformats.org/officeDocument/2006/relationships" xmlns:p="http://schemas.openxmlformats.org/presentationml/2006/main">
+  <p:cSld>
+    <p:bg>
+      <p:bgPr>
+        <a:solidFill>
+          <a:srgbClr val="5C5C5C"/>
+        </a:solidFill>
+        <a:effectLst/>
+      </p:bgPr>
+    </p:bg>
+    <p:spTree>
+      <p:nvGrpSpPr>
+        <p:cNvPr id="1" name="">
+          <a:extLst>
+            <a:ext uri="{FF2B5EF4-FFF2-40B4-BE49-F238E27FC236}">
+              <a16:creationId xmlns:a16="http://schemas.microsoft.com/office/drawing/2014/main" id="{0578A1B9-042D-CD89-BF86-F057F0C37BE7}"/>
+            </a:ext>
+          </a:extLst>
+        </p:cNvPr>
+        <p:cNvGrpSpPr/>
+        <p:nvPr/>
+      </p:nvGrpSpPr>
+      <p:grpSpPr>
+        <a:xfrm>
+          <a:off x="0" y="0"/>
+          <a:ext cx="0" cy="0"/>
+          <a:chOff x="0" y="0"/>
+          <a:chExt cx="0" cy="0"/>
+        </a:xfrm>
+      </p:grpSpPr>
+      <p:pic>
+        <p:nvPicPr>
           <p:cNvPr id="4" name="Picture 3">
             <a:extLst>
               <a:ext uri="{FF2B5EF4-FFF2-40B4-BE49-F238E27FC236}">
-                <a16:creationId xmlns:a16="http://schemas.microsoft.com/office/drawing/2014/main" id="{35AC8A44-F8E5-4253-30EE-6B1C3EA472C7}"/>
+                <a16:creationId xmlns:a16="http://schemas.microsoft.com/office/drawing/2014/main" id="{6399AF5C-B788-7377-0086-719EB31C09FD}"/>
+              </a:ext>
+            </a:extLst>
+          </p:cNvPr>
+          <p:cNvPicPr>
+            <a:picLocks noChangeAspect="1"/>
+          </p:cNvPicPr>
+          <p:nvPr/>
+        </p:nvPicPr>
+        <p:blipFill>
+          <a:blip r:embed="rId2">
+            <a:extLst>
+              <a:ext uri="{BEBA8EAE-BF5A-486C-A8C5-ECC9F3942E4B}">
+                <a14:imgProps xmlns:a14="http://schemas.microsoft.com/office/drawing/2010/main">
+                  <a14:imgLayer r:embed="rId3">
+                    <a14:imgEffect>
+                      <a14:backgroundRemoval t="1940" b="99138" l="9704" r="89803">
+                        <a14:foregroundMark x1="50329" y1="7328" x2="50329" y2="7328"/>
+                        <a14:foregroundMark x1="50822" y1="1940" x2="50822" y2="1940"/>
+                        <a14:foregroundMark x1="53454" y1="94181" x2="53454" y2="94181"/>
+                        <a14:foregroundMark x1="50164" y1="99138" x2="50164" y2="99138"/>
+                      </a14:backgroundRemoval>
+                    </a14:imgEffect>
+                  </a14:imgLayer>
+                </a14:imgProps>
+              </a:ext>
+            </a:extLst>
+          </a:blip>
+          <a:stretch>
+            <a:fillRect/>
+          </a:stretch>
+        </p:blipFill>
+        <p:spPr>
+          <a:xfrm>
+            <a:off x="3501517" y="1449000"/>
+            <a:ext cx="5188966" cy="3960000"/>
+          </a:xfrm>
+          <a:prstGeom prst="rect">
+            <a:avLst/>
+          </a:prstGeom>
+        </p:spPr>
+      </p:pic>
+    </p:spTree>
+    <p:extLst>
+      <p:ext uri="{BB962C8B-B14F-4D97-AF65-F5344CB8AC3E}">
+        <p14:creationId xmlns:p14="http://schemas.microsoft.com/office/powerpoint/2010/main" val="785923272"/>
+      </p:ext>
+    </p:extLst>
+  </p:cSld>
+  <p:clrMapOvr>
+    <a:masterClrMapping/>
+  </p:clrMapOvr>
+</p:sld>
+</file>
+
+<file path=ppt/slides/slide14.xml><?xml version="1.0" encoding="utf-8"?>
+<p:sld xmlns:a="http://schemas.openxmlformats.org/drawingml/2006/main" xmlns:r="http://schemas.openxmlformats.org/officeDocument/2006/relationships" xmlns:p="http://schemas.openxmlformats.org/presentationml/2006/main">
+  <p:cSld>
+    <p:bg>
+      <p:bgPr>
+        <a:solidFill>
+          <a:srgbClr val="5C5C5C"/>
+        </a:solidFill>
+        <a:effectLst/>
+      </p:bgPr>
+    </p:bg>
+    <p:spTree>
+      <p:nvGrpSpPr>
+        <p:cNvPr id="1" name=""/>
+        <p:cNvGrpSpPr/>
+        <p:nvPr/>
+      </p:nvGrpSpPr>
+      <p:grpSpPr>
+        <a:xfrm>
+          <a:off x="0" y="0"/>
+          <a:ext cx="0" cy="0"/>
+          <a:chOff x="0" y="0"/>
+          <a:chExt cx="0" cy="0"/>
+        </a:xfrm>
+      </p:grpSpPr>
+      <p:pic>
+        <p:nvPicPr>
+          <p:cNvPr id="4" name="Picture 3">
+            <a:extLst>
+              <a:ext uri="{FF2B5EF4-FFF2-40B4-BE49-F238E27FC236}">
+                <a16:creationId xmlns:a16="http://schemas.microsoft.com/office/drawing/2014/main" id="{AC877C18-2AC4-AD3E-88E1-3B24759CC822}"/>
               </a:ext>
             </a:extLst>
           </p:cNvPr>
@@ -3620,6 +3845,268 @@
         </p:nvPicPr>
         <p:blipFill>
           <a:blip r:embed="rId2"/>
+          <a:stretch>
+            <a:fillRect/>
+          </a:stretch>
+        </p:blipFill>
+        <p:spPr>
+          <a:xfrm>
+            <a:off x="3501517" y="1449000"/>
+            <a:ext cx="5188966" cy="3960000"/>
+          </a:xfrm>
+          <a:prstGeom prst="rect">
+            <a:avLst/>
+          </a:prstGeom>
+        </p:spPr>
+      </p:pic>
+    </p:spTree>
+    <p:extLst>
+      <p:ext uri="{BB962C8B-B14F-4D97-AF65-F5344CB8AC3E}">
+        <p14:creationId xmlns:p14="http://schemas.microsoft.com/office/powerpoint/2010/main" val="1944642154"/>
+      </p:ext>
+    </p:extLst>
+  </p:cSld>
+  <p:clrMapOvr>
+    <a:masterClrMapping/>
+  </p:clrMapOvr>
+</p:sld>
+</file>
+
+<file path=ppt/slides/slide15.xml><?xml version="1.0" encoding="utf-8"?>
+<p:sld xmlns:a="http://schemas.openxmlformats.org/drawingml/2006/main" xmlns:r="http://schemas.openxmlformats.org/officeDocument/2006/relationships" xmlns:p="http://schemas.openxmlformats.org/presentationml/2006/main">
+  <p:cSld>
+    <p:bg>
+      <p:bgPr>
+        <a:solidFill>
+          <a:srgbClr val="5C5C5C"/>
+        </a:solidFill>
+        <a:effectLst/>
+      </p:bgPr>
+    </p:bg>
+    <p:spTree>
+      <p:nvGrpSpPr>
+        <p:cNvPr id="1" name=""/>
+        <p:cNvGrpSpPr/>
+        <p:nvPr/>
+      </p:nvGrpSpPr>
+      <p:grpSpPr>
+        <a:xfrm>
+          <a:off x="0" y="0"/>
+          <a:ext cx="0" cy="0"/>
+          <a:chOff x="0" y="0"/>
+          <a:chExt cx="0" cy="0"/>
+        </a:xfrm>
+      </p:grpSpPr>
+      <p:pic>
+        <p:nvPicPr>
+          <p:cNvPr id="4" name="Picture 3">
+            <a:extLst>
+              <a:ext uri="{FF2B5EF4-FFF2-40B4-BE49-F238E27FC236}">
+                <a16:creationId xmlns:a16="http://schemas.microsoft.com/office/drawing/2014/main" id="{BF22FE1A-67F2-9A08-251F-880432C4BF90}"/>
+              </a:ext>
+            </a:extLst>
+          </p:cNvPr>
+          <p:cNvPicPr>
+            <a:picLocks noChangeAspect="1"/>
+          </p:cNvPicPr>
+          <p:nvPr/>
+        </p:nvPicPr>
+        <p:blipFill>
+          <a:blip r:embed="rId2">
+            <a:extLst>
+              <a:ext uri="{BEBA8EAE-BF5A-486C-A8C5-ECC9F3942E4B}">
+                <a14:imgProps xmlns:a14="http://schemas.microsoft.com/office/drawing/2010/main">
+                  <a14:imgLayer r:embed="rId3">
+                    <a14:imgEffect>
+                      <a14:backgroundRemoval t="2371" b="98922" l="9704" r="89803">
+                        <a14:foregroundMark x1="46053" y1="13147" x2="46053" y2="13147"/>
+                        <a14:foregroundMark x1="49836" y1="2586" x2="49836" y2="2586"/>
+                        <a14:foregroundMark x1="50822" y1="93750" x2="50822" y2="93750"/>
+                        <a14:foregroundMark x1="50164" y1="98922" x2="50164" y2="98922"/>
+                      </a14:backgroundRemoval>
+                    </a14:imgEffect>
+                  </a14:imgLayer>
+                </a14:imgProps>
+              </a:ext>
+            </a:extLst>
+          </a:blip>
+          <a:stretch>
+            <a:fillRect/>
+          </a:stretch>
+        </p:blipFill>
+        <p:spPr>
+          <a:xfrm>
+            <a:off x="3501517" y="1449000"/>
+            <a:ext cx="5188966" cy="3960000"/>
+          </a:xfrm>
+          <a:prstGeom prst="rect">
+            <a:avLst/>
+          </a:prstGeom>
+        </p:spPr>
+      </p:pic>
+    </p:spTree>
+    <p:extLst>
+      <p:ext uri="{BB962C8B-B14F-4D97-AF65-F5344CB8AC3E}">
+        <p14:creationId xmlns:p14="http://schemas.microsoft.com/office/powerpoint/2010/main" val="3262247840"/>
+      </p:ext>
+    </p:extLst>
+  </p:cSld>
+  <p:clrMapOvr>
+    <a:masterClrMapping/>
+  </p:clrMapOvr>
+</p:sld>
+</file>
+
+<file path=ppt/slides/slide16.xml><?xml version="1.0" encoding="utf-8"?>
+<p:sld xmlns:a="http://schemas.openxmlformats.org/drawingml/2006/main" xmlns:r="http://schemas.openxmlformats.org/officeDocument/2006/relationships" xmlns:p="http://schemas.openxmlformats.org/presentationml/2006/main">
+  <p:cSld>
+    <p:bg>
+      <p:bgPr>
+        <a:solidFill>
+          <a:srgbClr val="5C5C5C"/>
+        </a:solidFill>
+        <a:effectLst/>
+      </p:bgPr>
+    </p:bg>
+    <p:spTree>
+      <p:nvGrpSpPr>
+        <p:cNvPr id="1" name="">
+          <a:extLst>
+            <a:ext uri="{FF2B5EF4-FFF2-40B4-BE49-F238E27FC236}">
+              <a16:creationId xmlns:a16="http://schemas.microsoft.com/office/drawing/2014/main" id="{51C18D08-F086-F85E-FF25-C9353A919F6F}"/>
+            </a:ext>
+          </a:extLst>
+        </p:cNvPr>
+        <p:cNvGrpSpPr/>
+        <p:nvPr/>
+      </p:nvGrpSpPr>
+      <p:grpSpPr>
+        <a:xfrm>
+          <a:off x="0" y="0"/>
+          <a:ext cx="0" cy="0"/>
+          <a:chOff x="0" y="0"/>
+          <a:chExt cx="0" cy="0"/>
+        </a:xfrm>
+      </p:grpSpPr>
+      <p:pic>
+        <p:nvPicPr>
+          <p:cNvPr id="3" name="Picture 2">
+            <a:extLst>
+              <a:ext uri="{FF2B5EF4-FFF2-40B4-BE49-F238E27FC236}">
+                <a16:creationId xmlns:a16="http://schemas.microsoft.com/office/drawing/2014/main" id="{B7FA51B9-094D-EDEC-DF1C-947016823DF6}"/>
+              </a:ext>
+            </a:extLst>
+          </p:cNvPr>
+          <p:cNvPicPr>
+            <a:picLocks noChangeAspect="1"/>
+          </p:cNvPicPr>
+          <p:nvPr/>
+        </p:nvPicPr>
+        <p:blipFill>
+          <a:blip r:embed="rId2">
+            <a:extLst>
+              <a:ext uri="{BEBA8EAE-BF5A-486C-A8C5-ECC9F3942E4B}">
+                <a14:imgProps xmlns:a14="http://schemas.microsoft.com/office/drawing/2010/main">
+                  <a14:imgLayer r:embed="rId3">
+                    <a14:imgEffect>
+                      <a14:backgroundRemoval t="1078" b="99569" l="9704" r="89803">
+                        <a14:foregroundMark x1="53454" y1="17241" x2="53454" y2="17241"/>
+                        <a14:foregroundMark x1="51974" y1="5172" x2="51974" y2="5172"/>
+                        <a14:foregroundMark x1="50329" y1="1078" x2="50329" y2="1078"/>
+                        <a14:foregroundMark x1="50493" y1="93966" x2="50493" y2="93966"/>
+                        <a14:foregroundMark x1="48684" y1="99569" x2="48684" y2="99569"/>
+                      </a14:backgroundRemoval>
+                    </a14:imgEffect>
+                  </a14:imgLayer>
+                </a14:imgProps>
+              </a:ext>
+            </a:extLst>
+          </a:blip>
+          <a:stretch>
+            <a:fillRect/>
+          </a:stretch>
+        </p:blipFill>
+        <p:spPr>
+          <a:xfrm>
+            <a:off x="3501517" y="1449000"/>
+            <a:ext cx="5188966" cy="3960000"/>
+          </a:xfrm>
+          <a:prstGeom prst="rect">
+            <a:avLst/>
+          </a:prstGeom>
+        </p:spPr>
+      </p:pic>
+    </p:spTree>
+    <p:extLst>
+      <p:ext uri="{BB962C8B-B14F-4D97-AF65-F5344CB8AC3E}">
+        <p14:creationId xmlns:p14="http://schemas.microsoft.com/office/powerpoint/2010/main" val="2637108069"/>
+      </p:ext>
+    </p:extLst>
+  </p:cSld>
+  <p:clrMapOvr>
+    <a:masterClrMapping/>
+  </p:clrMapOvr>
+</p:sld>
+</file>
+
+<file path=ppt/slides/slide17.xml><?xml version="1.0" encoding="utf-8"?>
+<p:sld xmlns:a="http://schemas.openxmlformats.org/drawingml/2006/main" xmlns:r="http://schemas.openxmlformats.org/officeDocument/2006/relationships" xmlns:p="http://schemas.openxmlformats.org/presentationml/2006/main">
+  <p:cSld>
+    <p:bg>
+      <p:bgPr>
+        <a:solidFill>
+          <a:srgbClr val="5C5C5C"/>
+        </a:solidFill>
+        <a:effectLst/>
+      </p:bgPr>
+    </p:bg>
+    <p:spTree>
+      <p:nvGrpSpPr>
+        <p:cNvPr id="1" name=""/>
+        <p:cNvGrpSpPr/>
+        <p:nvPr/>
+      </p:nvGrpSpPr>
+      <p:grpSpPr>
+        <a:xfrm>
+          <a:off x="0" y="0"/>
+          <a:ext cx="0" cy="0"/>
+          <a:chOff x="0" y="0"/>
+          <a:chExt cx="0" cy="0"/>
+        </a:xfrm>
+      </p:grpSpPr>
+      <p:pic>
+        <p:nvPicPr>
+          <p:cNvPr id="4" name="Picture 3">
+            <a:extLst>
+              <a:ext uri="{FF2B5EF4-FFF2-40B4-BE49-F238E27FC236}">
+                <a16:creationId xmlns:a16="http://schemas.microsoft.com/office/drawing/2014/main" id="{35AC8A44-F8E5-4253-30EE-6B1C3EA472C7}"/>
+              </a:ext>
+            </a:extLst>
+          </p:cNvPr>
+          <p:cNvPicPr>
+            <a:picLocks noChangeAspect="1"/>
+          </p:cNvPicPr>
+          <p:nvPr/>
+        </p:nvPicPr>
+        <p:blipFill>
+          <a:blip r:embed="rId2">
+            <a:extLst>
+              <a:ext uri="{BEBA8EAE-BF5A-486C-A8C5-ECC9F3942E4B}">
+                <a14:imgProps xmlns:a14="http://schemas.microsoft.com/office/drawing/2010/main">
+                  <a14:imgLayer r:embed="rId3">
+                    <a14:imgEffect>
+                      <a14:backgroundRemoval t="3233" b="98922" l="9704" r="89803">
+                        <a14:foregroundMark x1="44243" y1="18750" x2="44243" y2="18750"/>
+                        <a14:foregroundMark x1="50329" y1="3233" x2="50329" y2="3233"/>
+                        <a14:foregroundMark x1="49507" y1="95474" x2="49507" y2="95474"/>
+                        <a14:foregroundMark x1="49013" y1="98922" x2="49013" y2="98922"/>
+                      </a14:backgroundRemoval>
+                    </a14:imgEffect>
+                  </a14:imgLayer>
+                </a14:imgProps>
+              </a:ext>
+            </a:extLst>
+          </a:blip>
           <a:stretch>
             <a:fillRect/>
           </a:stretch>
@@ -3647,7 +4134,7 @@
 </p:sld>
 </file>
 
-<file path=ppt/slides/slide13.xml><?xml version="1.0" encoding="utf-8"?>
+<file path=ppt/slides/slide18.xml><?xml version="1.0" encoding="utf-8"?>
 <p:sld xmlns:a="http://schemas.openxmlformats.org/drawingml/2006/main" xmlns:r="http://schemas.openxmlformats.org/officeDocument/2006/relationships" xmlns:p="http://schemas.openxmlformats.org/presentationml/2006/main">
   <p:cSld>
     <p:bg>
@@ -3687,7 +4174,24 @@
           <p:nvPr/>
         </p:nvPicPr>
         <p:blipFill>
-          <a:blip r:embed="rId2"/>
+          <a:blip r:embed="rId2">
+            <a:extLst>
+              <a:ext uri="{BEBA8EAE-BF5A-486C-A8C5-ECC9F3942E4B}">
+                <a14:imgProps xmlns:a14="http://schemas.microsoft.com/office/drawing/2010/main">
+                  <a14:imgLayer r:embed="rId3">
+                    <a14:imgEffect>
+                      <a14:backgroundRemoval t="2802" b="98491" l="9704" r="89803">
+                        <a14:foregroundMark x1="43750" y1="14871" x2="43750" y2="14871"/>
+                        <a14:foregroundMark x1="47039" y1="2802" x2="47039" y2="2802"/>
+                        <a14:foregroundMark x1="51151" y1="93750" x2="51151" y2="93750"/>
+                        <a14:foregroundMark x1="49507" y1="98491" x2="49507" y2="98491"/>
+                      </a14:backgroundRemoval>
+                    </a14:imgEffect>
+                  </a14:imgLayer>
+                </a14:imgProps>
+              </a:ext>
+            </a:extLst>
+          </a:blip>
           <a:stretch>
             <a:fillRect/>
           </a:stretch>
@@ -3715,7 +4219,165 @@
 </p:sld>
 </file>
 
-<file path=ppt/slides/slide14.xml><?xml version="1.0" encoding="utf-8"?>
+<file path=ppt/slides/slide19.xml><?xml version="1.0" encoding="utf-8"?>
+<p:sld xmlns:a="http://schemas.openxmlformats.org/drawingml/2006/main" xmlns:r="http://schemas.openxmlformats.org/officeDocument/2006/relationships" xmlns:p="http://schemas.openxmlformats.org/presentationml/2006/main">
+  <p:cSld>
+    <p:bg>
+      <p:bgPr>
+        <a:solidFill>
+          <a:srgbClr val="5C5C5C"/>
+        </a:solidFill>
+        <a:effectLst/>
+      </p:bgPr>
+    </p:bg>
+    <p:spTree>
+      <p:nvGrpSpPr>
+        <p:cNvPr id="1" name="">
+          <a:extLst>
+            <a:ext uri="{FF2B5EF4-FFF2-40B4-BE49-F238E27FC236}">
+              <a16:creationId xmlns:a16="http://schemas.microsoft.com/office/drawing/2014/main" id="{AFF5E5CB-3E43-1E16-A322-FC78625DBA10}"/>
+            </a:ext>
+          </a:extLst>
+        </p:cNvPr>
+        <p:cNvGrpSpPr/>
+        <p:nvPr/>
+      </p:nvGrpSpPr>
+      <p:grpSpPr>
+        <a:xfrm>
+          <a:off x="0" y="0"/>
+          <a:ext cx="0" cy="0"/>
+          <a:chOff x="0" y="0"/>
+          <a:chExt cx="0" cy="0"/>
+        </a:xfrm>
+      </p:grpSpPr>
+      <p:pic>
+        <p:nvPicPr>
+          <p:cNvPr id="3" name="Picture 2">
+            <a:extLst>
+              <a:ext uri="{FF2B5EF4-FFF2-40B4-BE49-F238E27FC236}">
+                <a16:creationId xmlns:a16="http://schemas.microsoft.com/office/drawing/2014/main" id="{05CC7C89-3CD6-9765-3F21-47E4AE87EE6C}"/>
+              </a:ext>
+            </a:extLst>
+          </p:cNvPr>
+          <p:cNvPicPr>
+            <a:picLocks noChangeAspect="1"/>
+          </p:cNvPicPr>
+          <p:nvPr/>
+        </p:nvPicPr>
+        <p:blipFill>
+          <a:blip r:embed="rId2">
+            <a:extLst>
+              <a:ext uri="{BEBA8EAE-BF5A-486C-A8C5-ECC9F3942E4B}">
+                <a14:imgProps xmlns:a14="http://schemas.microsoft.com/office/drawing/2010/main">
+                  <a14:imgLayer r:embed="rId3">
+                    <a14:imgEffect>
+                      <a14:backgroundRemoval t="3664" b="98922" l="9704" r="89803">
+                        <a14:foregroundMark x1="48849" y1="18750" x2="48849" y2="18750"/>
+                        <a14:foregroundMark x1="49013" y1="3664" x2="49013" y2="3664"/>
+                        <a14:foregroundMark x1="50822" y1="91810" x2="50822" y2="91810"/>
+                        <a14:foregroundMark x1="50493" y1="98922" x2="50493" y2="98922"/>
+                      </a14:backgroundRemoval>
+                    </a14:imgEffect>
+                  </a14:imgLayer>
+                </a14:imgProps>
+              </a:ext>
+            </a:extLst>
+          </a:blip>
+          <a:stretch>
+            <a:fillRect/>
+          </a:stretch>
+        </p:blipFill>
+        <p:spPr>
+          <a:xfrm>
+            <a:off x="3501517" y="1449000"/>
+            <a:ext cx="5188966" cy="3960000"/>
+          </a:xfrm>
+          <a:prstGeom prst="rect">
+            <a:avLst/>
+          </a:prstGeom>
+        </p:spPr>
+      </p:pic>
+    </p:spTree>
+    <p:extLst>
+      <p:ext uri="{BB962C8B-B14F-4D97-AF65-F5344CB8AC3E}">
+        <p14:creationId xmlns:p14="http://schemas.microsoft.com/office/powerpoint/2010/main" val="4038700167"/>
+      </p:ext>
+    </p:extLst>
+  </p:cSld>
+  <p:clrMapOvr>
+    <a:masterClrMapping/>
+  </p:clrMapOvr>
+</p:sld>
+</file>
+
+<file path=ppt/slides/slide2.xml><?xml version="1.0" encoding="utf-8"?>
+<p:sld xmlns:a="http://schemas.openxmlformats.org/drawingml/2006/main" xmlns:r="http://schemas.openxmlformats.org/officeDocument/2006/relationships" xmlns:p="http://schemas.openxmlformats.org/presentationml/2006/main">
+  <p:cSld>
+    <p:spTree>
+      <p:nvGrpSpPr>
+        <p:cNvPr id="1" name=""/>
+        <p:cNvGrpSpPr/>
+        <p:nvPr/>
+      </p:nvGrpSpPr>
+      <p:grpSpPr>
+        <a:xfrm>
+          <a:off x="0" y="0"/>
+          <a:ext cx="0" cy="0"/>
+          <a:chOff x="0" y="0"/>
+          <a:chExt cx="0" cy="0"/>
+        </a:xfrm>
+      </p:grpSpPr>
+      <p:sp>
+        <p:nvSpPr>
+          <p:cNvPr id="2" name="Title 1">
+            <a:extLst>
+              <a:ext uri="{FF2B5EF4-FFF2-40B4-BE49-F238E27FC236}">
+                <a16:creationId xmlns:a16="http://schemas.microsoft.com/office/drawing/2014/main" id="{0A1FA53E-25A0-0960-0FCC-4CC105416AC1}"/>
+              </a:ext>
+            </a:extLst>
+          </p:cNvPr>
+          <p:cNvSpPr>
+            <a:spLocks noGrp="1"/>
+          </p:cNvSpPr>
+          <p:nvPr>
+            <p:ph type="title"/>
+          </p:nvPr>
+        </p:nvSpPr>
+        <p:spPr>
+          <a:xfrm>
+            <a:off x="410688" y="365125"/>
+            <a:ext cx="10943112" cy="584901"/>
+          </a:xfrm>
+        </p:spPr>
+        <p:txBody>
+          <a:bodyPr>
+            <a:normAutofit/>
+          </a:bodyPr>
+          <a:lstStyle/>
+          <a:p>
+            <a:r>
+              <a:rPr lang="en-CH" sz="2800" b="1" dirty="0">
+                <a:latin typeface="Avenir Book" panose="02000503020000020003" pitchFamily="2" charset="0"/>
+              </a:rPr>
+              <a:t>Practice Task Slides (12 trials)</a:t>
+            </a:r>
+          </a:p>
+        </p:txBody>
+      </p:sp>
+    </p:spTree>
+    <p:extLst>
+      <p:ext uri="{BB962C8B-B14F-4D97-AF65-F5344CB8AC3E}">
+        <p14:creationId xmlns:p14="http://schemas.microsoft.com/office/powerpoint/2010/main" val="2739542140"/>
+      </p:ext>
+    </p:extLst>
+  </p:cSld>
+  <p:clrMapOvr>
+    <a:masterClrMapping/>
+  </p:clrMapOvr>
+</p:sld>
+</file>
+
+<file path=ppt/slides/slide20.xml><?xml version="1.0" encoding="utf-8"?>
 <p:sld xmlns:a="http://schemas.openxmlformats.org/drawingml/2006/main" xmlns:r="http://schemas.openxmlformats.org/officeDocument/2006/relationships" xmlns:p="http://schemas.openxmlformats.org/presentationml/2006/main">
   <p:cSld>
     <p:bg>
@@ -3761,7 +4423,24 @@
           <p:nvPr/>
         </p:nvPicPr>
         <p:blipFill>
-          <a:blip r:embed="rId2"/>
+          <a:blip r:embed="rId2">
+            <a:extLst>
+              <a:ext uri="{BEBA8EAE-BF5A-486C-A8C5-ECC9F3942E4B}">
+                <a14:imgProps xmlns:a14="http://schemas.microsoft.com/office/drawing/2010/main">
+                  <a14:imgLayer r:embed="rId3">
+                    <a14:imgEffect>
+                      <a14:backgroundRemoval t="2802" b="98922" l="9704" r="89803">
+                        <a14:foregroundMark x1="47204" y1="21336" x2="47204" y2="21336"/>
+                        <a14:foregroundMark x1="49507" y1="2802" x2="49507" y2="2802"/>
+                        <a14:foregroundMark x1="47368" y1="92241" x2="47368" y2="92241"/>
+                        <a14:foregroundMark x1="50164" y1="98922" x2="50164" y2="98922"/>
+                      </a14:backgroundRemoval>
+                    </a14:imgEffect>
+                  </a14:imgLayer>
+                </a14:imgProps>
+              </a:ext>
+            </a:extLst>
+          </a:blip>
           <a:stretch>
             <a:fillRect/>
           </a:stretch>
@@ -3789,7 +4468,7 @@
 </p:sld>
 </file>
 
-<file path=ppt/slides/slide15.xml><?xml version="1.0" encoding="utf-8"?>
+<file path=ppt/slides/slide21.xml><?xml version="1.0" encoding="utf-8"?>
 <p:sld xmlns:a="http://schemas.openxmlformats.org/drawingml/2006/main" xmlns:r="http://schemas.openxmlformats.org/officeDocument/2006/relationships" xmlns:p="http://schemas.openxmlformats.org/presentationml/2006/main">
   <p:cSld>
     <p:bg>
@@ -3835,7 +4514,24 @@
           <p:nvPr/>
         </p:nvPicPr>
         <p:blipFill>
-          <a:blip r:embed="rId2"/>
+          <a:blip r:embed="rId2">
+            <a:extLst>
+              <a:ext uri="{BEBA8EAE-BF5A-486C-A8C5-ECC9F3942E4B}">
+                <a14:imgProps xmlns:a14="http://schemas.microsoft.com/office/drawing/2010/main">
+                  <a14:imgLayer r:embed="rId3">
+                    <a14:imgEffect>
+                      <a14:backgroundRemoval t="3233" b="98922" l="9704" r="89803">
+                        <a14:foregroundMark x1="48026" y1="20259" x2="48026" y2="20259"/>
+                        <a14:foregroundMark x1="48849" y1="3448" x2="48849" y2="3448"/>
+                        <a14:foregroundMark x1="51974" y1="95259" x2="51974" y2="95259"/>
+                        <a14:foregroundMark x1="50329" y1="98922" x2="50329" y2="98922"/>
+                      </a14:backgroundRemoval>
+                    </a14:imgEffect>
+                  </a14:imgLayer>
+                </a14:imgProps>
+              </a:ext>
+            </a:extLst>
+          </a:blip>
           <a:stretch>
             <a:fillRect/>
           </a:stretch>
@@ -3863,7 +4559,98 @@
 </p:sld>
 </file>
 
-<file path=ppt/slides/slide16.xml><?xml version="1.0" encoding="utf-8"?>
+<file path=ppt/slides/slide22.xml><?xml version="1.0" encoding="utf-8"?>
+<p:sld xmlns:a="http://schemas.openxmlformats.org/drawingml/2006/main" xmlns:r="http://schemas.openxmlformats.org/officeDocument/2006/relationships" xmlns:p="http://schemas.openxmlformats.org/presentationml/2006/main">
+  <p:cSld>
+    <p:bg>
+      <p:bgPr>
+        <a:solidFill>
+          <a:srgbClr val="5C5C5C"/>
+        </a:solidFill>
+        <a:effectLst/>
+      </p:bgPr>
+    </p:bg>
+    <p:spTree>
+      <p:nvGrpSpPr>
+        <p:cNvPr id="1" name="">
+          <a:extLst>
+            <a:ext uri="{FF2B5EF4-FFF2-40B4-BE49-F238E27FC236}">
+              <a16:creationId xmlns:a16="http://schemas.microsoft.com/office/drawing/2014/main" id="{821C0922-EBAC-8A26-4C47-1C9F0C257515}"/>
+            </a:ext>
+          </a:extLst>
+        </p:cNvPr>
+        <p:cNvGrpSpPr/>
+        <p:nvPr/>
+      </p:nvGrpSpPr>
+      <p:grpSpPr>
+        <a:xfrm>
+          <a:off x="0" y="0"/>
+          <a:ext cx="0" cy="0"/>
+          <a:chOff x="0" y="0"/>
+          <a:chExt cx="0" cy="0"/>
+        </a:xfrm>
+      </p:grpSpPr>
+      <p:pic>
+        <p:nvPicPr>
+          <p:cNvPr id="4" name="Picture 3">
+            <a:extLst>
+              <a:ext uri="{FF2B5EF4-FFF2-40B4-BE49-F238E27FC236}">
+                <a16:creationId xmlns:a16="http://schemas.microsoft.com/office/drawing/2014/main" id="{77FBEFD0-790E-C6C2-48D5-E08474DB8D22}"/>
+              </a:ext>
+            </a:extLst>
+          </p:cNvPr>
+          <p:cNvPicPr>
+            <a:picLocks noChangeAspect="1"/>
+          </p:cNvPicPr>
+          <p:nvPr/>
+        </p:nvPicPr>
+        <p:blipFill>
+          <a:blip r:embed="rId2">
+            <a:extLst>
+              <a:ext uri="{BEBA8EAE-BF5A-486C-A8C5-ECC9F3942E4B}">
+                <a14:imgProps xmlns:a14="http://schemas.microsoft.com/office/drawing/2010/main">
+                  <a14:imgLayer r:embed="rId3">
+                    <a14:imgEffect>
+                      <a14:backgroundRemoval t="3664" b="99784" l="9704" r="89803">
+                        <a14:foregroundMark x1="43257" y1="18966" x2="43257" y2="18966"/>
+                        <a14:foregroundMark x1="50987" y1="3664" x2="50987" y2="3664"/>
+                        <a14:foregroundMark x1="49671" y1="95905" x2="49671" y2="95905"/>
+                        <a14:foregroundMark x1="49836" y1="99784" x2="49836" y2="99784"/>
+                      </a14:backgroundRemoval>
+                    </a14:imgEffect>
+                  </a14:imgLayer>
+                </a14:imgProps>
+              </a:ext>
+            </a:extLst>
+          </a:blip>
+          <a:stretch>
+            <a:fillRect/>
+          </a:stretch>
+        </p:blipFill>
+        <p:spPr>
+          <a:xfrm>
+            <a:off x="3501517" y="1449000"/>
+            <a:ext cx="5188966" cy="3960000"/>
+          </a:xfrm>
+          <a:prstGeom prst="rect">
+            <a:avLst/>
+          </a:prstGeom>
+        </p:spPr>
+      </p:pic>
+    </p:spTree>
+    <p:extLst>
+      <p:ext uri="{BB962C8B-B14F-4D97-AF65-F5344CB8AC3E}">
+        <p14:creationId xmlns:p14="http://schemas.microsoft.com/office/powerpoint/2010/main" val="2244933385"/>
+      </p:ext>
+    </p:extLst>
+  </p:cSld>
+  <p:clrMapOvr>
+    <a:masterClrMapping/>
+  </p:clrMapOvr>
+</p:sld>
+</file>
+
+<file path=ppt/slides/slide23.xml><?xml version="1.0" encoding="utf-8"?>
 <p:sld xmlns:a="http://schemas.openxmlformats.org/drawingml/2006/main" xmlns:r="http://schemas.openxmlformats.org/officeDocument/2006/relationships" xmlns:p="http://schemas.openxmlformats.org/presentationml/2006/main">
   <p:cSld>
     <p:bg>
@@ -3909,7 +4696,24 @@
           <p:nvPr/>
         </p:nvPicPr>
         <p:blipFill>
-          <a:blip r:embed="rId2"/>
+          <a:blip r:embed="rId2">
+            <a:extLst>
+              <a:ext uri="{BEBA8EAE-BF5A-486C-A8C5-ECC9F3942E4B}">
+                <a14:imgProps xmlns:a14="http://schemas.microsoft.com/office/drawing/2010/main">
+                  <a14:imgLayer r:embed="rId3">
+                    <a14:imgEffect>
+                      <a14:backgroundRemoval t="2371" b="97198" l="9704" r="89803">
+                        <a14:foregroundMark x1="49836" y1="17888" x2="49836" y2="17888"/>
+                        <a14:foregroundMark x1="47204" y1="2371" x2="47204" y2="2371"/>
+                        <a14:foregroundMark x1="49836" y1="91595" x2="49836" y2="91595"/>
+                        <a14:foregroundMark x1="50164" y1="97198" x2="50164" y2="97198"/>
+                      </a14:backgroundRemoval>
+                    </a14:imgEffect>
+                  </a14:imgLayer>
+                </a14:imgProps>
+              </a:ext>
+            </a:extLst>
+          </a:blip>
           <a:stretch>
             <a:fillRect/>
           </a:stretch>
@@ -3937,7 +4741,7 @@
 </p:sld>
 </file>
 
-<file path=ppt/slides/slide17.xml><?xml version="1.0" encoding="utf-8"?>
+<file path=ppt/slides/slide24.xml><?xml version="1.0" encoding="utf-8"?>
 <p:sld xmlns:a="http://schemas.openxmlformats.org/drawingml/2006/main" xmlns:r="http://schemas.openxmlformats.org/officeDocument/2006/relationships" xmlns:p="http://schemas.openxmlformats.org/presentationml/2006/main">
   <p:cSld>
     <p:bg>
@@ -3983,7 +4787,24 @@
           <p:nvPr/>
         </p:nvPicPr>
         <p:blipFill>
-          <a:blip r:embed="rId2"/>
+          <a:blip r:embed="rId2">
+            <a:extLst>
+              <a:ext uri="{BEBA8EAE-BF5A-486C-A8C5-ECC9F3942E4B}">
+                <a14:imgProps xmlns:a14="http://schemas.microsoft.com/office/drawing/2010/main">
+                  <a14:imgLayer r:embed="rId3">
+                    <a14:imgEffect>
+                      <a14:backgroundRemoval t="3664" b="98922" l="9704" r="89803">
+                        <a14:foregroundMark x1="48684" y1="15948" x2="48684" y2="15948"/>
+                        <a14:foregroundMark x1="49671" y1="3879" x2="49671" y2="3879"/>
+                        <a14:foregroundMark x1="50329" y1="92672" x2="50329" y2="92672"/>
+                        <a14:foregroundMark x1="50329" y1="98922" x2="50329" y2="98922"/>
+                      </a14:backgroundRemoval>
+                    </a14:imgEffect>
+                  </a14:imgLayer>
+                </a14:imgProps>
+              </a:ext>
+            </a:extLst>
+          </a:blip>
           <a:stretch>
             <a:fillRect/>
           </a:stretch>
@@ -4011,7 +4832,98 @@
 </p:sld>
 </file>
 
-<file path=ppt/slides/slide18.xml><?xml version="1.0" encoding="utf-8"?>
+<file path=ppt/slides/slide25.xml><?xml version="1.0" encoding="utf-8"?>
+<p:sld xmlns:a="http://schemas.openxmlformats.org/drawingml/2006/main" xmlns:r="http://schemas.openxmlformats.org/officeDocument/2006/relationships" xmlns:p="http://schemas.openxmlformats.org/presentationml/2006/main">
+  <p:cSld>
+    <p:bg>
+      <p:bgPr>
+        <a:solidFill>
+          <a:srgbClr val="5C5C5C"/>
+        </a:solidFill>
+        <a:effectLst/>
+      </p:bgPr>
+    </p:bg>
+    <p:spTree>
+      <p:nvGrpSpPr>
+        <p:cNvPr id="1" name="">
+          <a:extLst>
+            <a:ext uri="{FF2B5EF4-FFF2-40B4-BE49-F238E27FC236}">
+              <a16:creationId xmlns:a16="http://schemas.microsoft.com/office/drawing/2014/main" id="{556241F5-FF2C-280A-C3D3-C0D3820CA761}"/>
+            </a:ext>
+          </a:extLst>
+        </p:cNvPr>
+        <p:cNvGrpSpPr/>
+        <p:nvPr/>
+      </p:nvGrpSpPr>
+      <p:grpSpPr>
+        <a:xfrm>
+          <a:off x="0" y="0"/>
+          <a:ext cx="0" cy="0"/>
+          <a:chOff x="0" y="0"/>
+          <a:chExt cx="0" cy="0"/>
+        </a:xfrm>
+      </p:grpSpPr>
+      <p:pic>
+        <p:nvPicPr>
+          <p:cNvPr id="4" name="Picture 3">
+            <a:extLst>
+              <a:ext uri="{FF2B5EF4-FFF2-40B4-BE49-F238E27FC236}">
+                <a16:creationId xmlns:a16="http://schemas.microsoft.com/office/drawing/2014/main" id="{4C35A6A6-43B5-4E3F-AFCE-60B169372F1D}"/>
+              </a:ext>
+            </a:extLst>
+          </p:cNvPr>
+          <p:cNvPicPr>
+            <a:picLocks noChangeAspect="1"/>
+          </p:cNvPicPr>
+          <p:nvPr/>
+        </p:nvPicPr>
+        <p:blipFill>
+          <a:blip r:embed="rId2">
+            <a:extLst>
+              <a:ext uri="{BEBA8EAE-BF5A-486C-A8C5-ECC9F3942E4B}">
+                <a14:imgProps xmlns:a14="http://schemas.microsoft.com/office/drawing/2010/main">
+                  <a14:imgLayer r:embed="rId3">
+                    <a14:imgEffect>
+                      <a14:backgroundRemoval t="3233" b="98922" l="9704" r="89803">
+                        <a14:foregroundMark x1="48026" y1="18750" x2="48026" y2="18750"/>
+                        <a14:foregroundMark x1="49178" y1="3233" x2="49178" y2="3233"/>
+                        <a14:foregroundMark x1="53454" y1="92672" x2="53454" y2="92672"/>
+                        <a14:foregroundMark x1="48849" y1="98922" x2="48849" y2="98922"/>
+                      </a14:backgroundRemoval>
+                    </a14:imgEffect>
+                  </a14:imgLayer>
+                </a14:imgProps>
+              </a:ext>
+            </a:extLst>
+          </a:blip>
+          <a:stretch>
+            <a:fillRect/>
+          </a:stretch>
+        </p:blipFill>
+        <p:spPr>
+          <a:xfrm>
+            <a:off x="3501517" y="1449000"/>
+            <a:ext cx="5188966" cy="3960000"/>
+          </a:xfrm>
+          <a:prstGeom prst="rect">
+            <a:avLst/>
+          </a:prstGeom>
+        </p:spPr>
+      </p:pic>
+    </p:spTree>
+    <p:extLst>
+      <p:ext uri="{BB962C8B-B14F-4D97-AF65-F5344CB8AC3E}">
+        <p14:creationId xmlns:p14="http://schemas.microsoft.com/office/powerpoint/2010/main" val="3969072245"/>
+      </p:ext>
+    </p:extLst>
+  </p:cSld>
+  <p:clrMapOvr>
+    <a:masterClrMapping/>
+  </p:clrMapOvr>
+</p:sld>
+</file>
+
+<file path=ppt/slides/slide26.xml><?xml version="1.0" encoding="utf-8"?>
 <p:sld xmlns:a="http://schemas.openxmlformats.org/drawingml/2006/main" xmlns:r="http://schemas.openxmlformats.org/officeDocument/2006/relationships" xmlns:p="http://schemas.openxmlformats.org/presentationml/2006/main">
   <p:cSld>
     <p:bg>
@@ -4057,7 +4969,24 @@
           <p:nvPr/>
         </p:nvPicPr>
         <p:blipFill>
-          <a:blip r:embed="rId2"/>
+          <a:blip r:embed="rId2">
+            <a:extLst>
+              <a:ext uri="{BEBA8EAE-BF5A-486C-A8C5-ECC9F3942E4B}">
+                <a14:imgProps xmlns:a14="http://schemas.microsoft.com/office/drawing/2010/main">
+                  <a14:imgLayer r:embed="rId3">
+                    <a14:imgEffect>
+                      <a14:backgroundRemoval t="3233" b="99138" l="9704" r="89803">
+                        <a14:foregroundMark x1="52138" y1="18103" x2="52138" y2="18103"/>
+                        <a14:foregroundMark x1="47862" y1="3448" x2="47862" y2="3448"/>
+                        <a14:foregroundMark x1="48849" y1="95043" x2="48849" y2="95043"/>
+                        <a14:foregroundMark x1="49178" y1="99138" x2="49178" y2="99138"/>
+                      </a14:backgroundRemoval>
+                    </a14:imgEffect>
+                  </a14:imgLayer>
+                </a14:imgProps>
+              </a:ext>
+            </a:extLst>
+          </a:blip>
           <a:stretch>
             <a:fillRect/>
           </a:stretch>
@@ -4085,7 +5014,7 @@
 </p:sld>
 </file>
 
-<file path=ppt/slides/slide19.xml><?xml version="1.0" encoding="utf-8"?>
+<file path=ppt/slides/slide27.xml><?xml version="1.0" encoding="utf-8"?>
 <p:sld xmlns:a="http://schemas.openxmlformats.org/drawingml/2006/main" xmlns:r="http://schemas.openxmlformats.org/officeDocument/2006/relationships" xmlns:p="http://schemas.openxmlformats.org/presentationml/2006/main">
   <p:cSld>
     <p:bg>
@@ -4131,7 +5060,24 @@
           <p:nvPr/>
         </p:nvPicPr>
         <p:blipFill>
-          <a:blip r:embed="rId2"/>
+          <a:blip r:embed="rId2">
+            <a:extLst>
+              <a:ext uri="{BEBA8EAE-BF5A-486C-A8C5-ECC9F3942E4B}">
+                <a14:imgProps xmlns:a14="http://schemas.microsoft.com/office/drawing/2010/main">
+                  <a14:imgLayer r:embed="rId3">
+                    <a14:imgEffect>
+                      <a14:backgroundRemoval t="3664" b="97629" l="9704" r="89803">
+                        <a14:foregroundMark x1="49507" y1="18103" x2="49507" y2="18103"/>
+                        <a14:foregroundMark x1="50164" y1="3664" x2="50164" y2="3664"/>
+                        <a14:foregroundMark x1="49671" y1="92457" x2="49671" y2="92457"/>
+                        <a14:foregroundMark x1="50000" y1="97629" x2="50000" y2="97629"/>
+                      </a14:backgroundRemoval>
+                    </a14:imgEffect>
+                  </a14:imgLayer>
+                </a14:imgProps>
+              </a:ext>
+            </a:extLst>
+          </a:blip>
           <a:stretch>
             <a:fillRect/>
           </a:stretch>
@@ -4159,12 +5105,26 @@
 </p:sld>
 </file>
 
-<file path=ppt/slides/slide2.xml><?xml version="1.0" encoding="utf-8"?>
+<file path=ppt/slides/slide28.xml><?xml version="1.0" encoding="utf-8"?>
 <p:sld xmlns:a="http://schemas.openxmlformats.org/drawingml/2006/main" xmlns:r="http://schemas.openxmlformats.org/officeDocument/2006/relationships" xmlns:p="http://schemas.openxmlformats.org/presentationml/2006/main">
   <p:cSld>
+    <p:bg>
+      <p:bgPr>
+        <a:solidFill>
+          <a:srgbClr val="5C5C5C"/>
+        </a:solidFill>
+        <a:effectLst/>
+      </p:bgPr>
+    </p:bg>
     <p:spTree>
       <p:nvGrpSpPr>
-        <p:cNvPr id="1" name=""/>
+        <p:cNvPr id="1" name="">
+          <a:extLst>
+            <a:ext uri="{FF2B5EF4-FFF2-40B4-BE49-F238E27FC236}">
+              <a16:creationId xmlns:a16="http://schemas.microsoft.com/office/drawing/2014/main" id="{63580460-F224-F50C-29B2-B0E143BF6257}"/>
+            </a:ext>
+          </a:extLst>
+        </p:cNvPr>
         <p:cNvGrpSpPr/>
         <p:nvPr/>
       </p:nvGrpSpPr>
@@ -4176,47 +5136,57 @@
           <a:chExt cx="0" cy="0"/>
         </a:xfrm>
       </p:grpSpPr>
-      <p:sp>
-        <p:nvSpPr>
-          <p:cNvPr id="2" name="Title 1">
-            <a:extLst>
-              <a:ext uri="{FF2B5EF4-FFF2-40B4-BE49-F238E27FC236}">
-                <a16:creationId xmlns:a16="http://schemas.microsoft.com/office/drawing/2014/main" id="{0A1FA53E-25A0-0960-0FCC-4CC105416AC1}"/>
-              </a:ext>
-            </a:extLst>
-          </p:cNvPr>
-          <p:cNvSpPr>
-            <a:spLocks noGrp="1"/>
-          </p:cNvSpPr>
-          <p:nvPr>
-            <p:ph type="title"/>
-          </p:nvPr>
-        </p:nvSpPr>
+      <p:pic>
+        <p:nvPicPr>
+          <p:cNvPr id="4" name="Picture 3">
+            <a:extLst>
+              <a:ext uri="{FF2B5EF4-FFF2-40B4-BE49-F238E27FC236}">
+                <a16:creationId xmlns:a16="http://schemas.microsoft.com/office/drawing/2014/main" id="{B309E94A-FEB5-1E05-769B-A51C1F1C645E}"/>
+              </a:ext>
+            </a:extLst>
+          </p:cNvPr>
+          <p:cNvPicPr>
+            <a:picLocks noChangeAspect="1"/>
+          </p:cNvPicPr>
+          <p:nvPr/>
+        </p:nvPicPr>
+        <p:blipFill>
+          <a:blip r:embed="rId2">
+            <a:extLst>
+              <a:ext uri="{BEBA8EAE-BF5A-486C-A8C5-ECC9F3942E4B}">
+                <a14:imgProps xmlns:a14="http://schemas.microsoft.com/office/drawing/2010/main">
+                  <a14:imgLayer r:embed="rId3">
+                    <a14:imgEffect>
+                      <a14:backgroundRemoval t="2371" b="99569" l="9704" r="89803">
+                        <a14:foregroundMark x1="45888" y1="18750" x2="45888" y2="18750"/>
+                        <a14:foregroundMark x1="52467" y1="2371" x2="52467" y2="2371"/>
+                        <a14:foregroundMark x1="49671" y1="94612" x2="49671" y2="94612"/>
+                        <a14:foregroundMark x1="49836" y1="99569" x2="49836" y2="99569"/>
+                      </a14:backgroundRemoval>
+                    </a14:imgEffect>
+                  </a14:imgLayer>
+                </a14:imgProps>
+              </a:ext>
+            </a:extLst>
+          </a:blip>
+          <a:stretch>
+            <a:fillRect/>
+          </a:stretch>
+        </p:blipFill>
         <p:spPr>
           <a:xfrm>
-            <a:off x="410688" y="365125"/>
-            <a:ext cx="10943112" cy="584901"/>
+            <a:off x="3501517" y="1449000"/>
+            <a:ext cx="5188966" cy="3960000"/>
           </a:xfrm>
+          <a:prstGeom prst="rect">
+            <a:avLst/>
+          </a:prstGeom>
         </p:spPr>
-        <p:txBody>
-          <a:bodyPr>
-            <a:normAutofit/>
-          </a:bodyPr>
-          <a:lstStyle/>
-          <a:p>
-            <a:r>
-              <a:rPr lang="en-CH" sz="2800" b="1" dirty="0">
-                <a:latin typeface="Avenir Book" panose="02000503020000020003" pitchFamily="2" charset="0"/>
-              </a:rPr>
-              <a:t>Practice Task Slides (12 trials)</a:t>
-            </a:r>
-          </a:p>
-        </p:txBody>
-      </p:sp>
+      </p:pic>
     </p:spTree>
     <p:extLst>
       <p:ext uri="{BB962C8B-B14F-4D97-AF65-F5344CB8AC3E}">
-        <p14:creationId xmlns:p14="http://schemas.microsoft.com/office/powerpoint/2010/main" val="2739542140"/>
+        <p14:creationId xmlns:p14="http://schemas.microsoft.com/office/powerpoint/2010/main" val="2022457918"/>
       </p:ext>
     </p:extLst>
   </p:cSld>
@@ -4226,7 +5196,7 @@
 </p:sld>
 </file>
 
-<file path=ppt/slides/slide20.xml><?xml version="1.0" encoding="utf-8"?>
+<file path=ppt/slides/slide29.xml><?xml version="1.0" encoding="utf-8"?>
 <p:sld xmlns:a="http://schemas.openxmlformats.org/drawingml/2006/main" xmlns:r="http://schemas.openxmlformats.org/officeDocument/2006/relationships" xmlns:p="http://schemas.openxmlformats.org/presentationml/2006/main">
   <p:cSld>
     <p:bg>
@@ -4272,7 +5242,25 @@
           <p:nvPr/>
         </p:nvPicPr>
         <p:blipFill>
-          <a:blip r:embed="rId2"/>
+          <a:blip r:embed="rId2">
+            <a:extLst>
+              <a:ext uri="{BEBA8EAE-BF5A-486C-A8C5-ECC9F3942E4B}">
+                <a14:imgProps xmlns:a14="http://schemas.microsoft.com/office/drawing/2010/main">
+                  <a14:imgLayer r:embed="rId3">
+                    <a14:imgEffect>
+                      <a14:backgroundRemoval t="2371" b="98276" l="9704" r="89803">
+                        <a14:foregroundMark x1="49671" y1="19828" x2="49671" y2="19828"/>
+                        <a14:foregroundMark x1="49507" y1="4526" x2="49507" y2="4526"/>
+                        <a14:foregroundMark x1="50164" y1="2371" x2="50164" y2="2371"/>
+                        <a14:foregroundMark x1="53454" y1="92672" x2="53454" y2="92672"/>
+                        <a14:foregroundMark x1="50822" y1="98276" x2="50822" y2="98276"/>
+                      </a14:backgroundRemoval>
+                    </a14:imgEffect>
+                  </a14:imgLayer>
+                </a14:imgProps>
+              </a:ext>
+            </a:extLst>
+          </a:blip>
           <a:stretch>
             <a:fillRect/>
           </a:stretch>
@@ -4291,981 +5279,6 @@
     <p:extLst>
       <p:ext uri="{BB962C8B-B14F-4D97-AF65-F5344CB8AC3E}">
         <p14:creationId xmlns:p14="http://schemas.microsoft.com/office/powerpoint/2010/main" val="1274849160"/>
-      </p:ext>
-    </p:extLst>
-  </p:cSld>
-  <p:clrMapOvr>
-    <a:masterClrMapping/>
-  </p:clrMapOvr>
-</p:sld>
-</file>
-
-<file path=ppt/slides/slide21.xml><?xml version="1.0" encoding="utf-8"?>
-<p:sld xmlns:a="http://schemas.openxmlformats.org/drawingml/2006/main" xmlns:r="http://schemas.openxmlformats.org/officeDocument/2006/relationships" xmlns:p="http://schemas.openxmlformats.org/presentationml/2006/main">
-  <p:cSld>
-    <p:bg>
-      <p:bgPr>
-        <a:solidFill>
-          <a:srgbClr val="5C5C5C"/>
-        </a:solidFill>
-        <a:effectLst/>
-      </p:bgPr>
-    </p:bg>
-    <p:spTree>
-      <p:nvGrpSpPr>
-        <p:cNvPr id="1" name=""/>
-        <p:cNvGrpSpPr/>
-        <p:nvPr/>
-      </p:nvGrpSpPr>
-      <p:grpSpPr>
-        <a:xfrm>
-          <a:off x="0" y="0"/>
-          <a:ext cx="0" cy="0"/>
-          <a:chOff x="0" y="0"/>
-          <a:chExt cx="0" cy="0"/>
-        </a:xfrm>
-      </p:grpSpPr>
-      <p:sp>
-        <p:nvSpPr>
-          <p:cNvPr id="5" name="TextBox 4">
-            <a:extLst>
-              <a:ext uri="{FF2B5EF4-FFF2-40B4-BE49-F238E27FC236}">
-                <a16:creationId xmlns:a16="http://schemas.microsoft.com/office/drawing/2014/main" id="{5C3101FE-916F-7AC8-03CF-F8680EC21ADF}"/>
-              </a:ext>
-            </a:extLst>
-          </p:cNvPr>
-          <p:cNvSpPr txBox="1"/>
-          <p:nvPr/>
-        </p:nvSpPr>
-        <p:spPr>
-          <a:xfrm>
-            <a:off x="373856" y="2510165"/>
-            <a:ext cx="11444287" cy="1569660"/>
-          </a:xfrm>
-          <a:prstGeom prst="rect">
-            <a:avLst/>
-          </a:prstGeom>
-          <a:noFill/>
-        </p:spPr>
-        <p:txBody>
-          <a:bodyPr wrap="square" rtlCol="0">
-            <a:spAutoFit/>
-          </a:bodyPr>
-          <a:lstStyle/>
-          <a:p>
-            <a:pPr algn="ctr"/>
-            <a:r>
-              <a:rPr lang="en-CH" sz="9600" dirty="0">
-                <a:solidFill>
-                  <a:schemeClr val="bg1"/>
-                </a:solidFill>
-                <a:latin typeface="Avenir Light" panose="020B0402020203020204" pitchFamily="34" charset="77"/>
-                <a:cs typeface="Arial" panose="020B0604020202020204" pitchFamily="34" charset="0"/>
-              </a:rPr>
-              <a:t>+</a:t>
-            </a:r>
-          </a:p>
-        </p:txBody>
-      </p:sp>
-    </p:spTree>
-    <p:extLst>
-      <p:ext uri="{BB962C8B-B14F-4D97-AF65-F5344CB8AC3E}">
-        <p14:creationId xmlns:p14="http://schemas.microsoft.com/office/powerpoint/2010/main" val="1400167985"/>
-      </p:ext>
-    </p:extLst>
-  </p:cSld>
-  <p:clrMapOvr>
-    <a:masterClrMapping/>
-  </p:clrMapOvr>
-</p:sld>
-</file>
-
-<file path=ppt/slides/slide22.xml><?xml version="1.0" encoding="utf-8"?>
-<p:sld xmlns:a="http://schemas.openxmlformats.org/drawingml/2006/main" xmlns:r="http://schemas.openxmlformats.org/officeDocument/2006/relationships" xmlns:p="http://schemas.openxmlformats.org/presentationml/2006/main">
-  <p:cSld>
-    <p:spTree>
-      <p:nvGrpSpPr>
-        <p:cNvPr id="1" name=""/>
-        <p:cNvGrpSpPr/>
-        <p:nvPr/>
-      </p:nvGrpSpPr>
-      <p:grpSpPr>
-        <a:xfrm>
-          <a:off x="0" y="0"/>
-          <a:ext cx="0" cy="0"/>
-          <a:chOff x="0" y="0"/>
-          <a:chExt cx="0" cy="0"/>
-        </a:xfrm>
-      </p:grpSpPr>
-      <p:sp>
-        <p:nvSpPr>
-          <p:cNvPr id="2" name="Title 1">
-            <a:extLst>
-              <a:ext uri="{FF2B5EF4-FFF2-40B4-BE49-F238E27FC236}">
-                <a16:creationId xmlns:a16="http://schemas.microsoft.com/office/drawing/2014/main" id="{0A1FA53E-25A0-0960-0FCC-4CC105416AC1}"/>
-              </a:ext>
-            </a:extLst>
-          </p:cNvPr>
-          <p:cNvSpPr>
-            <a:spLocks noGrp="1"/>
-          </p:cNvSpPr>
-          <p:nvPr>
-            <p:ph type="title"/>
-          </p:nvPr>
-        </p:nvSpPr>
-        <p:spPr>
-          <a:xfrm>
-            <a:off x="410688" y="365125"/>
-            <a:ext cx="10943112" cy="584901"/>
-          </a:xfrm>
-        </p:spPr>
-        <p:txBody>
-          <a:bodyPr>
-            <a:normAutofit/>
-          </a:bodyPr>
-          <a:lstStyle/>
-          <a:p>
-            <a:r>
-              <a:rPr lang="en-CH" sz="2800" b="1" dirty="0">
-                <a:latin typeface="Avenir Book" panose="02000503020000020003" pitchFamily="2" charset="0"/>
-              </a:rPr>
-              <a:t>Practice Task Slides in scanner (4 trials)</a:t>
-            </a:r>
-          </a:p>
-        </p:txBody>
-      </p:sp>
-    </p:spTree>
-    <p:extLst>
-      <p:ext uri="{BB962C8B-B14F-4D97-AF65-F5344CB8AC3E}">
-        <p14:creationId xmlns:p14="http://schemas.microsoft.com/office/powerpoint/2010/main" val="1730170648"/>
-      </p:ext>
-    </p:extLst>
-  </p:cSld>
-  <p:clrMapOvr>
-    <a:masterClrMapping/>
-  </p:clrMapOvr>
-</p:sld>
-</file>
-
-<file path=ppt/slides/slide23.xml><?xml version="1.0" encoding="utf-8"?>
-<p:sld xmlns:a="http://schemas.openxmlformats.org/drawingml/2006/main" xmlns:r="http://schemas.openxmlformats.org/officeDocument/2006/relationships" xmlns:p="http://schemas.openxmlformats.org/presentationml/2006/main">
-  <p:cSld>
-    <p:bg>
-      <p:bgPr>
-        <a:solidFill>
-          <a:srgbClr val="5C5C5C"/>
-        </a:solidFill>
-        <a:effectLst/>
-      </p:bgPr>
-    </p:bg>
-    <p:spTree>
-      <p:nvGrpSpPr>
-        <p:cNvPr id="1" name=""/>
-        <p:cNvGrpSpPr/>
-        <p:nvPr/>
-      </p:nvGrpSpPr>
-      <p:grpSpPr>
-        <a:xfrm>
-          <a:off x="0" y="0"/>
-          <a:ext cx="0" cy="0"/>
-          <a:chOff x="0" y="0"/>
-          <a:chExt cx="0" cy="0"/>
-        </a:xfrm>
-      </p:grpSpPr>
-      <p:sp>
-        <p:nvSpPr>
-          <p:cNvPr id="5" name="TextBox 4">
-            <a:extLst>
-              <a:ext uri="{FF2B5EF4-FFF2-40B4-BE49-F238E27FC236}">
-                <a16:creationId xmlns:a16="http://schemas.microsoft.com/office/drawing/2014/main" id="{5C3101FE-916F-7AC8-03CF-F8680EC21ADF}"/>
-              </a:ext>
-            </a:extLst>
-          </p:cNvPr>
-          <p:cNvSpPr txBox="1"/>
-          <p:nvPr/>
-        </p:nvSpPr>
-        <p:spPr>
-          <a:xfrm>
-            <a:off x="391886" y="130629"/>
-            <a:ext cx="11614067" cy="4216539"/>
-          </a:xfrm>
-          <a:prstGeom prst="rect">
-            <a:avLst/>
-          </a:prstGeom>
-          <a:noFill/>
-          <a:ln>
-            <a:noFill/>
-          </a:ln>
-        </p:spPr>
-        <p:txBody>
-          <a:bodyPr wrap="square" rtlCol="0">
-            <a:spAutoFit/>
-          </a:bodyPr>
-          <a:lstStyle/>
-          <a:p>
-            <a:pPr algn="ctr"/>
-            <a:r>
-              <a:rPr lang="en-CH" sz="2400" dirty="0">
-                <a:solidFill>
-                  <a:schemeClr val="bg1"/>
-                </a:solidFill>
-                <a:latin typeface="Arial" panose="020B0604020202020204" pitchFamily="34" charset="0"/>
-                <a:cs typeface="Arial" panose="020B0604020202020204" pitchFamily="34" charset="0"/>
-              </a:rPr>
-              <a:t>Welcome to the </a:t>
-            </a:r>
-            <a:r>
-              <a:rPr lang="en-GB" sz="2400" dirty="0">
-                <a:solidFill>
-                  <a:schemeClr val="bg1"/>
-                </a:solidFill>
-                <a:latin typeface="Arial" panose="020B0604020202020204" pitchFamily="34" charset="0"/>
-                <a:cs typeface="Arial" panose="020B0604020202020204" pitchFamily="34" charset="0"/>
-              </a:rPr>
-              <a:t>s</a:t>
-            </a:r>
-            <a:r>
-              <a:rPr lang="en-CH" sz="2400" dirty="0">
-                <a:solidFill>
-                  <a:schemeClr val="bg1"/>
-                </a:solidFill>
-                <a:latin typeface="Arial" panose="020B0604020202020204" pitchFamily="34" charset="0"/>
-                <a:cs typeface="Arial" panose="020B0604020202020204" pitchFamily="34" charset="0"/>
-              </a:rPr>
-              <a:t>canner practice round of the SAP task.</a:t>
-            </a:r>
-          </a:p>
-          <a:p>
-            <a:endParaRPr lang="en-CH" sz="2400" dirty="0">
-              <a:solidFill>
-                <a:schemeClr val="bg1"/>
-              </a:solidFill>
-              <a:latin typeface="Arial" panose="020B0604020202020204" pitchFamily="34" charset="0"/>
-              <a:cs typeface="Arial" panose="020B0604020202020204" pitchFamily="34" charset="0"/>
-            </a:endParaRPr>
-          </a:p>
-          <a:p>
-            <a:endParaRPr lang="en-CH" sz="2200" dirty="0">
-              <a:solidFill>
-                <a:schemeClr val="bg1"/>
-              </a:solidFill>
-              <a:latin typeface="Arial" panose="020B0604020202020204" pitchFamily="34" charset="0"/>
-              <a:cs typeface="Arial" panose="020B0604020202020204" pitchFamily="34" charset="0"/>
-            </a:endParaRPr>
-          </a:p>
-          <a:p>
-            <a:r>
-              <a:rPr lang="en-CH" sz="2200" dirty="0">
-                <a:solidFill>
-                  <a:schemeClr val="bg1"/>
-                </a:solidFill>
-                <a:latin typeface="Arial" panose="020B0604020202020204" pitchFamily="34" charset="0"/>
-                <a:cs typeface="Arial" panose="020B0604020202020204" pitchFamily="34" charset="0"/>
-              </a:rPr>
-              <a:t>You are now getting a chance to practice the task in the scanner with the button box.</a:t>
-            </a:r>
-          </a:p>
-          <a:p>
-            <a:endParaRPr lang="en-CH" sz="2200" dirty="0">
-              <a:solidFill>
-                <a:schemeClr val="bg1"/>
-              </a:solidFill>
-              <a:latin typeface="Arial" panose="020B0604020202020204" pitchFamily="34" charset="0"/>
-              <a:cs typeface="Arial" panose="020B0604020202020204" pitchFamily="34" charset="0"/>
-            </a:endParaRPr>
-          </a:p>
-          <a:p>
-            <a:r>
-              <a:rPr lang="en-CH" sz="2200" dirty="0">
-                <a:solidFill>
-                  <a:schemeClr val="bg1"/>
-                </a:solidFill>
-                <a:latin typeface="Arial" panose="020B0604020202020204" pitchFamily="34" charset="0"/>
-                <a:cs typeface="Arial" panose="020B0604020202020204" pitchFamily="34" charset="0"/>
-              </a:rPr>
-              <a:t>This is just so that you can get used to the setup with the button box and you laying down. You will see two faces here again. They will not be the same faces that you will interact with in the task later.</a:t>
-            </a:r>
-          </a:p>
-          <a:p>
-            <a:endParaRPr lang="en-CH" sz="2200" dirty="0">
-              <a:solidFill>
-                <a:schemeClr val="bg1"/>
-              </a:solidFill>
-              <a:latin typeface="Arial" panose="020B0604020202020204" pitchFamily="34" charset="0"/>
-              <a:cs typeface="Arial" panose="020B0604020202020204" pitchFamily="34" charset="0"/>
-            </a:endParaRPr>
-          </a:p>
-          <a:p>
-            <a:r>
-              <a:rPr lang="en-CH" sz="2200" dirty="0">
-                <a:solidFill>
-                  <a:schemeClr val="bg1"/>
-                </a:solidFill>
-                <a:latin typeface="Arial" panose="020B0604020202020204" pitchFamily="34" charset="0"/>
-                <a:cs typeface="Arial" panose="020B0604020202020204" pitchFamily="34" charset="0"/>
-              </a:rPr>
-              <a:t>This practice will only involve 4 rounds.</a:t>
-            </a:r>
-          </a:p>
-          <a:p>
-            <a:endParaRPr lang="en-CH" sz="2200" dirty="0">
-              <a:solidFill>
-                <a:schemeClr val="bg1"/>
-              </a:solidFill>
-              <a:latin typeface="Arial" panose="020B0604020202020204" pitchFamily="34" charset="0"/>
-              <a:cs typeface="Arial" panose="020B0604020202020204" pitchFamily="34" charset="0"/>
-            </a:endParaRPr>
-          </a:p>
-          <a:p>
-            <a:r>
-              <a:rPr lang="en-CH" sz="2200" dirty="0">
-                <a:solidFill>
-                  <a:schemeClr val="bg1"/>
-                </a:solidFill>
-                <a:latin typeface="Arial" panose="020B0604020202020204" pitchFamily="34" charset="0"/>
-                <a:cs typeface="Arial" panose="020B0604020202020204" pitchFamily="34" charset="0"/>
-              </a:rPr>
-              <a:t>If you have any questions, you can ask anytime during this short practice.</a:t>
-            </a:r>
-          </a:p>
-        </p:txBody>
-      </p:sp>
-    </p:spTree>
-    <p:extLst>
-      <p:ext uri="{BB962C8B-B14F-4D97-AF65-F5344CB8AC3E}">
-        <p14:creationId xmlns:p14="http://schemas.microsoft.com/office/powerpoint/2010/main" val="1894031005"/>
-      </p:ext>
-    </p:extLst>
-  </p:cSld>
-  <p:clrMapOvr>
-    <a:masterClrMapping/>
-  </p:clrMapOvr>
-</p:sld>
-</file>
-
-<file path=ppt/slides/slide24.xml><?xml version="1.0" encoding="utf-8"?>
-<p:sld xmlns:a="http://schemas.openxmlformats.org/drawingml/2006/main" xmlns:r="http://schemas.openxmlformats.org/officeDocument/2006/relationships" xmlns:p="http://schemas.openxmlformats.org/presentationml/2006/main">
-  <p:cSld>
-    <p:spTree>
-      <p:nvGrpSpPr>
-        <p:cNvPr id="1" name=""/>
-        <p:cNvGrpSpPr/>
-        <p:nvPr/>
-      </p:nvGrpSpPr>
-      <p:grpSpPr>
-        <a:xfrm>
-          <a:off x="0" y="0"/>
-          <a:ext cx="0" cy="0"/>
-          <a:chOff x="0" y="0"/>
-          <a:chExt cx="0" cy="0"/>
-        </a:xfrm>
-      </p:grpSpPr>
-      <p:sp>
-        <p:nvSpPr>
-          <p:cNvPr id="2" name="Title 1">
-            <a:extLst>
-              <a:ext uri="{FF2B5EF4-FFF2-40B4-BE49-F238E27FC236}">
-                <a16:creationId xmlns:a16="http://schemas.microsoft.com/office/drawing/2014/main" id="{0A1FA53E-25A0-0960-0FCC-4CC105416AC1}"/>
-              </a:ext>
-            </a:extLst>
-          </p:cNvPr>
-          <p:cNvSpPr>
-            <a:spLocks noGrp="1"/>
-          </p:cNvSpPr>
-          <p:nvPr>
-            <p:ph type="title"/>
-          </p:nvPr>
-        </p:nvSpPr>
-        <p:spPr>
-          <a:xfrm>
-            <a:off x="410688" y="365125"/>
-            <a:ext cx="10943112" cy="584901"/>
-          </a:xfrm>
-        </p:spPr>
-        <p:txBody>
-          <a:bodyPr>
-            <a:normAutofit/>
-          </a:bodyPr>
-          <a:lstStyle/>
-          <a:p>
-            <a:r>
-              <a:rPr lang="en-CH" sz="2800" b="1" dirty="0">
-                <a:latin typeface="Avenir Book" panose="02000503020000020003" pitchFamily="2" charset="0"/>
-              </a:rPr>
-              <a:t>Main Task Slides</a:t>
-            </a:r>
-          </a:p>
-        </p:txBody>
-      </p:sp>
-    </p:spTree>
-    <p:extLst>
-      <p:ext uri="{BB962C8B-B14F-4D97-AF65-F5344CB8AC3E}">
-        <p14:creationId xmlns:p14="http://schemas.microsoft.com/office/powerpoint/2010/main" val="4119700243"/>
-      </p:ext>
-    </p:extLst>
-  </p:cSld>
-  <p:clrMapOvr>
-    <a:masterClrMapping/>
-  </p:clrMapOvr>
-</p:sld>
-</file>
-
-<file path=ppt/slides/slide25.xml><?xml version="1.0" encoding="utf-8"?>
-<p:sld xmlns:a="http://schemas.openxmlformats.org/drawingml/2006/main" xmlns:r="http://schemas.openxmlformats.org/officeDocument/2006/relationships" xmlns:p="http://schemas.openxmlformats.org/presentationml/2006/main">
-  <p:cSld>
-    <p:bg>
-      <p:bgPr>
-        <a:solidFill>
-          <a:srgbClr val="5C5C5C"/>
-        </a:solidFill>
-        <a:effectLst/>
-      </p:bgPr>
-    </p:bg>
-    <p:spTree>
-      <p:nvGrpSpPr>
-        <p:cNvPr id="1" name=""/>
-        <p:cNvGrpSpPr/>
-        <p:nvPr/>
-      </p:nvGrpSpPr>
-      <p:grpSpPr>
-        <a:xfrm>
-          <a:off x="0" y="0"/>
-          <a:ext cx="0" cy="0"/>
-          <a:chOff x="0" y="0"/>
-          <a:chExt cx="0" cy="0"/>
-        </a:xfrm>
-      </p:grpSpPr>
-      <p:sp>
-        <p:nvSpPr>
-          <p:cNvPr id="5" name="TextBox 4">
-            <a:extLst>
-              <a:ext uri="{FF2B5EF4-FFF2-40B4-BE49-F238E27FC236}">
-                <a16:creationId xmlns:a16="http://schemas.microsoft.com/office/drawing/2014/main" id="{5C3101FE-916F-7AC8-03CF-F8680EC21ADF}"/>
-              </a:ext>
-            </a:extLst>
-          </p:cNvPr>
-          <p:cNvSpPr txBox="1"/>
-          <p:nvPr/>
-        </p:nvSpPr>
-        <p:spPr>
-          <a:xfrm>
-            <a:off x="391886" y="130629"/>
-            <a:ext cx="11614067" cy="4524315"/>
-          </a:xfrm>
-          <a:prstGeom prst="rect">
-            <a:avLst/>
-          </a:prstGeom>
-          <a:noFill/>
-          <a:ln>
-            <a:noFill/>
-          </a:ln>
-        </p:spPr>
-        <p:txBody>
-          <a:bodyPr wrap="square" rtlCol="0">
-            <a:spAutoFit/>
-          </a:bodyPr>
-          <a:lstStyle/>
-          <a:p>
-            <a:pPr algn="ctr"/>
-            <a:r>
-              <a:rPr lang="en-CH" sz="2400" dirty="0">
-                <a:solidFill>
-                  <a:schemeClr val="bg1"/>
-                </a:solidFill>
-                <a:latin typeface="Arial" panose="020B0604020202020204" pitchFamily="34" charset="0"/>
-                <a:cs typeface="Arial" panose="020B0604020202020204" pitchFamily="34" charset="0"/>
-              </a:rPr>
-              <a:t>Welcome to the SAP task.</a:t>
-            </a:r>
-          </a:p>
-          <a:p>
-            <a:endParaRPr lang="en-CH" sz="2200" dirty="0">
-              <a:solidFill>
-                <a:schemeClr val="bg1"/>
-              </a:solidFill>
-              <a:latin typeface="Arial" panose="020B0604020202020204" pitchFamily="34" charset="0"/>
-              <a:cs typeface="Arial" panose="020B0604020202020204" pitchFamily="34" charset="0"/>
-            </a:endParaRPr>
-          </a:p>
-          <a:p>
-            <a:r>
-              <a:rPr lang="en-CH" sz="2200" dirty="0">
-                <a:solidFill>
-                  <a:schemeClr val="bg1"/>
-                </a:solidFill>
-                <a:latin typeface="Arial" panose="020B0604020202020204" pitchFamily="34" charset="0"/>
-                <a:cs typeface="Arial" panose="020B0604020202020204" pitchFamily="34" charset="0"/>
-              </a:rPr>
-              <a:t>This is the SAP task that you have practiced already.</a:t>
-            </a:r>
-          </a:p>
-          <a:p>
-            <a:endParaRPr lang="en-CH" sz="2200" dirty="0">
-              <a:solidFill>
-                <a:schemeClr val="bg1"/>
-              </a:solidFill>
-              <a:latin typeface="Arial" panose="020B0604020202020204" pitchFamily="34" charset="0"/>
-              <a:cs typeface="Arial" panose="020B0604020202020204" pitchFamily="34" charset="0"/>
-            </a:endParaRPr>
-          </a:p>
-          <a:p>
-            <a:r>
-              <a:rPr lang="en-CH" sz="2200" dirty="0">
-                <a:solidFill>
-                  <a:schemeClr val="bg1"/>
-                </a:solidFill>
-                <a:latin typeface="Arial" panose="020B0604020202020204" pitchFamily="34" charset="0"/>
-                <a:cs typeface="Arial" panose="020B0604020202020204" pitchFamily="34" charset="0"/>
-              </a:rPr>
-              <a:t>During the task you cannot ask any questions. So if you have questions, please ask now.</a:t>
-            </a:r>
-          </a:p>
-          <a:p>
-            <a:pPr marL="342900" indent="-342900">
-              <a:buFont typeface="Arial" panose="020B0604020202020204" pitchFamily="34" charset="0"/>
-              <a:buChar char="•"/>
-            </a:pPr>
-            <a:endParaRPr lang="en-CH" sz="2200" dirty="0">
-              <a:solidFill>
-                <a:schemeClr val="bg1"/>
-              </a:solidFill>
-              <a:latin typeface="Arial" panose="020B0604020202020204" pitchFamily="34" charset="0"/>
-              <a:cs typeface="Arial" panose="020B0604020202020204" pitchFamily="34" charset="0"/>
-            </a:endParaRPr>
-          </a:p>
-          <a:p>
-            <a:r>
-              <a:rPr lang="en-CH" sz="2200" dirty="0">
-                <a:solidFill>
-                  <a:schemeClr val="bg1"/>
-                </a:solidFill>
-                <a:latin typeface="Arial" panose="020B0604020202020204" pitchFamily="34" charset="0"/>
-                <a:cs typeface="Arial" panose="020B0604020202020204" pitchFamily="34" charset="0"/>
-              </a:rPr>
-              <a:t>Because we are recording brain and physiological activity, please move as little as possible. If you move too much (yawning, clenching your fists or yaw, wiggling your toes) the data cannot be used. So if you are uncomfortable, please let us know at this point. </a:t>
-            </a:r>
-          </a:p>
-          <a:p>
-            <a:r>
-              <a:rPr lang="en-CH" sz="2200" dirty="0">
-                <a:solidFill>
-                  <a:schemeClr val="bg1"/>
-                </a:solidFill>
-                <a:latin typeface="Arial" panose="020B0604020202020204" pitchFamily="34" charset="0"/>
-                <a:cs typeface="Arial" panose="020B0604020202020204" pitchFamily="34" charset="0"/>
-              </a:rPr>
-              <a:t>The data quality will be best if you are relaxed and still. Try not to tensen up any muscles, also keep your face relaxed when you are </a:t>
-            </a:r>
-            <a:r>
-              <a:rPr lang="en-CH" sz="2200" u="sng" dirty="0">
-                <a:solidFill>
-                  <a:schemeClr val="bg1"/>
-                </a:solidFill>
-                <a:latin typeface="Arial" panose="020B0604020202020204" pitchFamily="34" charset="0"/>
-                <a:cs typeface="Arial" panose="020B0604020202020204" pitchFamily="34" charset="0"/>
-              </a:rPr>
-              <a:t>not</a:t>
-            </a:r>
-            <a:r>
-              <a:rPr lang="en-CH" sz="2200" dirty="0">
-                <a:solidFill>
-                  <a:schemeClr val="bg1"/>
-                </a:solidFill>
-                <a:latin typeface="Arial" panose="020B0604020202020204" pitchFamily="34" charset="0"/>
-                <a:cs typeface="Arial" panose="020B0604020202020204" pitchFamily="34" charset="0"/>
-              </a:rPr>
-              <a:t> asked to smile. </a:t>
-            </a:r>
-            <a:r>
-              <a:rPr lang="en-CH" sz="2200" dirty="0">
-                <a:solidFill>
-                  <a:schemeClr val="bg1"/>
-                </a:solidFill>
-                <a:latin typeface="Arial" panose="020B0604020202020204" pitchFamily="34" charset="0"/>
-                <a:cs typeface="Arial" panose="020B0604020202020204" pitchFamily="34" charset="0"/>
-                <a:sym typeface="Wingdings" pitchFamily="2" charset="2"/>
-              </a:rPr>
-              <a:t></a:t>
-            </a:r>
-          </a:p>
-          <a:p>
-            <a:endParaRPr lang="en-CH" sz="2200" dirty="0">
-              <a:solidFill>
-                <a:schemeClr val="bg1"/>
-              </a:solidFill>
-              <a:latin typeface="Arial" panose="020B0604020202020204" pitchFamily="34" charset="0"/>
-              <a:cs typeface="Arial" panose="020B0604020202020204" pitchFamily="34" charset="0"/>
-            </a:endParaRPr>
-          </a:p>
-          <a:p>
-            <a:r>
-              <a:rPr lang="en-CH" sz="2200" dirty="0">
-                <a:solidFill>
-                  <a:schemeClr val="bg1"/>
-                </a:solidFill>
-                <a:latin typeface="Arial" panose="020B0604020202020204" pitchFamily="34" charset="0"/>
-                <a:cs typeface="Arial" panose="020B0604020202020204" pitchFamily="34" charset="0"/>
-              </a:rPr>
-              <a:t>The task is going to take about 20 minutes. </a:t>
-            </a:r>
-          </a:p>
-        </p:txBody>
-      </p:sp>
-    </p:spTree>
-    <p:extLst>
-      <p:ext uri="{BB962C8B-B14F-4D97-AF65-F5344CB8AC3E}">
-        <p14:creationId xmlns:p14="http://schemas.microsoft.com/office/powerpoint/2010/main" val="1357929970"/>
-      </p:ext>
-    </p:extLst>
-  </p:cSld>
-  <p:clrMapOvr>
-    <a:masterClrMapping/>
-  </p:clrMapOvr>
-</p:sld>
-</file>
-
-<file path=ppt/slides/slide26.xml><?xml version="1.0" encoding="utf-8"?>
-<p:sld xmlns:a="http://schemas.openxmlformats.org/drawingml/2006/main" xmlns:r="http://schemas.openxmlformats.org/officeDocument/2006/relationships" xmlns:p="http://schemas.openxmlformats.org/presentationml/2006/main">
-  <p:cSld>
-    <p:bg>
-      <p:bgPr>
-        <a:solidFill>
-          <a:srgbClr val="5C5C5C"/>
-        </a:solidFill>
-        <a:effectLst/>
-      </p:bgPr>
-    </p:bg>
-    <p:spTree>
-      <p:nvGrpSpPr>
-        <p:cNvPr id="1" name=""/>
-        <p:cNvGrpSpPr/>
-        <p:nvPr/>
-      </p:nvGrpSpPr>
-      <p:grpSpPr>
-        <a:xfrm>
-          <a:off x="0" y="0"/>
-          <a:ext cx="0" cy="0"/>
-          <a:chOff x="0" y="0"/>
-          <a:chExt cx="0" cy="0"/>
-        </a:xfrm>
-      </p:grpSpPr>
-      <p:sp>
-        <p:nvSpPr>
-          <p:cNvPr id="5" name="TextBox 4">
-            <a:extLst>
-              <a:ext uri="{FF2B5EF4-FFF2-40B4-BE49-F238E27FC236}">
-                <a16:creationId xmlns:a16="http://schemas.microsoft.com/office/drawing/2014/main" id="{5C3101FE-916F-7AC8-03CF-F8680EC21ADF}"/>
-              </a:ext>
-            </a:extLst>
-          </p:cNvPr>
-          <p:cNvSpPr txBox="1"/>
-          <p:nvPr/>
-        </p:nvSpPr>
-        <p:spPr>
-          <a:xfrm>
-            <a:off x="391886" y="130629"/>
-            <a:ext cx="11614067" cy="4124206"/>
-          </a:xfrm>
-          <a:prstGeom prst="rect">
-            <a:avLst/>
-          </a:prstGeom>
-          <a:noFill/>
-          <a:ln>
-            <a:noFill/>
-          </a:ln>
-        </p:spPr>
-        <p:txBody>
-          <a:bodyPr wrap="square" rtlCol="0">
-            <a:spAutoFit/>
-          </a:bodyPr>
-          <a:lstStyle/>
-          <a:p>
-            <a:pPr algn="ctr"/>
-            <a:endParaRPr lang="en-CH" sz="2400" dirty="0">
-              <a:solidFill>
-                <a:schemeClr val="bg1"/>
-              </a:solidFill>
-              <a:latin typeface="Arial" panose="020B0604020202020204" pitchFamily="34" charset="0"/>
-              <a:cs typeface="Arial" panose="020B0604020202020204" pitchFamily="34" charset="0"/>
-            </a:endParaRPr>
-          </a:p>
-          <a:p>
-            <a:pPr algn="ctr"/>
-            <a:endParaRPr lang="en-CH" sz="2400" dirty="0">
-              <a:solidFill>
-                <a:schemeClr val="bg1"/>
-              </a:solidFill>
-              <a:latin typeface="Arial" panose="020B0604020202020204" pitchFamily="34" charset="0"/>
-              <a:cs typeface="Arial" panose="020B0604020202020204" pitchFamily="34" charset="0"/>
-            </a:endParaRPr>
-          </a:p>
-          <a:p>
-            <a:pPr algn="ctr"/>
-            <a:endParaRPr lang="en-CH" sz="2400" dirty="0">
-              <a:solidFill>
-                <a:schemeClr val="bg1"/>
-              </a:solidFill>
-              <a:latin typeface="Arial" panose="020B0604020202020204" pitchFamily="34" charset="0"/>
-              <a:cs typeface="Arial" panose="020B0604020202020204" pitchFamily="34" charset="0"/>
-            </a:endParaRPr>
-          </a:p>
-          <a:p>
-            <a:pPr algn="ctr"/>
-            <a:endParaRPr lang="en-CH" sz="2400" dirty="0">
-              <a:solidFill>
-                <a:schemeClr val="bg1"/>
-              </a:solidFill>
-              <a:latin typeface="Arial" panose="020B0604020202020204" pitchFamily="34" charset="0"/>
-              <a:cs typeface="Arial" panose="020B0604020202020204" pitchFamily="34" charset="0"/>
-            </a:endParaRPr>
-          </a:p>
-          <a:p>
-            <a:pPr algn="ctr"/>
-            <a:endParaRPr lang="en-CH" sz="2400" dirty="0">
-              <a:solidFill>
-                <a:schemeClr val="bg1"/>
-              </a:solidFill>
-              <a:latin typeface="Arial" panose="020B0604020202020204" pitchFamily="34" charset="0"/>
-              <a:cs typeface="Arial" panose="020B0604020202020204" pitchFamily="34" charset="0"/>
-            </a:endParaRPr>
-          </a:p>
-          <a:p>
-            <a:pPr algn="ctr"/>
-            <a:endParaRPr lang="en-CH" sz="2400" dirty="0">
-              <a:solidFill>
-                <a:schemeClr val="bg1"/>
-              </a:solidFill>
-              <a:latin typeface="Arial" panose="020B0604020202020204" pitchFamily="34" charset="0"/>
-              <a:cs typeface="Arial" panose="020B0604020202020204" pitchFamily="34" charset="0"/>
-            </a:endParaRPr>
-          </a:p>
-          <a:p>
-            <a:pPr algn="ctr"/>
-            <a:endParaRPr lang="en-CH" sz="2400" dirty="0">
-              <a:solidFill>
-                <a:schemeClr val="bg1"/>
-              </a:solidFill>
-              <a:latin typeface="Arial" panose="020B0604020202020204" pitchFamily="34" charset="0"/>
-              <a:cs typeface="Arial" panose="020B0604020202020204" pitchFamily="34" charset="0"/>
-            </a:endParaRPr>
-          </a:p>
-          <a:p>
-            <a:pPr algn="ctr"/>
-            <a:endParaRPr lang="en-CH" sz="2400" dirty="0">
-              <a:solidFill>
-                <a:schemeClr val="bg1"/>
-              </a:solidFill>
-              <a:latin typeface="Arial" panose="020B0604020202020204" pitchFamily="34" charset="0"/>
-              <a:cs typeface="Arial" panose="020B0604020202020204" pitchFamily="34" charset="0"/>
-            </a:endParaRPr>
-          </a:p>
-          <a:p>
-            <a:pPr algn="ctr"/>
-            <a:r>
-              <a:rPr lang="en-US" sz="2400" dirty="0">
-                <a:solidFill>
-                  <a:schemeClr val="bg1"/>
-                </a:solidFill>
-                <a:latin typeface="Arial" panose="020B0604020202020204" pitchFamily="34" charset="0"/>
-                <a:cs typeface="Arial" panose="020B0604020202020204" pitchFamily="34" charset="0"/>
-              </a:rPr>
-              <a:t>The </a:t>
-            </a:r>
-            <a:r>
-              <a:rPr lang="en-CH" sz="2400" dirty="0">
-                <a:solidFill>
-                  <a:schemeClr val="bg1"/>
-                </a:solidFill>
-                <a:latin typeface="Arial" panose="020B0604020202020204" pitchFamily="34" charset="0"/>
-                <a:cs typeface="Arial" panose="020B0604020202020204" pitchFamily="34" charset="0"/>
-              </a:rPr>
-              <a:t>SAP task is starting anytime now...</a:t>
-            </a:r>
-          </a:p>
-          <a:p>
-            <a:endParaRPr lang="en-CH" sz="2400" dirty="0">
-              <a:solidFill>
-                <a:schemeClr val="bg1"/>
-              </a:solidFill>
-              <a:latin typeface="Arial" panose="020B0604020202020204" pitchFamily="34" charset="0"/>
-              <a:cs typeface="Arial" panose="020B0604020202020204" pitchFamily="34" charset="0"/>
-            </a:endParaRPr>
-          </a:p>
-          <a:p>
-            <a:endParaRPr lang="en-CH" sz="2200" dirty="0">
-              <a:solidFill>
-                <a:schemeClr val="bg1"/>
-              </a:solidFill>
-              <a:latin typeface="Arial" panose="020B0604020202020204" pitchFamily="34" charset="0"/>
-              <a:cs typeface="Arial" panose="020B0604020202020204" pitchFamily="34" charset="0"/>
-            </a:endParaRPr>
-          </a:p>
-        </p:txBody>
-      </p:sp>
-    </p:spTree>
-    <p:extLst>
-      <p:ext uri="{BB962C8B-B14F-4D97-AF65-F5344CB8AC3E}">
-        <p14:creationId xmlns:p14="http://schemas.microsoft.com/office/powerpoint/2010/main" val="265753330"/>
-      </p:ext>
-    </p:extLst>
-  </p:cSld>
-  <p:clrMapOvr>
-    <a:masterClrMapping/>
-  </p:clrMapOvr>
-</p:sld>
-</file>
-
-<file path=ppt/slides/slide27.xml><?xml version="1.0" encoding="utf-8"?>
-<p:sld xmlns:a="http://schemas.openxmlformats.org/drawingml/2006/main" xmlns:r="http://schemas.openxmlformats.org/officeDocument/2006/relationships" xmlns:p="http://schemas.openxmlformats.org/presentationml/2006/main">
-  <p:cSld>
-    <p:bg>
-      <p:bgPr>
-        <a:solidFill>
-          <a:srgbClr val="5C5C5C"/>
-        </a:solidFill>
-        <a:effectLst/>
-      </p:bgPr>
-    </p:bg>
-    <p:spTree>
-      <p:nvGrpSpPr>
-        <p:cNvPr id="1" name=""/>
-        <p:cNvGrpSpPr/>
-        <p:nvPr/>
-      </p:nvGrpSpPr>
-      <p:grpSpPr>
-        <a:xfrm>
-          <a:off x="0" y="0"/>
-          <a:ext cx="0" cy="0"/>
-          <a:chOff x="0" y="0"/>
-          <a:chExt cx="0" cy="0"/>
-        </a:xfrm>
-      </p:grpSpPr>
-      <p:sp>
-        <p:nvSpPr>
-          <p:cNvPr id="6" name="TextBox 5">
-            <a:extLst>
-              <a:ext uri="{FF2B5EF4-FFF2-40B4-BE49-F238E27FC236}">
-                <a16:creationId xmlns:a16="http://schemas.microsoft.com/office/drawing/2014/main" id="{D73EA4BC-C794-ADDF-A1A3-B7FC9E83B19C}"/>
-              </a:ext>
-            </a:extLst>
-          </p:cNvPr>
-          <p:cNvSpPr txBox="1"/>
-          <p:nvPr/>
-        </p:nvSpPr>
-        <p:spPr>
-          <a:xfrm>
-            <a:off x="373853" y="3013501"/>
-            <a:ext cx="11444287" cy="830997"/>
-          </a:xfrm>
-          <a:prstGeom prst="rect">
-            <a:avLst/>
-          </a:prstGeom>
-          <a:noFill/>
-        </p:spPr>
-        <p:txBody>
-          <a:bodyPr wrap="square" rtlCol="0">
-            <a:spAutoFit/>
-          </a:bodyPr>
-          <a:lstStyle/>
-          <a:p>
-            <a:pPr algn="ctr"/>
-            <a:r>
-              <a:rPr lang="en-CH" sz="4800" dirty="0">
-                <a:solidFill>
-                  <a:schemeClr val="bg1"/>
-                </a:solidFill>
-                <a:latin typeface="Arial" panose="020B0604020202020204" pitchFamily="34" charset="0"/>
-                <a:cs typeface="Arial" panose="020B0604020202020204" pitchFamily="34" charset="0"/>
-              </a:rPr>
-              <a:t>+ 1</a:t>
-            </a:r>
-          </a:p>
-        </p:txBody>
-      </p:sp>
-    </p:spTree>
-    <p:extLst>
-      <p:ext uri="{BB962C8B-B14F-4D97-AF65-F5344CB8AC3E}">
-        <p14:creationId xmlns:p14="http://schemas.microsoft.com/office/powerpoint/2010/main" val="1062932709"/>
-      </p:ext>
-    </p:extLst>
-  </p:cSld>
-  <p:clrMapOvr>
-    <a:masterClrMapping/>
-  </p:clrMapOvr>
-</p:sld>
-</file>
-
-<file path=ppt/slides/slide28.xml><?xml version="1.0" encoding="utf-8"?>
-<p:sld xmlns:a="http://schemas.openxmlformats.org/drawingml/2006/main" xmlns:r="http://schemas.openxmlformats.org/officeDocument/2006/relationships" xmlns:p="http://schemas.openxmlformats.org/presentationml/2006/main">
-  <p:cSld>
-    <p:bg>
-      <p:bgPr>
-        <a:solidFill>
-          <a:srgbClr val="5C5C5C"/>
-        </a:solidFill>
-        <a:effectLst/>
-      </p:bgPr>
-    </p:bg>
-    <p:spTree>
-      <p:nvGrpSpPr>
-        <p:cNvPr id="1" name=""/>
-        <p:cNvGrpSpPr/>
-        <p:nvPr/>
-      </p:nvGrpSpPr>
-      <p:grpSpPr>
-        <a:xfrm>
-          <a:off x="0" y="0"/>
-          <a:ext cx="0" cy="0"/>
-          <a:chOff x="0" y="0"/>
-          <a:chExt cx="0" cy="0"/>
-        </a:xfrm>
-      </p:grpSpPr>
-      <p:sp>
-        <p:nvSpPr>
-          <p:cNvPr id="2" name="TextBox 1">
-            <a:extLst>
-              <a:ext uri="{FF2B5EF4-FFF2-40B4-BE49-F238E27FC236}">
-                <a16:creationId xmlns:a16="http://schemas.microsoft.com/office/drawing/2014/main" id="{A2F27E21-B004-68AF-2485-A4D06B57CE76}"/>
-              </a:ext>
-            </a:extLst>
-          </p:cNvPr>
-          <p:cNvSpPr txBox="1"/>
-          <p:nvPr/>
-        </p:nvSpPr>
-        <p:spPr>
-          <a:xfrm>
-            <a:off x="373853" y="3013501"/>
-            <a:ext cx="11444287" cy="830997"/>
-          </a:xfrm>
-          <a:prstGeom prst="rect">
-            <a:avLst/>
-          </a:prstGeom>
-          <a:noFill/>
-        </p:spPr>
-        <p:txBody>
-          <a:bodyPr wrap="square" rtlCol="0">
-            <a:spAutoFit/>
-          </a:bodyPr>
-          <a:lstStyle/>
-          <a:p>
-            <a:pPr algn="ctr"/>
-            <a:r>
-              <a:rPr lang="en-CH" sz="4800" dirty="0">
-                <a:solidFill>
-                  <a:schemeClr val="bg1"/>
-                </a:solidFill>
-                <a:latin typeface="Arial" panose="020B0604020202020204" pitchFamily="34" charset="0"/>
-                <a:cs typeface="Arial" panose="020B0604020202020204" pitchFamily="34" charset="0"/>
-              </a:rPr>
-              <a:t>- 1</a:t>
-            </a:r>
-          </a:p>
-        </p:txBody>
-      </p:sp>
-    </p:spTree>
-    <p:extLst>
-      <p:ext uri="{BB962C8B-B14F-4D97-AF65-F5344CB8AC3E}">
-        <p14:creationId xmlns:p14="http://schemas.microsoft.com/office/powerpoint/2010/main" val="386870888"/>
       </p:ext>
     </p:extLst>
   </p:cSld>
@@ -5315,7 +5328,7 @@
         <p:spPr>
           <a:xfrm>
             <a:off x="391886" y="130629"/>
-            <a:ext cx="11614067" cy="6494085"/>
+            <a:ext cx="11614067" cy="5663089"/>
           </a:xfrm>
           <a:prstGeom prst="rect">
             <a:avLst/>
@@ -5480,43 +5493,6 @@
             </a:r>
           </a:p>
           <a:p>
-            <a:pPr>
-              <a:spcAft>
-                <a:spcPts val="1200"/>
-              </a:spcAft>
-            </a:pPr>
-            <a:r>
-              <a:rPr lang="en-CH" sz="2200" dirty="0">
-                <a:solidFill>
-                  <a:schemeClr val="bg1"/>
-                </a:solidFill>
-                <a:latin typeface="Arial" panose="020B0604020202020204" pitchFamily="34" charset="0"/>
-                <a:cs typeface="Arial" panose="020B0604020202020204" pitchFamily="34" charset="0"/>
-              </a:rPr>
-              <a:t>6. You </a:t>
-            </a:r>
-            <a:r>
-              <a:rPr lang="en-CH" sz="2200" u="sng" dirty="0">
-                <a:solidFill>
-                  <a:schemeClr val="bg1"/>
-                </a:solidFill>
-                <a:latin typeface="Arial" panose="020B0604020202020204" pitchFamily="34" charset="0"/>
-                <a:cs typeface="Arial" panose="020B0604020202020204" pitchFamily="34" charset="0"/>
-              </a:rPr>
-              <a:t>receive a point </a:t>
-            </a:r>
-            <a:r>
-              <a:rPr lang="en-CH" sz="2200" dirty="0">
-                <a:solidFill>
-                  <a:schemeClr val="bg1"/>
-                </a:solidFill>
-                <a:latin typeface="Arial" panose="020B0604020202020204" pitchFamily="34" charset="0"/>
-                <a:cs typeface="Arial" panose="020B0604020202020204" pitchFamily="34" charset="0"/>
-              </a:rPr>
-              <a:t>if you smiled and got a smile back or if the face stayed neutral when you also stayed neutral.</a:t>
-            </a:r>
-          </a:p>
-          <a:p>
             <a:endParaRPr lang="en-CH" sz="2200" dirty="0">
               <a:solidFill>
                 <a:schemeClr val="bg1"/>
@@ -5548,6 +5524,981 @@
     <p:extLst>
       <p:ext uri="{BB962C8B-B14F-4D97-AF65-F5344CB8AC3E}">
         <p14:creationId xmlns:p14="http://schemas.microsoft.com/office/powerpoint/2010/main" val="2976116893"/>
+      </p:ext>
+    </p:extLst>
+  </p:cSld>
+  <p:clrMapOvr>
+    <a:masterClrMapping/>
+  </p:clrMapOvr>
+</p:sld>
+</file>
+
+<file path=ppt/slides/slide30.xml><?xml version="1.0" encoding="utf-8"?>
+<p:sld xmlns:a="http://schemas.openxmlformats.org/drawingml/2006/main" xmlns:r="http://schemas.openxmlformats.org/officeDocument/2006/relationships" xmlns:p="http://schemas.openxmlformats.org/presentationml/2006/main">
+  <p:cSld>
+    <p:bg>
+      <p:bgPr>
+        <a:solidFill>
+          <a:srgbClr val="5C5C5C"/>
+        </a:solidFill>
+        <a:effectLst/>
+      </p:bgPr>
+    </p:bg>
+    <p:spTree>
+      <p:nvGrpSpPr>
+        <p:cNvPr id="1" name=""/>
+        <p:cNvGrpSpPr/>
+        <p:nvPr/>
+      </p:nvGrpSpPr>
+      <p:grpSpPr>
+        <a:xfrm>
+          <a:off x="0" y="0"/>
+          <a:ext cx="0" cy="0"/>
+          <a:chOff x="0" y="0"/>
+          <a:chExt cx="0" cy="0"/>
+        </a:xfrm>
+      </p:grpSpPr>
+      <p:sp>
+        <p:nvSpPr>
+          <p:cNvPr id="5" name="TextBox 4">
+            <a:extLst>
+              <a:ext uri="{FF2B5EF4-FFF2-40B4-BE49-F238E27FC236}">
+                <a16:creationId xmlns:a16="http://schemas.microsoft.com/office/drawing/2014/main" id="{5C3101FE-916F-7AC8-03CF-F8680EC21ADF}"/>
+              </a:ext>
+            </a:extLst>
+          </p:cNvPr>
+          <p:cNvSpPr txBox="1"/>
+          <p:nvPr/>
+        </p:nvSpPr>
+        <p:spPr>
+          <a:xfrm>
+            <a:off x="373856" y="2510165"/>
+            <a:ext cx="11444287" cy="1569660"/>
+          </a:xfrm>
+          <a:prstGeom prst="rect">
+            <a:avLst/>
+          </a:prstGeom>
+          <a:noFill/>
+        </p:spPr>
+        <p:txBody>
+          <a:bodyPr wrap="square" rtlCol="0">
+            <a:spAutoFit/>
+          </a:bodyPr>
+          <a:lstStyle/>
+          <a:p>
+            <a:pPr algn="ctr"/>
+            <a:r>
+              <a:rPr lang="en-CH" sz="9600" dirty="0">
+                <a:solidFill>
+                  <a:schemeClr val="bg1"/>
+                </a:solidFill>
+                <a:latin typeface="Avenir Light" panose="020B0402020203020204" pitchFamily="34" charset="77"/>
+                <a:cs typeface="Arial" panose="020B0604020202020204" pitchFamily="34" charset="0"/>
+              </a:rPr>
+              <a:t>+</a:t>
+            </a:r>
+          </a:p>
+        </p:txBody>
+      </p:sp>
+    </p:spTree>
+    <p:extLst>
+      <p:ext uri="{BB962C8B-B14F-4D97-AF65-F5344CB8AC3E}">
+        <p14:creationId xmlns:p14="http://schemas.microsoft.com/office/powerpoint/2010/main" val="1400167985"/>
+      </p:ext>
+    </p:extLst>
+  </p:cSld>
+  <p:clrMapOvr>
+    <a:masterClrMapping/>
+  </p:clrMapOvr>
+</p:sld>
+</file>
+
+<file path=ppt/slides/slide31.xml><?xml version="1.0" encoding="utf-8"?>
+<p:sld xmlns:a="http://schemas.openxmlformats.org/drawingml/2006/main" xmlns:r="http://schemas.openxmlformats.org/officeDocument/2006/relationships" xmlns:p="http://schemas.openxmlformats.org/presentationml/2006/main">
+  <p:cSld>
+    <p:spTree>
+      <p:nvGrpSpPr>
+        <p:cNvPr id="1" name=""/>
+        <p:cNvGrpSpPr/>
+        <p:nvPr/>
+      </p:nvGrpSpPr>
+      <p:grpSpPr>
+        <a:xfrm>
+          <a:off x="0" y="0"/>
+          <a:ext cx="0" cy="0"/>
+          <a:chOff x="0" y="0"/>
+          <a:chExt cx="0" cy="0"/>
+        </a:xfrm>
+      </p:grpSpPr>
+      <p:sp>
+        <p:nvSpPr>
+          <p:cNvPr id="2" name="Title 1">
+            <a:extLst>
+              <a:ext uri="{FF2B5EF4-FFF2-40B4-BE49-F238E27FC236}">
+                <a16:creationId xmlns:a16="http://schemas.microsoft.com/office/drawing/2014/main" id="{0A1FA53E-25A0-0960-0FCC-4CC105416AC1}"/>
+              </a:ext>
+            </a:extLst>
+          </p:cNvPr>
+          <p:cNvSpPr>
+            <a:spLocks noGrp="1"/>
+          </p:cNvSpPr>
+          <p:nvPr>
+            <p:ph type="title"/>
+          </p:nvPr>
+        </p:nvSpPr>
+        <p:spPr>
+          <a:xfrm>
+            <a:off x="410688" y="365125"/>
+            <a:ext cx="10943112" cy="584901"/>
+          </a:xfrm>
+        </p:spPr>
+        <p:txBody>
+          <a:bodyPr>
+            <a:normAutofit/>
+          </a:bodyPr>
+          <a:lstStyle/>
+          <a:p>
+            <a:r>
+              <a:rPr lang="en-CH" sz="2800" b="1" dirty="0">
+                <a:latin typeface="Avenir Book" panose="02000503020000020003" pitchFamily="2" charset="0"/>
+              </a:rPr>
+              <a:t>Practice Task Slides in scanner (4 trials)</a:t>
+            </a:r>
+          </a:p>
+        </p:txBody>
+      </p:sp>
+    </p:spTree>
+    <p:extLst>
+      <p:ext uri="{BB962C8B-B14F-4D97-AF65-F5344CB8AC3E}">
+        <p14:creationId xmlns:p14="http://schemas.microsoft.com/office/powerpoint/2010/main" val="1730170648"/>
+      </p:ext>
+    </p:extLst>
+  </p:cSld>
+  <p:clrMapOvr>
+    <a:masterClrMapping/>
+  </p:clrMapOvr>
+</p:sld>
+</file>
+
+<file path=ppt/slides/slide32.xml><?xml version="1.0" encoding="utf-8"?>
+<p:sld xmlns:a="http://schemas.openxmlformats.org/drawingml/2006/main" xmlns:r="http://schemas.openxmlformats.org/officeDocument/2006/relationships" xmlns:p="http://schemas.openxmlformats.org/presentationml/2006/main">
+  <p:cSld>
+    <p:bg>
+      <p:bgPr>
+        <a:solidFill>
+          <a:srgbClr val="5C5C5C"/>
+        </a:solidFill>
+        <a:effectLst/>
+      </p:bgPr>
+    </p:bg>
+    <p:spTree>
+      <p:nvGrpSpPr>
+        <p:cNvPr id="1" name=""/>
+        <p:cNvGrpSpPr/>
+        <p:nvPr/>
+      </p:nvGrpSpPr>
+      <p:grpSpPr>
+        <a:xfrm>
+          <a:off x="0" y="0"/>
+          <a:ext cx="0" cy="0"/>
+          <a:chOff x="0" y="0"/>
+          <a:chExt cx="0" cy="0"/>
+        </a:xfrm>
+      </p:grpSpPr>
+      <p:sp>
+        <p:nvSpPr>
+          <p:cNvPr id="5" name="TextBox 4">
+            <a:extLst>
+              <a:ext uri="{FF2B5EF4-FFF2-40B4-BE49-F238E27FC236}">
+                <a16:creationId xmlns:a16="http://schemas.microsoft.com/office/drawing/2014/main" id="{5C3101FE-916F-7AC8-03CF-F8680EC21ADF}"/>
+              </a:ext>
+            </a:extLst>
+          </p:cNvPr>
+          <p:cNvSpPr txBox="1"/>
+          <p:nvPr/>
+        </p:nvSpPr>
+        <p:spPr>
+          <a:xfrm>
+            <a:off x="391886" y="130629"/>
+            <a:ext cx="11614067" cy="4216539"/>
+          </a:xfrm>
+          <a:prstGeom prst="rect">
+            <a:avLst/>
+          </a:prstGeom>
+          <a:noFill/>
+          <a:ln>
+            <a:noFill/>
+          </a:ln>
+        </p:spPr>
+        <p:txBody>
+          <a:bodyPr wrap="square" rtlCol="0">
+            <a:spAutoFit/>
+          </a:bodyPr>
+          <a:lstStyle/>
+          <a:p>
+            <a:pPr algn="ctr"/>
+            <a:r>
+              <a:rPr lang="en-CH" sz="2400" dirty="0">
+                <a:solidFill>
+                  <a:schemeClr val="bg1"/>
+                </a:solidFill>
+                <a:latin typeface="Arial" panose="020B0604020202020204" pitchFamily="34" charset="0"/>
+                <a:cs typeface="Arial" panose="020B0604020202020204" pitchFamily="34" charset="0"/>
+              </a:rPr>
+              <a:t>Welcome to the </a:t>
+            </a:r>
+            <a:r>
+              <a:rPr lang="en-GB" sz="2400" dirty="0">
+                <a:solidFill>
+                  <a:schemeClr val="bg1"/>
+                </a:solidFill>
+                <a:latin typeface="Arial" panose="020B0604020202020204" pitchFamily="34" charset="0"/>
+                <a:cs typeface="Arial" panose="020B0604020202020204" pitchFamily="34" charset="0"/>
+              </a:rPr>
+              <a:t>s</a:t>
+            </a:r>
+            <a:r>
+              <a:rPr lang="en-CH" sz="2400" dirty="0">
+                <a:solidFill>
+                  <a:schemeClr val="bg1"/>
+                </a:solidFill>
+                <a:latin typeface="Arial" panose="020B0604020202020204" pitchFamily="34" charset="0"/>
+                <a:cs typeface="Arial" panose="020B0604020202020204" pitchFamily="34" charset="0"/>
+              </a:rPr>
+              <a:t>canner practice round of the SAP task.</a:t>
+            </a:r>
+          </a:p>
+          <a:p>
+            <a:endParaRPr lang="en-CH" sz="2400" dirty="0">
+              <a:solidFill>
+                <a:schemeClr val="bg1"/>
+              </a:solidFill>
+              <a:latin typeface="Arial" panose="020B0604020202020204" pitchFamily="34" charset="0"/>
+              <a:cs typeface="Arial" panose="020B0604020202020204" pitchFamily="34" charset="0"/>
+            </a:endParaRPr>
+          </a:p>
+          <a:p>
+            <a:endParaRPr lang="en-CH" sz="2200" dirty="0">
+              <a:solidFill>
+                <a:schemeClr val="bg1"/>
+              </a:solidFill>
+              <a:latin typeface="Arial" panose="020B0604020202020204" pitchFamily="34" charset="0"/>
+              <a:cs typeface="Arial" panose="020B0604020202020204" pitchFamily="34" charset="0"/>
+            </a:endParaRPr>
+          </a:p>
+          <a:p>
+            <a:r>
+              <a:rPr lang="en-CH" sz="2200" dirty="0">
+                <a:solidFill>
+                  <a:schemeClr val="bg1"/>
+                </a:solidFill>
+                <a:latin typeface="Arial" panose="020B0604020202020204" pitchFamily="34" charset="0"/>
+                <a:cs typeface="Arial" panose="020B0604020202020204" pitchFamily="34" charset="0"/>
+              </a:rPr>
+              <a:t>You are now getting a chance to practice the task in the scanner with the button box.</a:t>
+            </a:r>
+          </a:p>
+          <a:p>
+            <a:endParaRPr lang="en-CH" sz="2200" dirty="0">
+              <a:solidFill>
+                <a:schemeClr val="bg1"/>
+              </a:solidFill>
+              <a:latin typeface="Arial" panose="020B0604020202020204" pitchFamily="34" charset="0"/>
+              <a:cs typeface="Arial" panose="020B0604020202020204" pitchFamily="34" charset="0"/>
+            </a:endParaRPr>
+          </a:p>
+          <a:p>
+            <a:r>
+              <a:rPr lang="en-CH" sz="2200" dirty="0">
+                <a:solidFill>
+                  <a:schemeClr val="bg1"/>
+                </a:solidFill>
+                <a:latin typeface="Arial" panose="020B0604020202020204" pitchFamily="34" charset="0"/>
+                <a:cs typeface="Arial" panose="020B0604020202020204" pitchFamily="34" charset="0"/>
+              </a:rPr>
+              <a:t>This is just so that you can get used to the setup with the button box and you laying down. You will see two faces here again. They will not be the same faces that you will interact with in the task later.</a:t>
+            </a:r>
+          </a:p>
+          <a:p>
+            <a:endParaRPr lang="en-CH" sz="2200" dirty="0">
+              <a:solidFill>
+                <a:schemeClr val="bg1"/>
+              </a:solidFill>
+              <a:latin typeface="Arial" panose="020B0604020202020204" pitchFamily="34" charset="0"/>
+              <a:cs typeface="Arial" panose="020B0604020202020204" pitchFamily="34" charset="0"/>
+            </a:endParaRPr>
+          </a:p>
+          <a:p>
+            <a:r>
+              <a:rPr lang="en-CH" sz="2200" dirty="0">
+                <a:solidFill>
+                  <a:schemeClr val="bg1"/>
+                </a:solidFill>
+                <a:latin typeface="Arial" panose="020B0604020202020204" pitchFamily="34" charset="0"/>
+                <a:cs typeface="Arial" panose="020B0604020202020204" pitchFamily="34" charset="0"/>
+              </a:rPr>
+              <a:t>This practice will only involve 4 rounds.</a:t>
+            </a:r>
+          </a:p>
+          <a:p>
+            <a:endParaRPr lang="en-CH" sz="2200" dirty="0">
+              <a:solidFill>
+                <a:schemeClr val="bg1"/>
+              </a:solidFill>
+              <a:latin typeface="Arial" panose="020B0604020202020204" pitchFamily="34" charset="0"/>
+              <a:cs typeface="Arial" panose="020B0604020202020204" pitchFamily="34" charset="0"/>
+            </a:endParaRPr>
+          </a:p>
+          <a:p>
+            <a:r>
+              <a:rPr lang="en-CH" sz="2200" dirty="0">
+                <a:solidFill>
+                  <a:schemeClr val="bg1"/>
+                </a:solidFill>
+                <a:latin typeface="Arial" panose="020B0604020202020204" pitchFamily="34" charset="0"/>
+                <a:cs typeface="Arial" panose="020B0604020202020204" pitchFamily="34" charset="0"/>
+              </a:rPr>
+              <a:t>If you have any questions, you can ask anytime during this short practice.</a:t>
+            </a:r>
+          </a:p>
+        </p:txBody>
+      </p:sp>
+    </p:spTree>
+    <p:extLst>
+      <p:ext uri="{BB962C8B-B14F-4D97-AF65-F5344CB8AC3E}">
+        <p14:creationId xmlns:p14="http://schemas.microsoft.com/office/powerpoint/2010/main" val="1894031005"/>
+      </p:ext>
+    </p:extLst>
+  </p:cSld>
+  <p:clrMapOvr>
+    <a:masterClrMapping/>
+  </p:clrMapOvr>
+</p:sld>
+</file>
+
+<file path=ppt/slides/slide33.xml><?xml version="1.0" encoding="utf-8"?>
+<p:sld xmlns:a="http://schemas.openxmlformats.org/drawingml/2006/main" xmlns:r="http://schemas.openxmlformats.org/officeDocument/2006/relationships" xmlns:p="http://schemas.openxmlformats.org/presentationml/2006/main">
+  <p:cSld>
+    <p:spTree>
+      <p:nvGrpSpPr>
+        <p:cNvPr id="1" name=""/>
+        <p:cNvGrpSpPr/>
+        <p:nvPr/>
+      </p:nvGrpSpPr>
+      <p:grpSpPr>
+        <a:xfrm>
+          <a:off x="0" y="0"/>
+          <a:ext cx="0" cy="0"/>
+          <a:chOff x="0" y="0"/>
+          <a:chExt cx="0" cy="0"/>
+        </a:xfrm>
+      </p:grpSpPr>
+      <p:sp>
+        <p:nvSpPr>
+          <p:cNvPr id="2" name="Title 1">
+            <a:extLst>
+              <a:ext uri="{FF2B5EF4-FFF2-40B4-BE49-F238E27FC236}">
+                <a16:creationId xmlns:a16="http://schemas.microsoft.com/office/drawing/2014/main" id="{0A1FA53E-25A0-0960-0FCC-4CC105416AC1}"/>
+              </a:ext>
+            </a:extLst>
+          </p:cNvPr>
+          <p:cNvSpPr>
+            <a:spLocks noGrp="1"/>
+          </p:cNvSpPr>
+          <p:nvPr>
+            <p:ph type="title"/>
+          </p:nvPr>
+        </p:nvSpPr>
+        <p:spPr>
+          <a:xfrm>
+            <a:off x="410688" y="365125"/>
+            <a:ext cx="10943112" cy="584901"/>
+          </a:xfrm>
+        </p:spPr>
+        <p:txBody>
+          <a:bodyPr>
+            <a:normAutofit/>
+          </a:bodyPr>
+          <a:lstStyle/>
+          <a:p>
+            <a:r>
+              <a:rPr lang="en-CH" sz="2800" b="1" dirty="0">
+                <a:latin typeface="Avenir Book" panose="02000503020000020003" pitchFamily="2" charset="0"/>
+              </a:rPr>
+              <a:t>Main Task Slides</a:t>
+            </a:r>
+          </a:p>
+        </p:txBody>
+      </p:sp>
+    </p:spTree>
+    <p:extLst>
+      <p:ext uri="{BB962C8B-B14F-4D97-AF65-F5344CB8AC3E}">
+        <p14:creationId xmlns:p14="http://schemas.microsoft.com/office/powerpoint/2010/main" val="4119700243"/>
+      </p:ext>
+    </p:extLst>
+  </p:cSld>
+  <p:clrMapOvr>
+    <a:masterClrMapping/>
+  </p:clrMapOvr>
+</p:sld>
+</file>
+
+<file path=ppt/slides/slide34.xml><?xml version="1.0" encoding="utf-8"?>
+<p:sld xmlns:a="http://schemas.openxmlformats.org/drawingml/2006/main" xmlns:r="http://schemas.openxmlformats.org/officeDocument/2006/relationships" xmlns:p="http://schemas.openxmlformats.org/presentationml/2006/main">
+  <p:cSld>
+    <p:bg>
+      <p:bgPr>
+        <a:solidFill>
+          <a:srgbClr val="5C5C5C"/>
+        </a:solidFill>
+        <a:effectLst/>
+      </p:bgPr>
+    </p:bg>
+    <p:spTree>
+      <p:nvGrpSpPr>
+        <p:cNvPr id="1" name=""/>
+        <p:cNvGrpSpPr/>
+        <p:nvPr/>
+      </p:nvGrpSpPr>
+      <p:grpSpPr>
+        <a:xfrm>
+          <a:off x="0" y="0"/>
+          <a:ext cx="0" cy="0"/>
+          <a:chOff x="0" y="0"/>
+          <a:chExt cx="0" cy="0"/>
+        </a:xfrm>
+      </p:grpSpPr>
+      <p:sp>
+        <p:nvSpPr>
+          <p:cNvPr id="5" name="TextBox 4">
+            <a:extLst>
+              <a:ext uri="{FF2B5EF4-FFF2-40B4-BE49-F238E27FC236}">
+                <a16:creationId xmlns:a16="http://schemas.microsoft.com/office/drawing/2014/main" id="{5C3101FE-916F-7AC8-03CF-F8680EC21ADF}"/>
+              </a:ext>
+            </a:extLst>
+          </p:cNvPr>
+          <p:cNvSpPr txBox="1"/>
+          <p:nvPr/>
+        </p:nvSpPr>
+        <p:spPr>
+          <a:xfrm>
+            <a:off x="391886" y="130629"/>
+            <a:ext cx="11614067" cy="4524315"/>
+          </a:xfrm>
+          <a:prstGeom prst="rect">
+            <a:avLst/>
+          </a:prstGeom>
+          <a:noFill/>
+          <a:ln>
+            <a:noFill/>
+          </a:ln>
+        </p:spPr>
+        <p:txBody>
+          <a:bodyPr wrap="square" rtlCol="0">
+            <a:spAutoFit/>
+          </a:bodyPr>
+          <a:lstStyle/>
+          <a:p>
+            <a:pPr algn="ctr"/>
+            <a:r>
+              <a:rPr lang="en-CH" sz="2400" dirty="0">
+                <a:solidFill>
+                  <a:schemeClr val="bg1"/>
+                </a:solidFill>
+                <a:latin typeface="Arial" panose="020B0604020202020204" pitchFamily="34" charset="0"/>
+                <a:cs typeface="Arial" panose="020B0604020202020204" pitchFamily="34" charset="0"/>
+              </a:rPr>
+              <a:t>Welcome to the SAP task.</a:t>
+            </a:r>
+          </a:p>
+          <a:p>
+            <a:endParaRPr lang="en-CH" sz="2200" dirty="0">
+              <a:solidFill>
+                <a:schemeClr val="bg1"/>
+              </a:solidFill>
+              <a:latin typeface="Arial" panose="020B0604020202020204" pitchFamily="34" charset="0"/>
+              <a:cs typeface="Arial" panose="020B0604020202020204" pitchFamily="34" charset="0"/>
+            </a:endParaRPr>
+          </a:p>
+          <a:p>
+            <a:r>
+              <a:rPr lang="en-CH" sz="2200" dirty="0">
+                <a:solidFill>
+                  <a:schemeClr val="bg1"/>
+                </a:solidFill>
+                <a:latin typeface="Arial" panose="020B0604020202020204" pitchFamily="34" charset="0"/>
+                <a:cs typeface="Arial" panose="020B0604020202020204" pitchFamily="34" charset="0"/>
+              </a:rPr>
+              <a:t>This is the SAP task that you have practiced already.</a:t>
+            </a:r>
+          </a:p>
+          <a:p>
+            <a:endParaRPr lang="en-CH" sz="2200" dirty="0">
+              <a:solidFill>
+                <a:schemeClr val="bg1"/>
+              </a:solidFill>
+              <a:latin typeface="Arial" panose="020B0604020202020204" pitchFamily="34" charset="0"/>
+              <a:cs typeface="Arial" panose="020B0604020202020204" pitchFamily="34" charset="0"/>
+            </a:endParaRPr>
+          </a:p>
+          <a:p>
+            <a:r>
+              <a:rPr lang="en-CH" sz="2200" dirty="0">
+                <a:solidFill>
+                  <a:schemeClr val="bg1"/>
+                </a:solidFill>
+                <a:latin typeface="Arial" panose="020B0604020202020204" pitchFamily="34" charset="0"/>
+                <a:cs typeface="Arial" panose="020B0604020202020204" pitchFamily="34" charset="0"/>
+              </a:rPr>
+              <a:t>During the task you cannot ask any questions. So if you have questions, please ask now.</a:t>
+            </a:r>
+          </a:p>
+          <a:p>
+            <a:pPr marL="342900" indent="-342900">
+              <a:buFont typeface="Arial" panose="020B0604020202020204" pitchFamily="34" charset="0"/>
+              <a:buChar char="•"/>
+            </a:pPr>
+            <a:endParaRPr lang="en-CH" sz="2200" dirty="0">
+              <a:solidFill>
+                <a:schemeClr val="bg1"/>
+              </a:solidFill>
+              <a:latin typeface="Arial" panose="020B0604020202020204" pitchFamily="34" charset="0"/>
+              <a:cs typeface="Arial" panose="020B0604020202020204" pitchFamily="34" charset="0"/>
+            </a:endParaRPr>
+          </a:p>
+          <a:p>
+            <a:r>
+              <a:rPr lang="en-CH" sz="2200" dirty="0">
+                <a:solidFill>
+                  <a:schemeClr val="bg1"/>
+                </a:solidFill>
+                <a:latin typeface="Arial" panose="020B0604020202020204" pitchFamily="34" charset="0"/>
+                <a:cs typeface="Arial" panose="020B0604020202020204" pitchFamily="34" charset="0"/>
+              </a:rPr>
+              <a:t>Because we are recording brain and physiological activity, please move as little as possible. If you move too much (yawning, clenching your fists or yaw, wiggling your toes) the data cannot be used. So if you are uncomfortable, please let us know at this point. </a:t>
+            </a:r>
+          </a:p>
+          <a:p>
+            <a:r>
+              <a:rPr lang="en-CH" sz="2200" dirty="0">
+                <a:solidFill>
+                  <a:schemeClr val="bg1"/>
+                </a:solidFill>
+                <a:latin typeface="Arial" panose="020B0604020202020204" pitchFamily="34" charset="0"/>
+                <a:cs typeface="Arial" panose="020B0604020202020204" pitchFamily="34" charset="0"/>
+              </a:rPr>
+              <a:t>The data quality will be best if you are relaxed and still. Try not to tensen up any muscles, also keep your face relaxed when you are </a:t>
+            </a:r>
+            <a:r>
+              <a:rPr lang="en-CH" sz="2200" u="sng" dirty="0">
+                <a:solidFill>
+                  <a:schemeClr val="bg1"/>
+                </a:solidFill>
+                <a:latin typeface="Arial" panose="020B0604020202020204" pitchFamily="34" charset="0"/>
+                <a:cs typeface="Arial" panose="020B0604020202020204" pitchFamily="34" charset="0"/>
+              </a:rPr>
+              <a:t>not</a:t>
+            </a:r>
+            <a:r>
+              <a:rPr lang="en-CH" sz="2200" dirty="0">
+                <a:solidFill>
+                  <a:schemeClr val="bg1"/>
+                </a:solidFill>
+                <a:latin typeface="Arial" panose="020B0604020202020204" pitchFamily="34" charset="0"/>
+                <a:cs typeface="Arial" panose="020B0604020202020204" pitchFamily="34" charset="0"/>
+              </a:rPr>
+              <a:t> asked to smile. </a:t>
+            </a:r>
+            <a:r>
+              <a:rPr lang="en-CH" sz="2200" dirty="0">
+                <a:solidFill>
+                  <a:schemeClr val="bg1"/>
+                </a:solidFill>
+                <a:latin typeface="Arial" panose="020B0604020202020204" pitchFamily="34" charset="0"/>
+                <a:cs typeface="Arial" panose="020B0604020202020204" pitchFamily="34" charset="0"/>
+                <a:sym typeface="Wingdings" pitchFamily="2" charset="2"/>
+              </a:rPr>
+              <a:t></a:t>
+            </a:r>
+          </a:p>
+          <a:p>
+            <a:endParaRPr lang="en-CH" sz="2200" dirty="0">
+              <a:solidFill>
+                <a:schemeClr val="bg1"/>
+              </a:solidFill>
+              <a:latin typeface="Arial" panose="020B0604020202020204" pitchFamily="34" charset="0"/>
+              <a:cs typeface="Arial" panose="020B0604020202020204" pitchFamily="34" charset="0"/>
+            </a:endParaRPr>
+          </a:p>
+          <a:p>
+            <a:r>
+              <a:rPr lang="en-CH" sz="2200" dirty="0">
+                <a:solidFill>
+                  <a:schemeClr val="bg1"/>
+                </a:solidFill>
+                <a:latin typeface="Arial" panose="020B0604020202020204" pitchFamily="34" charset="0"/>
+                <a:cs typeface="Arial" panose="020B0604020202020204" pitchFamily="34" charset="0"/>
+              </a:rPr>
+              <a:t>The task is going to take about 20 minutes. </a:t>
+            </a:r>
+          </a:p>
+        </p:txBody>
+      </p:sp>
+    </p:spTree>
+    <p:extLst>
+      <p:ext uri="{BB962C8B-B14F-4D97-AF65-F5344CB8AC3E}">
+        <p14:creationId xmlns:p14="http://schemas.microsoft.com/office/powerpoint/2010/main" val="1357929970"/>
+      </p:ext>
+    </p:extLst>
+  </p:cSld>
+  <p:clrMapOvr>
+    <a:masterClrMapping/>
+  </p:clrMapOvr>
+</p:sld>
+</file>
+
+<file path=ppt/slides/slide35.xml><?xml version="1.0" encoding="utf-8"?>
+<p:sld xmlns:a="http://schemas.openxmlformats.org/drawingml/2006/main" xmlns:r="http://schemas.openxmlformats.org/officeDocument/2006/relationships" xmlns:p="http://schemas.openxmlformats.org/presentationml/2006/main">
+  <p:cSld>
+    <p:bg>
+      <p:bgPr>
+        <a:solidFill>
+          <a:srgbClr val="5C5C5C"/>
+        </a:solidFill>
+        <a:effectLst/>
+      </p:bgPr>
+    </p:bg>
+    <p:spTree>
+      <p:nvGrpSpPr>
+        <p:cNvPr id="1" name=""/>
+        <p:cNvGrpSpPr/>
+        <p:nvPr/>
+      </p:nvGrpSpPr>
+      <p:grpSpPr>
+        <a:xfrm>
+          <a:off x="0" y="0"/>
+          <a:ext cx="0" cy="0"/>
+          <a:chOff x="0" y="0"/>
+          <a:chExt cx="0" cy="0"/>
+        </a:xfrm>
+      </p:grpSpPr>
+      <p:sp>
+        <p:nvSpPr>
+          <p:cNvPr id="5" name="TextBox 4">
+            <a:extLst>
+              <a:ext uri="{FF2B5EF4-FFF2-40B4-BE49-F238E27FC236}">
+                <a16:creationId xmlns:a16="http://schemas.microsoft.com/office/drawing/2014/main" id="{5C3101FE-916F-7AC8-03CF-F8680EC21ADF}"/>
+              </a:ext>
+            </a:extLst>
+          </p:cNvPr>
+          <p:cNvSpPr txBox="1"/>
+          <p:nvPr/>
+        </p:nvSpPr>
+        <p:spPr>
+          <a:xfrm>
+            <a:off x="391886" y="130629"/>
+            <a:ext cx="11614067" cy="4124206"/>
+          </a:xfrm>
+          <a:prstGeom prst="rect">
+            <a:avLst/>
+          </a:prstGeom>
+          <a:noFill/>
+          <a:ln>
+            <a:noFill/>
+          </a:ln>
+        </p:spPr>
+        <p:txBody>
+          <a:bodyPr wrap="square" rtlCol="0">
+            <a:spAutoFit/>
+          </a:bodyPr>
+          <a:lstStyle/>
+          <a:p>
+            <a:pPr algn="ctr"/>
+            <a:endParaRPr lang="en-CH" sz="2400" dirty="0">
+              <a:solidFill>
+                <a:schemeClr val="bg1"/>
+              </a:solidFill>
+              <a:latin typeface="Arial" panose="020B0604020202020204" pitchFamily="34" charset="0"/>
+              <a:cs typeface="Arial" panose="020B0604020202020204" pitchFamily="34" charset="0"/>
+            </a:endParaRPr>
+          </a:p>
+          <a:p>
+            <a:pPr algn="ctr"/>
+            <a:endParaRPr lang="en-CH" sz="2400" dirty="0">
+              <a:solidFill>
+                <a:schemeClr val="bg1"/>
+              </a:solidFill>
+              <a:latin typeface="Arial" panose="020B0604020202020204" pitchFamily="34" charset="0"/>
+              <a:cs typeface="Arial" panose="020B0604020202020204" pitchFamily="34" charset="0"/>
+            </a:endParaRPr>
+          </a:p>
+          <a:p>
+            <a:pPr algn="ctr"/>
+            <a:endParaRPr lang="en-CH" sz="2400" dirty="0">
+              <a:solidFill>
+                <a:schemeClr val="bg1"/>
+              </a:solidFill>
+              <a:latin typeface="Arial" panose="020B0604020202020204" pitchFamily="34" charset="0"/>
+              <a:cs typeface="Arial" panose="020B0604020202020204" pitchFamily="34" charset="0"/>
+            </a:endParaRPr>
+          </a:p>
+          <a:p>
+            <a:pPr algn="ctr"/>
+            <a:endParaRPr lang="en-CH" sz="2400" dirty="0">
+              <a:solidFill>
+                <a:schemeClr val="bg1"/>
+              </a:solidFill>
+              <a:latin typeface="Arial" panose="020B0604020202020204" pitchFamily="34" charset="0"/>
+              <a:cs typeface="Arial" panose="020B0604020202020204" pitchFamily="34" charset="0"/>
+            </a:endParaRPr>
+          </a:p>
+          <a:p>
+            <a:pPr algn="ctr"/>
+            <a:endParaRPr lang="en-CH" sz="2400" dirty="0">
+              <a:solidFill>
+                <a:schemeClr val="bg1"/>
+              </a:solidFill>
+              <a:latin typeface="Arial" panose="020B0604020202020204" pitchFamily="34" charset="0"/>
+              <a:cs typeface="Arial" panose="020B0604020202020204" pitchFamily="34" charset="0"/>
+            </a:endParaRPr>
+          </a:p>
+          <a:p>
+            <a:pPr algn="ctr"/>
+            <a:endParaRPr lang="en-CH" sz="2400" dirty="0">
+              <a:solidFill>
+                <a:schemeClr val="bg1"/>
+              </a:solidFill>
+              <a:latin typeface="Arial" panose="020B0604020202020204" pitchFamily="34" charset="0"/>
+              <a:cs typeface="Arial" panose="020B0604020202020204" pitchFamily="34" charset="0"/>
+            </a:endParaRPr>
+          </a:p>
+          <a:p>
+            <a:pPr algn="ctr"/>
+            <a:endParaRPr lang="en-CH" sz="2400" dirty="0">
+              <a:solidFill>
+                <a:schemeClr val="bg1"/>
+              </a:solidFill>
+              <a:latin typeface="Arial" panose="020B0604020202020204" pitchFamily="34" charset="0"/>
+              <a:cs typeface="Arial" panose="020B0604020202020204" pitchFamily="34" charset="0"/>
+            </a:endParaRPr>
+          </a:p>
+          <a:p>
+            <a:pPr algn="ctr"/>
+            <a:endParaRPr lang="en-CH" sz="2400" dirty="0">
+              <a:solidFill>
+                <a:schemeClr val="bg1"/>
+              </a:solidFill>
+              <a:latin typeface="Arial" panose="020B0604020202020204" pitchFamily="34" charset="0"/>
+              <a:cs typeface="Arial" panose="020B0604020202020204" pitchFamily="34" charset="0"/>
+            </a:endParaRPr>
+          </a:p>
+          <a:p>
+            <a:pPr algn="ctr"/>
+            <a:r>
+              <a:rPr lang="en-US" sz="2400" dirty="0">
+                <a:solidFill>
+                  <a:schemeClr val="bg1"/>
+                </a:solidFill>
+                <a:latin typeface="Arial" panose="020B0604020202020204" pitchFamily="34" charset="0"/>
+                <a:cs typeface="Arial" panose="020B0604020202020204" pitchFamily="34" charset="0"/>
+              </a:rPr>
+              <a:t>The </a:t>
+            </a:r>
+            <a:r>
+              <a:rPr lang="en-CH" sz="2400" dirty="0">
+                <a:solidFill>
+                  <a:schemeClr val="bg1"/>
+                </a:solidFill>
+                <a:latin typeface="Arial" panose="020B0604020202020204" pitchFamily="34" charset="0"/>
+                <a:cs typeface="Arial" panose="020B0604020202020204" pitchFamily="34" charset="0"/>
+              </a:rPr>
+              <a:t>SAP task is starting anytime now...</a:t>
+            </a:r>
+          </a:p>
+          <a:p>
+            <a:endParaRPr lang="en-CH" sz="2400" dirty="0">
+              <a:solidFill>
+                <a:schemeClr val="bg1"/>
+              </a:solidFill>
+              <a:latin typeface="Arial" panose="020B0604020202020204" pitchFamily="34" charset="0"/>
+              <a:cs typeface="Arial" panose="020B0604020202020204" pitchFamily="34" charset="0"/>
+            </a:endParaRPr>
+          </a:p>
+          <a:p>
+            <a:endParaRPr lang="en-CH" sz="2200" dirty="0">
+              <a:solidFill>
+                <a:schemeClr val="bg1"/>
+              </a:solidFill>
+              <a:latin typeface="Arial" panose="020B0604020202020204" pitchFamily="34" charset="0"/>
+              <a:cs typeface="Arial" panose="020B0604020202020204" pitchFamily="34" charset="0"/>
+            </a:endParaRPr>
+          </a:p>
+        </p:txBody>
+      </p:sp>
+    </p:spTree>
+    <p:extLst>
+      <p:ext uri="{BB962C8B-B14F-4D97-AF65-F5344CB8AC3E}">
+        <p14:creationId xmlns:p14="http://schemas.microsoft.com/office/powerpoint/2010/main" val="265753330"/>
+      </p:ext>
+    </p:extLst>
+  </p:cSld>
+  <p:clrMapOvr>
+    <a:masterClrMapping/>
+  </p:clrMapOvr>
+</p:sld>
+</file>
+
+<file path=ppt/slides/slide36.xml><?xml version="1.0" encoding="utf-8"?>
+<p:sld xmlns:a="http://schemas.openxmlformats.org/drawingml/2006/main" xmlns:r="http://schemas.openxmlformats.org/officeDocument/2006/relationships" xmlns:p="http://schemas.openxmlformats.org/presentationml/2006/main">
+  <p:cSld>
+    <p:bg>
+      <p:bgPr>
+        <a:solidFill>
+          <a:srgbClr val="5C5C5C"/>
+        </a:solidFill>
+        <a:effectLst/>
+      </p:bgPr>
+    </p:bg>
+    <p:spTree>
+      <p:nvGrpSpPr>
+        <p:cNvPr id="1" name=""/>
+        <p:cNvGrpSpPr/>
+        <p:nvPr/>
+      </p:nvGrpSpPr>
+      <p:grpSpPr>
+        <a:xfrm>
+          <a:off x="0" y="0"/>
+          <a:ext cx="0" cy="0"/>
+          <a:chOff x="0" y="0"/>
+          <a:chExt cx="0" cy="0"/>
+        </a:xfrm>
+      </p:grpSpPr>
+      <p:sp>
+        <p:nvSpPr>
+          <p:cNvPr id="6" name="TextBox 5">
+            <a:extLst>
+              <a:ext uri="{FF2B5EF4-FFF2-40B4-BE49-F238E27FC236}">
+                <a16:creationId xmlns:a16="http://schemas.microsoft.com/office/drawing/2014/main" id="{D73EA4BC-C794-ADDF-A1A3-B7FC9E83B19C}"/>
+              </a:ext>
+            </a:extLst>
+          </p:cNvPr>
+          <p:cNvSpPr txBox="1"/>
+          <p:nvPr/>
+        </p:nvSpPr>
+        <p:spPr>
+          <a:xfrm>
+            <a:off x="373853" y="3013501"/>
+            <a:ext cx="11444287" cy="830997"/>
+          </a:xfrm>
+          <a:prstGeom prst="rect">
+            <a:avLst/>
+          </a:prstGeom>
+          <a:noFill/>
+        </p:spPr>
+        <p:txBody>
+          <a:bodyPr wrap="square" rtlCol="0">
+            <a:spAutoFit/>
+          </a:bodyPr>
+          <a:lstStyle/>
+          <a:p>
+            <a:pPr algn="ctr"/>
+            <a:r>
+              <a:rPr lang="en-CH" sz="4800" dirty="0">
+                <a:solidFill>
+                  <a:schemeClr val="bg1"/>
+                </a:solidFill>
+                <a:latin typeface="Arial" panose="020B0604020202020204" pitchFamily="34" charset="0"/>
+                <a:cs typeface="Arial" panose="020B0604020202020204" pitchFamily="34" charset="0"/>
+              </a:rPr>
+              <a:t>+ 1</a:t>
+            </a:r>
+          </a:p>
+        </p:txBody>
+      </p:sp>
+    </p:spTree>
+    <p:extLst>
+      <p:ext uri="{BB962C8B-B14F-4D97-AF65-F5344CB8AC3E}">
+        <p14:creationId xmlns:p14="http://schemas.microsoft.com/office/powerpoint/2010/main" val="1062932709"/>
+      </p:ext>
+    </p:extLst>
+  </p:cSld>
+  <p:clrMapOvr>
+    <a:masterClrMapping/>
+  </p:clrMapOvr>
+</p:sld>
+</file>
+
+<file path=ppt/slides/slide37.xml><?xml version="1.0" encoding="utf-8"?>
+<p:sld xmlns:a="http://schemas.openxmlformats.org/drawingml/2006/main" xmlns:r="http://schemas.openxmlformats.org/officeDocument/2006/relationships" xmlns:p="http://schemas.openxmlformats.org/presentationml/2006/main">
+  <p:cSld>
+    <p:bg>
+      <p:bgPr>
+        <a:solidFill>
+          <a:srgbClr val="5C5C5C"/>
+        </a:solidFill>
+        <a:effectLst/>
+      </p:bgPr>
+    </p:bg>
+    <p:spTree>
+      <p:nvGrpSpPr>
+        <p:cNvPr id="1" name=""/>
+        <p:cNvGrpSpPr/>
+        <p:nvPr/>
+      </p:nvGrpSpPr>
+      <p:grpSpPr>
+        <a:xfrm>
+          <a:off x="0" y="0"/>
+          <a:ext cx="0" cy="0"/>
+          <a:chOff x="0" y="0"/>
+          <a:chExt cx="0" cy="0"/>
+        </a:xfrm>
+      </p:grpSpPr>
+      <p:sp>
+        <p:nvSpPr>
+          <p:cNvPr id="2" name="TextBox 1">
+            <a:extLst>
+              <a:ext uri="{FF2B5EF4-FFF2-40B4-BE49-F238E27FC236}">
+                <a16:creationId xmlns:a16="http://schemas.microsoft.com/office/drawing/2014/main" id="{A2F27E21-B004-68AF-2485-A4D06B57CE76}"/>
+              </a:ext>
+            </a:extLst>
+          </p:cNvPr>
+          <p:cNvSpPr txBox="1"/>
+          <p:nvPr/>
+        </p:nvSpPr>
+        <p:spPr>
+          <a:xfrm>
+            <a:off x="373853" y="3013501"/>
+            <a:ext cx="11444287" cy="830997"/>
+          </a:xfrm>
+          <a:prstGeom prst="rect">
+            <a:avLst/>
+          </a:prstGeom>
+          <a:noFill/>
+        </p:spPr>
+        <p:txBody>
+          <a:bodyPr wrap="square" rtlCol="0">
+            <a:spAutoFit/>
+          </a:bodyPr>
+          <a:lstStyle/>
+          <a:p>
+            <a:pPr algn="ctr"/>
+            <a:r>
+              <a:rPr lang="en-CH" sz="4800" dirty="0">
+                <a:solidFill>
+                  <a:schemeClr val="bg1"/>
+                </a:solidFill>
+                <a:latin typeface="Arial" panose="020B0604020202020204" pitchFamily="34" charset="0"/>
+                <a:cs typeface="Arial" panose="020B0604020202020204" pitchFamily="34" charset="0"/>
+              </a:rPr>
+              <a:t>- 1</a:t>
+            </a:r>
+          </a:p>
+        </p:txBody>
+      </p:sp>
+    </p:spTree>
+    <p:extLst>
+      <p:ext uri="{BB962C8B-B14F-4D97-AF65-F5344CB8AC3E}">
+        <p14:creationId xmlns:p14="http://schemas.microsoft.com/office/powerpoint/2010/main" val="386870888"/>
       </p:ext>
     </p:extLst>
   </p:cSld>
@@ -5643,7 +6594,7 @@
                 <a:latin typeface="Arial" panose="020B0604020202020204" pitchFamily="34" charset="0"/>
                 <a:cs typeface="Arial" panose="020B0604020202020204" pitchFamily="34" charset="0"/>
               </a:rPr>
-              <a:t>If you predict accurately and smile at faces that smile back and stay neutral with faces that stay neutral in return, you will make points.</a:t>
+              <a:t>If you predict accurately and smile at faces that smile back and stay neutral with faces that don’t smile back you will make points.</a:t>
             </a:r>
           </a:p>
           <a:p>
@@ -5706,7 +6657,7 @@
                 <a:latin typeface="Arial" panose="020B0604020202020204" pitchFamily="34" charset="0"/>
                 <a:cs typeface="Arial" panose="020B0604020202020204" pitchFamily="34" charset="0"/>
               </a:rPr>
-              <a:t>After each task you will learn how many points you accumulated.</a:t>
+              <a:t>After each task you will learn how many points you collected.</a:t>
             </a:r>
           </a:p>
           <a:p>
@@ -5746,7 +6697,13 @@
     </p:bg>
     <p:spTree>
       <p:nvGrpSpPr>
-        <p:cNvPr id="1" name=""/>
+        <p:cNvPr id="1" name="">
+          <a:extLst>
+            <a:ext uri="{FF2B5EF4-FFF2-40B4-BE49-F238E27FC236}">
+              <a16:creationId xmlns:a16="http://schemas.microsoft.com/office/drawing/2014/main" id="{9235A5C9-F444-3AD2-9093-F8A393277438}"/>
+            </a:ext>
+          </a:extLst>
+        </p:cNvPr>
         <p:cNvGrpSpPr/>
         <p:nvPr/>
       </p:nvGrpSpPr>
@@ -5758,40 +6715,148 @@
           <a:chExt cx="0" cy="0"/>
         </a:xfrm>
       </p:grpSpPr>
-      <p:pic>
-        <p:nvPicPr>
-          <p:cNvPr id="4" name="Picture 3">
-            <a:extLst>
-              <a:ext uri="{FF2B5EF4-FFF2-40B4-BE49-F238E27FC236}">
-                <a16:creationId xmlns:a16="http://schemas.microsoft.com/office/drawing/2014/main" id="{BC42480A-BBD8-6D26-ED28-6A7FA443D398}"/>
-              </a:ext>
-            </a:extLst>
-          </p:cNvPr>
-          <p:cNvPicPr>
-            <a:picLocks noChangeAspect="1"/>
-          </p:cNvPicPr>
+      <p:sp>
+        <p:nvSpPr>
+          <p:cNvPr id="5" name="TextBox 4">
+            <a:extLst>
+              <a:ext uri="{FF2B5EF4-FFF2-40B4-BE49-F238E27FC236}">
+                <a16:creationId xmlns:a16="http://schemas.microsoft.com/office/drawing/2014/main" id="{036A15B3-7EE0-EC74-FD42-57F99239A4E8}"/>
+              </a:ext>
+            </a:extLst>
+          </p:cNvPr>
+          <p:cNvSpPr txBox="1"/>
           <p:nvPr/>
-        </p:nvPicPr>
-        <p:blipFill>
-          <a:blip r:embed="rId2"/>
-          <a:stretch>
-            <a:fillRect/>
-          </a:stretch>
-        </p:blipFill>
+        </p:nvSpPr>
         <p:spPr>
           <a:xfrm>
-            <a:off x="3501517" y="1449000"/>
-            <a:ext cx="5188966" cy="3960000"/>
+            <a:off x="391886" y="130629"/>
+            <a:ext cx="11614067" cy="4555093"/>
           </a:xfrm>
           <a:prstGeom prst="rect">
             <a:avLst/>
           </a:prstGeom>
+          <a:noFill/>
+          <a:ln>
+            <a:noFill/>
+          </a:ln>
         </p:spPr>
-      </p:pic>
+        <p:txBody>
+          <a:bodyPr wrap="square" rtlCol="0">
+            <a:spAutoFit/>
+          </a:bodyPr>
+          <a:lstStyle/>
+          <a:p>
+            <a:pPr algn="ctr"/>
+            <a:r>
+              <a:rPr lang="en-CH" sz="2400" dirty="0">
+                <a:solidFill>
+                  <a:schemeClr val="bg1"/>
+                </a:solidFill>
+                <a:latin typeface="Arial" panose="020B0604020202020204" pitchFamily="34" charset="0"/>
+                <a:cs typeface="Arial" panose="020B0604020202020204" pitchFamily="34" charset="0"/>
+              </a:rPr>
+              <a:t>POINTS</a:t>
+            </a:r>
+          </a:p>
+          <a:p>
+            <a:endParaRPr lang="en-CH" sz="2400" dirty="0">
+              <a:solidFill>
+                <a:schemeClr val="bg1"/>
+              </a:solidFill>
+              <a:latin typeface="Arial" panose="020B0604020202020204" pitchFamily="34" charset="0"/>
+              <a:cs typeface="Arial" panose="020B0604020202020204" pitchFamily="34" charset="0"/>
+            </a:endParaRPr>
+          </a:p>
+          <a:p>
+            <a:r>
+              <a:rPr lang="en-CH" sz="2200" dirty="0">
+                <a:solidFill>
+                  <a:schemeClr val="bg1"/>
+                </a:solidFill>
+                <a:latin typeface="Arial" panose="020B0604020202020204" pitchFamily="34" charset="0"/>
+                <a:cs typeface="Arial" panose="020B0604020202020204" pitchFamily="34" charset="0"/>
+              </a:rPr>
+              <a:t>If you predict accurately and smile at faces that smile back and stay neutral with faces that don’t smile back you will make points.</a:t>
+            </a:r>
+          </a:p>
+          <a:p>
+            <a:endParaRPr lang="en-CH" sz="2200" dirty="0">
+              <a:solidFill>
+                <a:schemeClr val="bg1"/>
+              </a:solidFill>
+              <a:latin typeface="Arial" panose="020B0604020202020204" pitchFamily="34" charset="0"/>
+              <a:cs typeface="Arial" panose="020B0604020202020204" pitchFamily="34" charset="0"/>
+            </a:endParaRPr>
+          </a:p>
+          <a:p>
+            <a:r>
+              <a:rPr lang="en-CH" sz="2200" dirty="0">
+                <a:solidFill>
+                  <a:schemeClr val="bg1"/>
+                </a:solidFill>
+                <a:latin typeface="Arial" panose="020B0604020202020204" pitchFamily="34" charset="0"/>
+                <a:cs typeface="Arial" panose="020B0604020202020204" pitchFamily="34" charset="0"/>
+              </a:rPr>
+              <a:t>If you can reach 20 points you will earn an additional 5 AUD on top of the participation reimbursement.</a:t>
+            </a:r>
+          </a:p>
+          <a:p>
+            <a:endParaRPr lang="en-CH" sz="2200" dirty="0">
+              <a:solidFill>
+                <a:schemeClr val="bg1"/>
+              </a:solidFill>
+              <a:latin typeface="Arial" panose="020B0604020202020204" pitchFamily="34" charset="0"/>
+              <a:cs typeface="Arial" panose="020B0604020202020204" pitchFamily="34" charset="0"/>
+            </a:endParaRPr>
+          </a:p>
+          <a:p>
+            <a:r>
+              <a:rPr lang="en-CH" sz="2200" dirty="0">
+                <a:solidFill>
+                  <a:schemeClr val="bg1"/>
+                </a:solidFill>
+                <a:latin typeface="Arial" panose="020B0604020202020204" pitchFamily="34" charset="0"/>
+                <a:cs typeface="Arial" panose="020B0604020202020204" pitchFamily="34" charset="0"/>
+              </a:rPr>
+              <a:t>If you reach 40 points you will earn an additional 5 AUD on top of the participation reimbursement and the 20-point bonus.</a:t>
+            </a:r>
+          </a:p>
+          <a:p>
+            <a:endParaRPr lang="en-CH" sz="2200" dirty="0">
+              <a:solidFill>
+                <a:schemeClr val="bg1"/>
+              </a:solidFill>
+              <a:latin typeface="Arial" panose="020B0604020202020204" pitchFamily="34" charset="0"/>
+              <a:cs typeface="Arial" panose="020B0604020202020204" pitchFamily="34" charset="0"/>
+            </a:endParaRPr>
+          </a:p>
+          <a:p>
+            <a:r>
+              <a:rPr lang="en-CH" sz="2200" dirty="0">
+                <a:solidFill>
+                  <a:schemeClr val="bg1"/>
+                </a:solidFill>
+                <a:latin typeface="Arial" panose="020B0604020202020204" pitchFamily="34" charset="0"/>
+                <a:cs typeface="Arial" panose="020B0604020202020204" pitchFamily="34" charset="0"/>
+              </a:rPr>
+              <a:t>After the task you will learn how many points you collected.</a:t>
+            </a:r>
+          </a:p>
+          <a:p>
+            <a:endParaRPr lang="en-CH" sz="2200" dirty="0">
+              <a:solidFill>
+                <a:schemeClr val="bg1"/>
+              </a:solidFill>
+              <a:latin typeface="Arial" panose="020B0604020202020204" pitchFamily="34" charset="0"/>
+              <a:cs typeface="Arial" panose="020B0604020202020204" pitchFamily="34" charset="0"/>
+            </a:endParaRPr>
+          </a:p>
+        </p:txBody>
+      </p:sp>
     </p:spTree>
     <p:extLst>
       <p:ext uri="{BB962C8B-B14F-4D97-AF65-F5344CB8AC3E}">
-        <p14:creationId xmlns:p14="http://schemas.microsoft.com/office/powerpoint/2010/main" val="3024732115"/>
+        <p14:creationId xmlns:p14="http://schemas.microsoft.com/office/powerpoint/2010/main" val="694144612"/>
       </p:ext>
     </p:extLst>
   </p:cSld>
@@ -5828,10 +6893,10 @@
       </p:grpSpPr>
       <p:pic>
         <p:nvPicPr>
-          <p:cNvPr id="3" name="Picture 2">
-            <a:extLst>
-              <a:ext uri="{FF2B5EF4-FFF2-40B4-BE49-F238E27FC236}">
-                <a16:creationId xmlns:a16="http://schemas.microsoft.com/office/drawing/2014/main" id="{F19FD08C-73E1-7B9E-6DEC-32BF3283A1A4}"/>
+          <p:cNvPr id="4" name="Picture 3">
+            <a:extLst>
+              <a:ext uri="{FF2B5EF4-FFF2-40B4-BE49-F238E27FC236}">
+                <a16:creationId xmlns:a16="http://schemas.microsoft.com/office/drawing/2014/main" id="{BC42480A-BBD8-6D26-ED28-6A7FA443D398}"/>
               </a:ext>
             </a:extLst>
           </p:cNvPr>
@@ -5841,7 +6906,24 @@
           <p:nvPr/>
         </p:nvPicPr>
         <p:blipFill>
-          <a:blip r:embed="rId2"/>
+          <a:blip r:embed="rId2">
+            <a:extLst>
+              <a:ext uri="{BEBA8EAE-BF5A-486C-A8C5-ECC9F3942E4B}">
+                <a14:imgProps xmlns:a14="http://schemas.microsoft.com/office/drawing/2010/main">
+                  <a14:imgLayer r:embed="rId3">
+                    <a14:imgEffect>
+                      <a14:backgroundRemoval t="3233" b="99569" l="9704" r="89803">
+                        <a14:foregroundMark x1="49013" y1="10129" x2="49013" y2="10129"/>
+                        <a14:foregroundMark x1="48849" y1="3233" x2="48849" y2="3233"/>
+                        <a14:foregroundMark x1="53454" y1="93750" x2="53454" y2="93750"/>
+                        <a14:foregroundMark x1="50822" y1="99569" x2="50822" y2="99569"/>
+                      </a14:backgroundRemoval>
+                    </a14:imgEffect>
+                  </a14:imgLayer>
+                </a14:imgProps>
+              </a:ext>
+            </a:extLst>
+          </a:blip>
           <a:stretch>
             <a:fillRect/>
           </a:stretch>
@@ -5859,7 +6941,7 @@
     </p:spTree>
     <p:extLst>
       <p:ext uri="{BB962C8B-B14F-4D97-AF65-F5344CB8AC3E}">
-        <p14:creationId xmlns:p14="http://schemas.microsoft.com/office/powerpoint/2010/main" val="1971449608"/>
+        <p14:creationId xmlns:p14="http://schemas.microsoft.com/office/powerpoint/2010/main" val="3024732115"/>
       </p:ext>
     </p:extLst>
   </p:cSld>
@@ -5882,7 +6964,13 @@
     </p:bg>
     <p:spTree>
       <p:nvGrpSpPr>
-        <p:cNvPr id="1" name=""/>
+        <p:cNvPr id="1" name="">
+          <a:extLst>
+            <a:ext uri="{FF2B5EF4-FFF2-40B4-BE49-F238E27FC236}">
+              <a16:creationId xmlns:a16="http://schemas.microsoft.com/office/drawing/2014/main" id="{AD748C38-470C-113B-B094-3A2FBEBFA674}"/>
+            </a:ext>
+          </a:extLst>
+        </p:cNvPr>
         <p:cNvGrpSpPr/>
         <p:nvPr/>
       </p:nvGrpSpPr>
@@ -5899,7 +6987,7 @@
           <p:cNvPr id="3" name="Picture 2">
             <a:extLst>
               <a:ext uri="{FF2B5EF4-FFF2-40B4-BE49-F238E27FC236}">
-                <a16:creationId xmlns:a16="http://schemas.microsoft.com/office/drawing/2014/main" id="{08526774-AD3D-A2BF-8B22-289424073E47}"/>
+                <a16:creationId xmlns:a16="http://schemas.microsoft.com/office/drawing/2014/main" id="{BC1C8547-360D-CF8D-AB17-541B0CF7DD7E}"/>
               </a:ext>
             </a:extLst>
           </p:cNvPr>
@@ -5909,7 +6997,26 @@
           <p:nvPr/>
         </p:nvPicPr>
         <p:blipFill>
-          <a:blip r:embed="rId2"/>
+          <a:blip r:embed="rId2">
+            <a:extLst>
+              <a:ext uri="{BEBA8EAE-BF5A-486C-A8C5-ECC9F3942E4B}">
+                <a14:imgProps xmlns:a14="http://schemas.microsoft.com/office/drawing/2010/main">
+                  <a14:imgLayer r:embed="rId3">
+                    <a14:imgEffect>
+                      <a14:backgroundRemoval t="1078" b="98922" l="9704" r="89803">
+                        <a14:foregroundMark x1="48355" y1="5172" x2="48355" y2="5172"/>
+                        <a14:foregroundMark x1="50000" y1="1078" x2="50000" y2="1078"/>
+                        <a14:foregroundMark x1="47697" y1="93750" x2="47697" y2="93750"/>
+                        <a14:foregroundMark x1="47862" y1="98922" x2="47862" y2="98922"/>
+                        <a14:foregroundMark x1="35362" y1="6681" x2="35362" y2="6681"/>
+                        <a14:foregroundMark x1="34704" y1="6897" x2="34704" y2="6897"/>
+                      </a14:backgroundRemoval>
+                    </a14:imgEffect>
+                  </a14:imgLayer>
+                </a14:imgProps>
+              </a:ext>
+            </a:extLst>
+          </a:blip>
           <a:stretch>
             <a:fillRect/>
           </a:stretch>
@@ -5927,7 +7034,7 @@
     </p:spTree>
     <p:extLst>
       <p:ext uri="{BB962C8B-B14F-4D97-AF65-F5344CB8AC3E}">
-        <p14:creationId xmlns:p14="http://schemas.microsoft.com/office/powerpoint/2010/main" val="4139463847"/>
+        <p14:creationId xmlns:p14="http://schemas.microsoft.com/office/powerpoint/2010/main" val="1890130128"/>
       </p:ext>
     </p:extLst>
   </p:cSld>
@@ -5967,7 +7074,7 @@
           <p:cNvPr id="3" name="Picture 2">
             <a:extLst>
               <a:ext uri="{FF2B5EF4-FFF2-40B4-BE49-F238E27FC236}">
-                <a16:creationId xmlns:a16="http://schemas.microsoft.com/office/drawing/2014/main" id="{B720F08B-DC1B-BB78-54B3-C8A371BB9278}"/>
+                <a16:creationId xmlns:a16="http://schemas.microsoft.com/office/drawing/2014/main" id="{F19FD08C-73E1-7B9E-6DEC-32BF3283A1A4}"/>
               </a:ext>
             </a:extLst>
           </p:cNvPr>
@@ -5977,7 +7084,23 @@
           <p:nvPr/>
         </p:nvPicPr>
         <p:blipFill>
-          <a:blip r:embed="rId2"/>
+          <a:blip r:embed="rId2">
+            <a:extLst>
+              <a:ext uri="{BEBA8EAE-BF5A-486C-A8C5-ECC9F3942E4B}">
+                <a14:imgProps xmlns:a14="http://schemas.microsoft.com/office/drawing/2010/main">
+                  <a14:imgLayer r:embed="rId3">
+                    <a14:imgEffect>
+                      <a14:backgroundRemoval t="4095" b="95043" l="9704" r="89803">
+                        <a14:foregroundMark x1="44572" y1="13578" x2="44572" y2="13578"/>
+                        <a14:foregroundMark x1="48849" y1="4310" x2="48849" y2="4310"/>
+                        <a14:foregroundMark x1="52632" y1="95043" x2="52632" y2="95043"/>
+                      </a14:backgroundRemoval>
+                    </a14:imgEffect>
+                  </a14:imgLayer>
+                </a14:imgProps>
+              </a:ext>
+            </a:extLst>
+          </a:blip>
           <a:stretch>
             <a:fillRect/>
           </a:stretch>
@@ -5995,7 +7118,7 @@
     </p:spTree>
     <p:extLst>
       <p:ext uri="{BB962C8B-B14F-4D97-AF65-F5344CB8AC3E}">
-        <p14:creationId xmlns:p14="http://schemas.microsoft.com/office/powerpoint/2010/main" val="586545891"/>
+        <p14:creationId xmlns:p14="http://schemas.microsoft.com/office/powerpoint/2010/main" val="1971449608"/>
       </p:ext>
     </p:extLst>
   </p:cSld>
@@ -6035,7 +7158,7 @@
           <p:cNvPr id="3" name="Picture 2">
             <a:extLst>
               <a:ext uri="{FF2B5EF4-FFF2-40B4-BE49-F238E27FC236}">
-                <a16:creationId xmlns:a16="http://schemas.microsoft.com/office/drawing/2014/main" id="{02C3729A-FF3F-F995-3345-DEEDC1FC84C1}"/>
+                <a16:creationId xmlns:a16="http://schemas.microsoft.com/office/drawing/2014/main" id="{08526774-AD3D-A2BF-8B22-289424073E47}"/>
               </a:ext>
             </a:extLst>
           </p:cNvPr>
@@ -6045,7 +7168,23 @@
           <p:nvPr/>
         </p:nvPicPr>
         <p:blipFill>
-          <a:blip r:embed="rId2"/>
+          <a:blip r:embed="rId2">
+            <a:extLst>
+              <a:ext uri="{BEBA8EAE-BF5A-486C-A8C5-ECC9F3942E4B}">
+                <a14:imgProps xmlns:a14="http://schemas.microsoft.com/office/drawing/2010/main">
+                  <a14:imgLayer r:embed="rId3">
+                    <a14:imgEffect>
+                      <a14:backgroundRemoval t="3664" b="95905" l="9704" r="89803">
+                        <a14:foregroundMark x1="47368" y1="15302" x2="47368" y2="15302"/>
+                        <a14:foregroundMark x1="49507" y1="3879" x2="49507" y2="3879"/>
+                        <a14:foregroundMark x1="52467" y1="95905" x2="52467" y2="95905"/>
+                      </a14:backgroundRemoval>
+                    </a14:imgEffect>
+                  </a14:imgLayer>
+                </a14:imgProps>
+              </a:ext>
+            </a:extLst>
+          </a:blip>
           <a:stretch>
             <a:fillRect/>
           </a:stretch>
@@ -6063,7 +7202,7 @@
     </p:spTree>
     <p:extLst>
       <p:ext uri="{BB962C8B-B14F-4D97-AF65-F5344CB8AC3E}">
-        <p14:creationId xmlns:p14="http://schemas.microsoft.com/office/powerpoint/2010/main" val="1313142258"/>
+        <p14:creationId xmlns:p14="http://schemas.microsoft.com/office/powerpoint/2010/main" val="4139463847"/>
       </p:ext>
     </p:extLst>
   </p:cSld>

</xml_diff>

<commit_message>
changed task timings, fixed showPoints function, added additional event to control task to match SAP task timings better
</commit_message>
<xml_diff>
--- a/task/stimuli/originals_SAP_Task.pptx
+++ b/task/stimuli/originals_SAP_Task.pptx
@@ -9,39 +9,38 @@
     <p:sldId id="258" r:id="rId3"/>
     <p:sldId id="282" r:id="rId4"/>
     <p:sldId id="3497" r:id="rId5"/>
-    <p:sldId id="3519" r:id="rId6"/>
-    <p:sldId id="283" r:id="rId7"/>
-    <p:sldId id="3511" r:id="rId8"/>
-    <p:sldId id="3479" r:id="rId9"/>
-    <p:sldId id="3480" r:id="rId10"/>
-    <p:sldId id="3512" r:id="rId11"/>
-    <p:sldId id="3481" r:id="rId12"/>
-    <p:sldId id="3482" r:id="rId13"/>
-    <p:sldId id="3513" r:id="rId14"/>
-    <p:sldId id="3483" r:id="rId15"/>
-    <p:sldId id="3484" r:id="rId16"/>
-    <p:sldId id="3514" r:id="rId17"/>
-    <p:sldId id="3485" r:id="rId18"/>
-    <p:sldId id="3486" r:id="rId19"/>
-    <p:sldId id="3515" r:id="rId20"/>
-    <p:sldId id="3503" r:id="rId21"/>
-    <p:sldId id="3504" r:id="rId22"/>
-    <p:sldId id="3516" r:id="rId23"/>
-    <p:sldId id="3505" r:id="rId24"/>
-    <p:sldId id="3506" r:id="rId25"/>
-    <p:sldId id="3517" r:id="rId26"/>
-    <p:sldId id="3508" r:id="rId27"/>
-    <p:sldId id="3509" r:id="rId28"/>
-    <p:sldId id="3518" r:id="rId29"/>
-    <p:sldId id="3510" r:id="rId30"/>
-    <p:sldId id="3475" r:id="rId31"/>
-    <p:sldId id="3474" r:id="rId32"/>
-    <p:sldId id="3498" r:id="rId33"/>
-    <p:sldId id="3502" r:id="rId34"/>
-    <p:sldId id="3500" r:id="rId35"/>
-    <p:sldId id="3499" r:id="rId36"/>
-    <p:sldId id="3476" r:id="rId37"/>
-    <p:sldId id="3477" r:id="rId38"/>
+    <p:sldId id="283" r:id="rId6"/>
+    <p:sldId id="3511" r:id="rId7"/>
+    <p:sldId id="3479" r:id="rId8"/>
+    <p:sldId id="3480" r:id="rId9"/>
+    <p:sldId id="3512" r:id="rId10"/>
+    <p:sldId id="3481" r:id="rId11"/>
+    <p:sldId id="3482" r:id="rId12"/>
+    <p:sldId id="3513" r:id="rId13"/>
+    <p:sldId id="3483" r:id="rId14"/>
+    <p:sldId id="3484" r:id="rId15"/>
+    <p:sldId id="3514" r:id="rId16"/>
+    <p:sldId id="3485" r:id="rId17"/>
+    <p:sldId id="3486" r:id="rId18"/>
+    <p:sldId id="3515" r:id="rId19"/>
+    <p:sldId id="3503" r:id="rId20"/>
+    <p:sldId id="3504" r:id="rId21"/>
+    <p:sldId id="3516" r:id="rId22"/>
+    <p:sldId id="3505" r:id="rId23"/>
+    <p:sldId id="3506" r:id="rId24"/>
+    <p:sldId id="3517" r:id="rId25"/>
+    <p:sldId id="3508" r:id="rId26"/>
+    <p:sldId id="3509" r:id="rId27"/>
+    <p:sldId id="3518" r:id="rId28"/>
+    <p:sldId id="3510" r:id="rId29"/>
+    <p:sldId id="3475" r:id="rId30"/>
+    <p:sldId id="3474" r:id="rId31"/>
+    <p:sldId id="3498" r:id="rId32"/>
+    <p:sldId id="3502" r:id="rId33"/>
+    <p:sldId id="3500" r:id="rId34"/>
+    <p:sldId id="3499" r:id="rId35"/>
+    <p:sldId id="3476" r:id="rId36"/>
+    <p:sldId id="3477" r:id="rId37"/>
   </p:sldIdLst>
   <p:sldSz cx="12192000" cy="6858000"/>
   <p:notesSz cx="6858000" cy="9144000"/>
@@ -297,7 +296,7 @@
           <a:p>
             <a:fld id="{9B916260-F45C-B647-88A4-C91F6BA5DC4E}" type="datetimeFigureOut">
               <a:rPr lang="en-CH" smtClean="0"/>
-              <a:t>11.10.24</a:t>
+              <a:t>15.10.24</a:t>
             </a:fld>
             <a:endParaRPr lang="en-CH"/>
           </a:p>
@@ -497,7 +496,7 @@
           <a:p>
             <a:fld id="{9B916260-F45C-B647-88A4-C91F6BA5DC4E}" type="datetimeFigureOut">
               <a:rPr lang="en-CH" smtClean="0"/>
-              <a:t>11.10.24</a:t>
+              <a:t>15.10.24</a:t>
             </a:fld>
             <a:endParaRPr lang="en-CH"/>
           </a:p>
@@ -707,7 +706,7 @@
           <a:p>
             <a:fld id="{9B916260-F45C-B647-88A4-C91F6BA5DC4E}" type="datetimeFigureOut">
               <a:rPr lang="en-CH" smtClean="0"/>
-              <a:t>11.10.24</a:t>
+              <a:t>15.10.24</a:t>
             </a:fld>
             <a:endParaRPr lang="en-CH"/>
           </a:p>
@@ -907,7 +906,7 @@
           <a:p>
             <a:fld id="{9B916260-F45C-B647-88A4-C91F6BA5DC4E}" type="datetimeFigureOut">
               <a:rPr lang="en-CH" smtClean="0"/>
-              <a:t>11.10.24</a:t>
+              <a:t>15.10.24</a:t>
             </a:fld>
             <a:endParaRPr lang="en-CH"/>
           </a:p>
@@ -1183,7 +1182,7 @@
           <a:p>
             <a:fld id="{9B916260-F45C-B647-88A4-C91F6BA5DC4E}" type="datetimeFigureOut">
               <a:rPr lang="en-CH" smtClean="0"/>
-              <a:t>11.10.24</a:t>
+              <a:t>15.10.24</a:t>
             </a:fld>
             <a:endParaRPr lang="en-CH"/>
           </a:p>
@@ -1451,7 +1450,7 @@
           <a:p>
             <a:fld id="{9B916260-F45C-B647-88A4-C91F6BA5DC4E}" type="datetimeFigureOut">
               <a:rPr lang="en-CH" smtClean="0"/>
-              <a:t>11.10.24</a:t>
+              <a:t>15.10.24</a:t>
             </a:fld>
             <a:endParaRPr lang="en-CH"/>
           </a:p>
@@ -1866,7 +1865,7 @@
           <a:p>
             <a:fld id="{9B916260-F45C-B647-88A4-C91F6BA5DC4E}" type="datetimeFigureOut">
               <a:rPr lang="en-CH" smtClean="0"/>
-              <a:t>11.10.24</a:t>
+              <a:t>15.10.24</a:t>
             </a:fld>
             <a:endParaRPr lang="en-CH"/>
           </a:p>
@@ -2008,7 +2007,7 @@
           <a:p>
             <a:fld id="{9B916260-F45C-B647-88A4-C91F6BA5DC4E}" type="datetimeFigureOut">
               <a:rPr lang="en-CH" smtClean="0"/>
-              <a:t>11.10.24</a:t>
+              <a:t>15.10.24</a:t>
             </a:fld>
             <a:endParaRPr lang="en-CH"/>
           </a:p>
@@ -2121,7 +2120,7 @@
           <a:p>
             <a:fld id="{9B916260-F45C-B647-88A4-C91F6BA5DC4E}" type="datetimeFigureOut">
               <a:rPr lang="en-CH" smtClean="0"/>
-              <a:t>11.10.24</a:t>
+              <a:t>15.10.24</a:t>
             </a:fld>
             <a:endParaRPr lang="en-CH"/>
           </a:p>
@@ -2434,7 +2433,7 @@
           <a:p>
             <a:fld id="{9B916260-F45C-B647-88A4-C91F6BA5DC4E}" type="datetimeFigureOut">
               <a:rPr lang="en-CH" smtClean="0"/>
-              <a:t>11.10.24</a:t>
+              <a:t>15.10.24</a:t>
             </a:fld>
             <a:endParaRPr lang="en-CH"/>
           </a:p>
@@ -2723,7 +2722,7 @@
           <a:p>
             <a:fld id="{9B916260-F45C-B647-88A4-C91F6BA5DC4E}" type="datetimeFigureOut">
               <a:rPr lang="en-CH" smtClean="0"/>
-              <a:t>11.10.24</a:t>
+              <a:t>15.10.24</a:t>
             </a:fld>
             <a:endParaRPr lang="en-CH"/>
           </a:p>
@@ -2966,7 +2965,7 @@
           <a:p>
             <a:fld id="{9B916260-F45C-B647-88A4-C91F6BA5DC4E}" type="datetimeFigureOut">
               <a:rPr lang="en-CH" smtClean="0"/>
-              <a:t>11.10.24</a:t>
+              <a:t>15.10.24</a:t>
             </a:fld>
             <a:endParaRPr lang="en-CH"/>
           </a:p>
@@ -3465,13 +3464,7 @@
     </p:bg>
     <p:spTree>
       <p:nvGrpSpPr>
-        <p:cNvPr id="1" name="">
-          <a:extLst>
-            <a:ext uri="{FF2B5EF4-FFF2-40B4-BE49-F238E27FC236}">
-              <a16:creationId xmlns:a16="http://schemas.microsoft.com/office/drawing/2014/main" id="{58362876-6F74-6E63-CF52-920E19E230DA}"/>
-            </a:ext>
-          </a:extLst>
-        </p:cNvPr>
+        <p:cNvPr id="1" name=""/>
         <p:cNvGrpSpPr/>
         <p:nvPr/>
       </p:nvGrpSpPr>
@@ -3485,10 +3478,10 @@
       </p:grpSpPr>
       <p:pic>
         <p:nvPicPr>
-          <p:cNvPr id="4" name="Picture 3">
-            <a:extLst>
-              <a:ext uri="{FF2B5EF4-FFF2-40B4-BE49-F238E27FC236}">
-                <a16:creationId xmlns:a16="http://schemas.microsoft.com/office/drawing/2014/main" id="{34157AAE-2B20-D88F-D95B-3AD9283E705D}"/>
+          <p:cNvPr id="3" name="Picture 2">
+            <a:extLst>
+              <a:ext uri="{FF2B5EF4-FFF2-40B4-BE49-F238E27FC236}">
+                <a16:creationId xmlns:a16="http://schemas.microsoft.com/office/drawing/2014/main" id="{B720F08B-DC1B-BB78-54B3-C8A371BB9278}"/>
               </a:ext>
             </a:extLst>
           </p:cNvPr>
@@ -3504,11 +3497,11 @@
                 <a14:imgProps xmlns:a14="http://schemas.microsoft.com/office/drawing/2010/main">
                   <a14:imgLayer r:embed="rId3">
                     <a14:imgEffect>
-                      <a14:backgroundRemoval t="3664" b="98922" l="9704" r="89803">
-                        <a14:foregroundMark x1="45888" y1="12716" x2="45888" y2="12716"/>
-                        <a14:foregroundMark x1="48026" y1="3879" x2="48026" y2="3879"/>
-                        <a14:foregroundMark x1="52796" y1="93103" x2="52796" y2="93103"/>
-                        <a14:foregroundMark x1="50164" y1="98922" x2="50164" y2="98922"/>
+                      <a14:backgroundRemoval t="4095" b="98276" l="9704" r="89803">
+                        <a14:foregroundMark x1="50000" y1="18534" x2="50000" y2="18534"/>
+                        <a14:foregroundMark x1="51480" y1="4095" x2="51480" y2="4095"/>
+                        <a14:foregroundMark x1="49671" y1="92672" x2="49671" y2="92672"/>
+                        <a14:foregroundMark x1="49671" y1="98276" x2="49671" y2="98276"/>
                       </a14:backgroundRemoval>
                     </a14:imgEffect>
                   </a14:imgLayer>
@@ -3533,7 +3526,7 @@
     </p:spTree>
     <p:extLst>
       <p:ext uri="{BB962C8B-B14F-4D97-AF65-F5344CB8AC3E}">
-        <p14:creationId xmlns:p14="http://schemas.microsoft.com/office/powerpoint/2010/main" val="2463032928"/>
+        <p14:creationId xmlns:p14="http://schemas.microsoft.com/office/powerpoint/2010/main" val="586545891"/>
       </p:ext>
     </p:extLst>
   </p:cSld>
@@ -3573,91 +3566,6 @@
           <p:cNvPr id="3" name="Picture 2">
             <a:extLst>
               <a:ext uri="{FF2B5EF4-FFF2-40B4-BE49-F238E27FC236}">
-                <a16:creationId xmlns:a16="http://schemas.microsoft.com/office/drawing/2014/main" id="{B720F08B-DC1B-BB78-54B3-C8A371BB9278}"/>
-              </a:ext>
-            </a:extLst>
-          </p:cNvPr>
-          <p:cNvPicPr>
-            <a:picLocks noChangeAspect="1"/>
-          </p:cNvPicPr>
-          <p:nvPr/>
-        </p:nvPicPr>
-        <p:blipFill>
-          <a:blip r:embed="rId2">
-            <a:extLst>
-              <a:ext uri="{BEBA8EAE-BF5A-486C-A8C5-ECC9F3942E4B}">
-                <a14:imgProps xmlns:a14="http://schemas.microsoft.com/office/drawing/2010/main">
-                  <a14:imgLayer r:embed="rId3">
-                    <a14:imgEffect>
-                      <a14:backgroundRemoval t="4095" b="98276" l="9704" r="89803">
-                        <a14:foregroundMark x1="50000" y1="18534" x2="50000" y2="18534"/>
-                        <a14:foregroundMark x1="51480" y1="4095" x2="51480" y2="4095"/>
-                        <a14:foregroundMark x1="49671" y1="92672" x2="49671" y2="92672"/>
-                        <a14:foregroundMark x1="49671" y1="98276" x2="49671" y2="98276"/>
-                      </a14:backgroundRemoval>
-                    </a14:imgEffect>
-                  </a14:imgLayer>
-                </a14:imgProps>
-              </a:ext>
-            </a:extLst>
-          </a:blip>
-          <a:stretch>
-            <a:fillRect/>
-          </a:stretch>
-        </p:blipFill>
-        <p:spPr>
-          <a:xfrm>
-            <a:off x="3501517" y="1449000"/>
-            <a:ext cx="5188966" cy="3960000"/>
-          </a:xfrm>
-          <a:prstGeom prst="rect">
-            <a:avLst/>
-          </a:prstGeom>
-        </p:spPr>
-      </p:pic>
-    </p:spTree>
-    <p:extLst>
-      <p:ext uri="{BB962C8B-B14F-4D97-AF65-F5344CB8AC3E}">
-        <p14:creationId xmlns:p14="http://schemas.microsoft.com/office/powerpoint/2010/main" val="586545891"/>
-      </p:ext>
-    </p:extLst>
-  </p:cSld>
-  <p:clrMapOvr>
-    <a:masterClrMapping/>
-  </p:clrMapOvr>
-</p:sld>
-</file>
-
-<file path=ppt/slides/slide12.xml><?xml version="1.0" encoding="utf-8"?>
-<p:sld xmlns:a="http://schemas.openxmlformats.org/drawingml/2006/main" xmlns:r="http://schemas.openxmlformats.org/officeDocument/2006/relationships" xmlns:p="http://schemas.openxmlformats.org/presentationml/2006/main">
-  <p:cSld>
-    <p:bg>
-      <p:bgPr>
-        <a:solidFill>
-          <a:srgbClr val="5C5C5C"/>
-        </a:solidFill>
-        <a:effectLst/>
-      </p:bgPr>
-    </p:bg>
-    <p:spTree>
-      <p:nvGrpSpPr>
-        <p:cNvPr id="1" name=""/>
-        <p:cNvGrpSpPr/>
-        <p:nvPr/>
-      </p:nvGrpSpPr>
-      <p:grpSpPr>
-        <a:xfrm>
-          <a:off x="0" y="0"/>
-          <a:ext cx="0" cy="0"/>
-          <a:chOff x="0" y="0"/>
-          <a:chExt cx="0" cy="0"/>
-        </a:xfrm>
-      </p:grpSpPr>
-      <p:pic>
-        <p:nvPicPr>
-          <p:cNvPr id="3" name="Picture 2">
-            <a:extLst>
-              <a:ext uri="{FF2B5EF4-FFF2-40B4-BE49-F238E27FC236}">
                 <a16:creationId xmlns:a16="http://schemas.microsoft.com/office/drawing/2014/main" id="{02C3729A-FF3F-F995-3345-DEEDC1FC84C1}"/>
               </a:ext>
             </a:extLst>
@@ -3713,7 +3621,7 @@
 </p:sld>
 </file>
 
-<file path=ppt/slides/slide13.xml><?xml version="1.0" encoding="utf-8"?>
+<file path=ppt/slides/slide12.xml><?xml version="1.0" encoding="utf-8"?>
 <p:sld xmlns:a="http://schemas.openxmlformats.org/drawingml/2006/main" xmlns:r="http://schemas.openxmlformats.org/officeDocument/2006/relationships" xmlns:p="http://schemas.openxmlformats.org/presentationml/2006/main">
   <p:cSld>
     <p:bg>
@@ -3795,6 +3703,74 @@
     <p:extLst>
       <p:ext uri="{BB962C8B-B14F-4D97-AF65-F5344CB8AC3E}">
         <p14:creationId xmlns:p14="http://schemas.microsoft.com/office/powerpoint/2010/main" val="785923272"/>
+      </p:ext>
+    </p:extLst>
+  </p:cSld>
+  <p:clrMapOvr>
+    <a:masterClrMapping/>
+  </p:clrMapOvr>
+</p:sld>
+</file>
+
+<file path=ppt/slides/slide13.xml><?xml version="1.0" encoding="utf-8"?>
+<p:sld xmlns:a="http://schemas.openxmlformats.org/drawingml/2006/main" xmlns:r="http://schemas.openxmlformats.org/officeDocument/2006/relationships" xmlns:p="http://schemas.openxmlformats.org/presentationml/2006/main">
+  <p:cSld>
+    <p:bg>
+      <p:bgPr>
+        <a:solidFill>
+          <a:srgbClr val="5C5C5C"/>
+        </a:solidFill>
+        <a:effectLst/>
+      </p:bgPr>
+    </p:bg>
+    <p:spTree>
+      <p:nvGrpSpPr>
+        <p:cNvPr id="1" name=""/>
+        <p:cNvGrpSpPr/>
+        <p:nvPr/>
+      </p:nvGrpSpPr>
+      <p:grpSpPr>
+        <a:xfrm>
+          <a:off x="0" y="0"/>
+          <a:ext cx="0" cy="0"/>
+          <a:chOff x="0" y="0"/>
+          <a:chExt cx="0" cy="0"/>
+        </a:xfrm>
+      </p:grpSpPr>
+      <p:pic>
+        <p:nvPicPr>
+          <p:cNvPr id="4" name="Picture 3">
+            <a:extLst>
+              <a:ext uri="{FF2B5EF4-FFF2-40B4-BE49-F238E27FC236}">
+                <a16:creationId xmlns:a16="http://schemas.microsoft.com/office/drawing/2014/main" id="{AC877C18-2AC4-AD3E-88E1-3B24759CC822}"/>
+              </a:ext>
+            </a:extLst>
+          </p:cNvPr>
+          <p:cNvPicPr>
+            <a:picLocks noChangeAspect="1"/>
+          </p:cNvPicPr>
+          <p:nvPr/>
+        </p:nvPicPr>
+        <p:blipFill>
+          <a:blip r:embed="rId2"/>
+          <a:stretch>
+            <a:fillRect/>
+          </a:stretch>
+        </p:blipFill>
+        <p:spPr>
+          <a:xfrm>
+            <a:off x="3501517" y="1449000"/>
+            <a:ext cx="5188966" cy="3960000"/>
+          </a:xfrm>
+          <a:prstGeom prst="rect">
+            <a:avLst/>
+          </a:prstGeom>
+        </p:spPr>
+      </p:pic>
+    </p:spTree>
+    <p:extLst>
+      <p:ext uri="{BB962C8B-B14F-4D97-AF65-F5344CB8AC3E}">
+        <p14:creationId xmlns:p14="http://schemas.microsoft.com/office/powerpoint/2010/main" val="1944642154"/>
       </p:ext>
     </p:extLst>
   </p:cSld>
@@ -3834,74 +3810,6 @@
           <p:cNvPr id="4" name="Picture 3">
             <a:extLst>
               <a:ext uri="{FF2B5EF4-FFF2-40B4-BE49-F238E27FC236}">
-                <a16:creationId xmlns:a16="http://schemas.microsoft.com/office/drawing/2014/main" id="{AC877C18-2AC4-AD3E-88E1-3B24759CC822}"/>
-              </a:ext>
-            </a:extLst>
-          </p:cNvPr>
-          <p:cNvPicPr>
-            <a:picLocks noChangeAspect="1"/>
-          </p:cNvPicPr>
-          <p:nvPr/>
-        </p:nvPicPr>
-        <p:blipFill>
-          <a:blip r:embed="rId2"/>
-          <a:stretch>
-            <a:fillRect/>
-          </a:stretch>
-        </p:blipFill>
-        <p:spPr>
-          <a:xfrm>
-            <a:off x="3501517" y="1449000"/>
-            <a:ext cx="5188966" cy="3960000"/>
-          </a:xfrm>
-          <a:prstGeom prst="rect">
-            <a:avLst/>
-          </a:prstGeom>
-        </p:spPr>
-      </p:pic>
-    </p:spTree>
-    <p:extLst>
-      <p:ext uri="{BB962C8B-B14F-4D97-AF65-F5344CB8AC3E}">
-        <p14:creationId xmlns:p14="http://schemas.microsoft.com/office/powerpoint/2010/main" val="1944642154"/>
-      </p:ext>
-    </p:extLst>
-  </p:cSld>
-  <p:clrMapOvr>
-    <a:masterClrMapping/>
-  </p:clrMapOvr>
-</p:sld>
-</file>
-
-<file path=ppt/slides/slide15.xml><?xml version="1.0" encoding="utf-8"?>
-<p:sld xmlns:a="http://schemas.openxmlformats.org/drawingml/2006/main" xmlns:r="http://schemas.openxmlformats.org/officeDocument/2006/relationships" xmlns:p="http://schemas.openxmlformats.org/presentationml/2006/main">
-  <p:cSld>
-    <p:bg>
-      <p:bgPr>
-        <a:solidFill>
-          <a:srgbClr val="5C5C5C"/>
-        </a:solidFill>
-        <a:effectLst/>
-      </p:bgPr>
-    </p:bg>
-    <p:spTree>
-      <p:nvGrpSpPr>
-        <p:cNvPr id="1" name=""/>
-        <p:cNvGrpSpPr/>
-        <p:nvPr/>
-      </p:nvGrpSpPr>
-      <p:grpSpPr>
-        <a:xfrm>
-          <a:off x="0" y="0"/>
-          <a:ext cx="0" cy="0"/>
-          <a:chOff x="0" y="0"/>
-          <a:chExt cx="0" cy="0"/>
-        </a:xfrm>
-      </p:grpSpPr>
-      <p:pic>
-        <p:nvPicPr>
-          <p:cNvPr id="4" name="Picture 3">
-            <a:extLst>
-              <a:ext uri="{FF2B5EF4-FFF2-40B4-BE49-F238E27FC236}">
                 <a16:creationId xmlns:a16="http://schemas.microsoft.com/office/drawing/2014/main" id="{BF22FE1A-67F2-9A08-251F-880432C4BF90}"/>
               </a:ext>
             </a:extLst>
@@ -3957,7 +3865,7 @@
 </p:sld>
 </file>
 
-<file path=ppt/slides/slide16.xml><?xml version="1.0" encoding="utf-8"?>
+<file path=ppt/slides/slide15.xml><?xml version="1.0" encoding="utf-8"?>
 <p:sld xmlns:a="http://schemas.openxmlformats.org/drawingml/2006/main" xmlns:r="http://schemas.openxmlformats.org/officeDocument/2006/relationships" xmlns:p="http://schemas.openxmlformats.org/presentationml/2006/main">
   <p:cSld>
     <p:bg>
@@ -4040,6 +3948,91 @@
     <p:extLst>
       <p:ext uri="{BB962C8B-B14F-4D97-AF65-F5344CB8AC3E}">
         <p14:creationId xmlns:p14="http://schemas.microsoft.com/office/powerpoint/2010/main" val="2637108069"/>
+      </p:ext>
+    </p:extLst>
+  </p:cSld>
+  <p:clrMapOvr>
+    <a:masterClrMapping/>
+  </p:clrMapOvr>
+</p:sld>
+</file>
+
+<file path=ppt/slides/slide16.xml><?xml version="1.0" encoding="utf-8"?>
+<p:sld xmlns:a="http://schemas.openxmlformats.org/drawingml/2006/main" xmlns:r="http://schemas.openxmlformats.org/officeDocument/2006/relationships" xmlns:p="http://schemas.openxmlformats.org/presentationml/2006/main">
+  <p:cSld>
+    <p:bg>
+      <p:bgPr>
+        <a:solidFill>
+          <a:srgbClr val="5C5C5C"/>
+        </a:solidFill>
+        <a:effectLst/>
+      </p:bgPr>
+    </p:bg>
+    <p:spTree>
+      <p:nvGrpSpPr>
+        <p:cNvPr id="1" name=""/>
+        <p:cNvGrpSpPr/>
+        <p:nvPr/>
+      </p:nvGrpSpPr>
+      <p:grpSpPr>
+        <a:xfrm>
+          <a:off x="0" y="0"/>
+          <a:ext cx="0" cy="0"/>
+          <a:chOff x="0" y="0"/>
+          <a:chExt cx="0" cy="0"/>
+        </a:xfrm>
+      </p:grpSpPr>
+      <p:pic>
+        <p:nvPicPr>
+          <p:cNvPr id="4" name="Picture 3">
+            <a:extLst>
+              <a:ext uri="{FF2B5EF4-FFF2-40B4-BE49-F238E27FC236}">
+                <a16:creationId xmlns:a16="http://schemas.microsoft.com/office/drawing/2014/main" id="{35AC8A44-F8E5-4253-30EE-6B1C3EA472C7}"/>
+              </a:ext>
+            </a:extLst>
+          </p:cNvPr>
+          <p:cNvPicPr>
+            <a:picLocks noChangeAspect="1"/>
+          </p:cNvPicPr>
+          <p:nvPr/>
+        </p:nvPicPr>
+        <p:blipFill>
+          <a:blip r:embed="rId2">
+            <a:extLst>
+              <a:ext uri="{BEBA8EAE-BF5A-486C-A8C5-ECC9F3942E4B}">
+                <a14:imgProps xmlns:a14="http://schemas.microsoft.com/office/drawing/2010/main">
+                  <a14:imgLayer r:embed="rId3">
+                    <a14:imgEffect>
+                      <a14:backgroundRemoval t="3233" b="98922" l="9704" r="89803">
+                        <a14:foregroundMark x1="44243" y1="18750" x2="44243" y2="18750"/>
+                        <a14:foregroundMark x1="50329" y1="3233" x2="50329" y2="3233"/>
+                        <a14:foregroundMark x1="49507" y1="95474" x2="49507" y2="95474"/>
+                        <a14:foregroundMark x1="49013" y1="98922" x2="49013" y2="98922"/>
+                      </a14:backgroundRemoval>
+                    </a14:imgEffect>
+                  </a14:imgLayer>
+                </a14:imgProps>
+              </a:ext>
+            </a:extLst>
+          </a:blip>
+          <a:stretch>
+            <a:fillRect/>
+          </a:stretch>
+        </p:blipFill>
+        <p:spPr>
+          <a:xfrm>
+            <a:off x="3501517" y="1449000"/>
+            <a:ext cx="5188966" cy="3960000"/>
+          </a:xfrm>
+          <a:prstGeom prst="rect">
+            <a:avLst/>
+          </a:prstGeom>
+        </p:spPr>
+      </p:pic>
+    </p:spTree>
+    <p:extLst>
+      <p:ext uri="{BB962C8B-B14F-4D97-AF65-F5344CB8AC3E}">
+        <p14:creationId xmlns:p14="http://schemas.microsoft.com/office/powerpoint/2010/main" val="139787960"/>
       </p:ext>
     </p:extLst>
   </p:cSld>
@@ -4076,91 +4069,6 @@
       </p:grpSpPr>
       <p:pic>
         <p:nvPicPr>
-          <p:cNvPr id="4" name="Picture 3">
-            <a:extLst>
-              <a:ext uri="{FF2B5EF4-FFF2-40B4-BE49-F238E27FC236}">
-                <a16:creationId xmlns:a16="http://schemas.microsoft.com/office/drawing/2014/main" id="{35AC8A44-F8E5-4253-30EE-6B1C3EA472C7}"/>
-              </a:ext>
-            </a:extLst>
-          </p:cNvPr>
-          <p:cNvPicPr>
-            <a:picLocks noChangeAspect="1"/>
-          </p:cNvPicPr>
-          <p:nvPr/>
-        </p:nvPicPr>
-        <p:blipFill>
-          <a:blip r:embed="rId2">
-            <a:extLst>
-              <a:ext uri="{BEBA8EAE-BF5A-486C-A8C5-ECC9F3942E4B}">
-                <a14:imgProps xmlns:a14="http://schemas.microsoft.com/office/drawing/2010/main">
-                  <a14:imgLayer r:embed="rId3">
-                    <a14:imgEffect>
-                      <a14:backgroundRemoval t="3233" b="98922" l="9704" r="89803">
-                        <a14:foregroundMark x1="44243" y1="18750" x2="44243" y2="18750"/>
-                        <a14:foregroundMark x1="50329" y1="3233" x2="50329" y2="3233"/>
-                        <a14:foregroundMark x1="49507" y1="95474" x2="49507" y2="95474"/>
-                        <a14:foregroundMark x1="49013" y1="98922" x2="49013" y2="98922"/>
-                      </a14:backgroundRemoval>
-                    </a14:imgEffect>
-                  </a14:imgLayer>
-                </a14:imgProps>
-              </a:ext>
-            </a:extLst>
-          </a:blip>
-          <a:stretch>
-            <a:fillRect/>
-          </a:stretch>
-        </p:blipFill>
-        <p:spPr>
-          <a:xfrm>
-            <a:off x="3501517" y="1449000"/>
-            <a:ext cx="5188966" cy="3960000"/>
-          </a:xfrm>
-          <a:prstGeom prst="rect">
-            <a:avLst/>
-          </a:prstGeom>
-        </p:spPr>
-      </p:pic>
-    </p:spTree>
-    <p:extLst>
-      <p:ext uri="{BB962C8B-B14F-4D97-AF65-F5344CB8AC3E}">
-        <p14:creationId xmlns:p14="http://schemas.microsoft.com/office/powerpoint/2010/main" val="139787960"/>
-      </p:ext>
-    </p:extLst>
-  </p:cSld>
-  <p:clrMapOvr>
-    <a:masterClrMapping/>
-  </p:clrMapOvr>
-</p:sld>
-</file>
-
-<file path=ppt/slides/slide18.xml><?xml version="1.0" encoding="utf-8"?>
-<p:sld xmlns:a="http://schemas.openxmlformats.org/drawingml/2006/main" xmlns:r="http://schemas.openxmlformats.org/officeDocument/2006/relationships" xmlns:p="http://schemas.openxmlformats.org/presentationml/2006/main">
-  <p:cSld>
-    <p:bg>
-      <p:bgPr>
-        <a:solidFill>
-          <a:srgbClr val="5C5C5C"/>
-        </a:solidFill>
-        <a:effectLst/>
-      </p:bgPr>
-    </p:bg>
-    <p:spTree>
-      <p:nvGrpSpPr>
-        <p:cNvPr id="1" name=""/>
-        <p:cNvGrpSpPr/>
-        <p:nvPr/>
-      </p:nvGrpSpPr>
-      <p:grpSpPr>
-        <a:xfrm>
-          <a:off x="0" y="0"/>
-          <a:ext cx="0" cy="0"/>
-          <a:chOff x="0" y="0"/>
-          <a:chExt cx="0" cy="0"/>
-        </a:xfrm>
-      </p:grpSpPr>
-      <p:pic>
-        <p:nvPicPr>
           <p:cNvPr id="6" name="Picture 5">
             <a:extLst>
               <a:ext uri="{FF2B5EF4-FFF2-40B4-BE49-F238E27FC236}">
@@ -4219,7 +4127,7 @@
 </p:sld>
 </file>
 
-<file path=ppt/slides/slide19.xml><?xml version="1.0" encoding="utf-8"?>
+<file path=ppt/slides/slide18.xml><?xml version="1.0" encoding="utf-8"?>
 <p:sld xmlns:a="http://schemas.openxmlformats.org/drawingml/2006/main" xmlns:r="http://schemas.openxmlformats.org/officeDocument/2006/relationships" xmlns:p="http://schemas.openxmlformats.org/presentationml/2006/main">
   <p:cSld>
     <p:bg>
@@ -4310,74 +4218,7 @@
 </p:sld>
 </file>
 
-<file path=ppt/slides/slide2.xml><?xml version="1.0" encoding="utf-8"?>
-<p:sld xmlns:a="http://schemas.openxmlformats.org/drawingml/2006/main" xmlns:r="http://schemas.openxmlformats.org/officeDocument/2006/relationships" xmlns:p="http://schemas.openxmlformats.org/presentationml/2006/main">
-  <p:cSld>
-    <p:spTree>
-      <p:nvGrpSpPr>
-        <p:cNvPr id="1" name=""/>
-        <p:cNvGrpSpPr/>
-        <p:nvPr/>
-      </p:nvGrpSpPr>
-      <p:grpSpPr>
-        <a:xfrm>
-          <a:off x="0" y="0"/>
-          <a:ext cx="0" cy="0"/>
-          <a:chOff x="0" y="0"/>
-          <a:chExt cx="0" cy="0"/>
-        </a:xfrm>
-      </p:grpSpPr>
-      <p:sp>
-        <p:nvSpPr>
-          <p:cNvPr id="2" name="Title 1">
-            <a:extLst>
-              <a:ext uri="{FF2B5EF4-FFF2-40B4-BE49-F238E27FC236}">
-                <a16:creationId xmlns:a16="http://schemas.microsoft.com/office/drawing/2014/main" id="{0A1FA53E-25A0-0960-0FCC-4CC105416AC1}"/>
-              </a:ext>
-            </a:extLst>
-          </p:cNvPr>
-          <p:cNvSpPr>
-            <a:spLocks noGrp="1"/>
-          </p:cNvSpPr>
-          <p:nvPr>
-            <p:ph type="title"/>
-          </p:nvPr>
-        </p:nvSpPr>
-        <p:spPr>
-          <a:xfrm>
-            <a:off x="410688" y="365125"/>
-            <a:ext cx="10943112" cy="584901"/>
-          </a:xfrm>
-        </p:spPr>
-        <p:txBody>
-          <a:bodyPr>
-            <a:normAutofit/>
-          </a:bodyPr>
-          <a:lstStyle/>
-          <a:p>
-            <a:r>
-              <a:rPr lang="en-CH" sz="2800" b="1" dirty="0">
-                <a:latin typeface="Avenir Book" panose="02000503020000020003" pitchFamily="2" charset="0"/>
-              </a:rPr>
-              <a:t>Practice Task Slides (12 trials)</a:t>
-            </a:r>
-          </a:p>
-        </p:txBody>
-      </p:sp>
-    </p:spTree>
-    <p:extLst>
-      <p:ext uri="{BB962C8B-B14F-4D97-AF65-F5344CB8AC3E}">
-        <p14:creationId xmlns:p14="http://schemas.microsoft.com/office/powerpoint/2010/main" val="2739542140"/>
-      </p:ext>
-    </p:extLst>
-  </p:cSld>
-  <p:clrMapOvr>
-    <a:masterClrMapping/>
-  </p:clrMapOvr>
-</p:sld>
-</file>
-
-<file path=ppt/slides/slide20.xml><?xml version="1.0" encoding="utf-8"?>
+<file path=ppt/slides/slide19.xml><?xml version="1.0" encoding="utf-8"?>
 <p:sld xmlns:a="http://schemas.openxmlformats.org/drawingml/2006/main" xmlns:r="http://schemas.openxmlformats.org/officeDocument/2006/relationships" xmlns:p="http://schemas.openxmlformats.org/presentationml/2006/main">
   <p:cSld>
     <p:bg>
@@ -4468,7 +4309,74 @@
 </p:sld>
 </file>
 
-<file path=ppt/slides/slide21.xml><?xml version="1.0" encoding="utf-8"?>
+<file path=ppt/slides/slide2.xml><?xml version="1.0" encoding="utf-8"?>
+<p:sld xmlns:a="http://schemas.openxmlformats.org/drawingml/2006/main" xmlns:r="http://schemas.openxmlformats.org/officeDocument/2006/relationships" xmlns:p="http://schemas.openxmlformats.org/presentationml/2006/main">
+  <p:cSld>
+    <p:spTree>
+      <p:nvGrpSpPr>
+        <p:cNvPr id="1" name=""/>
+        <p:cNvGrpSpPr/>
+        <p:nvPr/>
+      </p:nvGrpSpPr>
+      <p:grpSpPr>
+        <a:xfrm>
+          <a:off x="0" y="0"/>
+          <a:ext cx="0" cy="0"/>
+          <a:chOff x="0" y="0"/>
+          <a:chExt cx="0" cy="0"/>
+        </a:xfrm>
+      </p:grpSpPr>
+      <p:sp>
+        <p:nvSpPr>
+          <p:cNvPr id="2" name="Title 1">
+            <a:extLst>
+              <a:ext uri="{FF2B5EF4-FFF2-40B4-BE49-F238E27FC236}">
+                <a16:creationId xmlns:a16="http://schemas.microsoft.com/office/drawing/2014/main" id="{0A1FA53E-25A0-0960-0FCC-4CC105416AC1}"/>
+              </a:ext>
+            </a:extLst>
+          </p:cNvPr>
+          <p:cNvSpPr>
+            <a:spLocks noGrp="1"/>
+          </p:cNvSpPr>
+          <p:nvPr>
+            <p:ph type="title"/>
+          </p:nvPr>
+        </p:nvSpPr>
+        <p:spPr>
+          <a:xfrm>
+            <a:off x="410688" y="365125"/>
+            <a:ext cx="10943112" cy="584901"/>
+          </a:xfrm>
+        </p:spPr>
+        <p:txBody>
+          <a:bodyPr>
+            <a:normAutofit/>
+          </a:bodyPr>
+          <a:lstStyle/>
+          <a:p>
+            <a:r>
+              <a:rPr lang="en-CH" sz="2800" b="1" dirty="0">
+                <a:latin typeface="Avenir Book" panose="02000503020000020003" pitchFamily="2" charset="0"/>
+              </a:rPr>
+              <a:t>Practice Task Slides (12 trials)</a:t>
+            </a:r>
+          </a:p>
+        </p:txBody>
+      </p:sp>
+    </p:spTree>
+    <p:extLst>
+      <p:ext uri="{BB962C8B-B14F-4D97-AF65-F5344CB8AC3E}">
+        <p14:creationId xmlns:p14="http://schemas.microsoft.com/office/powerpoint/2010/main" val="2739542140"/>
+      </p:ext>
+    </p:extLst>
+  </p:cSld>
+  <p:clrMapOvr>
+    <a:masterClrMapping/>
+  </p:clrMapOvr>
+</p:sld>
+</file>
+
+<file path=ppt/slides/slide20.xml><?xml version="1.0" encoding="utf-8"?>
 <p:sld xmlns:a="http://schemas.openxmlformats.org/drawingml/2006/main" xmlns:r="http://schemas.openxmlformats.org/officeDocument/2006/relationships" xmlns:p="http://schemas.openxmlformats.org/presentationml/2006/main">
   <p:cSld>
     <p:bg>
@@ -4559,7 +4467,7 @@
 </p:sld>
 </file>
 
-<file path=ppt/slides/slide22.xml><?xml version="1.0" encoding="utf-8"?>
+<file path=ppt/slides/slide21.xml><?xml version="1.0" encoding="utf-8"?>
 <p:sld xmlns:a="http://schemas.openxmlformats.org/drawingml/2006/main" xmlns:r="http://schemas.openxmlformats.org/officeDocument/2006/relationships" xmlns:p="http://schemas.openxmlformats.org/presentationml/2006/main">
   <p:cSld>
     <p:bg>
@@ -4650,7 +4558,7 @@
 </p:sld>
 </file>
 
-<file path=ppt/slides/slide23.xml><?xml version="1.0" encoding="utf-8"?>
+<file path=ppt/slides/slide22.xml><?xml version="1.0" encoding="utf-8"?>
 <p:sld xmlns:a="http://schemas.openxmlformats.org/drawingml/2006/main" xmlns:r="http://schemas.openxmlformats.org/officeDocument/2006/relationships" xmlns:p="http://schemas.openxmlformats.org/presentationml/2006/main">
   <p:cSld>
     <p:bg>
@@ -4741,7 +4649,7 @@
 </p:sld>
 </file>
 
-<file path=ppt/slides/slide24.xml><?xml version="1.0" encoding="utf-8"?>
+<file path=ppt/slides/slide23.xml><?xml version="1.0" encoding="utf-8"?>
 <p:sld xmlns:a="http://schemas.openxmlformats.org/drawingml/2006/main" xmlns:r="http://schemas.openxmlformats.org/officeDocument/2006/relationships" xmlns:p="http://schemas.openxmlformats.org/presentationml/2006/main">
   <p:cSld>
     <p:bg>
@@ -4832,7 +4740,7 @@
 </p:sld>
 </file>
 
-<file path=ppt/slides/slide25.xml><?xml version="1.0" encoding="utf-8"?>
+<file path=ppt/slides/slide24.xml><?xml version="1.0" encoding="utf-8"?>
 <p:sld xmlns:a="http://schemas.openxmlformats.org/drawingml/2006/main" xmlns:r="http://schemas.openxmlformats.org/officeDocument/2006/relationships" xmlns:p="http://schemas.openxmlformats.org/presentationml/2006/main">
   <p:cSld>
     <p:bg>
@@ -4923,7 +4831,7 @@
 </p:sld>
 </file>
 
-<file path=ppt/slides/slide26.xml><?xml version="1.0" encoding="utf-8"?>
+<file path=ppt/slides/slide25.xml><?xml version="1.0" encoding="utf-8"?>
 <p:sld xmlns:a="http://schemas.openxmlformats.org/drawingml/2006/main" xmlns:r="http://schemas.openxmlformats.org/officeDocument/2006/relationships" xmlns:p="http://schemas.openxmlformats.org/presentationml/2006/main">
   <p:cSld>
     <p:bg>
@@ -5014,7 +4922,7 @@
 </p:sld>
 </file>
 
-<file path=ppt/slides/slide27.xml><?xml version="1.0" encoding="utf-8"?>
+<file path=ppt/slides/slide26.xml><?xml version="1.0" encoding="utf-8"?>
 <p:sld xmlns:a="http://schemas.openxmlformats.org/drawingml/2006/main" xmlns:r="http://schemas.openxmlformats.org/officeDocument/2006/relationships" xmlns:p="http://schemas.openxmlformats.org/presentationml/2006/main">
   <p:cSld>
     <p:bg>
@@ -5105,7 +5013,7 @@
 </p:sld>
 </file>
 
-<file path=ppt/slides/slide28.xml><?xml version="1.0" encoding="utf-8"?>
+<file path=ppt/slides/slide27.xml><?xml version="1.0" encoding="utf-8"?>
 <p:sld xmlns:a="http://schemas.openxmlformats.org/drawingml/2006/main" xmlns:r="http://schemas.openxmlformats.org/officeDocument/2006/relationships" xmlns:p="http://schemas.openxmlformats.org/presentationml/2006/main">
   <p:cSld>
     <p:bg>
@@ -5196,7 +5104,7 @@
 </p:sld>
 </file>
 
-<file path=ppt/slides/slide29.xml><?xml version="1.0" encoding="utf-8"?>
+<file path=ppt/slides/slide28.xml><?xml version="1.0" encoding="utf-8"?>
 <p:sld xmlns:a="http://schemas.openxmlformats.org/drawingml/2006/main" xmlns:r="http://schemas.openxmlformats.org/officeDocument/2006/relationships" xmlns:p="http://schemas.openxmlformats.org/presentationml/2006/main">
   <p:cSld>
     <p:bg>
@@ -5279,6 +5187,86 @@
     <p:extLst>
       <p:ext uri="{BB962C8B-B14F-4D97-AF65-F5344CB8AC3E}">
         <p14:creationId xmlns:p14="http://schemas.microsoft.com/office/powerpoint/2010/main" val="1274849160"/>
+      </p:ext>
+    </p:extLst>
+  </p:cSld>
+  <p:clrMapOvr>
+    <a:masterClrMapping/>
+  </p:clrMapOvr>
+</p:sld>
+</file>
+
+<file path=ppt/slides/slide29.xml><?xml version="1.0" encoding="utf-8"?>
+<p:sld xmlns:a="http://schemas.openxmlformats.org/drawingml/2006/main" xmlns:r="http://schemas.openxmlformats.org/officeDocument/2006/relationships" xmlns:p="http://schemas.openxmlformats.org/presentationml/2006/main">
+  <p:cSld>
+    <p:bg>
+      <p:bgPr>
+        <a:solidFill>
+          <a:srgbClr val="5C5C5C"/>
+        </a:solidFill>
+        <a:effectLst/>
+      </p:bgPr>
+    </p:bg>
+    <p:spTree>
+      <p:nvGrpSpPr>
+        <p:cNvPr id="1" name=""/>
+        <p:cNvGrpSpPr/>
+        <p:nvPr/>
+      </p:nvGrpSpPr>
+      <p:grpSpPr>
+        <a:xfrm>
+          <a:off x="0" y="0"/>
+          <a:ext cx="0" cy="0"/>
+          <a:chOff x="0" y="0"/>
+          <a:chExt cx="0" cy="0"/>
+        </a:xfrm>
+      </p:grpSpPr>
+      <p:sp>
+        <p:nvSpPr>
+          <p:cNvPr id="5" name="TextBox 4">
+            <a:extLst>
+              <a:ext uri="{FF2B5EF4-FFF2-40B4-BE49-F238E27FC236}">
+                <a16:creationId xmlns:a16="http://schemas.microsoft.com/office/drawing/2014/main" id="{5C3101FE-916F-7AC8-03CF-F8680EC21ADF}"/>
+              </a:ext>
+            </a:extLst>
+          </p:cNvPr>
+          <p:cNvSpPr txBox="1"/>
+          <p:nvPr/>
+        </p:nvSpPr>
+        <p:spPr>
+          <a:xfrm>
+            <a:off x="373856" y="2510165"/>
+            <a:ext cx="11444287" cy="1569660"/>
+          </a:xfrm>
+          <a:prstGeom prst="rect">
+            <a:avLst/>
+          </a:prstGeom>
+          <a:noFill/>
+        </p:spPr>
+        <p:txBody>
+          <a:bodyPr wrap="square" rtlCol="0">
+            <a:spAutoFit/>
+          </a:bodyPr>
+          <a:lstStyle/>
+          <a:p>
+            <a:pPr algn="ctr"/>
+            <a:r>
+              <a:rPr lang="en-CH" sz="9600" dirty="0">
+                <a:solidFill>
+                  <a:schemeClr val="bg1"/>
+                </a:solidFill>
+                <a:latin typeface="Avenir Light" panose="020B0402020203020204" pitchFamily="34" charset="77"/>
+                <a:cs typeface="Arial" panose="020B0604020202020204" pitchFamily="34" charset="0"/>
+              </a:rPr>
+              <a:t>+</a:t>
+            </a:r>
+          </a:p>
+        </p:txBody>
+      </p:sp>
+    </p:spTree>
+    <p:extLst>
+      <p:ext uri="{BB962C8B-B14F-4D97-AF65-F5344CB8AC3E}">
+        <p14:creationId xmlns:p14="http://schemas.microsoft.com/office/powerpoint/2010/main" val="1400167985"/>
       </p:ext>
     </p:extLst>
   </p:cSld>
@@ -5515,7 +5503,7 @@
                 <a:latin typeface="Arial" panose="020B0604020202020204" pitchFamily="34" charset="0"/>
                 <a:cs typeface="Arial" panose="020B0604020202020204" pitchFamily="34" charset="0"/>
               </a:rPr>
-              <a:t>Your goal is to predict accurately, whether a face will smile back at you or not.</a:t>
+              <a:t>Your goal is to predict accurately whether a face will smile back at you or not.</a:t>
             </a:r>
           </a:p>
         </p:txBody>
@@ -5534,6 +5522,73 @@
 </file>
 
 <file path=ppt/slides/slide30.xml><?xml version="1.0" encoding="utf-8"?>
+<p:sld xmlns:a="http://schemas.openxmlformats.org/drawingml/2006/main" xmlns:r="http://schemas.openxmlformats.org/officeDocument/2006/relationships" xmlns:p="http://schemas.openxmlformats.org/presentationml/2006/main">
+  <p:cSld>
+    <p:spTree>
+      <p:nvGrpSpPr>
+        <p:cNvPr id="1" name=""/>
+        <p:cNvGrpSpPr/>
+        <p:nvPr/>
+      </p:nvGrpSpPr>
+      <p:grpSpPr>
+        <a:xfrm>
+          <a:off x="0" y="0"/>
+          <a:ext cx="0" cy="0"/>
+          <a:chOff x="0" y="0"/>
+          <a:chExt cx="0" cy="0"/>
+        </a:xfrm>
+      </p:grpSpPr>
+      <p:sp>
+        <p:nvSpPr>
+          <p:cNvPr id="2" name="Title 1">
+            <a:extLst>
+              <a:ext uri="{FF2B5EF4-FFF2-40B4-BE49-F238E27FC236}">
+                <a16:creationId xmlns:a16="http://schemas.microsoft.com/office/drawing/2014/main" id="{0A1FA53E-25A0-0960-0FCC-4CC105416AC1}"/>
+              </a:ext>
+            </a:extLst>
+          </p:cNvPr>
+          <p:cNvSpPr>
+            <a:spLocks noGrp="1"/>
+          </p:cNvSpPr>
+          <p:nvPr>
+            <p:ph type="title"/>
+          </p:nvPr>
+        </p:nvSpPr>
+        <p:spPr>
+          <a:xfrm>
+            <a:off x="410688" y="365125"/>
+            <a:ext cx="10943112" cy="584901"/>
+          </a:xfrm>
+        </p:spPr>
+        <p:txBody>
+          <a:bodyPr>
+            <a:normAutofit/>
+          </a:bodyPr>
+          <a:lstStyle/>
+          <a:p>
+            <a:r>
+              <a:rPr lang="en-CH" sz="2800" b="1" dirty="0">
+                <a:latin typeface="Avenir Book" panose="02000503020000020003" pitchFamily="2" charset="0"/>
+              </a:rPr>
+              <a:t>Practice Task Slides in scanner (4 trials)</a:t>
+            </a:r>
+          </a:p>
+        </p:txBody>
+      </p:sp>
+    </p:spTree>
+    <p:extLst>
+      <p:ext uri="{BB962C8B-B14F-4D97-AF65-F5344CB8AC3E}">
+        <p14:creationId xmlns:p14="http://schemas.microsoft.com/office/powerpoint/2010/main" val="1730170648"/>
+      </p:ext>
+    </p:extLst>
+  </p:cSld>
+  <p:clrMapOvr>
+    <a:masterClrMapping/>
+  </p:clrMapOvr>
+</p:sld>
+</file>
+
+<file path=ppt/slides/slide31.xml><?xml version="1.0" encoding="utf-8"?>
 <p:sld xmlns:a="http://schemas.openxmlformats.org/drawingml/2006/main" xmlns:r="http://schemas.openxmlformats.org/officeDocument/2006/relationships" xmlns:p="http://schemas.openxmlformats.org/presentationml/2006/main">
   <p:cSld>
     <p:bg>
@@ -5572,13 +5627,16 @@
         </p:nvSpPr>
         <p:spPr>
           <a:xfrm>
-            <a:off x="373856" y="2510165"/>
-            <a:ext cx="11444287" cy="1569660"/>
+            <a:off x="391886" y="130629"/>
+            <a:ext cx="11614067" cy="4216539"/>
           </a:xfrm>
           <a:prstGeom prst="rect">
             <a:avLst/>
           </a:prstGeom>
           <a:noFill/>
+          <a:ln>
+            <a:noFill/>
+          </a:ln>
         </p:spPr>
         <p:txBody>
           <a:bodyPr wrap="square" rtlCol="0">
@@ -5588,14 +5646,127 @@
           <a:p>
             <a:pPr algn="ctr"/>
             <a:r>
-              <a:rPr lang="en-CH" sz="9600" dirty="0">
+              <a:rPr lang="en-CH" sz="2400" dirty="0">
                 <a:solidFill>
                   <a:schemeClr val="bg1"/>
                 </a:solidFill>
-                <a:latin typeface="Avenir Light" panose="020B0402020203020204" pitchFamily="34" charset="77"/>
+                <a:latin typeface="Arial" panose="020B0604020202020204" pitchFamily="34" charset="0"/>
                 <a:cs typeface="Arial" panose="020B0604020202020204" pitchFamily="34" charset="0"/>
               </a:rPr>
-              <a:t>+</a:t>
+              <a:t>Welcome to the </a:t>
+            </a:r>
+            <a:r>
+              <a:rPr lang="en-GB" sz="2400" dirty="0">
+                <a:solidFill>
+                  <a:schemeClr val="bg1"/>
+                </a:solidFill>
+                <a:latin typeface="Arial" panose="020B0604020202020204" pitchFamily="34" charset="0"/>
+                <a:cs typeface="Arial" panose="020B0604020202020204" pitchFamily="34" charset="0"/>
+              </a:rPr>
+              <a:t>s</a:t>
+            </a:r>
+            <a:r>
+              <a:rPr lang="en-CH" sz="2400" dirty="0">
+                <a:solidFill>
+                  <a:schemeClr val="bg1"/>
+                </a:solidFill>
+                <a:latin typeface="Arial" panose="020B0604020202020204" pitchFamily="34" charset="0"/>
+                <a:cs typeface="Arial" panose="020B0604020202020204" pitchFamily="34" charset="0"/>
+              </a:rPr>
+              <a:t>canner practice round of the SAP task.</a:t>
+            </a:r>
+          </a:p>
+          <a:p>
+            <a:endParaRPr lang="en-CH" sz="2400" dirty="0">
+              <a:solidFill>
+                <a:schemeClr val="bg1"/>
+              </a:solidFill>
+              <a:latin typeface="Arial" panose="020B0604020202020204" pitchFamily="34" charset="0"/>
+              <a:cs typeface="Arial" panose="020B0604020202020204" pitchFamily="34" charset="0"/>
+            </a:endParaRPr>
+          </a:p>
+          <a:p>
+            <a:endParaRPr lang="en-CH" sz="2200" dirty="0">
+              <a:solidFill>
+                <a:schemeClr val="bg1"/>
+              </a:solidFill>
+              <a:latin typeface="Arial" panose="020B0604020202020204" pitchFamily="34" charset="0"/>
+              <a:cs typeface="Arial" panose="020B0604020202020204" pitchFamily="34" charset="0"/>
+            </a:endParaRPr>
+          </a:p>
+          <a:p>
+            <a:r>
+              <a:rPr lang="en-CH" sz="2200" dirty="0">
+                <a:solidFill>
+                  <a:schemeClr val="bg1"/>
+                </a:solidFill>
+                <a:latin typeface="Arial" panose="020B0604020202020204" pitchFamily="34" charset="0"/>
+                <a:cs typeface="Arial" panose="020B0604020202020204" pitchFamily="34" charset="0"/>
+              </a:rPr>
+              <a:t>You are now getting a chance to practice the task in the scanner with the button box.</a:t>
+            </a:r>
+          </a:p>
+          <a:p>
+            <a:endParaRPr lang="en-CH" sz="2200" dirty="0">
+              <a:solidFill>
+                <a:schemeClr val="bg1"/>
+              </a:solidFill>
+              <a:latin typeface="Arial" panose="020B0604020202020204" pitchFamily="34" charset="0"/>
+              <a:cs typeface="Arial" panose="020B0604020202020204" pitchFamily="34" charset="0"/>
+            </a:endParaRPr>
+          </a:p>
+          <a:p>
+            <a:r>
+              <a:rPr lang="en-CH" sz="2200" dirty="0">
+                <a:solidFill>
+                  <a:schemeClr val="bg1"/>
+                </a:solidFill>
+                <a:latin typeface="Arial" panose="020B0604020202020204" pitchFamily="34" charset="0"/>
+                <a:cs typeface="Arial" panose="020B0604020202020204" pitchFamily="34" charset="0"/>
+              </a:rPr>
+              <a:t>This is just so that you can get used to the setup with the button box and you laying down. You will see two faces here again. They will not be the same faces that you will interact with in the task later.</a:t>
+            </a:r>
+          </a:p>
+          <a:p>
+            <a:endParaRPr lang="en-CH" sz="2200" dirty="0">
+              <a:solidFill>
+                <a:schemeClr val="bg1"/>
+              </a:solidFill>
+              <a:latin typeface="Arial" panose="020B0604020202020204" pitchFamily="34" charset="0"/>
+              <a:cs typeface="Arial" panose="020B0604020202020204" pitchFamily="34" charset="0"/>
+            </a:endParaRPr>
+          </a:p>
+          <a:p>
+            <a:r>
+              <a:rPr lang="en-CH" sz="2200" dirty="0">
+                <a:solidFill>
+                  <a:schemeClr val="bg1"/>
+                </a:solidFill>
+                <a:latin typeface="Arial" panose="020B0604020202020204" pitchFamily="34" charset="0"/>
+                <a:cs typeface="Arial" panose="020B0604020202020204" pitchFamily="34" charset="0"/>
+              </a:rPr>
+              <a:t>This practice will only involve 4 rounds.</a:t>
+            </a:r>
+          </a:p>
+          <a:p>
+            <a:endParaRPr lang="en-CH" sz="2200" dirty="0">
+              <a:solidFill>
+                <a:schemeClr val="bg1"/>
+              </a:solidFill>
+              <a:latin typeface="Arial" panose="020B0604020202020204" pitchFamily="34" charset="0"/>
+              <a:cs typeface="Arial" panose="020B0604020202020204" pitchFamily="34" charset="0"/>
+            </a:endParaRPr>
+          </a:p>
+          <a:p>
+            <a:r>
+              <a:rPr lang="en-CH" sz="2200" dirty="0">
+                <a:solidFill>
+                  <a:schemeClr val="bg1"/>
+                </a:solidFill>
+                <a:latin typeface="Arial" panose="020B0604020202020204" pitchFamily="34" charset="0"/>
+                <a:cs typeface="Arial" panose="020B0604020202020204" pitchFamily="34" charset="0"/>
+              </a:rPr>
+              <a:t>If you have any questions, you can ask anytime during this short practice.</a:t>
             </a:r>
           </a:p>
         </p:txBody>
@@ -5603,7 +5774,7 @@
     </p:spTree>
     <p:extLst>
       <p:ext uri="{BB962C8B-B14F-4D97-AF65-F5344CB8AC3E}">
-        <p14:creationId xmlns:p14="http://schemas.microsoft.com/office/powerpoint/2010/main" val="1400167985"/>
+        <p14:creationId xmlns:p14="http://schemas.microsoft.com/office/powerpoint/2010/main" val="1894031005"/>
       </p:ext>
     </p:extLst>
   </p:cSld>
@@ -5613,7 +5784,7 @@
 </p:sld>
 </file>
 
-<file path=ppt/slides/slide31.xml><?xml version="1.0" encoding="utf-8"?>
+<file path=ppt/slides/slide32.xml><?xml version="1.0" encoding="utf-8"?>
 <p:sld xmlns:a="http://schemas.openxmlformats.org/drawingml/2006/main" xmlns:r="http://schemas.openxmlformats.org/officeDocument/2006/relationships" xmlns:p="http://schemas.openxmlformats.org/presentationml/2006/main">
   <p:cSld>
     <p:spTree>
@@ -5662,7 +5833,7 @@
               <a:rPr lang="en-CH" sz="2800" b="1" dirty="0">
                 <a:latin typeface="Avenir Book" panose="02000503020000020003" pitchFamily="2" charset="0"/>
               </a:rPr>
-              <a:t>Practice Task Slides in scanner (4 trials)</a:t>
+              <a:t>Main Task Slides</a:t>
             </a:r>
           </a:p>
         </p:txBody>
@@ -5670,7 +5841,7 @@
     </p:spTree>
     <p:extLst>
       <p:ext uri="{BB962C8B-B14F-4D97-AF65-F5344CB8AC3E}">
-        <p14:creationId xmlns:p14="http://schemas.microsoft.com/office/powerpoint/2010/main" val="1730170648"/>
+        <p14:creationId xmlns:p14="http://schemas.microsoft.com/office/powerpoint/2010/main" val="4119700243"/>
       </p:ext>
     </p:extLst>
   </p:cSld>
@@ -5680,7 +5851,7 @@
 </p:sld>
 </file>
 
-<file path=ppt/slides/slide32.xml><?xml version="1.0" encoding="utf-8"?>
+<file path=ppt/slides/slide33.xml><?xml version="1.0" encoding="utf-8"?>
 <p:sld xmlns:a="http://schemas.openxmlformats.org/drawingml/2006/main" xmlns:r="http://schemas.openxmlformats.org/officeDocument/2006/relationships" xmlns:p="http://schemas.openxmlformats.org/presentationml/2006/main">
   <p:cSld>
     <p:bg>
@@ -5720,7 +5891,7 @@
         <p:spPr>
           <a:xfrm>
             <a:off x="391886" y="130629"/>
-            <a:ext cx="11614067" cy="4216539"/>
+            <a:ext cx="11614067" cy="4524315"/>
           </a:xfrm>
           <a:prstGeom prst="rect">
             <a:avLst/>
@@ -5745,37 +5916,8 @@
                 <a:latin typeface="Arial" panose="020B0604020202020204" pitchFamily="34" charset="0"/>
                 <a:cs typeface="Arial" panose="020B0604020202020204" pitchFamily="34" charset="0"/>
               </a:rPr>
-              <a:t>Welcome to the </a:t>
-            </a:r>
-            <a:r>
-              <a:rPr lang="en-GB" sz="2400" dirty="0">
-                <a:solidFill>
-                  <a:schemeClr val="bg1"/>
-                </a:solidFill>
-                <a:latin typeface="Arial" panose="020B0604020202020204" pitchFamily="34" charset="0"/>
-                <a:cs typeface="Arial" panose="020B0604020202020204" pitchFamily="34" charset="0"/>
-              </a:rPr>
-              <a:t>s</a:t>
-            </a:r>
-            <a:r>
-              <a:rPr lang="en-CH" sz="2400" dirty="0">
-                <a:solidFill>
-                  <a:schemeClr val="bg1"/>
-                </a:solidFill>
-                <a:latin typeface="Arial" panose="020B0604020202020204" pitchFamily="34" charset="0"/>
-                <a:cs typeface="Arial" panose="020B0604020202020204" pitchFamily="34" charset="0"/>
-              </a:rPr>
-              <a:t>canner practice round of the SAP task.</a:t>
-            </a:r>
-          </a:p>
-          <a:p>
-            <a:endParaRPr lang="en-CH" sz="2400" dirty="0">
-              <a:solidFill>
-                <a:schemeClr val="bg1"/>
-              </a:solidFill>
-              <a:latin typeface="Arial" panose="020B0604020202020204" pitchFamily="34" charset="0"/>
-              <a:cs typeface="Arial" panose="020B0604020202020204" pitchFamily="34" charset="0"/>
-            </a:endParaRPr>
+              <a:t>Welcome to the SAP task.</a:t>
+            </a:r>
           </a:p>
           <a:p>
             <a:endParaRPr lang="en-CH" sz="2200" dirty="0">
@@ -5795,7 +5937,7 @@
                 <a:latin typeface="Arial" panose="020B0604020202020204" pitchFamily="34" charset="0"/>
                 <a:cs typeface="Arial" panose="020B0604020202020204" pitchFamily="34" charset="0"/>
               </a:rPr>
-              <a:t>You are now getting a chance to practice the task in the scanner with the button box.</a:t>
+              <a:t>This is the SAP task that you have practiced already.</a:t>
             </a:r>
           </a:p>
           <a:p>
@@ -5816,10 +5958,14 @@
                 <a:latin typeface="Arial" panose="020B0604020202020204" pitchFamily="34" charset="0"/>
                 <a:cs typeface="Arial" panose="020B0604020202020204" pitchFamily="34" charset="0"/>
               </a:rPr>
-              <a:t>This is just so that you can get used to the setup with the button box and you laying down. You will see two faces here again. They will not be the same faces that you will interact with in the task later.</a:t>
-            </a:r>
-          </a:p>
-          <a:p>
+              <a:t>During the task you cannot ask any questions. So if you have questions, please ask now.</a:t>
+            </a:r>
+          </a:p>
+          <a:p>
+            <a:pPr marL="342900" indent="-342900">
+              <a:buFont typeface="Arial" panose="020B0604020202020204" pitchFamily="34" charset="0"/>
+              <a:buChar char="•"/>
+            </a:pPr>
             <a:endParaRPr lang="en-CH" sz="2200" dirty="0">
               <a:solidFill>
                 <a:schemeClr val="bg1"/>
@@ -5837,7 +5983,50 @@
                 <a:latin typeface="Arial" panose="020B0604020202020204" pitchFamily="34" charset="0"/>
                 <a:cs typeface="Arial" panose="020B0604020202020204" pitchFamily="34" charset="0"/>
               </a:rPr>
-              <a:t>This practice will only involve 4 rounds.</a:t>
+              <a:t>Because we are recording brain and physiological activity, please move as little as possible. If you move too much (yawning, clenching your fists or yaw, wiggling your toes) the data cannot be used. So if you are uncomfortable, please let us know at this point. </a:t>
+            </a:r>
+          </a:p>
+          <a:p>
+            <a:r>
+              <a:rPr lang="en-CH" sz="2200" dirty="0">
+                <a:solidFill>
+                  <a:schemeClr val="bg1"/>
+                </a:solidFill>
+                <a:latin typeface="Arial" panose="020B0604020202020204" pitchFamily="34" charset="0"/>
+                <a:cs typeface="Arial" panose="020B0604020202020204" pitchFamily="34" charset="0"/>
+              </a:rPr>
+              <a:t>The data quality will be best if you are relaxed and still. Try not to tensen up any muscles, also keep your face relaxed when you are </a:t>
+            </a:r>
+            <a:r>
+              <a:rPr lang="en-CH" sz="2200" u="sng" dirty="0">
+                <a:solidFill>
+                  <a:schemeClr val="bg1"/>
+                </a:solidFill>
+                <a:latin typeface="Arial" panose="020B0604020202020204" pitchFamily="34" charset="0"/>
+                <a:cs typeface="Arial" panose="020B0604020202020204" pitchFamily="34" charset="0"/>
+              </a:rPr>
+              <a:t>not</a:t>
+            </a:r>
+            <a:r>
+              <a:rPr lang="en-CH" sz="2200" dirty="0">
+                <a:solidFill>
+                  <a:schemeClr val="bg1"/>
+                </a:solidFill>
+                <a:latin typeface="Arial" panose="020B0604020202020204" pitchFamily="34" charset="0"/>
+                <a:cs typeface="Arial" panose="020B0604020202020204" pitchFamily="34" charset="0"/>
+              </a:rPr>
+              <a:t> asked to smile. </a:t>
+            </a:r>
+            <a:r>
+              <a:rPr lang="en-CH" sz="2200" dirty="0">
+                <a:solidFill>
+                  <a:schemeClr val="bg1"/>
+                </a:solidFill>
+                <a:latin typeface="Arial" panose="020B0604020202020204" pitchFamily="34" charset="0"/>
+                <a:cs typeface="Arial" panose="020B0604020202020204" pitchFamily="34" charset="0"/>
+                <a:sym typeface="Wingdings" pitchFamily="2" charset="2"/>
+              </a:rPr>
+              <a:t></a:t>
             </a:r>
           </a:p>
           <a:p>
@@ -5858,7 +6047,7 @@
                 <a:latin typeface="Arial" panose="020B0604020202020204" pitchFamily="34" charset="0"/>
                 <a:cs typeface="Arial" panose="020B0604020202020204" pitchFamily="34" charset="0"/>
               </a:rPr>
-              <a:t>If you have any questions, you can ask anytime during this short practice.</a:t>
+              <a:t>The task is going to take about 20 minutes. </a:t>
             </a:r>
           </a:p>
         </p:txBody>
@@ -5866,74 +6055,7 @@
     </p:spTree>
     <p:extLst>
       <p:ext uri="{BB962C8B-B14F-4D97-AF65-F5344CB8AC3E}">
-        <p14:creationId xmlns:p14="http://schemas.microsoft.com/office/powerpoint/2010/main" val="1894031005"/>
-      </p:ext>
-    </p:extLst>
-  </p:cSld>
-  <p:clrMapOvr>
-    <a:masterClrMapping/>
-  </p:clrMapOvr>
-</p:sld>
-</file>
-
-<file path=ppt/slides/slide33.xml><?xml version="1.0" encoding="utf-8"?>
-<p:sld xmlns:a="http://schemas.openxmlformats.org/drawingml/2006/main" xmlns:r="http://schemas.openxmlformats.org/officeDocument/2006/relationships" xmlns:p="http://schemas.openxmlformats.org/presentationml/2006/main">
-  <p:cSld>
-    <p:spTree>
-      <p:nvGrpSpPr>
-        <p:cNvPr id="1" name=""/>
-        <p:cNvGrpSpPr/>
-        <p:nvPr/>
-      </p:nvGrpSpPr>
-      <p:grpSpPr>
-        <a:xfrm>
-          <a:off x="0" y="0"/>
-          <a:ext cx="0" cy="0"/>
-          <a:chOff x="0" y="0"/>
-          <a:chExt cx="0" cy="0"/>
-        </a:xfrm>
-      </p:grpSpPr>
-      <p:sp>
-        <p:nvSpPr>
-          <p:cNvPr id="2" name="Title 1">
-            <a:extLst>
-              <a:ext uri="{FF2B5EF4-FFF2-40B4-BE49-F238E27FC236}">
-                <a16:creationId xmlns:a16="http://schemas.microsoft.com/office/drawing/2014/main" id="{0A1FA53E-25A0-0960-0FCC-4CC105416AC1}"/>
-              </a:ext>
-            </a:extLst>
-          </p:cNvPr>
-          <p:cNvSpPr>
-            <a:spLocks noGrp="1"/>
-          </p:cNvSpPr>
-          <p:nvPr>
-            <p:ph type="title"/>
-          </p:nvPr>
-        </p:nvSpPr>
-        <p:spPr>
-          <a:xfrm>
-            <a:off x="410688" y="365125"/>
-            <a:ext cx="10943112" cy="584901"/>
-          </a:xfrm>
-        </p:spPr>
-        <p:txBody>
-          <a:bodyPr>
-            <a:normAutofit/>
-          </a:bodyPr>
-          <a:lstStyle/>
-          <a:p>
-            <a:r>
-              <a:rPr lang="en-CH" sz="2800" b="1" dirty="0">
-                <a:latin typeface="Avenir Book" panose="02000503020000020003" pitchFamily="2" charset="0"/>
-              </a:rPr>
-              <a:t>Main Task Slides</a:t>
-            </a:r>
-          </a:p>
-        </p:txBody>
-      </p:sp>
-    </p:spTree>
-    <p:extLst>
-      <p:ext uri="{BB962C8B-B14F-4D97-AF65-F5344CB8AC3E}">
-        <p14:creationId xmlns:p14="http://schemas.microsoft.com/office/powerpoint/2010/main" val="4119700243"/>
+        <p14:creationId xmlns:p14="http://schemas.microsoft.com/office/powerpoint/2010/main" val="1357929970"/>
       </p:ext>
     </p:extLst>
   </p:cSld>
@@ -5983,7 +6105,7 @@
         <p:spPr>
           <a:xfrm>
             <a:off x="391886" y="130629"/>
-            <a:ext cx="11614067" cy="4524315"/>
+            <a:ext cx="11614067" cy="4124206"/>
           </a:xfrm>
           <a:prstGeom prst="rect">
             <a:avLst/>
@@ -6000,6 +6122,96 @@
           <a:lstStyle/>
           <a:p>
             <a:pPr algn="ctr"/>
+            <a:endParaRPr lang="en-CH" sz="2400" dirty="0">
+              <a:solidFill>
+                <a:schemeClr val="bg1"/>
+              </a:solidFill>
+              <a:latin typeface="Arial" panose="020B0604020202020204" pitchFamily="34" charset="0"/>
+              <a:cs typeface="Arial" panose="020B0604020202020204" pitchFamily="34" charset="0"/>
+            </a:endParaRPr>
+          </a:p>
+          <a:p>
+            <a:pPr algn="ctr"/>
+            <a:endParaRPr lang="en-CH" sz="2400" dirty="0">
+              <a:solidFill>
+                <a:schemeClr val="bg1"/>
+              </a:solidFill>
+              <a:latin typeface="Arial" panose="020B0604020202020204" pitchFamily="34" charset="0"/>
+              <a:cs typeface="Arial" panose="020B0604020202020204" pitchFamily="34" charset="0"/>
+            </a:endParaRPr>
+          </a:p>
+          <a:p>
+            <a:pPr algn="ctr"/>
+            <a:endParaRPr lang="en-CH" sz="2400" dirty="0">
+              <a:solidFill>
+                <a:schemeClr val="bg1"/>
+              </a:solidFill>
+              <a:latin typeface="Arial" panose="020B0604020202020204" pitchFamily="34" charset="0"/>
+              <a:cs typeface="Arial" panose="020B0604020202020204" pitchFamily="34" charset="0"/>
+            </a:endParaRPr>
+          </a:p>
+          <a:p>
+            <a:pPr algn="ctr"/>
+            <a:endParaRPr lang="en-CH" sz="2400" dirty="0">
+              <a:solidFill>
+                <a:schemeClr val="bg1"/>
+              </a:solidFill>
+              <a:latin typeface="Arial" panose="020B0604020202020204" pitchFamily="34" charset="0"/>
+              <a:cs typeface="Arial" panose="020B0604020202020204" pitchFamily="34" charset="0"/>
+            </a:endParaRPr>
+          </a:p>
+          <a:p>
+            <a:pPr algn="ctr"/>
+            <a:endParaRPr lang="en-CH" sz="2400" dirty="0">
+              <a:solidFill>
+                <a:schemeClr val="bg1"/>
+              </a:solidFill>
+              <a:latin typeface="Arial" panose="020B0604020202020204" pitchFamily="34" charset="0"/>
+              <a:cs typeface="Arial" panose="020B0604020202020204" pitchFamily="34" charset="0"/>
+            </a:endParaRPr>
+          </a:p>
+          <a:p>
+            <a:pPr algn="ctr"/>
+            <a:endParaRPr lang="en-CH" sz="2400" dirty="0">
+              <a:solidFill>
+                <a:schemeClr val="bg1"/>
+              </a:solidFill>
+              <a:latin typeface="Arial" panose="020B0604020202020204" pitchFamily="34" charset="0"/>
+              <a:cs typeface="Arial" panose="020B0604020202020204" pitchFamily="34" charset="0"/>
+            </a:endParaRPr>
+          </a:p>
+          <a:p>
+            <a:pPr algn="ctr"/>
+            <a:endParaRPr lang="en-CH" sz="2400" dirty="0">
+              <a:solidFill>
+                <a:schemeClr val="bg1"/>
+              </a:solidFill>
+              <a:latin typeface="Arial" panose="020B0604020202020204" pitchFamily="34" charset="0"/>
+              <a:cs typeface="Arial" panose="020B0604020202020204" pitchFamily="34" charset="0"/>
+            </a:endParaRPr>
+          </a:p>
+          <a:p>
+            <a:pPr algn="ctr"/>
+            <a:endParaRPr lang="en-CH" sz="2400" dirty="0">
+              <a:solidFill>
+                <a:schemeClr val="bg1"/>
+              </a:solidFill>
+              <a:latin typeface="Arial" panose="020B0604020202020204" pitchFamily="34" charset="0"/>
+              <a:cs typeface="Arial" panose="020B0604020202020204" pitchFamily="34" charset="0"/>
+            </a:endParaRPr>
+          </a:p>
+          <a:p>
+            <a:pPr algn="ctr"/>
+            <a:r>
+              <a:rPr lang="en-US" sz="2400" dirty="0">
+                <a:solidFill>
+                  <a:schemeClr val="bg1"/>
+                </a:solidFill>
+                <a:latin typeface="Arial" panose="020B0604020202020204" pitchFamily="34" charset="0"/>
+                <a:cs typeface="Arial" panose="020B0604020202020204" pitchFamily="34" charset="0"/>
+              </a:rPr>
+              <a:t>The </a:t>
+            </a:r>
             <a:r>
               <a:rPr lang="en-CH" sz="2400" dirty="0">
                 <a:solidFill>
@@ -6008,8 +6220,17 @@
                 <a:latin typeface="Arial" panose="020B0604020202020204" pitchFamily="34" charset="0"/>
                 <a:cs typeface="Arial" panose="020B0604020202020204" pitchFamily="34" charset="0"/>
               </a:rPr>
-              <a:t>Welcome to the SAP task.</a:t>
-            </a:r>
+              <a:t>SAP task is starting anytime now...</a:t>
+            </a:r>
+          </a:p>
+          <a:p>
+            <a:endParaRPr lang="en-CH" sz="2400" dirty="0">
+              <a:solidFill>
+                <a:schemeClr val="bg1"/>
+              </a:solidFill>
+              <a:latin typeface="Arial" panose="020B0604020202020204" pitchFamily="34" charset="0"/>
+              <a:cs typeface="Arial" panose="020B0604020202020204" pitchFamily="34" charset="0"/>
+            </a:endParaRPr>
           </a:p>
           <a:p>
             <a:endParaRPr lang="en-CH" sz="2200" dirty="0">
@@ -6020,134 +6241,12 @@
               <a:cs typeface="Arial" panose="020B0604020202020204" pitchFamily="34" charset="0"/>
             </a:endParaRPr>
           </a:p>
-          <a:p>
-            <a:r>
-              <a:rPr lang="en-CH" sz="2200" dirty="0">
-                <a:solidFill>
-                  <a:schemeClr val="bg1"/>
-                </a:solidFill>
-                <a:latin typeface="Arial" panose="020B0604020202020204" pitchFamily="34" charset="0"/>
-                <a:cs typeface="Arial" panose="020B0604020202020204" pitchFamily="34" charset="0"/>
-              </a:rPr>
-              <a:t>This is the SAP task that you have practiced already.</a:t>
-            </a:r>
-          </a:p>
-          <a:p>
-            <a:endParaRPr lang="en-CH" sz="2200" dirty="0">
-              <a:solidFill>
-                <a:schemeClr val="bg1"/>
-              </a:solidFill>
-              <a:latin typeface="Arial" panose="020B0604020202020204" pitchFamily="34" charset="0"/>
-              <a:cs typeface="Arial" panose="020B0604020202020204" pitchFamily="34" charset="0"/>
-            </a:endParaRPr>
-          </a:p>
-          <a:p>
-            <a:r>
-              <a:rPr lang="en-CH" sz="2200" dirty="0">
-                <a:solidFill>
-                  <a:schemeClr val="bg1"/>
-                </a:solidFill>
-                <a:latin typeface="Arial" panose="020B0604020202020204" pitchFamily="34" charset="0"/>
-                <a:cs typeface="Arial" panose="020B0604020202020204" pitchFamily="34" charset="0"/>
-              </a:rPr>
-              <a:t>During the task you cannot ask any questions. So if you have questions, please ask now.</a:t>
-            </a:r>
-          </a:p>
-          <a:p>
-            <a:pPr marL="342900" indent="-342900">
-              <a:buFont typeface="Arial" panose="020B0604020202020204" pitchFamily="34" charset="0"/>
-              <a:buChar char="•"/>
-            </a:pPr>
-            <a:endParaRPr lang="en-CH" sz="2200" dirty="0">
-              <a:solidFill>
-                <a:schemeClr val="bg1"/>
-              </a:solidFill>
-              <a:latin typeface="Arial" panose="020B0604020202020204" pitchFamily="34" charset="0"/>
-              <a:cs typeface="Arial" panose="020B0604020202020204" pitchFamily="34" charset="0"/>
-            </a:endParaRPr>
-          </a:p>
-          <a:p>
-            <a:r>
-              <a:rPr lang="en-CH" sz="2200" dirty="0">
-                <a:solidFill>
-                  <a:schemeClr val="bg1"/>
-                </a:solidFill>
-                <a:latin typeface="Arial" panose="020B0604020202020204" pitchFamily="34" charset="0"/>
-                <a:cs typeface="Arial" panose="020B0604020202020204" pitchFamily="34" charset="0"/>
-              </a:rPr>
-              <a:t>Because we are recording brain and physiological activity, please move as little as possible. If you move too much (yawning, clenching your fists or yaw, wiggling your toes) the data cannot be used. So if you are uncomfortable, please let us know at this point. </a:t>
-            </a:r>
-          </a:p>
-          <a:p>
-            <a:r>
-              <a:rPr lang="en-CH" sz="2200" dirty="0">
-                <a:solidFill>
-                  <a:schemeClr val="bg1"/>
-                </a:solidFill>
-                <a:latin typeface="Arial" panose="020B0604020202020204" pitchFamily="34" charset="0"/>
-                <a:cs typeface="Arial" panose="020B0604020202020204" pitchFamily="34" charset="0"/>
-              </a:rPr>
-              <a:t>The data quality will be best if you are relaxed and still. Try not to tensen up any muscles, also keep your face relaxed when you are </a:t>
-            </a:r>
-            <a:r>
-              <a:rPr lang="en-CH" sz="2200" u="sng" dirty="0">
-                <a:solidFill>
-                  <a:schemeClr val="bg1"/>
-                </a:solidFill>
-                <a:latin typeface="Arial" panose="020B0604020202020204" pitchFamily="34" charset="0"/>
-                <a:cs typeface="Arial" panose="020B0604020202020204" pitchFamily="34" charset="0"/>
-              </a:rPr>
-              <a:t>not</a:t>
-            </a:r>
-            <a:r>
-              <a:rPr lang="en-CH" sz="2200" dirty="0">
-                <a:solidFill>
-                  <a:schemeClr val="bg1"/>
-                </a:solidFill>
-                <a:latin typeface="Arial" panose="020B0604020202020204" pitchFamily="34" charset="0"/>
-                <a:cs typeface="Arial" panose="020B0604020202020204" pitchFamily="34" charset="0"/>
-              </a:rPr>
-              <a:t> asked to smile. </a:t>
-            </a:r>
-            <a:r>
-              <a:rPr lang="en-CH" sz="2200" dirty="0">
-                <a:solidFill>
-                  <a:schemeClr val="bg1"/>
-                </a:solidFill>
-                <a:latin typeface="Arial" panose="020B0604020202020204" pitchFamily="34" charset="0"/>
-                <a:cs typeface="Arial" panose="020B0604020202020204" pitchFamily="34" charset="0"/>
-                <a:sym typeface="Wingdings" pitchFamily="2" charset="2"/>
-              </a:rPr>
-              <a:t></a:t>
-            </a:r>
-          </a:p>
-          <a:p>
-            <a:endParaRPr lang="en-CH" sz="2200" dirty="0">
-              <a:solidFill>
-                <a:schemeClr val="bg1"/>
-              </a:solidFill>
-              <a:latin typeface="Arial" panose="020B0604020202020204" pitchFamily="34" charset="0"/>
-              <a:cs typeface="Arial" panose="020B0604020202020204" pitchFamily="34" charset="0"/>
-            </a:endParaRPr>
-          </a:p>
-          <a:p>
-            <a:r>
-              <a:rPr lang="en-CH" sz="2200" dirty="0">
-                <a:solidFill>
-                  <a:schemeClr val="bg1"/>
-                </a:solidFill>
-                <a:latin typeface="Arial" panose="020B0604020202020204" pitchFamily="34" charset="0"/>
-                <a:cs typeface="Arial" panose="020B0604020202020204" pitchFamily="34" charset="0"/>
-              </a:rPr>
-              <a:t>The task is going to take about 20 minutes. </a:t>
-            </a:r>
-          </a:p>
         </p:txBody>
       </p:sp>
     </p:spTree>
     <p:extLst>
       <p:ext uri="{BB962C8B-B14F-4D97-AF65-F5344CB8AC3E}">
-        <p14:creationId xmlns:p14="http://schemas.microsoft.com/office/powerpoint/2010/main" val="1357929970"/>
+        <p14:creationId xmlns:p14="http://schemas.microsoft.com/office/powerpoint/2010/main" val="265753330"/>
       </p:ext>
     </p:extLst>
   </p:cSld>
@@ -6184,197 +6283,6 @@
       </p:grpSpPr>
       <p:sp>
         <p:nvSpPr>
-          <p:cNvPr id="5" name="TextBox 4">
-            <a:extLst>
-              <a:ext uri="{FF2B5EF4-FFF2-40B4-BE49-F238E27FC236}">
-                <a16:creationId xmlns:a16="http://schemas.microsoft.com/office/drawing/2014/main" id="{5C3101FE-916F-7AC8-03CF-F8680EC21ADF}"/>
-              </a:ext>
-            </a:extLst>
-          </p:cNvPr>
-          <p:cNvSpPr txBox="1"/>
-          <p:nvPr/>
-        </p:nvSpPr>
-        <p:spPr>
-          <a:xfrm>
-            <a:off x="391886" y="130629"/>
-            <a:ext cx="11614067" cy="4124206"/>
-          </a:xfrm>
-          <a:prstGeom prst="rect">
-            <a:avLst/>
-          </a:prstGeom>
-          <a:noFill/>
-          <a:ln>
-            <a:noFill/>
-          </a:ln>
-        </p:spPr>
-        <p:txBody>
-          <a:bodyPr wrap="square" rtlCol="0">
-            <a:spAutoFit/>
-          </a:bodyPr>
-          <a:lstStyle/>
-          <a:p>
-            <a:pPr algn="ctr"/>
-            <a:endParaRPr lang="en-CH" sz="2400" dirty="0">
-              <a:solidFill>
-                <a:schemeClr val="bg1"/>
-              </a:solidFill>
-              <a:latin typeface="Arial" panose="020B0604020202020204" pitchFamily="34" charset="0"/>
-              <a:cs typeface="Arial" panose="020B0604020202020204" pitchFamily="34" charset="0"/>
-            </a:endParaRPr>
-          </a:p>
-          <a:p>
-            <a:pPr algn="ctr"/>
-            <a:endParaRPr lang="en-CH" sz="2400" dirty="0">
-              <a:solidFill>
-                <a:schemeClr val="bg1"/>
-              </a:solidFill>
-              <a:latin typeface="Arial" panose="020B0604020202020204" pitchFamily="34" charset="0"/>
-              <a:cs typeface="Arial" panose="020B0604020202020204" pitchFamily="34" charset="0"/>
-            </a:endParaRPr>
-          </a:p>
-          <a:p>
-            <a:pPr algn="ctr"/>
-            <a:endParaRPr lang="en-CH" sz="2400" dirty="0">
-              <a:solidFill>
-                <a:schemeClr val="bg1"/>
-              </a:solidFill>
-              <a:latin typeface="Arial" panose="020B0604020202020204" pitchFamily="34" charset="0"/>
-              <a:cs typeface="Arial" panose="020B0604020202020204" pitchFamily="34" charset="0"/>
-            </a:endParaRPr>
-          </a:p>
-          <a:p>
-            <a:pPr algn="ctr"/>
-            <a:endParaRPr lang="en-CH" sz="2400" dirty="0">
-              <a:solidFill>
-                <a:schemeClr val="bg1"/>
-              </a:solidFill>
-              <a:latin typeface="Arial" panose="020B0604020202020204" pitchFamily="34" charset="0"/>
-              <a:cs typeface="Arial" panose="020B0604020202020204" pitchFamily="34" charset="0"/>
-            </a:endParaRPr>
-          </a:p>
-          <a:p>
-            <a:pPr algn="ctr"/>
-            <a:endParaRPr lang="en-CH" sz="2400" dirty="0">
-              <a:solidFill>
-                <a:schemeClr val="bg1"/>
-              </a:solidFill>
-              <a:latin typeface="Arial" panose="020B0604020202020204" pitchFamily="34" charset="0"/>
-              <a:cs typeface="Arial" panose="020B0604020202020204" pitchFamily="34" charset="0"/>
-            </a:endParaRPr>
-          </a:p>
-          <a:p>
-            <a:pPr algn="ctr"/>
-            <a:endParaRPr lang="en-CH" sz="2400" dirty="0">
-              <a:solidFill>
-                <a:schemeClr val="bg1"/>
-              </a:solidFill>
-              <a:latin typeface="Arial" panose="020B0604020202020204" pitchFamily="34" charset="0"/>
-              <a:cs typeface="Arial" panose="020B0604020202020204" pitchFamily="34" charset="0"/>
-            </a:endParaRPr>
-          </a:p>
-          <a:p>
-            <a:pPr algn="ctr"/>
-            <a:endParaRPr lang="en-CH" sz="2400" dirty="0">
-              <a:solidFill>
-                <a:schemeClr val="bg1"/>
-              </a:solidFill>
-              <a:latin typeface="Arial" panose="020B0604020202020204" pitchFamily="34" charset="0"/>
-              <a:cs typeface="Arial" panose="020B0604020202020204" pitchFamily="34" charset="0"/>
-            </a:endParaRPr>
-          </a:p>
-          <a:p>
-            <a:pPr algn="ctr"/>
-            <a:endParaRPr lang="en-CH" sz="2400" dirty="0">
-              <a:solidFill>
-                <a:schemeClr val="bg1"/>
-              </a:solidFill>
-              <a:latin typeface="Arial" panose="020B0604020202020204" pitchFamily="34" charset="0"/>
-              <a:cs typeface="Arial" panose="020B0604020202020204" pitchFamily="34" charset="0"/>
-            </a:endParaRPr>
-          </a:p>
-          <a:p>
-            <a:pPr algn="ctr"/>
-            <a:r>
-              <a:rPr lang="en-US" sz="2400" dirty="0">
-                <a:solidFill>
-                  <a:schemeClr val="bg1"/>
-                </a:solidFill>
-                <a:latin typeface="Arial" panose="020B0604020202020204" pitchFamily="34" charset="0"/>
-                <a:cs typeface="Arial" panose="020B0604020202020204" pitchFamily="34" charset="0"/>
-              </a:rPr>
-              <a:t>The </a:t>
-            </a:r>
-            <a:r>
-              <a:rPr lang="en-CH" sz="2400" dirty="0">
-                <a:solidFill>
-                  <a:schemeClr val="bg1"/>
-                </a:solidFill>
-                <a:latin typeface="Arial" panose="020B0604020202020204" pitchFamily="34" charset="0"/>
-                <a:cs typeface="Arial" panose="020B0604020202020204" pitchFamily="34" charset="0"/>
-              </a:rPr>
-              <a:t>SAP task is starting anytime now...</a:t>
-            </a:r>
-          </a:p>
-          <a:p>
-            <a:endParaRPr lang="en-CH" sz="2400" dirty="0">
-              <a:solidFill>
-                <a:schemeClr val="bg1"/>
-              </a:solidFill>
-              <a:latin typeface="Arial" panose="020B0604020202020204" pitchFamily="34" charset="0"/>
-              <a:cs typeface="Arial" panose="020B0604020202020204" pitchFamily="34" charset="0"/>
-            </a:endParaRPr>
-          </a:p>
-          <a:p>
-            <a:endParaRPr lang="en-CH" sz="2200" dirty="0">
-              <a:solidFill>
-                <a:schemeClr val="bg1"/>
-              </a:solidFill>
-              <a:latin typeface="Arial" panose="020B0604020202020204" pitchFamily="34" charset="0"/>
-              <a:cs typeface="Arial" panose="020B0604020202020204" pitchFamily="34" charset="0"/>
-            </a:endParaRPr>
-          </a:p>
-        </p:txBody>
-      </p:sp>
-    </p:spTree>
-    <p:extLst>
-      <p:ext uri="{BB962C8B-B14F-4D97-AF65-F5344CB8AC3E}">
-        <p14:creationId xmlns:p14="http://schemas.microsoft.com/office/powerpoint/2010/main" val="265753330"/>
-      </p:ext>
-    </p:extLst>
-  </p:cSld>
-  <p:clrMapOvr>
-    <a:masterClrMapping/>
-  </p:clrMapOvr>
-</p:sld>
-</file>
-
-<file path=ppt/slides/slide36.xml><?xml version="1.0" encoding="utf-8"?>
-<p:sld xmlns:a="http://schemas.openxmlformats.org/drawingml/2006/main" xmlns:r="http://schemas.openxmlformats.org/officeDocument/2006/relationships" xmlns:p="http://schemas.openxmlformats.org/presentationml/2006/main">
-  <p:cSld>
-    <p:bg>
-      <p:bgPr>
-        <a:solidFill>
-          <a:srgbClr val="5C5C5C"/>
-        </a:solidFill>
-        <a:effectLst/>
-      </p:bgPr>
-    </p:bg>
-    <p:spTree>
-      <p:nvGrpSpPr>
-        <p:cNvPr id="1" name=""/>
-        <p:cNvGrpSpPr/>
-        <p:nvPr/>
-      </p:nvGrpSpPr>
-      <p:grpSpPr>
-        <a:xfrm>
-          <a:off x="0" y="0"/>
-          <a:ext cx="0" cy="0"/>
-          <a:chOff x="0" y="0"/>
-          <a:chExt cx="0" cy="0"/>
-        </a:xfrm>
-      </p:grpSpPr>
-      <p:sp>
-        <p:nvSpPr>
           <p:cNvPr id="6" name="TextBox 5">
             <a:extLst>
               <a:ext uri="{FF2B5EF4-FFF2-40B4-BE49-F238E27FC236}">
@@ -6428,7 +6336,7 @@
 </p:sld>
 </file>
 
-<file path=ppt/slides/slide37.xml><?xml version="1.0" encoding="utf-8"?>
+<file path=ppt/slides/slide36.xml><?xml version="1.0" encoding="utf-8"?>
 <p:sld xmlns:a="http://schemas.openxmlformats.org/drawingml/2006/main" xmlns:r="http://schemas.openxmlformats.org/officeDocument/2006/relationships" xmlns:p="http://schemas.openxmlformats.org/presentationml/2006/main">
   <p:cSld>
     <p:bg>
@@ -6697,188 +6605,6 @@
     </p:bg>
     <p:spTree>
       <p:nvGrpSpPr>
-        <p:cNvPr id="1" name="">
-          <a:extLst>
-            <a:ext uri="{FF2B5EF4-FFF2-40B4-BE49-F238E27FC236}">
-              <a16:creationId xmlns:a16="http://schemas.microsoft.com/office/drawing/2014/main" id="{9235A5C9-F444-3AD2-9093-F8A393277438}"/>
-            </a:ext>
-          </a:extLst>
-        </p:cNvPr>
-        <p:cNvGrpSpPr/>
-        <p:nvPr/>
-      </p:nvGrpSpPr>
-      <p:grpSpPr>
-        <a:xfrm>
-          <a:off x="0" y="0"/>
-          <a:ext cx="0" cy="0"/>
-          <a:chOff x="0" y="0"/>
-          <a:chExt cx="0" cy="0"/>
-        </a:xfrm>
-      </p:grpSpPr>
-      <p:sp>
-        <p:nvSpPr>
-          <p:cNvPr id="5" name="TextBox 4">
-            <a:extLst>
-              <a:ext uri="{FF2B5EF4-FFF2-40B4-BE49-F238E27FC236}">
-                <a16:creationId xmlns:a16="http://schemas.microsoft.com/office/drawing/2014/main" id="{036A15B3-7EE0-EC74-FD42-57F99239A4E8}"/>
-              </a:ext>
-            </a:extLst>
-          </p:cNvPr>
-          <p:cNvSpPr txBox="1"/>
-          <p:nvPr/>
-        </p:nvSpPr>
-        <p:spPr>
-          <a:xfrm>
-            <a:off x="391886" y="130629"/>
-            <a:ext cx="11614067" cy="4555093"/>
-          </a:xfrm>
-          <a:prstGeom prst="rect">
-            <a:avLst/>
-          </a:prstGeom>
-          <a:noFill/>
-          <a:ln>
-            <a:noFill/>
-          </a:ln>
-        </p:spPr>
-        <p:txBody>
-          <a:bodyPr wrap="square" rtlCol="0">
-            <a:spAutoFit/>
-          </a:bodyPr>
-          <a:lstStyle/>
-          <a:p>
-            <a:pPr algn="ctr"/>
-            <a:r>
-              <a:rPr lang="en-CH" sz="2400" dirty="0">
-                <a:solidFill>
-                  <a:schemeClr val="bg1"/>
-                </a:solidFill>
-                <a:latin typeface="Arial" panose="020B0604020202020204" pitchFamily="34" charset="0"/>
-                <a:cs typeface="Arial" panose="020B0604020202020204" pitchFamily="34" charset="0"/>
-              </a:rPr>
-              <a:t>POINTS</a:t>
-            </a:r>
-          </a:p>
-          <a:p>
-            <a:endParaRPr lang="en-CH" sz="2400" dirty="0">
-              <a:solidFill>
-                <a:schemeClr val="bg1"/>
-              </a:solidFill>
-              <a:latin typeface="Arial" panose="020B0604020202020204" pitchFamily="34" charset="0"/>
-              <a:cs typeface="Arial" panose="020B0604020202020204" pitchFamily="34" charset="0"/>
-            </a:endParaRPr>
-          </a:p>
-          <a:p>
-            <a:r>
-              <a:rPr lang="en-CH" sz="2200" dirty="0">
-                <a:solidFill>
-                  <a:schemeClr val="bg1"/>
-                </a:solidFill>
-                <a:latin typeface="Arial" panose="020B0604020202020204" pitchFamily="34" charset="0"/>
-                <a:cs typeface="Arial" panose="020B0604020202020204" pitchFamily="34" charset="0"/>
-              </a:rPr>
-              <a:t>If you predict accurately and smile at faces that smile back and stay neutral with faces that don’t smile back you will make points.</a:t>
-            </a:r>
-          </a:p>
-          <a:p>
-            <a:endParaRPr lang="en-CH" sz="2200" dirty="0">
-              <a:solidFill>
-                <a:schemeClr val="bg1"/>
-              </a:solidFill>
-              <a:latin typeface="Arial" panose="020B0604020202020204" pitchFamily="34" charset="0"/>
-              <a:cs typeface="Arial" panose="020B0604020202020204" pitchFamily="34" charset="0"/>
-            </a:endParaRPr>
-          </a:p>
-          <a:p>
-            <a:r>
-              <a:rPr lang="en-CH" sz="2200" dirty="0">
-                <a:solidFill>
-                  <a:schemeClr val="bg1"/>
-                </a:solidFill>
-                <a:latin typeface="Arial" panose="020B0604020202020204" pitchFamily="34" charset="0"/>
-                <a:cs typeface="Arial" panose="020B0604020202020204" pitchFamily="34" charset="0"/>
-              </a:rPr>
-              <a:t>If you can reach 20 points you will earn an additional 5 AUD on top of the participation reimbursement.</a:t>
-            </a:r>
-          </a:p>
-          <a:p>
-            <a:endParaRPr lang="en-CH" sz="2200" dirty="0">
-              <a:solidFill>
-                <a:schemeClr val="bg1"/>
-              </a:solidFill>
-              <a:latin typeface="Arial" panose="020B0604020202020204" pitchFamily="34" charset="0"/>
-              <a:cs typeface="Arial" panose="020B0604020202020204" pitchFamily="34" charset="0"/>
-            </a:endParaRPr>
-          </a:p>
-          <a:p>
-            <a:r>
-              <a:rPr lang="en-CH" sz="2200" dirty="0">
-                <a:solidFill>
-                  <a:schemeClr val="bg1"/>
-                </a:solidFill>
-                <a:latin typeface="Arial" panose="020B0604020202020204" pitchFamily="34" charset="0"/>
-                <a:cs typeface="Arial" panose="020B0604020202020204" pitchFamily="34" charset="0"/>
-              </a:rPr>
-              <a:t>If you reach 40 points you will earn an additional 5 AUD on top of the participation reimbursement and the 20-point bonus.</a:t>
-            </a:r>
-          </a:p>
-          <a:p>
-            <a:endParaRPr lang="en-CH" sz="2200" dirty="0">
-              <a:solidFill>
-                <a:schemeClr val="bg1"/>
-              </a:solidFill>
-              <a:latin typeface="Arial" panose="020B0604020202020204" pitchFamily="34" charset="0"/>
-              <a:cs typeface="Arial" panose="020B0604020202020204" pitchFamily="34" charset="0"/>
-            </a:endParaRPr>
-          </a:p>
-          <a:p>
-            <a:r>
-              <a:rPr lang="en-CH" sz="2200" dirty="0">
-                <a:solidFill>
-                  <a:schemeClr val="bg1"/>
-                </a:solidFill>
-                <a:latin typeface="Arial" panose="020B0604020202020204" pitchFamily="34" charset="0"/>
-                <a:cs typeface="Arial" panose="020B0604020202020204" pitchFamily="34" charset="0"/>
-              </a:rPr>
-              <a:t>After the task you will learn how many points you collected.</a:t>
-            </a:r>
-          </a:p>
-          <a:p>
-            <a:endParaRPr lang="en-CH" sz="2200" dirty="0">
-              <a:solidFill>
-                <a:schemeClr val="bg1"/>
-              </a:solidFill>
-              <a:latin typeface="Arial" panose="020B0604020202020204" pitchFamily="34" charset="0"/>
-              <a:cs typeface="Arial" panose="020B0604020202020204" pitchFamily="34" charset="0"/>
-            </a:endParaRPr>
-          </a:p>
-        </p:txBody>
-      </p:sp>
-    </p:spTree>
-    <p:extLst>
-      <p:ext uri="{BB962C8B-B14F-4D97-AF65-F5344CB8AC3E}">
-        <p14:creationId xmlns:p14="http://schemas.microsoft.com/office/powerpoint/2010/main" val="694144612"/>
-      </p:ext>
-    </p:extLst>
-  </p:cSld>
-  <p:clrMapOvr>
-    <a:masterClrMapping/>
-  </p:clrMapOvr>
-</p:sld>
-</file>
-
-<file path=ppt/slides/slide6.xml><?xml version="1.0" encoding="utf-8"?>
-<p:sld xmlns:a="http://schemas.openxmlformats.org/drawingml/2006/main" xmlns:r="http://schemas.openxmlformats.org/officeDocument/2006/relationships" xmlns:p="http://schemas.openxmlformats.org/presentationml/2006/main">
-  <p:cSld>
-    <p:bg>
-      <p:bgPr>
-        <a:solidFill>
-          <a:srgbClr val="5C5C5C"/>
-        </a:solidFill>
-        <a:effectLst/>
-      </p:bgPr>
-    </p:bg>
-    <p:spTree>
-      <p:nvGrpSpPr>
         <p:cNvPr id="1" name=""/>
         <p:cNvGrpSpPr/>
         <p:nvPr/>
@@ -6951,7 +6677,7 @@
 </p:sld>
 </file>
 
-<file path=ppt/slides/slide7.xml><?xml version="1.0" encoding="utf-8"?>
+<file path=ppt/slides/slide6.xml><?xml version="1.0" encoding="utf-8"?>
 <p:sld xmlns:a="http://schemas.openxmlformats.org/drawingml/2006/main" xmlns:r="http://schemas.openxmlformats.org/officeDocument/2006/relationships" xmlns:p="http://schemas.openxmlformats.org/presentationml/2006/main">
   <p:cSld>
     <p:bg>
@@ -7035,6 +6761,90 @@
     <p:extLst>
       <p:ext uri="{BB962C8B-B14F-4D97-AF65-F5344CB8AC3E}">
         <p14:creationId xmlns:p14="http://schemas.microsoft.com/office/powerpoint/2010/main" val="1890130128"/>
+      </p:ext>
+    </p:extLst>
+  </p:cSld>
+  <p:clrMapOvr>
+    <a:masterClrMapping/>
+  </p:clrMapOvr>
+</p:sld>
+</file>
+
+<file path=ppt/slides/slide7.xml><?xml version="1.0" encoding="utf-8"?>
+<p:sld xmlns:a="http://schemas.openxmlformats.org/drawingml/2006/main" xmlns:r="http://schemas.openxmlformats.org/officeDocument/2006/relationships" xmlns:p="http://schemas.openxmlformats.org/presentationml/2006/main">
+  <p:cSld>
+    <p:bg>
+      <p:bgPr>
+        <a:solidFill>
+          <a:srgbClr val="5C5C5C"/>
+        </a:solidFill>
+        <a:effectLst/>
+      </p:bgPr>
+    </p:bg>
+    <p:spTree>
+      <p:nvGrpSpPr>
+        <p:cNvPr id="1" name=""/>
+        <p:cNvGrpSpPr/>
+        <p:nvPr/>
+      </p:nvGrpSpPr>
+      <p:grpSpPr>
+        <a:xfrm>
+          <a:off x="0" y="0"/>
+          <a:ext cx="0" cy="0"/>
+          <a:chOff x="0" y="0"/>
+          <a:chExt cx="0" cy="0"/>
+        </a:xfrm>
+      </p:grpSpPr>
+      <p:pic>
+        <p:nvPicPr>
+          <p:cNvPr id="3" name="Picture 2">
+            <a:extLst>
+              <a:ext uri="{FF2B5EF4-FFF2-40B4-BE49-F238E27FC236}">
+                <a16:creationId xmlns:a16="http://schemas.microsoft.com/office/drawing/2014/main" id="{F19FD08C-73E1-7B9E-6DEC-32BF3283A1A4}"/>
+              </a:ext>
+            </a:extLst>
+          </p:cNvPr>
+          <p:cNvPicPr>
+            <a:picLocks noChangeAspect="1"/>
+          </p:cNvPicPr>
+          <p:nvPr/>
+        </p:nvPicPr>
+        <p:blipFill>
+          <a:blip r:embed="rId2">
+            <a:extLst>
+              <a:ext uri="{BEBA8EAE-BF5A-486C-A8C5-ECC9F3942E4B}">
+                <a14:imgProps xmlns:a14="http://schemas.microsoft.com/office/drawing/2010/main">
+                  <a14:imgLayer r:embed="rId3">
+                    <a14:imgEffect>
+                      <a14:backgroundRemoval t="4095" b="95043" l="9704" r="89803">
+                        <a14:foregroundMark x1="44572" y1="13578" x2="44572" y2="13578"/>
+                        <a14:foregroundMark x1="48849" y1="4310" x2="48849" y2="4310"/>
+                        <a14:foregroundMark x1="52632" y1="95043" x2="52632" y2="95043"/>
+                      </a14:backgroundRemoval>
+                    </a14:imgEffect>
+                  </a14:imgLayer>
+                </a14:imgProps>
+              </a:ext>
+            </a:extLst>
+          </a:blip>
+          <a:stretch>
+            <a:fillRect/>
+          </a:stretch>
+        </p:blipFill>
+        <p:spPr>
+          <a:xfrm>
+            <a:off x="3501517" y="1449000"/>
+            <a:ext cx="5188966" cy="3960000"/>
+          </a:xfrm>
+          <a:prstGeom prst="rect">
+            <a:avLst/>
+          </a:prstGeom>
+        </p:spPr>
+      </p:pic>
+    </p:spTree>
+    <p:extLst>
+      <p:ext uri="{BB962C8B-B14F-4D97-AF65-F5344CB8AC3E}">
+        <p14:creationId xmlns:p14="http://schemas.microsoft.com/office/powerpoint/2010/main" val="1971449608"/>
       </p:ext>
     </p:extLst>
   </p:cSld>
@@ -7074,7 +6884,7 @@
           <p:cNvPr id="3" name="Picture 2">
             <a:extLst>
               <a:ext uri="{FF2B5EF4-FFF2-40B4-BE49-F238E27FC236}">
-                <a16:creationId xmlns:a16="http://schemas.microsoft.com/office/drawing/2014/main" id="{F19FD08C-73E1-7B9E-6DEC-32BF3283A1A4}"/>
+                <a16:creationId xmlns:a16="http://schemas.microsoft.com/office/drawing/2014/main" id="{08526774-AD3D-A2BF-8B22-289424073E47}"/>
               </a:ext>
             </a:extLst>
           </p:cNvPr>
@@ -7090,10 +6900,10 @@
                 <a14:imgProps xmlns:a14="http://schemas.microsoft.com/office/drawing/2010/main">
                   <a14:imgLayer r:embed="rId3">
                     <a14:imgEffect>
-                      <a14:backgroundRemoval t="4095" b="95043" l="9704" r="89803">
-                        <a14:foregroundMark x1="44572" y1="13578" x2="44572" y2="13578"/>
-                        <a14:foregroundMark x1="48849" y1="4310" x2="48849" y2="4310"/>
-                        <a14:foregroundMark x1="52632" y1="95043" x2="52632" y2="95043"/>
+                      <a14:backgroundRemoval t="3664" b="95905" l="9704" r="89803">
+                        <a14:foregroundMark x1="47368" y1="15302" x2="47368" y2="15302"/>
+                        <a14:foregroundMark x1="49507" y1="3879" x2="49507" y2="3879"/>
+                        <a14:foregroundMark x1="52467" y1="95905" x2="52467" y2="95905"/>
                       </a14:backgroundRemoval>
                     </a14:imgEffect>
                   </a14:imgLayer>
@@ -7118,7 +6928,7 @@
     </p:spTree>
     <p:extLst>
       <p:ext uri="{BB962C8B-B14F-4D97-AF65-F5344CB8AC3E}">
-        <p14:creationId xmlns:p14="http://schemas.microsoft.com/office/powerpoint/2010/main" val="1971449608"/>
+        <p14:creationId xmlns:p14="http://schemas.microsoft.com/office/powerpoint/2010/main" val="4139463847"/>
       </p:ext>
     </p:extLst>
   </p:cSld>
@@ -7141,7 +6951,13 @@
     </p:bg>
     <p:spTree>
       <p:nvGrpSpPr>
-        <p:cNvPr id="1" name=""/>
+        <p:cNvPr id="1" name="">
+          <a:extLst>
+            <a:ext uri="{FF2B5EF4-FFF2-40B4-BE49-F238E27FC236}">
+              <a16:creationId xmlns:a16="http://schemas.microsoft.com/office/drawing/2014/main" id="{58362876-6F74-6E63-CF52-920E19E230DA}"/>
+            </a:ext>
+          </a:extLst>
+        </p:cNvPr>
         <p:cNvGrpSpPr/>
         <p:nvPr/>
       </p:nvGrpSpPr>
@@ -7155,10 +6971,10 @@
       </p:grpSpPr>
       <p:pic>
         <p:nvPicPr>
-          <p:cNvPr id="3" name="Picture 2">
-            <a:extLst>
-              <a:ext uri="{FF2B5EF4-FFF2-40B4-BE49-F238E27FC236}">
-                <a16:creationId xmlns:a16="http://schemas.microsoft.com/office/drawing/2014/main" id="{08526774-AD3D-A2BF-8B22-289424073E47}"/>
+          <p:cNvPr id="4" name="Picture 3">
+            <a:extLst>
+              <a:ext uri="{FF2B5EF4-FFF2-40B4-BE49-F238E27FC236}">
+                <a16:creationId xmlns:a16="http://schemas.microsoft.com/office/drawing/2014/main" id="{34157AAE-2B20-D88F-D95B-3AD9283E705D}"/>
               </a:ext>
             </a:extLst>
           </p:cNvPr>
@@ -7174,10 +6990,11 @@
                 <a14:imgProps xmlns:a14="http://schemas.microsoft.com/office/drawing/2010/main">
                   <a14:imgLayer r:embed="rId3">
                     <a14:imgEffect>
-                      <a14:backgroundRemoval t="3664" b="95905" l="9704" r="89803">
-                        <a14:foregroundMark x1="47368" y1="15302" x2="47368" y2="15302"/>
-                        <a14:foregroundMark x1="49507" y1="3879" x2="49507" y2="3879"/>
-                        <a14:foregroundMark x1="52467" y1="95905" x2="52467" y2="95905"/>
+                      <a14:backgroundRemoval t="3664" b="98922" l="9704" r="89803">
+                        <a14:foregroundMark x1="45888" y1="12716" x2="45888" y2="12716"/>
+                        <a14:foregroundMark x1="48026" y1="3879" x2="48026" y2="3879"/>
+                        <a14:foregroundMark x1="52796" y1="93103" x2="52796" y2="93103"/>
+                        <a14:foregroundMark x1="50164" y1="98922" x2="50164" y2="98922"/>
                       </a14:backgroundRemoval>
                     </a14:imgEffect>
                   </a14:imgLayer>
@@ -7202,7 +7019,7 @@
     </p:spTree>
     <p:extLst>
       <p:ext uri="{BB962C8B-B14F-4D97-AF65-F5344CB8AC3E}">
-        <p14:creationId xmlns:p14="http://schemas.microsoft.com/office/powerpoint/2010/main" val="4139463847"/>
+        <p14:creationId xmlns:p14="http://schemas.microsoft.com/office/powerpoint/2010/main" val="2463032928"/>
       </p:ext>
     </p:extLst>
   </p:cSld>

</xml_diff>

<commit_message>
updated visuals and intro timings
</commit_message>
<xml_diff>
--- a/task/stimuli/originals_SAP_Task.pptx
+++ b/task/stimuli/originals_SAP_Task.pptx
@@ -296,7 +296,7 @@
           <a:p>
             <a:fld id="{9B916260-F45C-B647-88A4-C91F6BA5DC4E}" type="datetimeFigureOut">
               <a:rPr lang="en-CH" smtClean="0"/>
-              <a:t>15.10.24</a:t>
+              <a:t>25.10.24</a:t>
             </a:fld>
             <a:endParaRPr lang="en-CH"/>
           </a:p>
@@ -496,7 +496,7 @@
           <a:p>
             <a:fld id="{9B916260-F45C-B647-88A4-C91F6BA5DC4E}" type="datetimeFigureOut">
               <a:rPr lang="en-CH" smtClean="0"/>
-              <a:t>15.10.24</a:t>
+              <a:t>25.10.24</a:t>
             </a:fld>
             <a:endParaRPr lang="en-CH"/>
           </a:p>
@@ -706,7 +706,7 @@
           <a:p>
             <a:fld id="{9B916260-F45C-B647-88A4-C91F6BA5DC4E}" type="datetimeFigureOut">
               <a:rPr lang="en-CH" smtClean="0"/>
-              <a:t>15.10.24</a:t>
+              <a:t>25.10.24</a:t>
             </a:fld>
             <a:endParaRPr lang="en-CH"/>
           </a:p>
@@ -906,7 +906,7 @@
           <a:p>
             <a:fld id="{9B916260-F45C-B647-88A4-C91F6BA5DC4E}" type="datetimeFigureOut">
               <a:rPr lang="en-CH" smtClean="0"/>
-              <a:t>15.10.24</a:t>
+              <a:t>25.10.24</a:t>
             </a:fld>
             <a:endParaRPr lang="en-CH"/>
           </a:p>
@@ -1182,7 +1182,7 @@
           <a:p>
             <a:fld id="{9B916260-F45C-B647-88A4-C91F6BA5DC4E}" type="datetimeFigureOut">
               <a:rPr lang="en-CH" smtClean="0"/>
-              <a:t>15.10.24</a:t>
+              <a:t>25.10.24</a:t>
             </a:fld>
             <a:endParaRPr lang="en-CH"/>
           </a:p>
@@ -1450,7 +1450,7 @@
           <a:p>
             <a:fld id="{9B916260-F45C-B647-88A4-C91F6BA5DC4E}" type="datetimeFigureOut">
               <a:rPr lang="en-CH" smtClean="0"/>
-              <a:t>15.10.24</a:t>
+              <a:t>25.10.24</a:t>
             </a:fld>
             <a:endParaRPr lang="en-CH"/>
           </a:p>
@@ -1865,7 +1865,7 @@
           <a:p>
             <a:fld id="{9B916260-F45C-B647-88A4-C91F6BA5DC4E}" type="datetimeFigureOut">
               <a:rPr lang="en-CH" smtClean="0"/>
-              <a:t>15.10.24</a:t>
+              <a:t>25.10.24</a:t>
             </a:fld>
             <a:endParaRPr lang="en-CH"/>
           </a:p>
@@ -2007,7 +2007,7 @@
           <a:p>
             <a:fld id="{9B916260-F45C-B647-88A4-C91F6BA5DC4E}" type="datetimeFigureOut">
               <a:rPr lang="en-CH" smtClean="0"/>
-              <a:t>15.10.24</a:t>
+              <a:t>25.10.24</a:t>
             </a:fld>
             <a:endParaRPr lang="en-CH"/>
           </a:p>
@@ -2120,7 +2120,7 @@
           <a:p>
             <a:fld id="{9B916260-F45C-B647-88A4-C91F6BA5DC4E}" type="datetimeFigureOut">
               <a:rPr lang="en-CH" smtClean="0"/>
-              <a:t>15.10.24</a:t>
+              <a:t>25.10.24</a:t>
             </a:fld>
             <a:endParaRPr lang="en-CH"/>
           </a:p>
@@ -2433,7 +2433,7 @@
           <a:p>
             <a:fld id="{9B916260-F45C-B647-88A4-C91F6BA5DC4E}" type="datetimeFigureOut">
               <a:rPr lang="en-CH" smtClean="0"/>
-              <a:t>15.10.24</a:t>
+              <a:t>25.10.24</a:t>
             </a:fld>
             <a:endParaRPr lang="en-CH"/>
           </a:p>
@@ -2722,7 +2722,7 @@
           <a:p>
             <a:fld id="{9B916260-F45C-B647-88A4-C91F6BA5DC4E}" type="datetimeFigureOut">
               <a:rPr lang="en-CH" smtClean="0"/>
-              <a:t>15.10.24</a:t>
+              <a:t>25.10.24</a:t>
             </a:fld>
             <a:endParaRPr lang="en-CH"/>
           </a:p>
@@ -2965,7 +2965,7 @@
           <a:p>
             <a:fld id="{9B916260-F45C-B647-88A4-C91F6BA5DC4E}" type="datetimeFigureOut">
               <a:rPr lang="en-CH" smtClean="0"/>
-              <a:t>15.10.24</a:t>
+              <a:t>25.10.24</a:t>
             </a:fld>
             <a:endParaRPr lang="en-CH"/>
           </a:p>
@@ -6523,7 +6523,7 @@
                 <a:latin typeface="Arial" panose="020B0604020202020204" pitchFamily="34" charset="0"/>
                 <a:cs typeface="Arial" panose="020B0604020202020204" pitchFamily="34" charset="0"/>
               </a:rPr>
-              <a:t>If you can reach 50 points across all tasks you will earn an additional 5 AUD on top of the participation reimbursement.</a:t>
+              <a:t>If you can reach 50 points across all tasks you will earn an additional 5$ on top of the participation reimbursement.</a:t>
             </a:r>
           </a:p>
           <a:p>
@@ -6544,7 +6544,7 @@
                 <a:latin typeface="Arial" panose="020B0604020202020204" pitchFamily="34" charset="0"/>
                 <a:cs typeface="Arial" panose="020B0604020202020204" pitchFamily="34" charset="0"/>
               </a:rPr>
-              <a:t>If you reach 100 points across all tasks you will earn an additional 5 AUD on top of the participation reimbursement and the 50-point bonus.</a:t>
+              <a:t>If you reach 100 points across all tasks you will earn an additional 5$ on top of the participation reimbursement and the 50-point bonus.</a:t>
             </a:r>
           </a:p>
           <a:p>

</xml_diff>

<commit_message>
tasks: simplified some of the language on stimuli. Simulations: made some more plots for param recovery
</commit_message>
<xml_diff>
--- a/task/stimuli/originals_SAP_Task.pptx
+++ b/task/stimuli/originals_SAP_Task.pptx
@@ -296,7 +296,7 @@
           <a:p>
             <a:fld id="{9B916260-F45C-B647-88A4-C91F6BA5DC4E}" type="datetimeFigureOut">
               <a:rPr lang="en-CH" smtClean="0"/>
-              <a:t>25.10.24</a:t>
+              <a:t>29.10.24</a:t>
             </a:fld>
             <a:endParaRPr lang="en-CH"/>
           </a:p>
@@ -496,7 +496,7 @@
           <a:p>
             <a:fld id="{9B916260-F45C-B647-88A4-C91F6BA5DC4E}" type="datetimeFigureOut">
               <a:rPr lang="en-CH" smtClean="0"/>
-              <a:t>25.10.24</a:t>
+              <a:t>29.10.24</a:t>
             </a:fld>
             <a:endParaRPr lang="en-CH"/>
           </a:p>
@@ -706,7 +706,7 @@
           <a:p>
             <a:fld id="{9B916260-F45C-B647-88A4-C91F6BA5DC4E}" type="datetimeFigureOut">
               <a:rPr lang="en-CH" smtClean="0"/>
-              <a:t>25.10.24</a:t>
+              <a:t>29.10.24</a:t>
             </a:fld>
             <a:endParaRPr lang="en-CH"/>
           </a:p>
@@ -906,7 +906,7 @@
           <a:p>
             <a:fld id="{9B916260-F45C-B647-88A4-C91F6BA5DC4E}" type="datetimeFigureOut">
               <a:rPr lang="en-CH" smtClean="0"/>
-              <a:t>25.10.24</a:t>
+              <a:t>29.10.24</a:t>
             </a:fld>
             <a:endParaRPr lang="en-CH"/>
           </a:p>
@@ -1182,7 +1182,7 @@
           <a:p>
             <a:fld id="{9B916260-F45C-B647-88A4-C91F6BA5DC4E}" type="datetimeFigureOut">
               <a:rPr lang="en-CH" smtClean="0"/>
-              <a:t>25.10.24</a:t>
+              <a:t>29.10.24</a:t>
             </a:fld>
             <a:endParaRPr lang="en-CH"/>
           </a:p>
@@ -1450,7 +1450,7 @@
           <a:p>
             <a:fld id="{9B916260-F45C-B647-88A4-C91F6BA5DC4E}" type="datetimeFigureOut">
               <a:rPr lang="en-CH" smtClean="0"/>
-              <a:t>25.10.24</a:t>
+              <a:t>29.10.24</a:t>
             </a:fld>
             <a:endParaRPr lang="en-CH"/>
           </a:p>
@@ -1865,7 +1865,7 @@
           <a:p>
             <a:fld id="{9B916260-F45C-B647-88A4-C91F6BA5DC4E}" type="datetimeFigureOut">
               <a:rPr lang="en-CH" smtClean="0"/>
-              <a:t>25.10.24</a:t>
+              <a:t>29.10.24</a:t>
             </a:fld>
             <a:endParaRPr lang="en-CH"/>
           </a:p>
@@ -2007,7 +2007,7 @@
           <a:p>
             <a:fld id="{9B916260-F45C-B647-88A4-C91F6BA5DC4E}" type="datetimeFigureOut">
               <a:rPr lang="en-CH" smtClean="0"/>
-              <a:t>25.10.24</a:t>
+              <a:t>29.10.24</a:t>
             </a:fld>
             <a:endParaRPr lang="en-CH"/>
           </a:p>
@@ -2120,7 +2120,7 @@
           <a:p>
             <a:fld id="{9B916260-F45C-B647-88A4-C91F6BA5DC4E}" type="datetimeFigureOut">
               <a:rPr lang="en-CH" smtClean="0"/>
-              <a:t>25.10.24</a:t>
+              <a:t>29.10.24</a:t>
             </a:fld>
             <a:endParaRPr lang="en-CH"/>
           </a:p>
@@ -2433,7 +2433,7 @@
           <a:p>
             <a:fld id="{9B916260-F45C-B647-88A4-C91F6BA5DC4E}" type="datetimeFigureOut">
               <a:rPr lang="en-CH" smtClean="0"/>
-              <a:t>25.10.24</a:t>
+              <a:t>29.10.24</a:t>
             </a:fld>
             <a:endParaRPr lang="en-CH"/>
           </a:p>
@@ -2722,7 +2722,7 @@
           <a:p>
             <a:fld id="{9B916260-F45C-B647-88A4-C91F6BA5DC4E}" type="datetimeFigureOut">
               <a:rPr lang="en-CH" smtClean="0"/>
-              <a:t>25.10.24</a:t>
+              <a:t>29.10.24</a:t>
             </a:fld>
             <a:endParaRPr lang="en-CH"/>
           </a:p>
@@ -2965,7 +2965,7 @@
           <a:p>
             <a:fld id="{9B916260-F45C-B647-88A4-C91F6BA5DC4E}" type="datetimeFigureOut">
               <a:rPr lang="en-CH" smtClean="0"/>
-              <a:t>25.10.24</a:t>
+              <a:t>29.10.24</a:t>
             </a:fld>
             <a:endParaRPr lang="en-CH"/>
           </a:p>
@@ -5341,7 +5341,7 @@
                 <a:latin typeface="Arial" panose="020B0604020202020204" pitchFamily="34" charset="0"/>
                 <a:cs typeface="Arial" panose="020B0604020202020204" pitchFamily="34" charset="0"/>
               </a:rPr>
-              <a:t>Welcome to the practice round of the SAP task.</a:t>
+              <a:t>Welcome to the practice round of this task</a:t>
             </a:r>
           </a:p>
           <a:p>
@@ -5362,7 +5362,7 @@
                 <a:latin typeface="Arial" panose="020B0604020202020204" pitchFamily="34" charset="0"/>
                 <a:cs typeface="Arial" panose="020B0604020202020204" pitchFamily="34" charset="0"/>
               </a:rPr>
-              <a:t>In the following you will be able to practice the SAP task. The instructions will be more detailed here than in the MRI. You can ask questions at any time!</a:t>
+              <a:t>In the following you will be able to practice the “Smile Prediction” task. The instructions will be more detailed here than in the MRI. You can ask questions at any time!</a:t>
             </a:r>
           </a:p>
           <a:p>
@@ -5673,7 +5673,7 @@
                 <a:latin typeface="Arial" panose="020B0604020202020204" pitchFamily="34" charset="0"/>
                 <a:cs typeface="Arial" panose="020B0604020202020204" pitchFamily="34" charset="0"/>
               </a:rPr>
-              <a:t>canner practice round of the SAP task.</a:t>
+              <a:t>canner practice round of this task.</a:t>
             </a:r>
           </a:p>
           <a:p>
@@ -5766,7 +5766,7 @@
                 <a:latin typeface="Arial" panose="020B0604020202020204" pitchFamily="34" charset="0"/>
                 <a:cs typeface="Arial" panose="020B0604020202020204" pitchFamily="34" charset="0"/>
               </a:rPr>
-              <a:t>If you have any questions, you can ask anytime during this short practice.</a:t>
+              <a:t>If you have any questions you can ask anytime during this short practice.</a:t>
             </a:r>
           </a:p>
         </p:txBody>
@@ -5891,7 +5891,7 @@
         <p:spPr>
           <a:xfrm>
             <a:off x="391886" y="130629"/>
-            <a:ext cx="11614067" cy="4524315"/>
+            <a:ext cx="11614067" cy="4493538"/>
           </a:xfrm>
           <a:prstGeom prst="rect">
             <a:avLst/>
@@ -5907,19 +5907,6 @@
           </a:bodyPr>
           <a:lstStyle/>
           <a:p>
-            <a:pPr algn="ctr"/>
-            <a:r>
-              <a:rPr lang="en-CH" sz="2400" dirty="0">
-                <a:solidFill>
-                  <a:schemeClr val="bg1"/>
-                </a:solidFill>
-                <a:latin typeface="Arial" panose="020B0604020202020204" pitchFamily="34" charset="0"/>
-                <a:cs typeface="Arial" panose="020B0604020202020204" pitchFamily="34" charset="0"/>
-              </a:rPr>
-              <a:t>Welcome to the SAP task.</a:t>
-            </a:r>
-          </a:p>
-          <a:p>
             <a:endParaRPr lang="en-CH" sz="2200" dirty="0">
               <a:solidFill>
                 <a:schemeClr val="bg1"/>
@@ -5929,6 +5916,15 @@
             </a:endParaRPr>
           </a:p>
           <a:p>
+            <a:endParaRPr lang="en-CH" sz="2200" dirty="0">
+              <a:solidFill>
+                <a:schemeClr val="bg1"/>
+              </a:solidFill>
+              <a:latin typeface="Arial" panose="020B0604020202020204" pitchFamily="34" charset="0"/>
+              <a:cs typeface="Arial" panose="020B0604020202020204" pitchFamily="34" charset="0"/>
+            </a:endParaRPr>
+          </a:p>
+          <a:p>
             <a:r>
               <a:rPr lang="en-CH" sz="2200" dirty="0">
                 <a:solidFill>
@@ -5937,7 +5933,7 @@
                 <a:latin typeface="Arial" panose="020B0604020202020204" pitchFamily="34" charset="0"/>
                 <a:cs typeface="Arial" panose="020B0604020202020204" pitchFamily="34" charset="0"/>
               </a:rPr>
-              <a:t>This is the SAP task that you have practiced already.</a:t>
+              <a:t>This is the “Smile Prediction” task that you have practiced already.</a:t>
             </a:r>
           </a:p>
           <a:p>
@@ -6047,7 +6043,7 @@
                 <a:latin typeface="Arial" panose="020B0604020202020204" pitchFamily="34" charset="0"/>
                 <a:cs typeface="Arial" panose="020B0604020202020204" pitchFamily="34" charset="0"/>
               </a:rPr>
-              <a:t>The task is going to take about 20 minutes. </a:t>
+              <a:t>The task is going to take about 15 minutes. </a:t>
             </a:r>
           </a:p>
         </p:txBody>
@@ -6220,7 +6216,7 @@
                 <a:latin typeface="Arial" panose="020B0604020202020204" pitchFamily="34" charset="0"/>
                 <a:cs typeface="Arial" panose="020B0604020202020204" pitchFamily="34" charset="0"/>
               </a:rPr>
-              <a:t>SAP task is starting anytime now...</a:t>
+              <a:t>task is starting anytime now...</a:t>
             </a:r>
           </a:p>
           <a:p>

</xml_diff>

<commit_message>
added Eyelink functions but havent tested at all, added option to record/trigger EMG, made points conditional to how many tasks the participant will make and adjusted points intro slide
</commit_message>
<xml_diff>
--- a/task/stimuli/originals_SAP_Task.pptx
+++ b/task/stimuli/originals_SAP_Task.pptx
@@ -9,38 +9,39 @@
     <p:sldId id="258" r:id="rId3"/>
     <p:sldId id="282" r:id="rId4"/>
     <p:sldId id="3497" r:id="rId5"/>
-    <p:sldId id="283" r:id="rId6"/>
-    <p:sldId id="3511" r:id="rId7"/>
-    <p:sldId id="3479" r:id="rId8"/>
-    <p:sldId id="3480" r:id="rId9"/>
-    <p:sldId id="3512" r:id="rId10"/>
-    <p:sldId id="3481" r:id="rId11"/>
-    <p:sldId id="3482" r:id="rId12"/>
-    <p:sldId id="3513" r:id="rId13"/>
-    <p:sldId id="3483" r:id="rId14"/>
-    <p:sldId id="3484" r:id="rId15"/>
-    <p:sldId id="3514" r:id="rId16"/>
-    <p:sldId id="3485" r:id="rId17"/>
-    <p:sldId id="3486" r:id="rId18"/>
-    <p:sldId id="3515" r:id="rId19"/>
-    <p:sldId id="3503" r:id="rId20"/>
-    <p:sldId id="3504" r:id="rId21"/>
-    <p:sldId id="3516" r:id="rId22"/>
-    <p:sldId id="3505" r:id="rId23"/>
-    <p:sldId id="3506" r:id="rId24"/>
-    <p:sldId id="3517" r:id="rId25"/>
-    <p:sldId id="3508" r:id="rId26"/>
-    <p:sldId id="3509" r:id="rId27"/>
-    <p:sldId id="3518" r:id="rId28"/>
-    <p:sldId id="3510" r:id="rId29"/>
-    <p:sldId id="3475" r:id="rId30"/>
-    <p:sldId id="3474" r:id="rId31"/>
-    <p:sldId id="3498" r:id="rId32"/>
-    <p:sldId id="3502" r:id="rId33"/>
-    <p:sldId id="3500" r:id="rId34"/>
-    <p:sldId id="3499" r:id="rId35"/>
-    <p:sldId id="3476" r:id="rId36"/>
-    <p:sldId id="3477" r:id="rId37"/>
+    <p:sldId id="3519" r:id="rId6"/>
+    <p:sldId id="283" r:id="rId7"/>
+    <p:sldId id="3511" r:id="rId8"/>
+    <p:sldId id="3479" r:id="rId9"/>
+    <p:sldId id="3480" r:id="rId10"/>
+    <p:sldId id="3512" r:id="rId11"/>
+    <p:sldId id="3481" r:id="rId12"/>
+    <p:sldId id="3482" r:id="rId13"/>
+    <p:sldId id="3513" r:id="rId14"/>
+    <p:sldId id="3483" r:id="rId15"/>
+    <p:sldId id="3484" r:id="rId16"/>
+    <p:sldId id="3514" r:id="rId17"/>
+    <p:sldId id="3485" r:id="rId18"/>
+    <p:sldId id="3486" r:id="rId19"/>
+    <p:sldId id="3515" r:id="rId20"/>
+    <p:sldId id="3503" r:id="rId21"/>
+    <p:sldId id="3504" r:id="rId22"/>
+    <p:sldId id="3516" r:id="rId23"/>
+    <p:sldId id="3505" r:id="rId24"/>
+    <p:sldId id="3506" r:id="rId25"/>
+    <p:sldId id="3517" r:id="rId26"/>
+    <p:sldId id="3508" r:id="rId27"/>
+    <p:sldId id="3509" r:id="rId28"/>
+    <p:sldId id="3518" r:id="rId29"/>
+    <p:sldId id="3510" r:id="rId30"/>
+    <p:sldId id="3475" r:id="rId31"/>
+    <p:sldId id="3474" r:id="rId32"/>
+    <p:sldId id="3498" r:id="rId33"/>
+    <p:sldId id="3502" r:id="rId34"/>
+    <p:sldId id="3500" r:id="rId35"/>
+    <p:sldId id="3499" r:id="rId36"/>
+    <p:sldId id="3476" r:id="rId37"/>
+    <p:sldId id="3477" r:id="rId38"/>
   </p:sldIdLst>
   <p:sldSz cx="12192000" cy="6858000"/>
   <p:notesSz cx="6858000" cy="9144000"/>
@@ -296,7 +297,7 @@
           <a:p>
             <a:fld id="{9B916260-F45C-B647-88A4-C91F6BA5DC4E}" type="datetimeFigureOut">
               <a:rPr lang="en-CH" smtClean="0"/>
-              <a:t>29.10.24</a:t>
+              <a:t>14.11.24</a:t>
             </a:fld>
             <a:endParaRPr lang="en-CH"/>
           </a:p>
@@ -496,7 +497,7 @@
           <a:p>
             <a:fld id="{9B916260-F45C-B647-88A4-C91F6BA5DC4E}" type="datetimeFigureOut">
               <a:rPr lang="en-CH" smtClean="0"/>
-              <a:t>29.10.24</a:t>
+              <a:t>14.11.24</a:t>
             </a:fld>
             <a:endParaRPr lang="en-CH"/>
           </a:p>
@@ -706,7 +707,7 @@
           <a:p>
             <a:fld id="{9B916260-F45C-B647-88A4-C91F6BA5DC4E}" type="datetimeFigureOut">
               <a:rPr lang="en-CH" smtClean="0"/>
-              <a:t>29.10.24</a:t>
+              <a:t>14.11.24</a:t>
             </a:fld>
             <a:endParaRPr lang="en-CH"/>
           </a:p>
@@ -906,7 +907,7 @@
           <a:p>
             <a:fld id="{9B916260-F45C-B647-88A4-C91F6BA5DC4E}" type="datetimeFigureOut">
               <a:rPr lang="en-CH" smtClean="0"/>
-              <a:t>29.10.24</a:t>
+              <a:t>14.11.24</a:t>
             </a:fld>
             <a:endParaRPr lang="en-CH"/>
           </a:p>
@@ -1182,7 +1183,7 @@
           <a:p>
             <a:fld id="{9B916260-F45C-B647-88A4-C91F6BA5DC4E}" type="datetimeFigureOut">
               <a:rPr lang="en-CH" smtClean="0"/>
-              <a:t>29.10.24</a:t>
+              <a:t>14.11.24</a:t>
             </a:fld>
             <a:endParaRPr lang="en-CH"/>
           </a:p>
@@ -1450,7 +1451,7 @@
           <a:p>
             <a:fld id="{9B916260-F45C-B647-88A4-C91F6BA5DC4E}" type="datetimeFigureOut">
               <a:rPr lang="en-CH" smtClean="0"/>
-              <a:t>29.10.24</a:t>
+              <a:t>14.11.24</a:t>
             </a:fld>
             <a:endParaRPr lang="en-CH"/>
           </a:p>
@@ -1865,7 +1866,7 @@
           <a:p>
             <a:fld id="{9B916260-F45C-B647-88A4-C91F6BA5DC4E}" type="datetimeFigureOut">
               <a:rPr lang="en-CH" smtClean="0"/>
-              <a:t>29.10.24</a:t>
+              <a:t>14.11.24</a:t>
             </a:fld>
             <a:endParaRPr lang="en-CH"/>
           </a:p>
@@ -2007,7 +2008,7 @@
           <a:p>
             <a:fld id="{9B916260-F45C-B647-88A4-C91F6BA5DC4E}" type="datetimeFigureOut">
               <a:rPr lang="en-CH" smtClean="0"/>
-              <a:t>29.10.24</a:t>
+              <a:t>14.11.24</a:t>
             </a:fld>
             <a:endParaRPr lang="en-CH"/>
           </a:p>
@@ -2120,7 +2121,7 @@
           <a:p>
             <a:fld id="{9B916260-F45C-B647-88A4-C91F6BA5DC4E}" type="datetimeFigureOut">
               <a:rPr lang="en-CH" smtClean="0"/>
-              <a:t>29.10.24</a:t>
+              <a:t>14.11.24</a:t>
             </a:fld>
             <a:endParaRPr lang="en-CH"/>
           </a:p>
@@ -2433,7 +2434,7 @@
           <a:p>
             <a:fld id="{9B916260-F45C-B647-88A4-C91F6BA5DC4E}" type="datetimeFigureOut">
               <a:rPr lang="en-CH" smtClean="0"/>
-              <a:t>29.10.24</a:t>
+              <a:t>14.11.24</a:t>
             </a:fld>
             <a:endParaRPr lang="en-CH"/>
           </a:p>
@@ -2722,7 +2723,7 @@
           <a:p>
             <a:fld id="{9B916260-F45C-B647-88A4-C91F6BA5DC4E}" type="datetimeFigureOut">
               <a:rPr lang="en-CH" smtClean="0"/>
-              <a:t>29.10.24</a:t>
+              <a:t>14.11.24</a:t>
             </a:fld>
             <a:endParaRPr lang="en-CH"/>
           </a:p>
@@ -2965,7 +2966,7 @@
           <a:p>
             <a:fld id="{9B916260-F45C-B647-88A4-C91F6BA5DC4E}" type="datetimeFigureOut">
               <a:rPr lang="en-CH" smtClean="0"/>
-              <a:t>29.10.24</a:t>
+              <a:t>14.11.24</a:t>
             </a:fld>
             <a:endParaRPr lang="en-CH"/>
           </a:p>
@@ -3464,7 +3465,13 @@
     </p:bg>
     <p:spTree>
       <p:nvGrpSpPr>
-        <p:cNvPr id="1" name=""/>
+        <p:cNvPr id="1" name="">
+          <a:extLst>
+            <a:ext uri="{FF2B5EF4-FFF2-40B4-BE49-F238E27FC236}">
+              <a16:creationId xmlns:a16="http://schemas.microsoft.com/office/drawing/2014/main" id="{58362876-6F74-6E63-CF52-920E19E230DA}"/>
+            </a:ext>
+          </a:extLst>
+        </p:cNvPr>
         <p:cNvGrpSpPr/>
         <p:nvPr/>
       </p:nvGrpSpPr>
@@ -3478,10 +3485,10 @@
       </p:grpSpPr>
       <p:pic>
         <p:nvPicPr>
-          <p:cNvPr id="3" name="Picture 2">
-            <a:extLst>
-              <a:ext uri="{FF2B5EF4-FFF2-40B4-BE49-F238E27FC236}">
-                <a16:creationId xmlns:a16="http://schemas.microsoft.com/office/drawing/2014/main" id="{B720F08B-DC1B-BB78-54B3-C8A371BB9278}"/>
+          <p:cNvPr id="4" name="Picture 3">
+            <a:extLst>
+              <a:ext uri="{FF2B5EF4-FFF2-40B4-BE49-F238E27FC236}">
+                <a16:creationId xmlns:a16="http://schemas.microsoft.com/office/drawing/2014/main" id="{34157AAE-2B20-D88F-D95B-3AD9283E705D}"/>
               </a:ext>
             </a:extLst>
           </p:cNvPr>
@@ -3497,11 +3504,11 @@
                 <a14:imgProps xmlns:a14="http://schemas.microsoft.com/office/drawing/2010/main">
                   <a14:imgLayer r:embed="rId3">
                     <a14:imgEffect>
-                      <a14:backgroundRemoval t="4095" b="98276" l="9704" r="89803">
-                        <a14:foregroundMark x1="50000" y1="18534" x2="50000" y2="18534"/>
-                        <a14:foregroundMark x1="51480" y1="4095" x2="51480" y2="4095"/>
-                        <a14:foregroundMark x1="49671" y1="92672" x2="49671" y2="92672"/>
-                        <a14:foregroundMark x1="49671" y1="98276" x2="49671" y2="98276"/>
+                      <a14:backgroundRemoval t="3664" b="98922" l="9704" r="89803">
+                        <a14:foregroundMark x1="45888" y1="12716" x2="45888" y2="12716"/>
+                        <a14:foregroundMark x1="48026" y1="3879" x2="48026" y2="3879"/>
+                        <a14:foregroundMark x1="52796" y1="93103" x2="52796" y2="93103"/>
+                        <a14:foregroundMark x1="50164" y1="98922" x2="50164" y2="98922"/>
                       </a14:backgroundRemoval>
                     </a14:imgEffect>
                   </a14:imgLayer>
@@ -3526,7 +3533,7 @@
     </p:spTree>
     <p:extLst>
       <p:ext uri="{BB962C8B-B14F-4D97-AF65-F5344CB8AC3E}">
-        <p14:creationId xmlns:p14="http://schemas.microsoft.com/office/powerpoint/2010/main" val="586545891"/>
+        <p14:creationId xmlns:p14="http://schemas.microsoft.com/office/powerpoint/2010/main" val="2463032928"/>
       </p:ext>
     </p:extLst>
   </p:cSld>
@@ -3566,6 +3573,91 @@
           <p:cNvPr id="3" name="Picture 2">
             <a:extLst>
               <a:ext uri="{FF2B5EF4-FFF2-40B4-BE49-F238E27FC236}">
+                <a16:creationId xmlns:a16="http://schemas.microsoft.com/office/drawing/2014/main" id="{B720F08B-DC1B-BB78-54B3-C8A371BB9278}"/>
+              </a:ext>
+            </a:extLst>
+          </p:cNvPr>
+          <p:cNvPicPr>
+            <a:picLocks noChangeAspect="1"/>
+          </p:cNvPicPr>
+          <p:nvPr/>
+        </p:nvPicPr>
+        <p:blipFill>
+          <a:blip r:embed="rId2">
+            <a:extLst>
+              <a:ext uri="{BEBA8EAE-BF5A-486C-A8C5-ECC9F3942E4B}">
+                <a14:imgProps xmlns:a14="http://schemas.microsoft.com/office/drawing/2010/main">
+                  <a14:imgLayer r:embed="rId3">
+                    <a14:imgEffect>
+                      <a14:backgroundRemoval t="4095" b="98276" l="9704" r="89803">
+                        <a14:foregroundMark x1="50000" y1="18534" x2="50000" y2="18534"/>
+                        <a14:foregroundMark x1="51480" y1="4095" x2="51480" y2="4095"/>
+                        <a14:foregroundMark x1="49671" y1="92672" x2="49671" y2="92672"/>
+                        <a14:foregroundMark x1="49671" y1="98276" x2="49671" y2="98276"/>
+                      </a14:backgroundRemoval>
+                    </a14:imgEffect>
+                  </a14:imgLayer>
+                </a14:imgProps>
+              </a:ext>
+            </a:extLst>
+          </a:blip>
+          <a:stretch>
+            <a:fillRect/>
+          </a:stretch>
+        </p:blipFill>
+        <p:spPr>
+          <a:xfrm>
+            <a:off x="3501517" y="1449000"/>
+            <a:ext cx="5188966" cy="3960000"/>
+          </a:xfrm>
+          <a:prstGeom prst="rect">
+            <a:avLst/>
+          </a:prstGeom>
+        </p:spPr>
+      </p:pic>
+    </p:spTree>
+    <p:extLst>
+      <p:ext uri="{BB962C8B-B14F-4D97-AF65-F5344CB8AC3E}">
+        <p14:creationId xmlns:p14="http://schemas.microsoft.com/office/powerpoint/2010/main" val="586545891"/>
+      </p:ext>
+    </p:extLst>
+  </p:cSld>
+  <p:clrMapOvr>
+    <a:masterClrMapping/>
+  </p:clrMapOvr>
+</p:sld>
+</file>
+
+<file path=ppt/slides/slide12.xml><?xml version="1.0" encoding="utf-8"?>
+<p:sld xmlns:a="http://schemas.openxmlformats.org/drawingml/2006/main" xmlns:r="http://schemas.openxmlformats.org/officeDocument/2006/relationships" xmlns:p="http://schemas.openxmlformats.org/presentationml/2006/main">
+  <p:cSld>
+    <p:bg>
+      <p:bgPr>
+        <a:solidFill>
+          <a:srgbClr val="5C5C5C"/>
+        </a:solidFill>
+        <a:effectLst/>
+      </p:bgPr>
+    </p:bg>
+    <p:spTree>
+      <p:nvGrpSpPr>
+        <p:cNvPr id="1" name=""/>
+        <p:cNvGrpSpPr/>
+        <p:nvPr/>
+      </p:nvGrpSpPr>
+      <p:grpSpPr>
+        <a:xfrm>
+          <a:off x="0" y="0"/>
+          <a:ext cx="0" cy="0"/>
+          <a:chOff x="0" y="0"/>
+          <a:chExt cx="0" cy="0"/>
+        </a:xfrm>
+      </p:grpSpPr>
+      <p:pic>
+        <p:nvPicPr>
+          <p:cNvPr id="3" name="Picture 2">
+            <a:extLst>
+              <a:ext uri="{FF2B5EF4-FFF2-40B4-BE49-F238E27FC236}">
                 <a16:creationId xmlns:a16="http://schemas.microsoft.com/office/drawing/2014/main" id="{02C3729A-FF3F-F995-3345-DEEDC1FC84C1}"/>
               </a:ext>
             </a:extLst>
@@ -3621,7 +3713,7 @@
 </p:sld>
 </file>
 
-<file path=ppt/slides/slide12.xml><?xml version="1.0" encoding="utf-8"?>
+<file path=ppt/slides/slide13.xml><?xml version="1.0" encoding="utf-8"?>
 <p:sld xmlns:a="http://schemas.openxmlformats.org/drawingml/2006/main" xmlns:r="http://schemas.openxmlformats.org/officeDocument/2006/relationships" xmlns:p="http://schemas.openxmlformats.org/presentationml/2006/main">
   <p:cSld>
     <p:bg>
@@ -3703,74 +3795,6 @@
     <p:extLst>
       <p:ext uri="{BB962C8B-B14F-4D97-AF65-F5344CB8AC3E}">
         <p14:creationId xmlns:p14="http://schemas.microsoft.com/office/powerpoint/2010/main" val="785923272"/>
-      </p:ext>
-    </p:extLst>
-  </p:cSld>
-  <p:clrMapOvr>
-    <a:masterClrMapping/>
-  </p:clrMapOvr>
-</p:sld>
-</file>
-
-<file path=ppt/slides/slide13.xml><?xml version="1.0" encoding="utf-8"?>
-<p:sld xmlns:a="http://schemas.openxmlformats.org/drawingml/2006/main" xmlns:r="http://schemas.openxmlformats.org/officeDocument/2006/relationships" xmlns:p="http://schemas.openxmlformats.org/presentationml/2006/main">
-  <p:cSld>
-    <p:bg>
-      <p:bgPr>
-        <a:solidFill>
-          <a:srgbClr val="5C5C5C"/>
-        </a:solidFill>
-        <a:effectLst/>
-      </p:bgPr>
-    </p:bg>
-    <p:spTree>
-      <p:nvGrpSpPr>
-        <p:cNvPr id="1" name=""/>
-        <p:cNvGrpSpPr/>
-        <p:nvPr/>
-      </p:nvGrpSpPr>
-      <p:grpSpPr>
-        <a:xfrm>
-          <a:off x="0" y="0"/>
-          <a:ext cx="0" cy="0"/>
-          <a:chOff x="0" y="0"/>
-          <a:chExt cx="0" cy="0"/>
-        </a:xfrm>
-      </p:grpSpPr>
-      <p:pic>
-        <p:nvPicPr>
-          <p:cNvPr id="4" name="Picture 3">
-            <a:extLst>
-              <a:ext uri="{FF2B5EF4-FFF2-40B4-BE49-F238E27FC236}">
-                <a16:creationId xmlns:a16="http://schemas.microsoft.com/office/drawing/2014/main" id="{AC877C18-2AC4-AD3E-88E1-3B24759CC822}"/>
-              </a:ext>
-            </a:extLst>
-          </p:cNvPr>
-          <p:cNvPicPr>
-            <a:picLocks noChangeAspect="1"/>
-          </p:cNvPicPr>
-          <p:nvPr/>
-        </p:nvPicPr>
-        <p:blipFill>
-          <a:blip r:embed="rId2"/>
-          <a:stretch>
-            <a:fillRect/>
-          </a:stretch>
-        </p:blipFill>
-        <p:spPr>
-          <a:xfrm>
-            <a:off x="3501517" y="1449000"/>
-            <a:ext cx="5188966" cy="3960000"/>
-          </a:xfrm>
-          <a:prstGeom prst="rect">
-            <a:avLst/>
-          </a:prstGeom>
-        </p:spPr>
-      </p:pic>
-    </p:spTree>
-    <p:extLst>
-      <p:ext uri="{BB962C8B-B14F-4D97-AF65-F5344CB8AC3E}">
-        <p14:creationId xmlns:p14="http://schemas.microsoft.com/office/powerpoint/2010/main" val="1944642154"/>
       </p:ext>
     </p:extLst>
   </p:cSld>
@@ -3810,6 +3834,74 @@
           <p:cNvPr id="4" name="Picture 3">
             <a:extLst>
               <a:ext uri="{FF2B5EF4-FFF2-40B4-BE49-F238E27FC236}">
+                <a16:creationId xmlns:a16="http://schemas.microsoft.com/office/drawing/2014/main" id="{AC877C18-2AC4-AD3E-88E1-3B24759CC822}"/>
+              </a:ext>
+            </a:extLst>
+          </p:cNvPr>
+          <p:cNvPicPr>
+            <a:picLocks noChangeAspect="1"/>
+          </p:cNvPicPr>
+          <p:nvPr/>
+        </p:nvPicPr>
+        <p:blipFill>
+          <a:blip r:embed="rId2"/>
+          <a:stretch>
+            <a:fillRect/>
+          </a:stretch>
+        </p:blipFill>
+        <p:spPr>
+          <a:xfrm>
+            <a:off x="3501517" y="1449000"/>
+            <a:ext cx="5188966" cy="3960000"/>
+          </a:xfrm>
+          <a:prstGeom prst="rect">
+            <a:avLst/>
+          </a:prstGeom>
+        </p:spPr>
+      </p:pic>
+    </p:spTree>
+    <p:extLst>
+      <p:ext uri="{BB962C8B-B14F-4D97-AF65-F5344CB8AC3E}">
+        <p14:creationId xmlns:p14="http://schemas.microsoft.com/office/powerpoint/2010/main" val="1944642154"/>
+      </p:ext>
+    </p:extLst>
+  </p:cSld>
+  <p:clrMapOvr>
+    <a:masterClrMapping/>
+  </p:clrMapOvr>
+</p:sld>
+</file>
+
+<file path=ppt/slides/slide15.xml><?xml version="1.0" encoding="utf-8"?>
+<p:sld xmlns:a="http://schemas.openxmlformats.org/drawingml/2006/main" xmlns:r="http://schemas.openxmlformats.org/officeDocument/2006/relationships" xmlns:p="http://schemas.openxmlformats.org/presentationml/2006/main">
+  <p:cSld>
+    <p:bg>
+      <p:bgPr>
+        <a:solidFill>
+          <a:srgbClr val="5C5C5C"/>
+        </a:solidFill>
+        <a:effectLst/>
+      </p:bgPr>
+    </p:bg>
+    <p:spTree>
+      <p:nvGrpSpPr>
+        <p:cNvPr id="1" name=""/>
+        <p:cNvGrpSpPr/>
+        <p:nvPr/>
+      </p:nvGrpSpPr>
+      <p:grpSpPr>
+        <a:xfrm>
+          <a:off x="0" y="0"/>
+          <a:ext cx="0" cy="0"/>
+          <a:chOff x="0" y="0"/>
+          <a:chExt cx="0" cy="0"/>
+        </a:xfrm>
+      </p:grpSpPr>
+      <p:pic>
+        <p:nvPicPr>
+          <p:cNvPr id="4" name="Picture 3">
+            <a:extLst>
+              <a:ext uri="{FF2B5EF4-FFF2-40B4-BE49-F238E27FC236}">
                 <a16:creationId xmlns:a16="http://schemas.microsoft.com/office/drawing/2014/main" id="{BF22FE1A-67F2-9A08-251F-880432C4BF90}"/>
               </a:ext>
             </a:extLst>
@@ -3865,7 +3957,7 @@
 </p:sld>
 </file>
 
-<file path=ppt/slides/slide15.xml><?xml version="1.0" encoding="utf-8"?>
+<file path=ppt/slides/slide16.xml><?xml version="1.0" encoding="utf-8"?>
 <p:sld xmlns:a="http://schemas.openxmlformats.org/drawingml/2006/main" xmlns:r="http://schemas.openxmlformats.org/officeDocument/2006/relationships" xmlns:p="http://schemas.openxmlformats.org/presentationml/2006/main">
   <p:cSld>
     <p:bg>
@@ -3948,91 +4040,6 @@
     <p:extLst>
       <p:ext uri="{BB962C8B-B14F-4D97-AF65-F5344CB8AC3E}">
         <p14:creationId xmlns:p14="http://schemas.microsoft.com/office/powerpoint/2010/main" val="2637108069"/>
-      </p:ext>
-    </p:extLst>
-  </p:cSld>
-  <p:clrMapOvr>
-    <a:masterClrMapping/>
-  </p:clrMapOvr>
-</p:sld>
-</file>
-
-<file path=ppt/slides/slide16.xml><?xml version="1.0" encoding="utf-8"?>
-<p:sld xmlns:a="http://schemas.openxmlformats.org/drawingml/2006/main" xmlns:r="http://schemas.openxmlformats.org/officeDocument/2006/relationships" xmlns:p="http://schemas.openxmlformats.org/presentationml/2006/main">
-  <p:cSld>
-    <p:bg>
-      <p:bgPr>
-        <a:solidFill>
-          <a:srgbClr val="5C5C5C"/>
-        </a:solidFill>
-        <a:effectLst/>
-      </p:bgPr>
-    </p:bg>
-    <p:spTree>
-      <p:nvGrpSpPr>
-        <p:cNvPr id="1" name=""/>
-        <p:cNvGrpSpPr/>
-        <p:nvPr/>
-      </p:nvGrpSpPr>
-      <p:grpSpPr>
-        <a:xfrm>
-          <a:off x="0" y="0"/>
-          <a:ext cx="0" cy="0"/>
-          <a:chOff x="0" y="0"/>
-          <a:chExt cx="0" cy="0"/>
-        </a:xfrm>
-      </p:grpSpPr>
-      <p:pic>
-        <p:nvPicPr>
-          <p:cNvPr id="4" name="Picture 3">
-            <a:extLst>
-              <a:ext uri="{FF2B5EF4-FFF2-40B4-BE49-F238E27FC236}">
-                <a16:creationId xmlns:a16="http://schemas.microsoft.com/office/drawing/2014/main" id="{35AC8A44-F8E5-4253-30EE-6B1C3EA472C7}"/>
-              </a:ext>
-            </a:extLst>
-          </p:cNvPr>
-          <p:cNvPicPr>
-            <a:picLocks noChangeAspect="1"/>
-          </p:cNvPicPr>
-          <p:nvPr/>
-        </p:nvPicPr>
-        <p:blipFill>
-          <a:blip r:embed="rId2">
-            <a:extLst>
-              <a:ext uri="{BEBA8EAE-BF5A-486C-A8C5-ECC9F3942E4B}">
-                <a14:imgProps xmlns:a14="http://schemas.microsoft.com/office/drawing/2010/main">
-                  <a14:imgLayer r:embed="rId3">
-                    <a14:imgEffect>
-                      <a14:backgroundRemoval t="3233" b="98922" l="9704" r="89803">
-                        <a14:foregroundMark x1="44243" y1="18750" x2="44243" y2="18750"/>
-                        <a14:foregroundMark x1="50329" y1="3233" x2="50329" y2="3233"/>
-                        <a14:foregroundMark x1="49507" y1="95474" x2="49507" y2="95474"/>
-                        <a14:foregroundMark x1="49013" y1="98922" x2="49013" y2="98922"/>
-                      </a14:backgroundRemoval>
-                    </a14:imgEffect>
-                  </a14:imgLayer>
-                </a14:imgProps>
-              </a:ext>
-            </a:extLst>
-          </a:blip>
-          <a:stretch>
-            <a:fillRect/>
-          </a:stretch>
-        </p:blipFill>
-        <p:spPr>
-          <a:xfrm>
-            <a:off x="3501517" y="1449000"/>
-            <a:ext cx="5188966" cy="3960000"/>
-          </a:xfrm>
-          <a:prstGeom prst="rect">
-            <a:avLst/>
-          </a:prstGeom>
-        </p:spPr>
-      </p:pic>
-    </p:spTree>
-    <p:extLst>
-      <p:ext uri="{BB962C8B-B14F-4D97-AF65-F5344CB8AC3E}">
-        <p14:creationId xmlns:p14="http://schemas.microsoft.com/office/powerpoint/2010/main" val="139787960"/>
       </p:ext>
     </p:extLst>
   </p:cSld>
@@ -4069,6 +4076,91 @@
       </p:grpSpPr>
       <p:pic>
         <p:nvPicPr>
+          <p:cNvPr id="4" name="Picture 3">
+            <a:extLst>
+              <a:ext uri="{FF2B5EF4-FFF2-40B4-BE49-F238E27FC236}">
+                <a16:creationId xmlns:a16="http://schemas.microsoft.com/office/drawing/2014/main" id="{35AC8A44-F8E5-4253-30EE-6B1C3EA472C7}"/>
+              </a:ext>
+            </a:extLst>
+          </p:cNvPr>
+          <p:cNvPicPr>
+            <a:picLocks noChangeAspect="1"/>
+          </p:cNvPicPr>
+          <p:nvPr/>
+        </p:nvPicPr>
+        <p:blipFill>
+          <a:blip r:embed="rId2">
+            <a:extLst>
+              <a:ext uri="{BEBA8EAE-BF5A-486C-A8C5-ECC9F3942E4B}">
+                <a14:imgProps xmlns:a14="http://schemas.microsoft.com/office/drawing/2010/main">
+                  <a14:imgLayer r:embed="rId3">
+                    <a14:imgEffect>
+                      <a14:backgroundRemoval t="3233" b="98922" l="9704" r="89803">
+                        <a14:foregroundMark x1="44243" y1="18750" x2="44243" y2="18750"/>
+                        <a14:foregroundMark x1="50329" y1="3233" x2="50329" y2="3233"/>
+                        <a14:foregroundMark x1="49507" y1="95474" x2="49507" y2="95474"/>
+                        <a14:foregroundMark x1="49013" y1="98922" x2="49013" y2="98922"/>
+                      </a14:backgroundRemoval>
+                    </a14:imgEffect>
+                  </a14:imgLayer>
+                </a14:imgProps>
+              </a:ext>
+            </a:extLst>
+          </a:blip>
+          <a:stretch>
+            <a:fillRect/>
+          </a:stretch>
+        </p:blipFill>
+        <p:spPr>
+          <a:xfrm>
+            <a:off x="3501517" y="1449000"/>
+            <a:ext cx="5188966" cy="3960000"/>
+          </a:xfrm>
+          <a:prstGeom prst="rect">
+            <a:avLst/>
+          </a:prstGeom>
+        </p:spPr>
+      </p:pic>
+    </p:spTree>
+    <p:extLst>
+      <p:ext uri="{BB962C8B-B14F-4D97-AF65-F5344CB8AC3E}">
+        <p14:creationId xmlns:p14="http://schemas.microsoft.com/office/powerpoint/2010/main" val="139787960"/>
+      </p:ext>
+    </p:extLst>
+  </p:cSld>
+  <p:clrMapOvr>
+    <a:masterClrMapping/>
+  </p:clrMapOvr>
+</p:sld>
+</file>
+
+<file path=ppt/slides/slide18.xml><?xml version="1.0" encoding="utf-8"?>
+<p:sld xmlns:a="http://schemas.openxmlformats.org/drawingml/2006/main" xmlns:r="http://schemas.openxmlformats.org/officeDocument/2006/relationships" xmlns:p="http://schemas.openxmlformats.org/presentationml/2006/main">
+  <p:cSld>
+    <p:bg>
+      <p:bgPr>
+        <a:solidFill>
+          <a:srgbClr val="5C5C5C"/>
+        </a:solidFill>
+        <a:effectLst/>
+      </p:bgPr>
+    </p:bg>
+    <p:spTree>
+      <p:nvGrpSpPr>
+        <p:cNvPr id="1" name=""/>
+        <p:cNvGrpSpPr/>
+        <p:nvPr/>
+      </p:nvGrpSpPr>
+      <p:grpSpPr>
+        <a:xfrm>
+          <a:off x="0" y="0"/>
+          <a:ext cx="0" cy="0"/>
+          <a:chOff x="0" y="0"/>
+          <a:chExt cx="0" cy="0"/>
+        </a:xfrm>
+      </p:grpSpPr>
+      <p:pic>
+        <p:nvPicPr>
           <p:cNvPr id="6" name="Picture 5">
             <a:extLst>
               <a:ext uri="{FF2B5EF4-FFF2-40B4-BE49-F238E27FC236}">
@@ -4127,7 +4219,7 @@
 </p:sld>
 </file>
 
-<file path=ppt/slides/slide18.xml><?xml version="1.0" encoding="utf-8"?>
+<file path=ppt/slides/slide19.xml><?xml version="1.0" encoding="utf-8"?>
 <p:sld xmlns:a="http://schemas.openxmlformats.org/drawingml/2006/main" xmlns:r="http://schemas.openxmlformats.org/officeDocument/2006/relationships" xmlns:p="http://schemas.openxmlformats.org/presentationml/2006/main">
   <p:cSld>
     <p:bg>
@@ -4218,7 +4310,74 @@
 </p:sld>
 </file>
 
-<file path=ppt/slides/slide19.xml><?xml version="1.0" encoding="utf-8"?>
+<file path=ppt/slides/slide2.xml><?xml version="1.0" encoding="utf-8"?>
+<p:sld xmlns:a="http://schemas.openxmlformats.org/drawingml/2006/main" xmlns:r="http://schemas.openxmlformats.org/officeDocument/2006/relationships" xmlns:p="http://schemas.openxmlformats.org/presentationml/2006/main">
+  <p:cSld>
+    <p:spTree>
+      <p:nvGrpSpPr>
+        <p:cNvPr id="1" name=""/>
+        <p:cNvGrpSpPr/>
+        <p:nvPr/>
+      </p:nvGrpSpPr>
+      <p:grpSpPr>
+        <a:xfrm>
+          <a:off x="0" y="0"/>
+          <a:ext cx="0" cy="0"/>
+          <a:chOff x="0" y="0"/>
+          <a:chExt cx="0" cy="0"/>
+        </a:xfrm>
+      </p:grpSpPr>
+      <p:sp>
+        <p:nvSpPr>
+          <p:cNvPr id="2" name="Title 1">
+            <a:extLst>
+              <a:ext uri="{FF2B5EF4-FFF2-40B4-BE49-F238E27FC236}">
+                <a16:creationId xmlns:a16="http://schemas.microsoft.com/office/drawing/2014/main" id="{0A1FA53E-25A0-0960-0FCC-4CC105416AC1}"/>
+              </a:ext>
+            </a:extLst>
+          </p:cNvPr>
+          <p:cNvSpPr>
+            <a:spLocks noGrp="1"/>
+          </p:cNvSpPr>
+          <p:nvPr>
+            <p:ph type="title"/>
+          </p:nvPr>
+        </p:nvSpPr>
+        <p:spPr>
+          <a:xfrm>
+            <a:off x="410688" y="365125"/>
+            <a:ext cx="10943112" cy="584901"/>
+          </a:xfrm>
+        </p:spPr>
+        <p:txBody>
+          <a:bodyPr>
+            <a:normAutofit/>
+          </a:bodyPr>
+          <a:lstStyle/>
+          <a:p>
+            <a:r>
+              <a:rPr lang="en-CH" sz="2800" b="1" dirty="0">
+                <a:latin typeface="Avenir Book" panose="02000503020000020003" pitchFamily="2" charset="0"/>
+              </a:rPr>
+              <a:t>Practice Task Slides (12 trials)</a:t>
+            </a:r>
+          </a:p>
+        </p:txBody>
+      </p:sp>
+    </p:spTree>
+    <p:extLst>
+      <p:ext uri="{BB962C8B-B14F-4D97-AF65-F5344CB8AC3E}">
+        <p14:creationId xmlns:p14="http://schemas.microsoft.com/office/powerpoint/2010/main" val="2739542140"/>
+      </p:ext>
+    </p:extLst>
+  </p:cSld>
+  <p:clrMapOvr>
+    <a:masterClrMapping/>
+  </p:clrMapOvr>
+</p:sld>
+</file>
+
+<file path=ppt/slides/slide20.xml><?xml version="1.0" encoding="utf-8"?>
 <p:sld xmlns:a="http://schemas.openxmlformats.org/drawingml/2006/main" xmlns:r="http://schemas.openxmlformats.org/officeDocument/2006/relationships" xmlns:p="http://schemas.openxmlformats.org/presentationml/2006/main">
   <p:cSld>
     <p:bg>
@@ -4309,74 +4468,7 @@
 </p:sld>
 </file>
 
-<file path=ppt/slides/slide2.xml><?xml version="1.0" encoding="utf-8"?>
-<p:sld xmlns:a="http://schemas.openxmlformats.org/drawingml/2006/main" xmlns:r="http://schemas.openxmlformats.org/officeDocument/2006/relationships" xmlns:p="http://schemas.openxmlformats.org/presentationml/2006/main">
-  <p:cSld>
-    <p:spTree>
-      <p:nvGrpSpPr>
-        <p:cNvPr id="1" name=""/>
-        <p:cNvGrpSpPr/>
-        <p:nvPr/>
-      </p:nvGrpSpPr>
-      <p:grpSpPr>
-        <a:xfrm>
-          <a:off x="0" y="0"/>
-          <a:ext cx="0" cy="0"/>
-          <a:chOff x="0" y="0"/>
-          <a:chExt cx="0" cy="0"/>
-        </a:xfrm>
-      </p:grpSpPr>
-      <p:sp>
-        <p:nvSpPr>
-          <p:cNvPr id="2" name="Title 1">
-            <a:extLst>
-              <a:ext uri="{FF2B5EF4-FFF2-40B4-BE49-F238E27FC236}">
-                <a16:creationId xmlns:a16="http://schemas.microsoft.com/office/drawing/2014/main" id="{0A1FA53E-25A0-0960-0FCC-4CC105416AC1}"/>
-              </a:ext>
-            </a:extLst>
-          </p:cNvPr>
-          <p:cNvSpPr>
-            <a:spLocks noGrp="1"/>
-          </p:cNvSpPr>
-          <p:nvPr>
-            <p:ph type="title"/>
-          </p:nvPr>
-        </p:nvSpPr>
-        <p:spPr>
-          <a:xfrm>
-            <a:off x="410688" y="365125"/>
-            <a:ext cx="10943112" cy="584901"/>
-          </a:xfrm>
-        </p:spPr>
-        <p:txBody>
-          <a:bodyPr>
-            <a:normAutofit/>
-          </a:bodyPr>
-          <a:lstStyle/>
-          <a:p>
-            <a:r>
-              <a:rPr lang="en-CH" sz="2800" b="1" dirty="0">
-                <a:latin typeface="Avenir Book" panose="02000503020000020003" pitchFamily="2" charset="0"/>
-              </a:rPr>
-              <a:t>Practice Task Slides (12 trials)</a:t>
-            </a:r>
-          </a:p>
-        </p:txBody>
-      </p:sp>
-    </p:spTree>
-    <p:extLst>
-      <p:ext uri="{BB962C8B-B14F-4D97-AF65-F5344CB8AC3E}">
-        <p14:creationId xmlns:p14="http://schemas.microsoft.com/office/powerpoint/2010/main" val="2739542140"/>
-      </p:ext>
-    </p:extLst>
-  </p:cSld>
-  <p:clrMapOvr>
-    <a:masterClrMapping/>
-  </p:clrMapOvr>
-</p:sld>
-</file>
-
-<file path=ppt/slides/slide20.xml><?xml version="1.0" encoding="utf-8"?>
+<file path=ppt/slides/slide21.xml><?xml version="1.0" encoding="utf-8"?>
 <p:sld xmlns:a="http://schemas.openxmlformats.org/drawingml/2006/main" xmlns:r="http://schemas.openxmlformats.org/officeDocument/2006/relationships" xmlns:p="http://schemas.openxmlformats.org/presentationml/2006/main">
   <p:cSld>
     <p:bg>
@@ -4467,7 +4559,7 @@
 </p:sld>
 </file>
 
-<file path=ppt/slides/slide21.xml><?xml version="1.0" encoding="utf-8"?>
+<file path=ppt/slides/slide22.xml><?xml version="1.0" encoding="utf-8"?>
 <p:sld xmlns:a="http://schemas.openxmlformats.org/drawingml/2006/main" xmlns:r="http://schemas.openxmlformats.org/officeDocument/2006/relationships" xmlns:p="http://schemas.openxmlformats.org/presentationml/2006/main">
   <p:cSld>
     <p:bg>
@@ -4558,7 +4650,7 @@
 </p:sld>
 </file>
 
-<file path=ppt/slides/slide22.xml><?xml version="1.0" encoding="utf-8"?>
+<file path=ppt/slides/slide23.xml><?xml version="1.0" encoding="utf-8"?>
 <p:sld xmlns:a="http://schemas.openxmlformats.org/drawingml/2006/main" xmlns:r="http://schemas.openxmlformats.org/officeDocument/2006/relationships" xmlns:p="http://schemas.openxmlformats.org/presentationml/2006/main">
   <p:cSld>
     <p:bg>
@@ -4649,7 +4741,7 @@
 </p:sld>
 </file>
 
-<file path=ppt/slides/slide23.xml><?xml version="1.0" encoding="utf-8"?>
+<file path=ppt/slides/slide24.xml><?xml version="1.0" encoding="utf-8"?>
 <p:sld xmlns:a="http://schemas.openxmlformats.org/drawingml/2006/main" xmlns:r="http://schemas.openxmlformats.org/officeDocument/2006/relationships" xmlns:p="http://schemas.openxmlformats.org/presentationml/2006/main">
   <p:cSld>
     <p:bg>
@@ -4740,7 +4832,7 @@
 </p:sld>
 </file>
 
-<file path=ppt/slides/slide24.xml><?xml version="1.0" encoding="utf-8"?>
+<file path=ppt/slides/slide25.xml><?xml version="1.0" encoding="utf-8"?>
 <p:sld xmlns:a="http://schemas.openxmlformats.org/drawingml/2006/main" xmlns:r="http://schemas.openxmlformats.org/officeDocument/2006/relationships" xmlns:p="http://schemas.openxmlformats.org/presentationml/2006/main">
   <p:cSld>
     <p:bg>
@@ -4831,7 +4923,7 @@
 </p:sld>
 </file>
 
-<file path=ppt/slides/slide25.xml><?xml version="1.0" encoding="utf-8"?>
+<file path=ppt/slides/slide26.xml><?xml version="1.0" encoding="utf-8"?>
 <p:sld xmlns:a="http://schemas.openxmlformats.org/drawingml/2006/main" xmlns:r="http://schemas.openxmlformats.org/officeDocument/2006/relationships" xmlns:p="http://schemas.openxmlformats.org/presentationml/2006/main">
   <p:cSld>
     <p:bg>
@@ -4922,7 +5014,7 @@
 </p:sld>
 </file>
 
-<file path=ppt/slides/slide26.xml><?xml version="1.0" encoding="utf-8"?>
+<file path=ppt/slides/slide27.xml><?xml version="1.0" encoding="utf-8"?>
 <p:sld xmlns:a="http://schemas.openxmlformats.org/drawingml/2006/main" xmlns:r="http://schemas.openxmlformats.org/officeDocument/2006/relationships" xmlns:p="http://schemas.openxmlformats.org/presentationml/2006/main">
   <p:cSld>
     <p:bg>
@@ -5013,7 +5105,7 @@
 </p:sld>
 </file>
 
-<file path=ppt/slides/slide27.xml><?xml version="1.0" encoding="utf-8"?>
+<file path=ppt/slides/slide28.xml><?xml version="1.0" encoding="utf-8"?>
 <p:sld xmlns:a="http://schemas.openxmlformats.org/drawingml/2006/main" xmlns:r="http://schemas.openxmlformats.org/officeDocument/2006/relationships" xmlns:p="http://schemas.openxmlformats.org/presentationml/2006/main">
   <p:cSld>
     <p:bg>
@@ -5104,7 +5196,7 @@
 </p:sld>
 </file>
 
-<file path=ppt/slides/slide28.xml><?xml version="1.0" encoding="utf-8"?>
+<file path=ppt/slides/slide29.xml><?xml version="1.0" encoding="utf-8"?>
 <p:sld xmlns:a="http://schemas.openxmlformats.org/drawingml/2006/main" xmlns:r="http://schemas.openxmlformats.org/officeDocument/2006/relationships" xmlns:p="http://schemas.openxmlformats.org/presentationml/2006/main">
   <p:cSld>
     <p:bg>
@@ -5187,86 +5279,6 @@
     <p:extLst>
       <p:ext uri="{BB962C8B-B14F-4D97-AF65-F5344CB8AC3E}">
         <p14:creationId xmlns:p14="http://schemas.microsoft.com/office/powerpoint/2010/main" val="1274849160"/>
-      </p:ext>
-    </p:extLst>
-  </p:cSld>
-  <p:clrMapOvr>
-    <a:masterClrMapping/>
-  </p:clrMapOvr>
-</p:sld>
-</file>
-
-<file path=ppt/slides/slide29.xml><?xml version="1.0" encoding="utf-8"?>
-<p:sld xmlns:a="http://schemas.openxmlformats.org/drawingml/2006/main" xmlns:r="http://schemas.openxmlformats.org/officeDocument/2006/relationships" xmlns:p="http://schemas.openxmlformats.org/presentationml/2006/main">
-  <p:cSld>
-    <p:bg>
-      <p:bgPr>
-        <a:solidFill>
-          <a:srgbClr val="5C5C5C"/>
-        </a:solidFill>
-        <a:effectLst/>
-      </p:bgPr>
-    </p:bg>
-    <p:spTree>
-      <p:nvGrpSpPr>
-        <p:cNvPr id="1" name=""/>
-        <p:cNvGrpSpPr/>
-        <p:nvPr/>
-      </p:nvGrpSpPr>
-      <p:grpSpPr>
-        <a:xfrm>
-          <a:off x="0" y="0"/>
-          <a:ext cx="0" cy="0"/>
-          <a:chOff x="0" y="0"/>
-          <a:chExt cx="0" cy="0"/>
-        </a:xfrm>
-      </p:grpSpPr>
-      <p:sp>
-        <p:nvSpPr>
-          <p:cNvPr id="5" name="TextBox 4">
-            <a:extLst>
-              <a:ext uri="{FF2B5EF4-FFF2-40B4-BE49-F238E27FC236}">
-                <a16:creationId xmlns:a16="http://schemas.microsoft.com/office/drawing/2014/main" id="{5C3101FE-916F-7AC8-03CF-F8680EC21ADF}"/>
-              </a:ext>
-            </a:extLst>
-          </p:cNvPr>
-          <p:cNvSpPr txBox="1"/>
-          <p:nvPr/>
-        </p:nvSpPr>
-        <p:spPr>
-          <a:xfrm>
-            <a:off x="373856" y="2510165"/>
-            <a:ext cx="11444287" cy="1569660"/>
-          </a:xfrm>
-          <a:prstGeom prst="rect">
-            <a:avLst/>
-          </a:prstGeom>
-          <a:noFill/>
-        </p:spPr>
-        <p:txBody>
-          <a:bodyPr wrap="square" rtlCol="0">
-            <a:spAutoFit/>
-          </a:bodyPr>
-          <a:lstStyle/>
-          <a:p>
-            <a:pPr algn="ctr"/>
-            <a:r>
-              <a:rPr lang="en-CH" sz="9600" dirty="0">
-                <a:solidFill>
-                  <a:schemeClr val="bg1"/>
-                </a:solidFill>
-                <a:latin typeface="Avenir Light" panose="020B0402020203020204" pitchFamily="34" charset="77"/>
-                <a:cs typeface="Arial" panose="020B0604020202020204" pitchFamily="34" charset="0"/>
-              </a:rPr>
-              <a:t>+</a:t>
-            </a:r>
-          </a:p>
-        </p:txBody>
-      </p:sp>
-    </p:spTree>
-    <p:extLst>
-      <p:ext uri="{BB962C8B-B14F-4D97-AF65-F5344CB8AC3E}">
-        <p14:creationId xmlns:p14="http://schemas.microsoft.com/office/powerpoint/2010/main" val="1400167985"/>
       </p:ext>
     </p:extLst>
   </p:cSld>
@@ -5524,6 +5536,86 @@
 <file path=ppt/slides/slide30.xml><?xml version="1.0" encoding="utf-8"?>
 <p:sld xmlns:a="http://schemas.openxmlformats.org/drawingml/2006/main" xmlns:r="http://schemas.openxmlformats.org/officeDocument/2006/relationships" xmlns:p="http://schemas.openxmlformats.org/presentationml/2006/main">
   <p:cSld>
+    <p:bg>
+      <p:bgPr>
+        <a:solidFill>
+          <a:srgbClr val="5C5C5C"/>
+        </a:solidFill>
+        <a:effectLst/>
+      </p:bgPr>
+    </p:bg>
+    <p:spTree>
+      <p:nvGrpSpPr>
+        <p:cNvPr id="1" name=""/>
+        <p:cNvGrpSpPr/>
+        <p:nvPr/>
+      </p:nvGrpSpPr>
+      <p:grpSpPr>
+        <a:xfrm>
+          <a:off x="0" y="0"/>
+          <a:ext cx="0" cy="0"/>
+          <a:chOff x="0" y="0"/>
+          <a:chExt cx="0" cy="0"/>
+        </a:xfrm>
+      </p:grpSpPr>
+      <p:sp>
+        <p:nvSpPr>
+          <p:cNvPr id="5" name="TextBox 4">
+            <a:extLst>
+              <a:ext uri="{FF2B5EF4-FFF2-40B4-BE49-F238E27FC236}">
+                <a16:creationId xmlns:a16="http://schemas.microsoft.com/office/drawing/2014/main" id="{5C3101FE-916F-7AC8-03CF-F8680EC21ADF}"/>
+              </a:ext>
+            </a:extLst>
+          </p:cNvPr>
+          <p:cNvSpPr txBox="1"/>
+          <p:nvPr/>
+        </p:nvSpPr>
+        <p:spPr>
+          <a:xfrm>
+            <a:off x="373856" y="2510165"/>
+            <a:ext cx="11444287" cy="1569660"/>
+          </a:xfrm>
+          <a:prstGeom prst="rect">
+            <a:avLst/>
+          </a:prstGeom>
+          <a:noFill/>
+        </p:spPr>
+        <p:txBody>
+          <a:bodyPr wrap="square" rtlCol="0">
+            <a:spAutoFit/>
+          </a:bodyPr>
+          <a:lstStyle/>
+          <a:p>
+            <a:pPr algn="ctr"/>
+            <a:r>
+              <a:rPr lang="en-CH" sz="9600" dirty="0">
+                <a:solidFill>
+                  <a:schemeClr val="bg1"/>
+                </a:solidFill>
+                <a:latin typeface="Avenir Light" panose="020B0402020203020204" pitchFamily="34" charset="77"/>
+                <a:cs typeface="Arial" panose="020B0604020202020204" pitchFamily="34" charset="0"/>
+              </a:rPr>
+              <a:t>+</a:t>
+            </a:r>
+          </a:p>
+        </p:txBody>
+      </p:sp>
+    </p:spTree>
+    <p:extLst>
+      <p:ext uri="{BB962C8B-B14F-4D97-AF65-F5344CB8AC3E}">
+        <p14:creationId xmlns:p14="http://schemas.microsoft.com/office/powerpoint/2010/main" val="1400167985"/>
+      </p:ext>
+    </p:extLst>
+  </p:cSld>
+  <p:clrMapOvr>
+    <a:masterClrMapping/>
+  </p:clrMapOvr>
+</p:sld>
+</file>
+
+<file path=ppt/slides/slide31.xml><?xml version="1.0" encoding="utf-8"?>
+<p:sld xmlns:a="http://schemas.openxmlformats.org/drawingml/2006/main" xmlns:r="http://schemas.openxmlformats.org/officeDocument/2006/relationships" xmlns:p="http://schemas.openxmlformats.org/presentationml/2006/main">
+  <p:cSld>
     <p:spTree>
       <p:nvGrpSpPr>
         <p:cNvPr id="1" name=""/>
@@ -5588,7 +5680,7 @@
 </p:sld>
 </file>
 
-<file path=ppt/slides/slide31.xml><?xml version="1.0" encoding="utf-8"?>
+<file path=ppt/slides/slide32.xml><?xml version="1.0" encoding="utf-8"?>
 <p:sld xmlns:a="http://schemas.openxmlformats.org/drawingml/2006/main" xmlns:r="http://schemas.openxmlformats.org/officeDocument/2006/relationships" xmlns:p="http://schemas.openxmlformats.org/presentationml/2006/main">
   <p:cSld>
     <p:bg>
@@ -5784,7 +5876,7 @@
 </p:sld>
 </file>
 
-<file path=ppt/slides/slide32.xml><?xml version="1.0" encoding="utf-8"?>
+<file path=ppt/slides/slide33.xml><?xml version="1.0" encoding="utf-8"?>
 <p:sld xmlns:a="http://schemas.openxmlformats.org/drawingml/2006/main" xmlns:r="http://schemas.openxmlformats.org/officeDocument/2006/relationships" xmlns:p="http://schemas.openxmlformats.org/presentationml/2006/main">
   <p:cSld>
     <p:spTree>
@@ -5842,216 +5934,6 @@
     <p:extLst>
       <p:ext uri="{BB962C8B-B14F-4D97-AF65-F5344CB8AC3E}">
         <p14:creationId xmlns:p14="http://schemas.microsoft.com/office/powerpoint/2010/main" val="4119700243"/>
-      </p:ext>
-    </p:extLst>
-  </p:cSld>
-  <p:clrMapOvr>
-    <a:masterClrMapping/>
-  </p:clrMapOvr>
-</p:sld>
-</file>
-
-<file path=ppt/slides/slide33.xml><?xml version="1.0" encoding="utf-8"?>
-<p:sld xmlns:a="http://schemas.openxmlformats.org/drawingml/2006/main" xmlns:r="http://schemas.openxmlformats.org/officeDocument/2006/relationships" xmlns:p="http://schemas.openxmlformats.org/presentationml/2006/main">
-  <p:cSld>
-    <p:bg>
-      <p:bgPr>
-        <a:solidFill>
-          <a:srgbClr val="5C5C5C"/>
-        </a:solidFill>
-        <a:effectLst/>
-      </p:bgPr>
-    </p:bg>
-    <p:spTree>
-      <p:nvGrpSpPr>
-        <p:cNvPr id="1" name=""/>
-        <p:cNvGrpSpPr/>
-        <p:nvPr/>
-      </p:nvGrpSpPr>
-      <p:grpSpPr>
-        <a:xfrm>
-          <a:off x="0" y="0"/>
-          <a:ext cx="0" cy="0"/>
-          <a:chOff x="0" y="0"/>
-          <a:chExt cx="0" cy="0"/>
-        </a:xfrm>
-      </p:grpSpPr>
-      <p:sp>
-        <p:nvSpPr>
-          <p:cNvPr id="5" name="TextBox 4">
-            <a:extLst>
-              <a:ext uri="{FF2B5EF4-FFF2-40B4-BE49-F238E27FC236}">
-                <a16:creationId xmlns:a16="http://schemas.microsoft.com/office/drawing/2014/main" id="{5C3101FE-916F-7AC8-03CF-F8680EC21ADF}"/>
-              </a:ext>
-            </a:extLst>
-          </p:cNvPr>
-          <p:cNvSpPr txBox="1"/>
-          <p:nvPr/>
-        </p:nvSpPr>
-        <p:spPr>
-          <a:xfrm>
-            <a:off x="391886" y="130629"/>
-            <a:ext cx="11614067" cy="4493538"/>
-          </a:xfrm>
-          <a:prstGeom prst="rect">
-            <a:avLst/>
-          </a:prstGeom>
-          <a:noFill/>
-          <a:ln>
-            <a:noFill/>
-          </a:ln>
-        </p:spPr>
-        <p:txBody>
-          <a:bodyPr wrap="square" rtlCol="0">
-            <a:spAutoFit/>
-          </a:bodyPr>
-          <a:lstStyle/>
-          <a:p>
-            <a:endParaRPr lang="en-CH" sz="2200" dirty="0">
-              <a:solidFill>
-                <a:schemeClr val="bg1"/>
-              </a:solidFill>
-              <a:latin typeface="Arial" panose="020B0604020202020204" pitchFamily="34" charset="0"/>
-              <a:cs typeface="Arial" panose="020B0604020202020204" pitchFamily="34" charset="0"/>
-            </a:endParaRPr>
-          </a:p>
-          <a:p>
-            <a:endParaRPr lang="en-CH" sz="2200" dirty="0">
-              <a:solidFill>
-                <a:schemeClr val="bg1"/>
-              </a:solidFill>
-              <a:latin typeface="Arial" panose="020B0604020202020204" pitchFamily="34" charset="0"/>
-              <a:cs typeface="Arial" panose="020B0604020202020204" pitchFamily="34" charset="0"/>
-            </a:endParaRPr>
-          </a:p>
-          <a:p>
-            <a:r>
-              <a:rPr lang="en-CH" sz="2200" dirty="0">
-                <a:solidFill>
-                  <a:schemeClr val="bg1"/>
-                </a:solidFill>
-                <a:latin typeface="Arial" panose="020B0604020202020204" pitchFamily="34" charset="0"/>
-                <a:cs typeface="Arial" panose="020B0604020202020204" pitchFamily="34" charset="0"/>
-              </a:rPr>
-              <a:t>This is the “Smile Prediction” task that you have practiced already.</a:t>
-            </a:r>
-          </a:p>
-          <a:p>
-            <a:endParaRPr lang="en-CH" sz="2200" dirty="0">
-              <a:solidFill>
-                <a:schemeClr val="bg1"/>
-              </a:solidFill>
-              <a:latin typeface="Arial" panose="020B0604020202020204" pitchFamily="34" charset="0"/>
-              <a:cs typeface="Arial" panose="020B0604020202020204" pitchFamily="34" charset="0"/>
-            </a:endParaRPr>
-          </a:p>
-          <a:p>
-            <a:r>
-              <a:rPr lang="en-CH" sz="2200" dirty="0">
-                <a:solidFill>
-                  <a:schemeClr val="bg1"/>
-                </a:solidFill>
-                <a:latin typeface="Arial" panose="020B0604020202020204" pitchFamily="34" charset="0"/>
-                <a:cs typeface="Arial" panose="020B0604020202020204" pitchFamily="34" charset="0"/>
-              </a:rPr>
-              <a:t>During the task you cannot ask any questions. So if you have questions, please ask now.</a:t>
-            </a:r>
-          </a:p>
-          <a:p>
-            <a:pPr marL="342900" indent="-342900">
-              <a:buFont typeface="Arial" panose="020B0604020202020204" pitchFamily="34" charset="0"/>
-              <a:buChar char="•"/>
-            </a:pPr>
-            <a:endParaRPr lang="en-CH" sz="2200" dirty="0">
-              <a:solidFill>
-                <a:schemeClr val="bg1"/>
-              </a:solidFill>
-              <a:latin typeface="Arial" panose="020B0604020202020204" pitchFamily="34" charset="0"/>
-              <a:cs typeface="Arial" panose="020B0604020202020204" pitchFamily="34" charset="0"/>
-            </a:endParaRPr>
-          </a:p>
-          <a:p>
-            <a:r>
-              <a:rPr lang="en-CH" sz="2200" dirty="0">
-                <a:solidFill>
-                  <a:schemeClr val="bg1"/>
-                </a:solidFill>
-                <a:latin typeface="Arial" panose="020B0604020202020204" pitchFamily="34" charset="0"/>
-                <a:cs typeface="Arial" panose="020B0604020202020204" pitchFamily="34" charset="0"/>
-              </a:rPr>
-              <a:t>Because we are recording brain and physiological activity, please move as little as possible. If you move too much (yawning, clenching your fists or yaw, wiggling your toes) the data cannot be used. So if you are uncomfortable, please let us know at this point. </a:t>
-            </a:r>
-          </a:p>
-          <a:p>
-            <a:r>
-              <a:rPr lang="en-CH" sz="2200" dirty="0">
-                <a:solidFill>
-                  <a:schemeClr val="bg1"/>
-                </a:solidFill>
-                <a:latin typeface="Arial" panose="020B0604020202020204" pitchFamily="34" charset="0"/>
-                <a:cs typeface="Arial" panose="020B0604020202020204" pitchFamily="34" charset="0"/>
-              </a:rPr>
-              <a:t>The data quality will be best if you are relaxed and still. Try not to tensen up any muscles, also keep your face relaxed when you are </a:t>
-            </a:r>
-            <a:r>
-              <a:rPr lang="en-CH" sz="2200" u="sng" dirty="0">
-                <a:solidFill>
-                  <a:schemeClr val="bg1"/>
-                </a:solidFill>
-                <a:latin typeface="Arial" panose="020B0604020202020204" pitchFamily="34" charset="0"/>
-                <a:cs typeface="Arial" panose="020B0604020202020204" pitchFamily="34" charset="0"/>
-              </a:rPr>
-              <a:t>not</a:t>
-            </a:r>
-            <a:r>
-              <a:rPr lang="en-CH" sz="2200" dirty="0">
-                <a:solidFill>
-                  <a:schemeClr val="bg1"/>
-                </a:solidFill>
-                <a:latin typeface="Arial" panose="020B0604020202020204" pitchFamily="34" charset="0"/>
-                <a:cs typeface="Arial" panose="020B0604020202020204" pitchFamily="34" charset="0"/>
-              </a:rPr>
-              <a:t> asked to smile. </a:t>
-            </a:r>
-            <a:r>
-              <a:rPr lang="en-CH" sz="2200" dirty="0">
-                <a:solidFill>
-                  <a:schemeClr val="bg1"/>
-                </a:solidFill>
-                <a:latin typeface="Arial" panose="020B0604020202020204" pitchFamily="34" charset="0"/>
-                <a:cs typeface="Arial" panose="020B0604020202020204" pitchFamily="34" charset="0"/>
-                <a:sym typeface="Wingdings" pitchFamily="2" charset="2"/>
-              </a:rPr>
-              <a:t></a:t>
-            </a:r>
-          </a:p>
-          <a:p>
-            <a:endParaRPr lang="en-CH" sz="2200" dirty="0">
-              <a:solidFill>
-                <a:schemeClr val="bg1"/>
-              </a:solidFill>
-              <a:latin typeface="Arial" panose="020B0604020202020204" pitchFamily="34" charset="0"/>
-              <a:cs typeface="Arial" panose="020B0604020202020204" pitchFamily="34" charset="0"/>
-            </a:endParaRPr>
-          </a:p>
-          <a:p>
-            <a:r>
-              <a:rPr lang="en-CH" sz="2200" dirty="0">
-                <a:solidFill>
-                  <a:schemeClr val="bg1"/>
-                </a:solidFill>
-                <a:latin typeface="Arial" panose="020B0604020202020204" pitchFamily="34" charset="0"/>
-                <a:cs typeface="Arial" panose="020B0604020202020204" pitchFamily="34" charset="0"/>
-              </a:rPr>
-              <a:t>The task is going to take about 15 minutes. </a:t>
-            </a:r>
-          </a:p>
-        </p:txBody>
-      </p:sp>
-    </p:spTree>
-    <p:extLst>
-      <p:ext uri="{BB962C8B-B14F-4D97-AF65-F5344CB8AC3E}">
-        <p14:creationId xmlns:p14="http://schemas.microsoft.com/office/powerpoint/2010/main" val="1357929970"/>
       </p:ext>
     </p:extLst>
   </p:cSld>
@@ -6101,7 +5983,7 @@
         <p:spPr>
           <a:xfrm>
             <a:off x="391886" y="130629"/>
-            <a:ext cx="11614067" cy="4124206"/>
+            <a:ext cx="11614067" cy="4493538"/>
           </a:xfrm>
           <a:prstGeom prst="rect">
             <a:avLst/>
@@ -6117,118 +5999,6 @@
           </a:bodyPr>
           <a:lstStyle/>
           <a:p>
-            <a:pPr algn="ctr"/>
-            <a:endParaRPr lang="en-CH" sz="2400" dirty="0">
-              <a:solidFill>
-                <a:schemeClr val="bg1"/>
-              </a:solidFill>
-              <a:latin typeface="Arial" panose="020B0604020202020204" pitchFamily="34" charset="0"/>
-              <a:cs typeface="Arial" panose="020B0604020202020204" pitchFamily="34" charset="0"/>
-            </a:endParaRPr>
-          </a:p>
-          <a:p>
-            <a:pPr algn="ctr"/>
-            <a:endParaRPr lang="en-CH" sz="2400" dirty="0">
-              <a:solidFill>
-                <a:schemeClr val="bg1"/>
-              </a:solidFill>
-              <a:latin typeface="Arial" panose="020B0604020202020204" pitchFamily="34" charset="0"/>
-              <a:cs typeface="Arial" panose="020B0604020202020204" pitchFamily="34" charset="0"/>
-            </a:endParaRPr>
-          </a:p>
-          <a:p>
-            <a:pPr algn="ctr"/>
-            <a:endParaRPr lang="en-CH" sz="2400" dirty="0">
-              <a:solidFill>
-                <a:schemeClr val="bg1"/>
-              </a:solidFill>
-              <a:latin typeface="Arial" panose="020B0604020202020204" pitchFamily="34" charset="0"/>
-              <a:cs typeface="Arial" panose="020B0604020202020204" pitchFamily="34" charset="0"/>
-            </a:endParaRPr>
-          </a:p>
-          <a:p>
-            <a:pPr algn="ctr"/>
-            <a:endParaRPr lang="en-CH" sz="2400" dirty="0">
-              <a:solidFill>
-                <a:schemeClr val="bg1"/>
-              </a:solidFill>
-              <a:latin typeface="Arial" panose="020B0604020202020204" pitchFamily="34" charset="0"/>
-              <a:cs typeface="Arial" panose="020B0604020202020204" pitchFamily="34" charset="0"/>
-            </a:endParaRPr>
-          </a:p>
-          <a:p>
-            <a:pPr algn="ctr"/>
-            <a:endParaRPr lang="en-CH" sz="2400" dirty="0">
-              <a:solidFill>
-                <a:schemeClr val="bg1"/>
-              </a:solidFill>
-              <a:latin typeface="Arial" panose="020B0604020202020204" pitchFamily="34" charset="0"/>
-              <a:cs typeface="Arial" panose="020B0604020202020204" pitchFamily="34" charset="0"/>
-            </a:endParaRPr>
-          </a:p>
-          <a:p>
-            <a:pPr algn="ctr"/>
-            <a:endParaRPr lang="en-CH" sz="2400" dirty="0">
-              <a:solidFill>
-                <a:schemeClr val="bg1"/>
-              </a:solidFill>
-              <a:latin typeface="Arial" panose="020B0604020202020204" pitchFamily="34" charset="0"/>
-              <a:cs typeface="Arial" panose="020B0604020202020204" pitchFamily="34" charset="0"/>
-            </a:endParaRPr>
-          </a:p>
-          <a:p>
-            <a:pPr algn="ctr"/>
-            <a:endParaRPr lang="en-CH" sz="2400" dirty="0">
-              <a:solidFill>
-                <a:schemeClr val="bg1"/>
-              </a:solidFill>
-              <a:latin typeface="Arial" panose="020B0604020202020204" pitchFamily="34" charset="0"/>
-              <a:cs typeface="Arial" panose="020B0604020202020204" pitchFamily="34" charset="0"/>
-            </a:endParaRPr>
-          </a:p>
-          <a:p>
-            <a:pPr algn="ctr"/>
-            <a:endParaRPr lang="en-CH" sz="2400" dirty="0">
-              <a:solidFill>
-                <a:schemeClr val="bg1"/>
-              </a:solidFill>
-              <a:latin typeface="Arial" panose="020B0604020202020204" pitchFamily="34" charset="0"/>
-              <a:cs typeface="Arial" panose="020B0604020202020204" pitchFamily="34" charset="0"/>
-            </a:endParaRPr>
-          </a:p>
-          <a:p>
-            <a:pPr algn="ctr"/>
-            <a:r>
-              <a:rPr lang="en-US" sz="2400" dirty="0">
-                <a:solidFill>
-                  <a:schemeClr val="bg1"/>
-                </a:solidFill>
-                <a:latin typeface="Arial" panose="020B0604020202020204" pitchFamily="34" charset="0"/>
-                <a:cs typeface="Arial" panose="020B0604020202020204" pitchFamily="34" charset="0"/>
-              </a:rPr>
-              <a:t>The </a:t>
-            </a:r>
-            <a:r>
-              <a:rPr lang="en-CH" sz="2400" dirty="0">
-                <a:solidFill>
-                  <a:schemeClr val="bg1"/>
-                </a:solidFill>
-                <a:latin typeface="Arial" panose="020B0604020202020204" pitchFamily="34" charset="0"/>
-                <a:cs typeface="Arial" panose="020B0604020202020204" pitchFamily="34" charset="0"/>
-              </a:rPr>
-              <a:t>task is starting anytime now...</a:t>
-            </a:r>
-          </a:p>
-          <a:p>
-            <a:endParaRPr lang="en-CH" sz="2400" dirty="0">
-              <a:solidFill>
-                <a:schemeClr val="bg1"/>
-              </a:solidFill>
-              <a:latin typeface="Arial" panose="020B0604020202020204" pitchFamily="34" charset="0"/>
-              <a:cs typeface="Arial" panose="020B0604020202020204" pitchFamily="34" charset="0"/>
-            </a:endParaRPr>
-          </a:p>
-          <a:p>
             <a:endParaRPr lang="en-CH" sz="2200" dirty="0">
               <a:solidFill>
                 <a:schemeClr val="bg1"/>
@@ -6237,12 +6007,143 @@
               <a:cs typeface="Arial" panose="020B0604020202020204" pitchFamily="34" charset="0"/>
             </a:endParaRPr>
           </a:p>
+          <a:p>
+            <a:endParaRPr lang="en-CH" sz="2200" dirty="0">
+              <a:solidFill>
+                <a:schemeClr val="bg1"/>
+              </a:solidFill>
+              <a:latin typeface="Arial" panose="020B0604020202020204" pitchFamily="34" charset="0"/>
+              <a:cs typeface="Arial" panose="020B0604020202020204" pitchFamily="34" charset="0"/>
+            </a:endParaRPr>
+          </a:p>
+          <a:p>
+            <a:r>
+              <a:rPr lang="en-CH" sz="2200" dirty="0">
+                <a:solidFill>
+                  <a:schemeClr val="bg1"/>
+                </a:solidFill>
+                <a:latin typeface="Arial" panose="020B0604020202020204" pitchFamily="34" charset="0"/>
+                <a:cs typeface="Arial" panose="020B0604020202020204" pitchFamily="34" charset="0"/>
+              </a:rPr>
+              <a:t>This is the “Smile Prediction” task that you have practiced already.</a:t>
+            </a:r>
+          </a:p>
+          <a:p>
+            <a:endParaRPr lang="en-CH" sz="2200" dirty="0">
+              <a:solidFill>
+                <a:schemeClr val="bg1"/>
+              </a:solidFill>
+              <a:latin typeface="Arial" panose="020B0604020202020204" pitchFamily="34" charset="0"/>
+              <a:cs typeface="Arial" panose="020B0604020202020204" pitchFamily="34" charset="0"/>
+            </a:endParaRPr>
+          </a:p>
+          <a:p>
+            <a:r>
+              <a:rPr lang="en-CH" sz="2200" dirty="0">
+                <a:solidFill>
+                  <a:schemeClr val="bg1"/>
+                </a:solidFill>
+                <a:latin typeface="Arial" panose="020B0604020202020204" pitchFamily="34" charset="0"/>
+                <a:cs typeface="Arial" panose="020B0604020202020204" pitchFamily="34" charset="0"/>
+              </a:rPr>
+              <a:t>During the task you cannot ask any questions. So if you have questions, please ask now.</a:t>
+            </a:r>
+          </a:p>
+          <a:p>
+            <a:pPr marL="342900" indent="-342900">
+              <a:buFont typeface="Arial" panose="020B0604020202020204" pitchFamily="34" charset="0"/>
+              <a:buChar char="•"/>
+            </a:pPr>
+            <a:endParaRPr lang="en-CH" sz="2200" dirty="0">
+              <a:solidFill>
+                <a:schemeClr val="bg1"/>
+              </a:solidFill>
+              <a:latin typeface="Arial" panose="020B0604020202020204" pitchFamily="34" charset="0"/>
+              <a:cs typeface="Arial" panose="020B0604020202020204" pitchFamily="34" charset="0"/>
+            </a:endParaRPr>
+          </a:p>
+          <a:p>
+            <a:r>
+              <a:rPr lang="en-CH" sz="2200" dirty="0">
+                <a:solidFill>
+                  <a:schemeClr val="bg1"/>
+                </a:solidFill>
+                <a:latin typeface="Arial" panose="020B0604020202020204" pitchFamily="34" charset="0"/>
+                <a:cs typeface="Arial" panose="020B0604020202020204" pitchFamily="34" charset="0"/>
+              </a:rPr>
+              <a:t>Because we are recording brain and physiological activity, please move as little as possible. If you move too much (yawning, clenching your fists or yaw, wiggling your toes) the data cannot be used. So if you are uncomfortable, please let us know at this point. </a:t>
+            </a:r>
+          </a:p>
+          <a:p>
+            <a:r>
+              <a:rPr lang="en-CH" sz="2200" dirty="0">
+                <a:solidFill>
+                  <a:schemeClr val="bg1"/>
+                </a:solidFill>
+                <a:latin typeface="Arial" panose="020B0604020202020204" pitchFamily="34" charset="0"/>
+                <a:cs typeface="Arial" panose="020B0604020202020204" pitchFamily="34" charset="0"/>
+              </a:rPr>
+              <a:t>The data quality will be best if you are relaxed and still. Try not to tensen up any muscles, also keep your face relaxed when you are </a:t>
+            </a:r>
+            <a:r>
+              <a:rPr lang="en-CH" sz="2200" u="sng" dirty="0">
+                <a:solidFill>
+                  <a:schemeClr val="bg1"/>
+                </a:solidFill>
+                <a:latin typeface="Arial" panose="020B0604020202020204" pitchFamily="34" charset="0"/>
+                <a:cs typeface="Arial" panose="020B0604020202020204" pitchFamily="34" charset="0"/>
+              </a:rPr>
+              <a:t>not</a:t>
+            </a:r>
+            <a:r>
+              <a:rPr lang="en-CH" sz="2200" dirty="0">
+                <a:solidFill>
+                  <a:schemeClr val="bg1"/>
+                </a:solidFill>
+                <a:latin typeface="Arial" panose="020B0604020202020204" pitchFamily="34" charset="0"/>
+                <a:cs typeface="Arial" panose="020B0604020202020204" pitchFamily="34" charset="0"/>
+              </a:rPr>
+              <a:t> asked to smile. </a:t>
+            </a:r>
+            <a:r>
+              <a:rPr lang="en-CH" sz="2200" dirty="0">
+                <a:solidFill>
+                  <a:schemeClr val="bg1"/>
+                </a:solidFill>
+                <a:latin typeface="Arial" panose="020B0604020202020204" pitchFamily="34" charset="0"/>
+                <a:cs typeface="Arial" panose="020B0604020202020204" pitchFamily="34" charset="0"/>
+                <a:sym typeface="Wingdings" pitchFamily="2" charset="2"/>
+              </a:rPr>
+              <a:t></a:t>
+            </a:r>
+          </a:p>
+          <a:p>
+            <a:endParaRPr lang="en-CH" sz="2200" dirty="0">
+              <a:solidFill>
+                <a:schemeClr val="bg1"/>
+              </a:solidFill>
+              <a:latin typeface="Arial" panose="020B0604020202020204" pitchFamily="34" charset="0"/>
+              <a:cs typeface="Arial" panose="020B0604020202020204" pitchFamily="34" charset="0"/>
+            </a:endParaRPr>
+          </a:p>
+          <a:p>
+            <a:r>
+              <a:rPr lang="en-CH" sz="2200" dirty="0">
+                <a:solidFill>
+                  <a:schemeClr val="bg1"/>
+                </a:solidFill>
+                <a:latin typeface="Arial" panose="020B0604020202020204" pitchFamily="34" charset="0"/>
+                <a:cs typeface="Arial" panose="020B0604020202020204" pitchFamily="34" charset="0"/>
+              </a:rPr>
+              <a:t>The task is going to take about 15 minutes. </a:t>
+            </a:r>
+          </a:p>
         </p:txBody>
       </p:sp>
     </p:spTree>
     <p:extLst>
       <p:ext uri="{BB962C8B-B14F-4D97-AF65-F5344CB8AC3E}">
-        <p14:creationId xmlns:p14="http://schemas.microsoft.com/office/powerpoint/2010/main" val="265753330"/>
+        <p14:creationId xmlns:p14="http://schemas.microsoft.com/office/powerpoint/2010/main" val="1357929970"/>
       </p:ext>
     </p:extLst>
   </p:cSld>
@@ -6279,6 +6180,197 @@
       </p:grpSpPr>
       <p:sp>
         <p:nvSpPr>
+          <p:cNvPr id="5" name="TextBox 4">
+            <a:extLst>
+              <a:ext uri="{FF2B5EF4-FFF2-40B4-BE49-F238E27FC236}">
+                <a16:creationId xmlns:a16="http://schemas.microsoft.com/office/drawing/2014/main" id="{5C3101FE-916F-7AC8-03CF-F8680EC21ADF}"/>
+              </a:ext>
+            </a:extLst>
+          </p:cNvPr>
+          <p:cNvSpPr txBox="1"/>
+          <p:nvPr/>
+        </p:nvSpPr>
+        <p:spPr>
+          <a:xfrm>
+            <a:off x="391886" y="130629"/>
+            <a:ext cx="11614067" cy="4124206"/>
+          </a:xfrm>
+          <a:prstGeom prst="rect">
+            <a:avLst/>
+          </a:prstGeom>
+          <a:noFill/>
+          <a:ln>
+            <a:noFill/>
+          </a:ln>
+        </p:spPr>
+        <p:txBody>
+          <a:bodyPr wrap="square" rtlCol="0">
+            <a:spAutoFit/>
+          </a:bodyPr>
+          <a:lstStyle/>
+          <a:p>
+            <a:pPr algn="ctr"/>
+            <a:endParaRPr lang="en-CH" sz="2400" dirty="0">
+              <a:solidFill>
+                <a:schemeClr val="bg1"/>
+              </a:solidFill>
+              <a:latin typeface="Arial" panose="020B0604020202020204" pitchFamily="34" charset="0"/>
+              <a:cs typeface="Arial" panose="020B0604020202020204" pitchFamily="34" charset="0"/>
+            </a:endParaRPr>
+          </a:p>
+          <a:p>
+            <a:pPr algn="ctr"/>
+            <a:endParaRPr lang="en-CH" sz="2400" dirty="0">
+              <a:solidFill>
+                <a:schemeClr val="bg1"/>
+              </a:solidFill>
+              <a:latin typeface="Arial" panose="020B0604020202020204" pitchFamily="34" charset="0"/>
+              <a:cs typeface="Arial" panose="020B0604020202020204" pitchFamily="34" charset="0"/>
+            </a:endParaRPr>
+          </a:p>
+          <a:p>
+            <a:pPr algn="ctr"/>
+            <a:endParaRPr lang="en-CH" sz="2400" dirty="0">
+              <a:solidFill>
+                <a:schemeClr val="bg1"/>
+              </a:solidFill>
+              <a:latin typeface="Arial" panose="020B0604020202020204" pitchFamily="34" charset="0"/>
+              <a:cs typeface="Arial" panose="020B0604020202020204" pitchFamily="34" charset="0"/>
+            </a:endParaRPr>
+          </a:p>
+          <a:p>
+            <a:pPr algn="ctr"/>
+            <a:endParaRPr lang="en-CH" sz="2400" dirty="0">
+              <a:solidFill>
+                <a:schemeClr val="bg1"/>
+              </a:solidFill>
+              <a:latin typeface="Arial" panose="020B0604020202020204" pitchFamily="34" charset="0"/>
+              <a:cs typeface="Arial" panose="020B0604020202020204" pitchFamily="34" charset="0"/>
+            </a:endParaRPr>
+          </a:p>
+          <a:p>
+            <a:pPr algn="ctr"/>
+            <a:endParaRPr lang="en-CH" sz="2400" dirty="0">
+              <a:solidFill>
+                <a:schemeClr val="bg1"/>
+              </a:solidFill>
+              <a:latin typeface="Arial" panose="020B0604020202020204" pitchFamily="34" charset="0"/>
+              <a:cs typeface="Arial" panose="020B0604020202020204" pitchFamily="34" charset="0"/>
+            </a:endParaRPr>
+          </a:p>
+          <a:p>
+            <a:pPr algn="ctr"/>
+            <a:endParaRPr lang="en-CH" sz="2400" dirty="0">
+              <a:solidFill>
+                <a:schemeClr val="bg1"/>
+              </a:solidFill>
+              <a:latin typeface="Arial" panose="020B0604020202020204" pitchFamily="34" charset="0"/>
+              <a:cs typeface="Arial" panose="020B0604020202020204" pitchFamily="34" charset="0"/>
+            </a:endParaRPr>
+          </a:p>
+          <a:p>
+            <a:pPr algn="ctr"/>
+            <a:endParaRPr lang="en-CH" sz="2400" dirty="0">
+              <a:solidFill>
+                <a:schemeClr val="bg1"/>
+              </a:solidFill>
+              <a:latin typeface="Arial" panose="020B0604020202020204" pitchFamily="34" charset="0"/>
+              <a:cs typeface="Arial" panose="020B0604020202020204" pitchFamily="34" charset="0"/>
+            </a:endParaRPr>
+          </a:p>
+          <a:p>
+            <a:pPr algn="ctr"/>
+            <a:endParaRPr lang="en-CH" sz="2400" dirty="0">
+              <a:solidFill>
+                <a:schemeClr val="bg1"/>
+              </a:solidFill>
+              <a:latin typeface="Arial" panose="020B0604020202020204" pitchFamily="34" charset="0"/>
+              <a:cs typeface="Arial" panose="020B0604020202020204" pitchFamily="34" charset="0"/>
+            </a:endParaRPr>
+          </a:p>
+          <a:p>
+            <a:pPr algn="ctr"/>
+            <a:r>
+              <a:rPr lang="en-US" sz="2400" dirty="0">
+                <a:solidFill>
+                  <a:schemeClr val="bg1"/>
+                </a:solidFill>
+                <a:latin typeface="Arial" panose="020B0604020202020204" pitchFamily="34" charset="0"/>
+                <a:cs typeface="Arial" panose="020B0604020202020204" pitchFamily="34" charset="0"/>
+              </a:rPr>
+              <a:t>The </a:t>
+            </a:r>
+            <a:r>
+              <a:rPr lang="en-CH" sz="2400" dirty="0">
+                <a:solidFill>
+                  <a:schemeClr val="bg1"/>
+                </a:solidFill>
+                <a:latin typeface="Arial" panose="020B0604020202020204" pitchFamily="34" charset="0"/>
+                <a:cs typeface="Arial" panose="020B0604020202020204" pitchFamily="34" charset="0"/>
+              </a:rPr>
+              <a:t>task is starting anytime now...</a:t>
+            </a:r>
+          </a:p>
+          <a:p>
+            <a:endParaRPr lang="en-CH" sz="2400" dirty="0">
+              <a:solidFill>
+                <a:schemeClr val="bg1"/>
+              </a:solidFill>
+              <a:latin typeface="Arial" panose="020B0604020202020204" pitchFamily="34" charset="0"/>
+              <a:cs typeface="Arial" panose="020B0604020202020204" pitchFamily="34" charset="0"/>
+            </a:endParaRPr>
+          </a:p>
+          <a:p>
+            <a:endParaRPr lang="en-CH" sz="2200" dirty="0">
+              <a:solidFill>
+                <a:schemeClr val="bg1"/>
+              </a:solidFill>
+              <a:latin typeface="Arial" panose="020B0604020202020204" pitchFamily="34" charset="0"/>
+              <a:cs typeface="Arial" panose="020B0604020202020204" pitchFamily="34" charset="0"/>
+            </a:endParaRPr>
+          </a:p>
+        </p:txBody>
+      </p:sp>
+    </p:spTree>
+    <p:extLst>
+      <p:ext uri="{BB962C8B-B14F-4D97-AF65-F5344CB8AC3E}">
+        <p14:creationId xmlns:p14="http://schemas.microsoft.com/office/powerpoint/2010/main" val="265753330"/>
+      </p:ext>
+    </p:extLst>
+  </p:cSld>
+  <p:clrMapOvr>
+    <a:masterClrMapping/>
+  </p:clrMapOvr>
+</p:sld>
+</file>
+
+<file path=ppt/slides/slide36.xml><?xml version="1.0" encoding="utf-8"?>
+<p:sld xmlns:a="http://schemas.openxmlformats.org/drawingml/2006/main" xmlns:r="http://schemas.openxmlformats.org/officeDocument/2006/relationships" xmlns:p="http://schemas.openxmlformats.org/presentationml/2006/main">
+  <p:cSld>
+    <p:bg>
+      <p:bgPr>
+        <a:solidFill>
+          <a:srgbClr val="5C5C5C"/>
+        </a:solidFill>
+        <a:effectLst/>
+      </p:bgPr>
+    </p:bg>
+    <p:spTree>
+      <p:nvGrpSpPr>
+        <p:cNvPr id="1" name=""/>
+        <p:cNvGrpSpPr/>
+        <p:nvPr/>
+      </p:nvGrpSpPr>
+      <p:grpSpPr>
+        <a:xfrm>
+          <a:off x="0" y="0"/>
+          <a:ext cx="0" cy="0"/>
+          <a:chOff x="0" y="0"/>
+          <a:chExt cx="0" cy="0"/>
+        </a:xfrm>
+      </p:grpSpPr>
+      <p:sp>
+        <p:nvSpPr>
           <p:cNvPr id="6" name="TextBox 5">
             <a:extLst>
               <a:ext uri="{FF2B5EF4-FFF2-40B4-BE49-F238E27FC236}">
@@ -6332,7 +6424,7 @@
 </p:sld>
 </file>
 
-<file path=ppt/slides/slide36.xml><?xml version="1.0" encoding="utf-8"?>
+<file path=ppt/slides/slide37.xml><?xml version="1.0" encoding="utf-8"?>
 <p:sld xmlns:a="http://schemas.openxmlformats.org/drawingml/2006/main" xmlns:r="http://schemas.openxmlformats.org/officeDocument/2006/relationships" xmlns:p="http://schemas.openxmlformats.org/presentationml/2006/main">
   <p:cSld>
     <p:bg>
@@ -6601,6 +6693,188 @@
     </p:bg>
     <p:spTree>
       <p:nvGrpSpPr>
+        <p:cNvPr id="1" name="">
+          <a:extLst>
+            <a:ext uri="{FF2B5EF4-FFF2-40B4-BE49-F238E27FC236}">
+              <a16:creationId xmlns:a16="http://schemas.microsoft.com/office/drawing/2014/main" id="{D4D051F3-1788-BF72-16A5-F9D6857A8A5F}"/>
+            </a:ext>
+          </a:extLst>
+        </p:cNvPr>
+        <p:cNvGrpSpPr/>
+        <p:nvPr/>
+      </p:nvGrpSpPr>
+      <p:grpSpPr>
+        <a:xfrm>
+          <a:off x="0" y="0"/>
+          <a:ext cx="0" cy="0"/>
+          <a:chOff x="0" y="0"/>
+          <a:chExt cx="0" cy="0"/>
+        </a:xfrm>
+      </p:grpSpPr>
+      <p:sp>
+        <p:nvSpPr>
+          <p:cNvPr id="5" name="TextBox 4">
+            <a:extLst>
+              <a:ext uri="{FF2B5EF4-FFF2-40B4-BE49-F238E27FC236}">
+                <a16:creationId xmlns:a16="http://schemas.microsoft.com/office/drawing/2014/main" id="{9098FAC1-F948-F219-35E8-6769CCB8F4F5}"/>
+              </a:ext>
+            </a:extLst>
+          </p:cNvPr>
+          <p:cNvSpPr txBox="1"/>
+          <p:nvPr/>
+        </p:nvSpPr>
+        <p:spPr>
+          <a:xfrm>
+            <a:off x="391886" y="130629"/>
+            <a:ext cx="11614067" cy="4555093"/>
+          </a:xfrm>
+          <a:prstGeom prst="rect">
+            <a:avLst/>
+          </a:prstGeom>
+          <a:noFill/>
+          <a:ln>
+            <a:noFill/>
+          </a:ln>
+        </p:spPr>
+        <p:txBody>
+          <a:bodyPr wrap="square" rtlCol="0">
+            <a:spAutoFit/>
+          </a:bodyPr>
+          <a:lstStyle/>
+          <a:p>
+            <a:pPr algn="ctr"/>
+            <a:r>
+              <a:rPr lang="en-CH" sz="2400" dirty="0">
+                <a:solidFill>
+                  <a:schemeClr val="bg1"/>
+                </a:solidFill>
+                <a:latin typeface="Arial" panose="020B0604020202020204" pitchFamily="34" charset="0"/>
+                <a:cs typeface="Arial" panose="020B0604020202020204" pitchFamily="34" charset="0"/>
+              </a:rPr>
+              <a:t>POINTS</a:t>
+            </a:r>
+          </a:p>
+          <a:p>
+            <a:endParaRPr lang="en-CH" sz="2400" dirty="0">
+              <a:solidFill>
+                <a:schemeClr val="bg1"/>
+              </a:solidFill>
+              <a:latin typeface="Arial" panose="020B0604020202020204" pitchFamily="34" charset="0"/>
+              <a:cs typeface="Arial" panose="020B0604020202020204" pitchFamily="34" charset="0"/>
+            </a:endParaRPr>
+          </a:p>
+          <a:p>
+            <a:r>
+              <a:rPr lang="en-CH" sz="2200" dirty="0">
+                <a:solidFill>
+                  <a:schemeClr val="bg1"/>
+                </a:solidFill>
+                <a:latin typeface="Arial" panose="020B0604020202020204" pitchFamily="34" charset="0"/>
+                <a:cs typeface="Arial" panose="020B0604020202020204" pitchFamily="34" charset="0"/>
+              </a:rPr>
+              <a:t>If you predict accurately and smile at faces that smile back and stay neutral with faces that don’t smile back you will make points.</a:t>
+            </a:r>
+          </a:p>
+          <a:p>
+            <a:endParaRPr lang="en-CH" sz="2200" dirty="0">
+              <a:solidFill>
+                <a:schemeClr val="bg1"/>
+              </a:solidFill>
+              <a:latin typeface="Arial" panose="020B0604020202020204" pitchFamily="34" charset="0"/>
+              <a:cs typeface="Arial" panose="020B0604020202020204" pitchFamily="34" charset="0"/>
+            </a:endParaRPr>
+          </a:p>
+          <a:p>
+            <a:r>
+              <a:rPr lang="en-CH" sz="2200" dirty="0">
+                <a:solidFill>
+                  <a:schemeClr val="bg1"/>
+                </a:solidFill>
+                <a:latin typeface="Arial" panose="020B0604020202020204" pitchFamily="34" charset="0"/>
+                <a:cs typeface="Arial" panose="020B0604020202020204" pitchFamily="34" charset="0"/>
+              </a:rPr>
+              <a:t>If you can reach 40 points across all tasks you will earn an additional 5$ on top of the participation reimbursement.</a:t>
+            </a:r>
+          </a:p>
+          <a:p>
+            <a:endParaRPr lang="en-CH" sz="2200" dirty="0">
+              <a:solidFill>
+                <a:schemeClr val="bg1"/>
+              </a:solidFill>
+              <a:latin typeface="Arial" panose="020B0604020202020204" pitchFamily="34" charset="0"/>
+              <a:cs typeface="Arial" panose="020B0604020202020204" pitchFamily="34" charset="0"/>
+            </a:endParaRPr>
+          </a:p>
+          <a:p>
+            <a:r>
+              <a:rPr lang="en-CH" sz="2200" dirty="0">
+                <a:solidFill>
+                  <a:schemeClr val="bg1"/>
+                </a:solidFill>
+                <a:latin typeface="Arial" panose="020B0604020202020204" pitchFamily="34" charset="0"/>
+                <a:cs typeface="Arial" panose="020B0604020202020204" pitchFamily="34" charset="0"/>
+              </a:rPr>
+              <a:t>If you reach 80 points across all tasks you will earn an additional 5$ on top of the participation reimbursement and the 40-point bonus.</a:t>
+            </a:r>
+          </a:p>
+          <a:p>
+            <a:endParaRPr lang="en-CH" sz="2200" dirty="0">
+              <a:solidFill>
+                <a:schemeClr val="bg1"/>
+              </a:solidFill>
+              <a:latin typeface="Arial" panose="020B0604020202020204" pitchFamily="34" charset="0"/>
+              <a:cs typeface="Arial" panose="020B0604020202020204" pitchFamily="34" charset="0"/>
+            </a:endParaRPr>
+          </a:p>
+          <a:p>
+            <a:r>
+              <a:rPr lang="en-CH" sz="2200" dirty="0">
+                <a:solidFill>
+                  <a:schemeClr val="bg1"/>
+                </a:solidFill>
+                <a:latin typeface="Arial" panose="020B0604020202020204" pitchFamily="34" charset="0"/>
+                <a:cs typeface="Arial" panose="020B0604020202020204" pitchFamily="34" charset="0"/>
+              </a:rPr>
+              <a:t>After each task you will learn how many points you collected.</a:t>
+            </a:r>
+          </a:p>
+          <a:p>
+            <a:endParaRPr lang="en-CH" sz="2200" dirty="0">
+              <a:solidFill>
+                <a:schemeClr val="bg1"/>
+              </a:solidFill>
+              <a:latin typeface="Arial" panose="020B0604020202020204" pitchFamily="34" charset="0"/>
+              <a:cs typeface="Arial" panose="020B0604020202020204" pitchFamily="34" charset="0"/>
+            </a:endParaRPr>
+          </a:p>
+        </p:txBody>
+      </p:sp>
+    </p:spTree>
+    <p:extLst>
+      <p:ext uri="{BB962C8B-B14F-4D97-AF65-F5344CB8AC3E}">
+        <p14:creationId xmlns:p14="http://schemas.microsoft.com/office/powerpoint/2010/main" val="1720765381"/>
+      </p:ext>
+    </p:extLst>
+  </p:cSld>
+  <p:clrMapOvr>
+    <a:masterClrMapping/>
+  </p:clrMapOvr>
+</p:sld>
+</file>
+
+<file path=ppt/slides/slide6.xml><?xml version="1.0" encoding="utf-8"?>
+<p:sld xmlns:a="http://schemas.openxmlformats.org/drawingml/2006/main" xmlns:r="http://schemas.openxmlformats.org/officeDocument/2006/relationships" xmlns:p="http://schemas.openxmlformats.org/presentationml/2006/main">
+  <p:cSld>
+    <p:bg>
+      <p:bgPr>
+        <a:solidFill>
+          <a:srgbClr val="5C5C5C"/>
+        </a:solidFill>
+        <a:effectLst/>
+      </p:bgPr>
+    </p:bg>
+    <p:spTree>
+      <p:nvGrpSpPr>
         <p:cNvPr id="1" name=""/>
         <p:cNvGrpSpPr/>
         <p:nvPr/>
@@ -6673,7 +6947,7 @@
 </p:sld>
 </file>
 
-<file path=ppt/slides/slide6.xml><?xml version="1.0" encoding="utf-8"?>
+<file path=ppt/slides/slide7.xml><?xml version="1.0" encoding="utf-8"?>
 <p:sld xmlns:a="http://schemas.openxmlformats.org/drawingml/2006/main" xmlns:r="http://schemas.openxmlformats.org/officeDocument/2006/relationships" xmlns:p="http://schemas.openxmlformats.org/presentationml/2006/main">
   <p:cSld>
     <p:bg>
@@ -6757,90 +7031,6 @@
     <p:extLst>
       <p:ext uri="{BB962C8B-B14F-4D97-AF65-F5344CB8AC3E}">
         <p14:creationId xmlns:p14="http://schemas.microsoft.com/office/powerpoint/2010/main" val="1890130128"/>
-      </p:ext>
-    </p:extLst>
-  </p:cSld>
-  <p:clrMapOvr>
-    <a:masterClrMapping/>
-  </p:clrMapOvr>
-</p:sld>
-</file>
-
-<file path=ppt/slides/slide7.xml><?xml version="1.0" encoding="utf-8"?>
-<p:sld xmlns:a="http://schemas.openxmlformats.org/drawingml/2006/main" xmlns:r="http://schemas.openxmlformats.org/officeDocument/2006/relationships" xmlns:p="http://schemas.openxmlformats.org/presentationml/2006/main">
-  <p:cSld>
-    <p:bg>
-      <p:bgPr>
-        <a:solidFill>
-          <a:srgbClr val="5C5C5C"/>
-        </a:solidFill>
-        <a:effectLst/>
-      </p:bgPr>
-    </p:bg>
-    <p:spTree>
-      <p:nvGrpSpPr>
-        <p:cNvPr id="1" name=""/>
-        <p:cNvGrpSpPr/>
-        <p:nvPr/>
-      </p:nvGrpSpPr>
-      <p:grpSpPr>
-        <a:xfrm>
-          <a:off x="0" y="0"/>
-          <a:ext cx="0" cy="0"/>
-          <a:chOff x="0" y="0"/>
-          <a:chExt cx="0" cy="0"/>
-        </a:xfrm>
-      </p:grpSpPr>
-      <p:pic>
-        <p:nvPicPr>
-          <p:cNvPr id="3" name="Picture 2">
-            <a:extLst>
-              <a:ext uri="{FF2B5EF4-FFF2-40B4-BE49-F238E27FC236}">
-                <a16:creationId xmlns:a16="http://schemas.microsoft.com/office/drawing/2014/main" id="{F19FD08C-73E1-7B9E-6DEC-32BF3283A1A4}"/>
-              </a:ext>
-            </a:extLst>
-          </p:cNvPr>
-          <p:cNvPicPr>
-            <a:picLocks noChangeAspect="1"/>
-          </p:cNvPicPr>
-          <p:nvPr/>
-        </p:nvPicPr>
-        <p:blipFill>
-          <a:blip r:embed="rId2">
-            <a:extLst>
-              <a:ext uri="{BEBA8EAE-BF5A-486C-A8C5-ECC9F3942E4B}">
-                <a14:imgProps xmlns:a14="http://schemas.microsoft.com/office/drawing/2010/main">
-                  <a14:imgLayer r:embed="rId3">
-                    <a14:imgEffect>
-                      <a14:backgroundRemoval t="4095" b="95043" l="9704" r="89803">
-                        <a14:foregroundMark x1="44572" y1="13578" x2="44572" y2="13578"/>
-                        <a14:foregroundMark x1="48849" y1="4310" x2="48849" y2="4310"/>
-                        <a14:foregroundMark x1="52632" y1="95043" x2="52632" y2="95043"/>
-                      </a14:backgroundRemoval>
-                    </a14:imgEffect>
-                  </a14:imgLayer>
-                </a14:imgProps>
-              </a:ext>
-            </a:extLst>
-          </a:blip>
-          <a:stretch>
-            <a:fillRect/>
-          </a:stretch>
-        </p:blipFill>
-        <p:spPr>
-          <a:xfrm>
-            <a:off x="3501517" y="1449000"/>
-            <a:ext cx="5188966" cy="3960000"/>
-          </a:xfrm>
-          <a:prstGeom prst="rect">
-            <a:avLst/>
-          </a:prstGeom>
-        </p:spPr>
-      </p:pic>
-    </p:spTree>
-    <p:extLst>
-      <p:ext uri="{BB962C8B-B14F-4D97-AF65-F5344CB8AC3E}">
-        <p14:creationId xmlns:p14="http://schemas.microsoft.com/office/powerpoint/2010/main" val="1971449608"/>
       </p:ext>
     </p:extLst>
   </p:cSld>
@@ -6880,7 +7070,7 @@
           <p:cNvPr id="3" name="Picture 2">
             <a:extLst>
               <a:ext uri="{FF2B5EF4-FFF2-40B4-BE49-F238E27FC236}">
-                <a16:creationId xmlns:a16="http://schemas.microsoft.com/office/drawing/2014/main" id="{08526774-AD3D-A2BF-8B22-289424073E47}"/>
+                <a16:creationId xmlns:a16="http://schemas.microsoft.com/office/drawing/2014/main" id="{F19FD08C-73E1-7B9E-6DEC-32BF3283A1A4}"/>
               </a:ext>
             </a:extLst>
           </p:cNvPr>
@@ -6896,10 +7086,10 @@
                 <a14:imgProps xmlns:a14="http://schemas.microsoft.com/office/drawing/2010/main">
                   <a14:imgLayer r:embed="rId3">
                     <a14:imgEffect>
-                      <a14:backgroundRemoval t="3664" b="95905" l="9704" r="89803">
-                        <a14:foregroundMark x1="47368" y1="15302" x2="47368" y2="15302"/>
-                        <a14:foregroundMark x1="49507" y1="3879" x2="49507" y2="3879"/>
-                        <a14:foregroundMark x1="52467" y1="95905" x2="52467" y2="95905"/>
+                      <a14:backgroundRemoval t="4095" b="95043" l="9704" r="89803">
+                        <a14:foregroundMark x1="44572" y1="13578" x2="44572" y2="13578"/>
+                        <a14:foregroundMark x1="48849" y1="4310" x2="48849" y2="4310"/>
+                        <a14:foregroundMark x1="52632" y1="95043" x2="52632" y2="95043"/>
                       </a14:backgroundRemoval>
                     </a14:imgEffect>
                   </a14:imgLayer>
@@ -6924,7 +7114,7 @@
     </p:spTree>
     <p:extLst>
       <p:ext uri="{BB962C8B-B14F-4D97-AF65-F5344CB8AC3E}">
-        <p14:creationId xmlns:p14="http://schemas.microsoft.com/office/powerpoint/2010/main" val="4139463847"/>
+        <p14:creationId xmlns:p14="http://schemas.microsoft.com/office/powerpoint/2010/main" val="1971449608"/>
       </p:ext>
     </p:extLst>
   </p:cSld>
@@ -6947,13 +7137,7 @@
     </p:bg>
     <p:spTree>
       <p:nvGrpSpPr>
-        <p:cNvPr id="1" name="">
-          <a:extLst>
-            <a:ext uri="{FF2B5EF4-FFF2-40B4-BE49-F238E27FC236}">
-              <a16:creationId xmlns:a16="http://schemas.microsoft.com/office/drawing/2014/main" id="{58362876-6F74-6E63-CF52-920E19E230DA}"/>
-            </a:ext>
-          </a:extLst>
-        </p:cNvPr>
+        <p:cNvPr id="1" name=""/>
         <p:cNvGrpSpPr/>
         <p:nvPr/>
       </p:nvGrpSpPr>
@@ -6967,10 +7151,10 @@
       </p:grpSpPr>
       <p:pic>
         <p:nvPicPr>
-          <p:cNvPr id="4" name="Picture 3">
-            <a:extLst>
-              <a:ext uri="{FF2B5EF4-FFF2-40B4-BE49-F238E27FC236}">
-                <a16:creationId xmlns:a16="http://schemas.microsoft.com/office/drawing/2014/main" id="{34157AAE-2B20-D88F-D95B-3AD9283E705D}"/>
+          <p:cNvPr id="3" name="Picture 2">
+            <a:extLst>
+              <a:ext uri="{FF2B5EF4-FFF2-40B4-BE49-F238E27FC236}">
+                <a16:creationId xmlns:a16="http://schemas.microsoft.com/office/drawing/2014/main" id="{08526774-AD3D-A2BF-8B22-289424073E47}"/>
               </a:ext>
             </a:extLst>
           </p:cNvPr>
@@ -6986,11 +7170,10 @@
                 <a14:imgProps xmlns:a14="http://schemas.microsoft.com/office/drawing/2010/main">
                   <a14:imgLayer r:embed="rId3">
                     <a14:imgEffect>
-                      <a14:backgroundRemoval t="3664" b="98922" l="9704" r="89803">
-                        <a14:foregroundMark x1="45888" y1="12716" x2="45888" y2="12716"/>
-                        <a14:foregroundMark x1="48026" y1="3879" x2="48026" y2="3879"/>
-                        <a14:foregroundMark x1="52796" y1="93103" x2="52796" y2="93103"/>
-                        <a14:foregroundMark x1="50164" y1="98922" x2="50164" y2="98922"/>
+                      <a14:backgroundRemoval t="3664" b="95905" l="9704" r="89803">
+                        <a14:foregroundMark x1="47368" y1="15302" x2="47368" y2="15302"/>
+                        <a14:foregroundMark x1="49507" y1="3879" x2="49507" y2="3879"/>
+                        <a14:foregroundMark x1="52467" y1="95905" x2="52467" y2="95905"/>
                       </a14:backgroundRemoval>
                     </a14:imgEffect>
                   </a14:imgLayer>
@@ -7015,7 +7198,7 @@
     </p:spTree>
     <p:extLst>
       <p:ext uri="{BB962C8B-B14F-4D97-AF65-F5344CB8AC3E}">
-        <p14:creationId xmlns:p14="http://schemas.microsoft.com/office/powerpoint/2010/main" val="2463032928"/>
+        <p14:creationId xmlns:p14="http://schemas.microsoft.com/office/powerpoint/2010/main" val="4139463847"/>
       </p:ext>
     </p:extLst>
   </p:cSld>

</xml_diff>

<commit_message>
amended intro stimuli for task version without sliding bar question
</commit_message>
<xml_diff>
--- a/task/stimuli/originals_SAP_Task.pptx
+++ b/task/stimuli/originals_SAP_Task.pptx
@@ -297,7 +297,7 @@
           <a:p>
             <a:fld id="{9B916260-F45C-B647-88A4-C91F6BA5DC4E}" type="datetimeFigureOut">
               <a:rPr lang="en-CH" smtClean="0"/>
-              <a:t>14.11.24</a:t>
+              <a:t>25.11.24</a:t>
             </a:fld>
             <a:endParaRPr lang="en-CH"/>
           </a:p>
@@ -497,7 +497,7 @@
           <a:p>
             <a:fld id="{9B916260-F45C-B647-88A4-C91F6BA5DC4E}" type="datetimeFigureOut">
               <a:rPr lang="en-CH" smtClean="0"/>
-              <a:t>14.11.24</a:t>
+              <a:t>25.11.24</a:t>
             </a:fld>
             <a:endParaRPr lang="en-CH"/>
           </a:p>
@@ -707,7 +707,7 @@
           <a:p>
             <a:fld id="{9B916260-F45C-B647-88A4-C91F6BA5DC4E}" type="datetimeFigureOut">
               <a:rPr lang="en-CH" smtClean="0"/>
-              <a:t>14.11.24</a:t>
+              <a:t>25.11.24</a:t>
             </a:fld>
             <a:endParaRPr lang="en-CH"/>
           </a:p>
@@ -907,7 +907,7 @@
           <a:p>
             <a:fld id="{9B916260-F45C-B647-88A4-C91F6BA5DC4E}" type="datetimeFigureOut">
               <a:rPr lang="en-CH" smtClean="0"/>
-              <a:t>14.11.24</a:t>
+              <a:t>25.11.24</a:t>
             </a:fld>
             <a:endParaRPr lang="en-CH"/>
           </a:p>
@@ -1183,7 +1183,7 @@
           <a:p>
             <a:fld id="{9B916260-F45C-B647-88A4-C91F6BA5DC4E}" type="datetimeFigureOut">
               <a:rPr lang="en-CH" smtClean="0"/>
-              <a:t>14.11.24</a:t>
+              <a:t>25.11.24</a:t>
             </a:fld>
             <a:endParaRPr lang="en-CH"/>
           </a:p>
@@ -1451,7 +1451,7 @@
           <a:p>
             <a:fld id="{9B916260-F45C-B647-88A4-C91F6BA5DC4E}" type="datetimeFigureOut">
               <a:rPr lang="en-CH" smtClean="0"/>
-              <a:t>14.11.24</a:t>
+              <a:t>25.11.24</a:t>
             </a:fld>
             <a:endParaRPr lang="en-CH"/>
           </a:p>
@@ -1866,7 +1866,7 @@
           <a:p>
             <a:fld id="{9B916260-F45C-B647-88A4-C91F6BA5DC4E}" type="datetimeFigureOut">
               <a:rPr lang="en-CH" smtClean="0"/>
-              <a:t>14.11.24</a:t>
+              <a:t>25.11.24</a:t>
             </a:fld>
             <a:endParaRPr lang="en-CH"/>
           </a:p>
@@ -2008,7 +2008,7 @@
           <a:p>
             <a:fld id="{9B916260-F45C-B647-88A4-C91F6BA5DC4E}" type="datetimeFigureOut">
               <a:rPr lang="en-CH" smtClean="0"/>
-              <a:t>14.11.24</a:t>
+              <a:t>25.11.24</a:t>
             </a:fld>
             <a:endParaRPr lang="en-CH"/>
           </a:p>
@@ -2121,7 +2121,7 @@
           <a:p>
             <a:fld id="{9B916260-F45C-B647-88A4-C91F6BA5DC4E}" type="datetimeFigureOut">
               <a:rPr lang="en-CH" smtClean="0"/>
-              <a:t>14.11.24</a:t>
+              <a:t>25.11.24</a:t>
             </a:fld>
             <a:endParaRPr lang="en-CH"/>
           </a:p>
@@ -2434,7 +2434,7 @@
           <a:p>
             <a:fld id="{9B916260-F45C-B647-88A4-C91F6BA5DC4E}" type="datetimeFigureOut">
               <a:rPr lang="en-CH" smtClean="0"/>
-              <a:t>14.11.24</a:t>
+              <a:t>25.11.24</a:t>
             </a:fld>
             <a:endParaRPr lang="en-CH"/>
           </a:p>
@@ -2723,7 +2723,7 @@
           <a:p>
             <a:fld id="{9B916260-F45C-B647-88A4-C91F6BA5DC4E}" type="datetimeFigureOut">
               <a:rPr lang="en-CH" smtClean="0"/>
-              <a:t>14.11.24</a:t>
+              <a:t>25.11.24</a:t>
             </a:fld>
             <a:endParaRPr lang="en-CH"/>
           </a:p>
@@ -2966,7 +2966,7 @@
           <a:p>
             <a:fld id="{9B916260-F45C-B647-88A4-C91F6BA5DC4E}" type="datetimeFigureOut">
               <a:rPr lang="en-CH" smtClean="0"/>
-              <a:t>14.11.24</a:t>
+              <a:t>25.11.24</a:t>
             </a:fld>
             <a:endParaRPr lang="en-CH"/>
           </a:p>
@@ -5328,7 +5328,7 @@
         <p:spPr>
           <a:xfrm>
             <a:off x="391886" y="130629"/>
-            <a:ext cx="11614067" cy="5663089"/>
+            <a:ext cx="11614067" cy="5170646"/>
           </a:xfrm>
           <a:prstGeom prst="rect">
             <a:avLst/>
@@ -5438,7 +5438,7 @@
                 <a:latin typeface="Arial" panose="020B0604020202020204" pitchFamily="34" charset="0"/>
                 <a:cs typeface="Arial" panose="020B0604020202020204" pitchFamily="34" charset="0"/>
               </a:rPr>
-              <a:t>2. You are asked how likely this person is to smile back when receiving a smile</a:t>
+              <a:t>2. You are asked to smile or keep a neutral face and indicate that with a button press</a:t>
             </a:r>
           </a:p>
           <a:p>
@@ -5455,7 +5455,7 @@
                 <a:latin typeface="Arial" panose="020B0604020202020204" pitchFamily="34" charset="0"/>
                 <a:cs typeface="Arial" panose="020B0604020202020204" pitchFamily="34" charset="0"/>
               </a:rPr>
-              <a:t>3. You are asked to smile or keep a neutral face and indicate that with a button press</a:t>
+              <a:t>3. You smile or keep a neutral face</a:t>
             </a:r>
           </a:p>
           <a:p>
@@ -5472,24 +5472,7 @@
                 <a:latin typeface="Arial" panose="020B0604020202020204" pitchFamily="34" charset="0"/>
                 <a:cs typeface="Arial" panose="020B0604020202020204" pitchFamily="34" charset="0"/>
               </a:rPr>
-              <a:t>4. You smile or keep a neutral face</a:t>
-            </a:r>
-          </a:p>
-          <a:p>
-            <a:pPr>
-              <a:spcAft>
-                <a:spcPts val="1200"/>
-              </a:spcAft>
-            </a:pPr>
-            <a:r>
-              <a:rPr lang="en-CH" sz="2200" dirty="0">
-                <a:solidFill>
-                  <a:schemeClr val="bg1"/>
-                </a:solidFill>
-                <a:latin typeface="Arial" panose="020B0604020202020204" pitchFamily="34" charset="0"/>
-                <a:cs typeface="Arial" panose="020B0604020202020204" pitchFamily="34" charset="0"/>
-              </a:rPr>
-              <a:t>5. You then see the face smiling back at you or staying neutral</a:t>
+              <a:t>4. You then see the face smiling back at you or staying neutral</a:t>
             </a:r>
           </a:p>
           <a:p>
@@ -6135,7 +6118,7 @@
                 <a:latin typeface="Arial" panose="020B0604020202020204" pitchFamily="34" charset="0"/>
                 <a:cs typeface="Arial" panose="020B0604020202020204" pitchFamily="34" charset="0"/>
               </a:rPr>
-              <a:t>The task is going to take about 15 minutes. </a:t>
+              <a:t>The task is going to take about 10 minutes. </a:t>
             </a:r>
           </a:p>
         </p:txBody>

</xml_diff>

<commit_message>
changed task so that only one button press is needed
</commit_message>
<xml_diff>
--- a/task/stimuli/originals_SAP_Task.pptx
+++ b/task/stimuli/originals_SAP_Task.pptx
@@ -297,7 +297,7 @@
           <a:p>
             <a:fld id="{9B916260-F45C-B647-88A4-C91F6BA5DC4E}" type="datetimeFigureOut">
               <a:rPr lang="en-CH" smtClean="0"/>
-              <a:t>25.11.24</a:t>
+              <a:t>18.04.25</a:t>
             </a:fld>
             <a:endParaRPr lang="en-CH"/>
           </a:p>
@@ -497,7 +497,7 @@
           <a:p>
             <a:fld id="{9B916260-F45C-B647-88A4-C91F6BA5DC4E}" type="datetimeFigureOut">
               <a:rPr lang="en-CH" smtClean="0"/>
-              <a:t>25.11.24</a:t>
+              <a:t>18.04.25</a:t>
             </a:fld>
             <a:endParaRPr lang="en-CH"/>
           </a:p>
@@ -707,7 +707,7 @@
           <a:p>
             <a:fld id="{9B916260-F45C-B647-88A4-C91F6BA5DC4E}" type="datetimeFigureOut">
               <a:rPr lang="en-CH" smtClean="0"/>
-              <a:t>25.11.24</a:t>
+              <a:t>18.04.25</a:t>
             </a:fld>
             <a:endParaRPr lang="en-CH"/>
           </a:p>
@@ -907,7 +907,7 @@
           <a:p>
             <a:fld id="{9B916260-F45C-B647-88A4-C91F6BA5DC4E}" type="datetimeFigureOut">
               <a:rPr lang="en-CH" smtClean="0"/>
-              <a:t>25.11.24</a:t>
+              <a:t>18.04.25</a:t>
             </a:fld>
             <a:endParaRPr lang="en-CH"/>
           </a:p>
@@ -1183,7 +1183,7 @@
           <a:p>
             <a:fld id="{9B916260-F45C-B647-88A4-C91F6BA5DC4E}" type="datetimeFigureOut">
               <a:rPr lang="en-CH" smtClean="0"/>
-              <a:t>25.11.24</a:t>
+              <a:t>18.04.25</a:t>
             </a:fld>
             <a:endParaRPr lang="en-CH"/>
           </a:p>
@@ -1451,7 +1451,7 @@
           <a:p>
             <a:fld id="{9B916260-F45C-B647-88A4-C91F6BA5DC4E}" type="datetimeFigureOut">
               <a:rPr lang="en-CH" smtClean="0"/>
-              <a:t>25.11.24</a:t>
+              <a:t>18.04.25</a:t>
             </a:fld>
             <a:endParaRPr lang="en-CH"/>
           </a:p>
@@ -1866,7 +1866,7 @@
           <a:p>
             <a:fld id="{9B916260-F45C-B647-88A4-C91F6BA5DC4E}" type="datetimeFigureOut">
               <a:rPr lang="en-CH" smtClean="0"/>
-              <a:t>25.11.24</a:t>
+              <a:t>18.04.25</a:t>
             </a:fld>
             <a:endParaRPr lang="en-CH"/>
           </a:p>
@@ -2008,7 +2008,7 @@
           <a:p>
             <a:fld id="{9B916260-F45C-B647-88A4-C91F6BA5DC4E}" type="datetimeFigureOut">
               <a:rPr lang="en-CH" smtClean="0"/>
-              <a:t>25.11.24</a:t>
+              <a:t>18.04.25</a:t>
             </a:fld>
             <a:endParaRPr lang="en-CH"/>
           </a:p>
@@ -2121,7 +2121,7 @@
           <a:p>
             <a:fld id="{9B916260-F45C-B647-88A4-C91F6BA5DC4E}" type="datetimeFigureOut">
               <a:rPr lang="en-CH" smtClean="0"/>
-              <a:t>25.11.24</a:t>
+              <a:t>18.04.25</a:t>
             </a:fld>
             <a:endParaRPr lang="en-CH"/>
           </a:p>
@@ -2434,7 +2434,7 @@
           <a:p>
             <a:fld id="{9B916260-F45C-B647-88A4-C91F6BA5DC4E}" type="datetimeFigureOut">
               <a:rPr lang="en-CH" smtClean="0"/>
-              <a:t>25.11.24</a:t>
+              <a:t>18.04.25</a:t>
             </a:fld>
             <a:endParaRPr lang="en-CH"/>
           </a:p>
@@ -2723,7 +2723,7 @@
           <a:p>
             <a:fld id="{9B916260-F45C-B647-88A4-C91F6BA5DC4E}" type="datetimeFigureOut">
               <a:rPr lang="en-CH" smtClean="0"/>
-              <a:t>25.11.24</a:t>
+              <a:t>18.04.25</a:t>
             </a:fld>
             <a:endParaRPr lang="en-CH"/>
           </a:p>
@@ -2966,7 +2966,7 @@
           <a:p>
             <a:fld id="{9B916260-F45C-B647-88A4-C91F6BA5DC4E}" type="datetimeFigureOut">
               <a:rPr lang="en-CH" smtClean="0"/>
-              <a:t>25.11.24</a:t>
+              <a:t>18.04.25</a:t>
             </a:fld>
             <a:endParaRPr lang="en-CH"/>
           </a:p>
@@ -5328,7 +5328,7 @@
         <p:spPr>
           <a:xfrm>
             <a:off x="391886" y="130629"/>
-            <a:ext cx="11614067" cy="5170646"/>
+            <a:ext cx="11614067" cy="5663089"/>
           </a:xfrm>
           <a:prstGeom prst="rect">
             <a:avLst/>
@@ -5438,7 +5438,7 @@
                 <a:latin typeface="Arial" panose="020B0604020202020204" pitchFamily="34" charset="0"/>
                 <a:cs typeface="Arial" panose="020B0604020202020204" pitchFamily="34" charset="0"/>
               </a:rPr>
-              <a:t>2. You are asked to smile or keep a neutral face and indicate that with a button press</a:t>
+              <a:t>2. You are asked to decide if you want to smile at the face or not</a:t>
             </a:r>
           </a:p>
           <a:p>
@@ -5472,7 +5472,24 @@
                 <a:latin typeface="Arial" panose="020B0604020202020204" pitchFamily="34" charset="0"/>
                 <a:cs typeface="Arial" panose="020B0604020202020204" pitchFamily="34" charset="0"/>
               </a:rPr>
-              <a:t>4. You then see the face smiling back at you or staying neutral</a:t>
+              <a:t>4. You press a button when you are ready to stop the interaction</a:t>
+            </a:r>
+          </a:p>
+          <a:p>
+            <a:pPr>
+              <a:spcAft>
+                <a:spcPts val="1200"/>
+              </a:spcAft>
+            </a:pPr>
+            <a:r>
+              <a:rPr lang="en-CH" sz="2200" dirty="0">
+                <a:solidFill>
+                  <a:schemeClr val="bg1"/>
+                </a:solidFill>
+                <a:latin typeface="Arial" panose="020B0604020202020204" pitchFamily="34" charset="0"/>
+                <a:cs typeface="Arial" panose="020B0604020202020204" pitchFamily="34" charset="0"/>
+              </a:rPr>
+              <a:t>5. You then see the face smiling back at you or staying neutral</a:t>
             </a:r>
           </a:p>
           <a:p>

</xml_diff>

<commit_message>
fixed issue with timings not being aligned, fixxed issue with points slide and changed points targets, deleted redundant visuals
</commit_message>
<xml_diff>
--- a/task/stimuli/originals_SAP_Task.pptx
+++ b/task/stimuli/originals_SAP_Task.pptx
@@ -297,7 +297,7 @@
           <a:p>
             <a:fld id="{9B916260-F45C-B647-88A4-C91F6BA5DC4E}" type="datetimeFigureOut">
               <a:rPr lang="en-CH" smtClean="0"/>
-              <a:t>18.04.25</a:t>
+              <a:t>06.05.25</a:t>
             </a:fld>
             <a:endParaRPr lang="en-CH"/>
           </a:p>
@@ -497,7 +497,7 @@
           <a:p>
             <a:fld id="{9B916260-F45C-B647-88A4-C91F6BA5DC4E}" type="datetimeFigureOut">
               <a:rPr lang="en-CH" smtClean="0"/>
-              <a:t>18.04.25</a:t>
+              <a:t>06.05.25</a:t>
             </a:fld>
             <a:endParaRPr lang="en-CH"/>
           </a:p>
@@ -707,7 +707,7 @@
           <a:p>
             <a:fld id="{9B916260-F45C-B647-88A4-C91F6BA5DC4E}" type="datetimeFigureOut">
               <a:rPr lang="en-CH" smtClean="0"/>
-              <a:t>18.04.25</a:t>
+              <a:t>06.05.25</a:t>
             </a:fld>
             <a:endParaRPr lang="en-CH"/>
           </a:p>
@@ -907,7 +907,7 @@
           <a:p>
             <a:fld id="{9B916260-F45C-B647-88A4-C91F6BA5DC4E}" type="datetimeFigureOut">
               <a:rPr lang="en-CH" smtClean="0"/>
-              <a:t>18.04.25</a:t>
+              <a:t>06.05.25</a:t>
             </a:fld>
             <a:endParaRPr lang="en-CH"/>
           </a:p>
@@ -1183,7 +1183,7 @@
           <a:p>
             <a:fld id="{9B916260-F45C-B647-88A4-C91F6BA5DC4E}" type="datetimeFigureOut">
               <a:rPr lang="en-CH" smtClean="0"/>
-              <a:t>18.04.25</a:t>
+              <a:t>06.05.25</a:t>
             </a:fld>
             <a:endParaRPr lang="en-CH"/>
           </a:p>
@@ -1451,7 +1451,7 @@
           <a:p>
             <a:fld id="{9B916260-F45C-B647-88A4-C91F6BA5DC4E}" type="datetimeFigureOut">
               <a:rPr lang="en-CH" smtClean="0"/>
-              <a:t>18.04.25</a:t>
+              <a:t>06.05.25</a:t>
             </a:fld>
             <a:endParaRPr lang="en-CH"/>
           </a:p>
@@ -1866,7 +1866,7 @@
           <a:p>
             <a:fld id="{9B916260-F45C-B647-88A4-C91F6BA5DC4E}" type="datetimeFigureOut">
               <a:rPr lang="en-CH" smtClean="0"/>
-              <a:t>18.04.25</a:t>
+              <a:t>06.05.25</a:t>
             </a:fld>
             <a:endParaRPr lang="en-CH"/>
           </a:p>
@@ -2008,7 +2008,7 @@
           <a:p>
             <a:fld id="{9B916260-F45C-B647-88A4-C91F6BA5DC4E}" type="datetimeFigureOut">
               <a:rPr lang="en-CH" smtClean="0"/>
-              <a:t>18.04.25</a:t>
+              <a:t>06.05.25</a:t>
             </a:fld>
             <a:endParaRPr lang="en-CH"/>
           </a:p>
@@ -2121,7 +2121,7 @@
           <a:p>
             <a:fld id="{9B916260-F45C-B647-88A4-C91F6BA5DC4E}" type="datetimeFigureOut">
               <a:rPr lang="en-CH" smtClean="0"/>
-              <a:t>18.04.25</a:t>
+              <a:t>06.05.25</a:t>
             </a:fld>
             <a:endParaRPr lang="en-CH"/>
           </a:p>
@@ -2434,7 +2434,7 @@
           <a:p>
             <a:fld id="{9B916260-F45C-B647-88A4-C91F6BA5DC4E}" type="datetimeFigureOut">
               <a:rPr lang="en-CH" smtClean="0"/>
-              <a:t>18.04.25</a:t>
+              <a:t>06.05.25</a:t>
             </a:fld>
             <a:endParaRPr lang="en-CH"/>
           </a:p>
@@ -2723,7 +2723,7 @@
           <a:p>
             <a:fld id="{9B916260-F45C-B647-88A4-C91F6BA5DC4E}" type="datetimeFigureOut">
               <a:rPr lang="en-CH" smtClean="0"/>
-              <a:t>18.04.25</a:t>
+              <a:t>06.05.25</a:t>
             </a:fld>
             <a:endParaRPr lang="en-CH"/>
           </a:p>
@@ -2966,7 +2966,7 @@
           <a:p>
             <a:fld id="{9B916260-F45C-B647-88A4-C91F6BA5DC4E}" type="datetimeFigureOut">
               <a:rPr lang="en-CH" smtClean="0"/>
-              <a:t>18.04.25</a:t>
+              <a:t>06.05.25</a:t>
             </a:fld>
             <a:endParaRPr lang="en-CH"/>
           </a:p>
@@ -6793,7 +6793,7 @@
                 <a:latin typeface="Arial" panose="020B0604020202020204" pitchFamily="34" charset="0"/>
                 <a:cs typeface="Arial" panose="020B0604020202020204" pitchFamily="34" charset="0"/>
               </a:rPr>
-              <a:t>If you can reach 40 points across all tasks you will earn an additional 5$ on top of the participation reimbursement.</a:t>
+              <a:t>If you can reach 80 points across all tasks you will earn an additional 5$ on top of the participation reimbursement.</a:t>
             </a:r>
           </a:p>
           <a:p>
@@ -6814,7 +6814,7 @@
                 <a:latin typeface="Arial" panose="020B0604020202020204" pitchFamily="34" charset="0"/>
                 <a:cs typeface="Arial" panose="020B0604020202020204" pitchFamily="34" charset="0"/>
               </a:rPr>
-              <a:t>If you reach 80 points across all tasks you will earn an additional 5$ on top of the participation reimbursement and the 40-point bonus.</a:t>
+              <a:t>If you reach 160 points across all tasks you will earn an additional 5$ on top of the participation reimbursement and the 80-point bonus.</a:t>
             </a:r>
           </a:p>
           <a:p>

</xml_diff>

<commit_message>
fixed timing issues which were due to an error how missed trials were treated and added a fix to handling closing the serial port
</commit_message>
<xml_diff>
--- a/task/stimuli/originals_SAP_Task.pptx
+++ b/task/stimuli/originals_SAP_Task.pptx
@@ -297,7 +297,7 @@
           <a:p>
             <a:fld id="{9B916260-F45C-B647-88A4-C91F6BA5DC4E}" type="datetimeFigureOut">
               <a:rPr lang="en-CH" smtClean="0"/>
-              <a:t>06.05.25</a:t>
+              <a:t>08.05.25</a:t>
             </a:fld>
             <a:endParaRPr lang="en-CH"/>
           </a:p>
@@ -497,7 +497,7 @@
           <a:p>
             <a:fld id="{9B916260-F45C-B647-88A4-C91F6BA5DC4E}" type="datetimeFigureOut">
               <a:rPr lang="en-CH" smtClean="0"/>
-              <a:t>06.05.25</a:t>
+              <a:t>08.05.25</a:t>
             </a:fld>
             <a:endParaRPr lang="en-CH"/>
           </a:p>
@@ -707,7 +707,7 @@
           <a:p>
             <a:fld id="{9B916260-F45C-B647-88A4-C91F6BA5DC4E}" type="datetimeFigureOut">
               <a:rPr lang="en-CH" smtClean="0"/>
-              <a:t>06.05.25</a:t>
+              <a:t>08.05.25</a:t>
             </a:fld>
             <a:endParaRPr lang="en-CH"/>
           </a:p>
@@ -907,7 +907,7 @@
           <a:p>
             <a:fld id="{9B916260-F45C-B647-88A4-C91F6BA5DC4E}" type="datetimeFigureOut">
               <a:rPr lang="en-CH" smtClean="0"/>
-              <a:t>06.05.25</a:t>
+              <a:t>08.05.25</a:t>
             </a:fld>
             <a:endParaRPr lang="en-CH"/>
           </a:p>
@@ -1183,7 +1183,7 @@
           <a:p>
             <a:fld id="{9B916260-F45C-B647-88A4-C91F6BA5DC4E}" type="datetimeFigureOut">
               <a:rPr lang="en-CH" smtClean="0"/>
-              <a:t>06.05.25</a:t>
+              <a:t>08.05.25</a:t>
             </a:fld>
             <a:endParaRPr lang="en-CH"/>
           </a:p>
@@ -1451,7 +1451,7 @@
           <a:p>
             <a:fld id="{9B916260-F45C-B647-88A4-C91F6BA5DC4E}" type="datetimeFigureOut">
               <a:rPr lang="en-CH" smtClean="0"/>
-              <a:t>06.05.25</a:t>
+              <a:t>08.05.25</a:t>
             </a:fld>
             <a:endParaRPr lang="en-CH"/>
           </a:p>
@@ -1866,7 +1866,7 @@
           <a:p>
             <a:fld id="{9B916260-F45C-B647-88A4-C91F6BA5DC4E}" type="datetimeFigureOut">
               <a:rPr lang="en-CH" smtClean="0"/>
-              <a:t>06.05.25</a:t>
+              <a:t>08.05.25</a:t>
             </a:fld>
             <a:endParaRPr lang="en-CH"/>
           </a:p>
@@ -2008,7 +2008,7 @@
           <a:p>
             <a:fld id="{9B916260-F45C-B647-88A4-C91F6BA5DC4E}" type="datetimeFigureOut">
               <a:rPr lang="en-CH" smtClean="0"/>
-              <a:t>06.05.25</a:t>
+              <a:t>08.05.25</a:t>
             </a:fld>
             <a:endParaRPr lang="en-CH"/>
           </a:p>
@@ -2121,7 +2121,7 @@
           <a:p>
             <a:fld id="{9B916260-F45C-B647-88A4-C91F6BA5DC4E}" type="datetimeFigureOut">
               <a:rPr lang="en-CH" smtClean="0"/>
-              <a:t>06.05.25</a:t>
+              <a:t>08.05.25</a:t>
             </a:fld>
             <a:endParaRPr lang="en-CH"/>
           </a:p>
@@ -2434,7 +2434,7 @@
           <a:p>
             <a:fld id="{9B916260-F45C-B647-88A4-C91F6BA5DC4E}" type="datetimeFigureOut">
               <a:rPr lang="en-CH" smtClean="0"/>
-              <a:t>06.05.25</a:t>
+              <a:t>08.05.25</a:t>
             </a:fld>
             <a:endParaRPr lang="en-CH"/>
           </a:p>
@@ -2723,7 +2723,7 @@
           <a:p>
             <a:fld id="{9B916260-F45C-B647-88A4-C91F6BA5DC4E}" type="datetimeFigureOut">
               <a:rPr lang="en-CH" smtClean="0"/>
-              <a:t>06.05.25</a:t>
+              <a:t>08.05.25</a:t>
             </a:fld>
             <a:endParaRPr lang="en-CH"/>
           </a:p>
@@ -2966,7 +2966,7 @@
           <a:p>
             <a:fld id="{9B916260-F45C-B647-88A4-C91F6BA5DC4E}" type="datetimeFigureOut">
               <a:rPr lang="en-CH" smtClean="0"/>
-              <a:t>06.05.25</a:t>
+              <a:t>08.05.25</a:t>
             </a:fld>
             <a:endParaRPr lang="en-CH"/>
           </a:p>
@@ -6135,7 +6135,7 @@
                 <a:latin typeface="Arial" panose="020B0604020202020204" pitchFamily="34" charset="0"/>
                 <a:cs typeface="Arial" panose="020B0604020202020204" pitchFamily="34" charset="0"/>
               </a:rPr>
-              <a:t>The task is going to take about 10 minutes. </a:t>
+              <a:t>The task is going to take about 10-15 minutes. </a:t>
             </a:r>
           </a:p>
         </p:txBody>

</xml_diff>